<commit_message>
Updates for 08.17.22 COM AI workshop.
</commit_message>
<xml_diff>
--- a/presentations/01_py_intro.pptx
+++ b/presentations/01_py_intro.pptx
@@ -9,22 +9,22 @@
   </p:notesMasterIdLst>
   <p:sldIdLst>
     <p:sldId id="324" r:id="rId2"/>
-    <p:sldId id="266" r:id="rId3"/>
-    <p:sldId id="326" r:id="rId4"/>
-    <p:sldId id="304" r:id="rId5"/>
-    <p:sldId id="327" r:id="rId6"/>
-    <p:sldId id="323" r:id="rId7"/>
-    <p:sldId id="282" r:id="rId8"/>
-    <p:sldId id="277" r:id="rId9"/>
-    <p:sldId id="280" r:id="rId10"/>
-    <p:sldId id="278" r:id="rId11"/>
-    <p:sldId id="287" r:id="rId12"/>
-    <p:sldId id="296" r:id="rId13"/>
-    <p:sldId id="289" r:id="rId14"/>
-    <p:sldId id="293" r:id="rId15"/>
-    <p:sldId id="276" r:id="rId16"/>
-    <p:sldId id="325" r:id="rId17"/>
-    <p:sldId id="328" r:id="rId18"/>
+    <p:sldId id="325" r:id="rId3"/>
+    <p:sldId id="328" r:id="rId4"/>
+    <p:sldId id="266" r:id="rId5"/>
+    <p:sldId id="326" r:id="rId6"/>
+    <p:sldId id="304" r:id="rId7"/>
+    <p:sldId id="327" r:id="rId8"/>
+    <p:sldId id="323" r:id="rId9"/>
+    <p:sldId id="282" r:id="rId10"/>
+    <p:sldId id="277" r:id="rId11"/>
+    <p:sldId id="280" r:id="rId12"/>
+    <p:sldId id="278" r:id="rId13"/>
+    <p:sldId id="287" r:id="rId14"/>
+    <p:sldId id="296" r:id="rId15"/>
+    <p:sldId id="289" r:id="rId16"/>
+    <p:sldId id="293" r:id="rId17"/>
+    <p:sldId id="276" r:id="rId18"/>
   </p:sldIdLst>
   <p:sldSz cx="12192000" cy="6858000"/>
   <p:notesSz cx="6858000" cy="9144000"/>
@@ -643,7 +643,10 @@
               <a:tabLst/>
               <a:defRPr/>
             </a:pPr>
-            <a:endParaRPr lang="en-US" dirty="0"/>
+            <a:r>
+              <a:rPr lang="en-US" dirty="0"/>
+              <a:t>Adam naming the animals in the Biblical story.  Variable naming and standards are critically important.</a:t>
+            </a:r>
           </a:p>
         </p:txBody>
       </p:sp>
@@ -664,7 +667,7 @@
           <a:p>
             <a:fld id="{3148858F-F1DB-4027-9C85-CCA6849540DD}" type="slidenum">
               <a:rPr lang="en-US" smtClean="0"/>
-              <a:t>10</a:t>
+              <a:t>11</a:t>
             </a:fld>
             <a:endParaRPr lang="en-US"/>
           </a:p>
@@ -673,7 +676,7 @@
     </p:spTree>
     <p:extLst>
       <p:ext uri="{BB962C8B-B14F-4D97-AF65-F5344CB8AC3E}">
-        <p14:creationId xmlns:p14="http://schemas.microsoft.com/office/powerpoint/2010/main" val="4054386845"/>
+        <p14:creationId xmlns:p14="http://schemas.microsoft.com/office/powerpoint/2010/main" val="828379136"/>
       </p:ext>
     </p:extLst>
   </p:cSld>
@@ -765,7 +768,7 @@
           <a:p>
             <a:fld id="{3148858F-F1DB-4027-9C85-CCA6849540DD}" type="slidenum">
               <a:rPr lang="en-US" smtClean="0"/>
-              <a:t>11</a:t>
+              <a:t>12</a:t>
             </a:fld>
             <a:endParaRPr lang="en-US"/>
           </a:p>
@@ -774,7 +777,7 @@
     </p:spTree>
     <p:extLst>
       <p:ext uri="{BB962C8B-B14F-4D97-AF65-F5344CB8AC3E}">
-        <p14:creationId xmlns:p14="http://schemas.microsoft.com/office/powerpoint/2010/main" val="2996454508"/>
+        <p14:creationId xmlns:p14="http://schemas.microsoft.com/office/powerpoint/2010/main" val="4054386845"/>
       </p:ext>
     </p:extLst>
   </p:cSld>
@@ -866,7 +869,7 @@
           <a:p>
             <a:fld id="{3148858F-F1DB-4027-9C85-CCA6849540DD}" type="slidenum">
               <a:rPr lang="en-US" smtClean="0"/>
-              <a:t>12</a:t>
+              <a:t>13</a:t>
             </a:fld>
             <a:endParaRPr lang="en-US"/>
           </a:p>
@@ -875,7 +878,7 @@
     </p:spTree>
     <p:extLst>
       <p:ext uri="{BB962C8B-B14F-4D97-AF65-F5344CB8AC3E}">
-        <p14:creationId xmlns:p14="http://schemas.microsoft.com/office/powerpoint/2010/main" val="30799508"/>
+        <p14:creationId xmlns:p14="http://schemas.microsoft.com/office/powerpoint/2010/main" val="2996454508"/>
       </p:ext>
     </p:extLst>
   </p:cSld>
@@ -967,7 +970,7 @@
           <a:p>
             <a:fld id="{3148858F-F1DB-4027-9C85-CCA6849540DD}" type="slidenum">
               <a:rPr lang="en-US" smtClean="0"/>
-              <a:t>13</a:t>
+              <a:t>14</a:t>
             </a:fld>
             <a:endParaRPr lang="en-US"/>
           </a:p>
@@ -976,7 +979,7 @@
     </p:spTree>
     <p:extLst>
       <p:ext uri="{BB962C8B-B14F-4D97-AF65-F5344CB8AC3E}">
-        <p14:creationId xmlns:p14="http://schemas.microsoft.com/office/powerpoint/2010/main" val="555085068"/>
+        <p14:creationId xmlns:p14="http://schemas.microsoft.com/office/powerpoint/2010/main" val="30799508"/>
       </p:ext>
     </p:extLst>
   </p:cSld>
@@ -1068,7 +1071,7 @@
           <a:p>
             <a:fld id="{3148858F-F1DB-4027-9C85-CCA6849540DD}" type="slidenum">
               <a:rPr lang="en-US" smtClean="0"/>
-              <a:t>14</a:t>
+              <a:t>15</a:t>
             </a:fld>
             <a:endParaRPr lang="en-US"/>
           </a:p>
@@ -1077,7 +1080,7 @@
     </p:spTree>
     <p:extLst>
       <p:ext uri="{BB962C8B-B14F-4D97-AF65-F5344CB8AC3E}">
-        <p14:creationId xmlns:p14="http://schemas.microsoft.com/office/powerpoint/2010/main" val="651591465"/>
+        <p14:creationId xmlns:p14="http://schemas.microsoft.com/office/powerpoint/2010/main" val="555085068"/>
       </p:ext>
     </p:extLst>
   </p:cSld>
@@ -1148,10 +1151,7 @@
               <a:tabLst/>
               <a:defRPr/>
             </a:pPr>
-            <a:r>
-              <a:rPr lang="en-US" dirty="0"/>
-              <a:t>Interpreted languages are much slower than compiled languages.  When performance matters, an interpreted language may not be the best solution.  If that’s the case with you, Nvidia provides the Cuda development environment which supports the C and C++ languages.  These are compiled languages as opposed to interpreted. </a:t>
-            </a:r>
+            <a:endParaRPr lang="en-US" dirty="0"/>
           </a:p>
         </p:txBody>
       </p:sp>
@@ -1172,7 +1172,7 @@
           <a:p>
             <a:fld id="{3148858F-F1DB-4027-9C85-CCA6849540DD}" type="slidenum">
               <a:rPr lang="en-US" smtClean="0"/>
-              <a:t>15</a:t>
+              <a:t>16</a:t>
             </a:fld>
             <a:endParaRPr lang="en-US"/>
           </a:p>
@@ -1181,7 +1181,7 @@
     </p:spTree>
     <p:extLst>
       <p:ext uri="{BB962C8B-B14F-4D97-AF65-F5344CB8AC3E}">
-        <p14:creationId xmlns:p14="http://schemas.microsoft.com/office/powerpoint/2010/main" val="4129922841"/>
+        <p14:creationId xmlns:p14="http://schemas.microsoft.com/office/powerpoint/2010/main" val="651591465"/>
       </p:ext>
     </p:extLst>
   </p:cSld>
@@ -1235,7 +1235,27 @@
           <a:bodyPr/>
           <a:lstStyle/>
           <a:p>
-            <a:endParaRPr lang="en-US" dirty="0"/>
+            <a:pPr marL="0" marR="0" lvl="0" indent="0" algn="l" defTabSz="914400" rtl="0" eaLnBrk="1" fontAlgn="auto" latinLnBrk="0" hangingPunct="1">
+              <a:lnSpc>
+                <a:spcPct val="100000"/>
+              </a:lnSpc>
+              <a:spcBef>
+                <a:spcPts val="0"/>
+              </a:spcBef>
+              <a:spcAft>
+                <a:spcPts val="0"/>
+              </a:spcAft>
+              <a:buClrTx/>
+              <a:buSzTx/>
+              <a:buFontTx/>
+              <a:buNone/>
+              <a:tabLst/>
+              <a:defRPr/>
+            </a:pPr>
+            <a:r>
+              <a:rPr lang="en-US" dirty="0"/>
+              <a:t>Interpreted languages are much slower than compiled languages.  When performance matters, an interpreted language may not be the best solution.  If that’s the case with you, Nvidia provides the Cuda development environment which supports the C and C++ languages.  These are compiled languages as opposed to interpreted. </a:t>
+            </a:r>
           </a:p>
         </p:txBody>
       </p:sp>
@@ -1256,7 +1276,7 @@
           <a:p>
             <a:fld id="{3148858F-F1DB-4027-9C85-CCA6849540DD}" type="slidenum">
               <a:rPr lang="en-US" smtClean="0"/>
-              <a:t>16</a:t>
+              <a:t>17</a:t>
             </a:fld>
             <a:endParaRPr lang="en-US"/>
           </a:p>
@@ -1265,7 +1285,7 @@
     </p:spTree>
     <p:extLst>
       <p:ext uri="{BB962C8B-B14F-4D97-AF65-F5344CB8AC3E}">
-        <p14:creationId xmlns:p14="http://schemas.microsoft.com/office/powerpoint/2010/main" val="2558055240"/>
+        <p14:creationId xmlns:p14="http://schemas.microsoft.com/office/powerpoint/2010/main" val="4129922841"/>
       </p:ext>
     </p:extLst>
   </p:cSld>
@@ -1319,12 +1339,6 @@
           <a:bodyPr/>
           <a:lstStyle/>
           <a:p>
-            <a:r>
-              <a:rPr lang="en-US" dirty="0"/>
-              <a:t>The learning objectives for each Python session can be found here: https://github.com/PracticumAI/python</a:t>
-            </a:r>
-          </a:p>
-          <a:p>
             <a:endParaRPr lang="en-US" dirty="0"/>
           </a:p>
         </p:txBody>
@@ -1355,7 +1369,7 @@
     </p:spTree>
     <p:extLst>
       <p:ext uri="{BB962C8B-B14F-4D97-AF65-F5344CB8AC3E}">
-        <p14:creationId xmlns:p14="http://schemas.microsoft.com/office/powerpoint/2010/main" val="1207792633"/>
+        <p14:creationId xmlns:p14="http://schemas.microsoft.com/office/powerpoint/2010/main" val="2558055240"/>
       </p:ext>
     </p:extLst>
   </p:cSld>
@@ -1409,6 +1423,12 @@
           <a:bodyPr/>
           <a:lstStyle/>
           <a:p>
+            <a:r>
+              <a:rPr lang="en-US" dirty="0"/>
+              <a:t>The learning objectives for each Python session can be found here: https://github.com/PracticumAI/python</a:t>
+            </a:r>
+          </a:p>
+          <a:p>
             <a:endParaRPr lang="en-US" dirty="0"/>
           </a:p>
         </p:txBody>
@@ -1430,7 +1450,7 @@
           <a:p>
             <a:fld id="{3148858F-F1DB-4027-9C85-CCA6849540DD}" type="slidenum">
               <a:rPr lang="en-US" smtClean="0"/>
-              <a:t>3</a:t>
+              <a:t>4</a:t>
             </a:fld>
             <a:endParaRPr lang="en-US"/>
           </a:p>
@@ -1439,7 +1459,7 @@
     </p:spTree>
     <p:extLst>
       <p:ext uri="{BB962C8B-B14F-4D97-AF65-F5344CB8AC3E}">
-        <p14:creationId xmlns:p14="http://schemas.microsoft.com/office/powerpoint/2010/main" val="1218542571"/>
+        <p14:creationId xmlns:p14="http://schemas.microsoft.com/office/powerpoint/2010/main" val="1207792633"/>
       </p:ext>
     </p:extLst>
   </p:cSld>
@@ -1493,945 +1513,6 @@
           <a:bodyPr/>
           <a:lstStyle/>
           <a:p>
-            <a:pPr marL="342900" marR="0" lvl="0" indent="-342900" algn="l" defTabSz="914400" rtl="0" eaLnBrk="1" fontAlgn="auto" latinLnBrk="0" hangingPunct="1">
-              <a:lnSpc>
-                <a:spcPct val="100000"/>
-              </a:lnSpc>
-              <a:spcBef>
-                <a:spcPts val="0"/>
-              </a:spcBef>
-              <a:spcAft>
-                <a:spcPts val="0"/>
-              </a:spcAft>
-              <a:buClrTx/>
-              <a:buSzTx/>
-              <a:buFontTx/>
-              <a:buAutoNum type="arabicPeriod"/>
-              <a:tabLst/>
-              <a:defRPr/>
-            </a:pPr>
-            <a:r>
-              <a:rPr lang="en-US" sz="1100" b="1" dirty="0">
-                <a:solidFill>
-                  <a:srgbClr val="24292F"/>
-                </a:solidFill>
-                <a:effectLst>
-                  <a:outerShdw blurRad="38100" dist="38100" dir="2700000" algn="tl">
-                    <a:srgbClr val="000000">
-                      <a:alpha val="43137"/>
-                    </a:srgbClr>
-                  </a:outerShdw>
-                </a:effectLst>
-                <a:latin typeface="+mn-lt"/>
-                <a:ea typeface="Times New Roman" panose="02020603050405020304" pitchFamily="18" charset="0"/>
-              </a:rPr>
-              <a:t>Focus</a:t>
-            </a:r>
-          </a:p>
-          <a:p>
-            <a:pPr marL="800100" marR="0" lvl="1" indent="-342900" algn="l" defTabSz="914400" rtl="0" eaLnBrk="1" fontAlgn="auto" latinLnBrk="0" hangingPunct="1">
-              <a:lnSpc>
-                <a:spcPct val="100000"/>
-              </a:lnSpc>
-              <a:spcBef>
-                <a:spcPts val="0"/>
-              </a:spcBef>
-              <a:spcAft>
-                <a:spcPts val="0"/>
-              </a:spcAft>
-              <a:buClrTx/>
-              <a:buSzTx/>
-              <a:buFont typeface="Courier New" panose="02070309020205020404" pitchFamily="49" charset="0"/>
-              <a:buChar char="o"/>
-              <a:tabLst/>
-              <a:defRPr/>
-            </a:pPr>
-            <a:r>
-              <a:rPr lang="en-US" sz="1100" dirty="0">
-                <a:solidFill>
-                  <a:srgbClr val="24292F"/>
-                </a:solidFill>
-                <a:effectLst/>
-                <a:latin typeface="+mn-lt"/>
-                <a:ea typeface="Times New Roman" panose="02020603050405020304" pitchFamily="18" charset="0"/>
-              </a:rPr>
-              <a:t>So often, students think they can learn AI programming while multi-tasking on Facebook or texting friends on their cell phone. After programming for 30 years, I've learned one thing. You'll learn AI much faster if you can devote focused, uninterrupted time to practice.</a:t>
-            </a:r>
-          </a:p>
-          <a:p>
-            <a:pPr marL="342900" marR="0" lvl="0" indent="-342900" algn="l" defTabSz="914400" rtl="0" eaLnBrk="1" fontAlgn="auto" latinLnBrk="0" hangingPunct="1">
-              <a:lnSpc>
-                <a:spcPct val="100000"/>
-              </a:lnSpc>
-              <a:spcBef>
-                <a:spcPts val="0"/>
-              </a:spcBef>
-              <a:spcAft>
-                <a:spcPts val="0"/>
-              </a:spcAft>
-              <a:buClrTx/>
-              <a:buSzTx/>
-              <a:buFontTx/>
-              <a:buAutoNum type="arabicPeriod"/>
-              <a:tabLst/>
-              <a:defRPr/>
-            </a:pPr>
-            <a:r>
-              <a:rPr lang="en-US" sz="1100" b="1" dirty="0">
-                <a:effectLst/>
-                <a:latin typeface="+mn-lt"/>
-                <a:ea typeface="Calibri" panose="020F0502020204030204" pitchFamily="34" charset="0"/>
-                <a:cs typeface="LMRoman12-Bold"/>
-              </a:rPr>
-              <a:t>Avoid the “copy and paste” approach to writing code</a:t>
-            </a:r>
-          </a:p>
-          <a:p>
-            <a:pPr marL="800100" marR="0" lvl="1" indent="-342900" algn="l" defTabSz="914400" rtl="0" eaLnBrk="1" fontAlgn="auto" latinLnBrk="0" hangingPunct="1">
-              <a:lnSpc>
-                <a:spcPct val="100000"/>
-              </a:lnSpc>
-              <a:spcBef>
-                <a:spcPts val="0"/>
-              </a:spcBef>
-              <a:spcAft>
-                <a:spcPts val="0"/>
-              </a:spcAft>
-              <a:buClrTx/>
-              <a:buSzTx/>
-              <a:buFont typeface="Courier New" panose="02070309020205020404" pitchFamily="49" charset="0"/>
-              <a:buChar char="o"/>
-              <a:tabLst/>
-              <a:defRPr/>
-            </a:pPr>
-            <a:r>
-              <a:rPr lang="en-US" sz="1100" dirty="0">
-                <a:effectLst/>
-                <a:latin typeface="+mn-lt"/>
-                <a:ea typeface="Calibri" panose="020F0502020204030204" pitchFamily="34" charset="0"/>
-                <a:cs typeface="LMRoman10-Regular"/>
-              </a:rPr>
-              <a:t>Although copying and pasting may help you to avoid typing errors, it can also interfere with your learning</a:t>
-            </a:r>
-            <a:r>
-              <a:rPr lang="en-US" sz="1100" dirty="0">
-                <a:effectLst/>
-                <a:latin typeface="+mn-lt"/>
-                <a:ea typeface="Calibri" panose="020F0502020204030204" pitchFamily="34" charset="0"/>
-                <a:cs typeface="Times New Roman" panose="02020603050405020304" pitchFamily="18" charset="0"/>
-              </a:rPr>
-              <a:t> </a:t>
-            </a:r>
-            <a:r>
-              <a:rPr lang="en-US" sz="1100" dirty="0">
-                <a:effectLst/>
-                <a:latin typeface="+mn-lt"/>
-                <a:ea typeface="Calibri" panose="020F0502020204030204" pitchFamily="34" charset="0"/>
-                <a:cs typeface="LMRoman10-Regular"/>
-              </a:rPr>
-              <a:t>process for two reasons:</a:t>
-            </a:r>
-          </a:p>
-          <a:p>
-            <a:pPr marL="1257300" marR="0" lvl="2" indent="-342900" algn="l" defTabSz="914400" rtl="0" eaLnBrk="1" fontAlgn="auto" latinLnBrk="0" hangingPunct="1">
-              <a:lnSpc>
-                <a:spcPct val="100000"/>
-              </a:lnSpc>
-              <a:spcBef>
-                <a:spcPts val="0"/>
-              </a:spcBef>
-              <a:spcAft>
-                <a:spcPts val="0"/>
-              </a:spcAft>
-              <a:buClrTx/>
-              <a:buSzTx/>
-              <a:buFont typeface="Courier New" panose="02070309020205020404" pitchFamily="49" charset="0"/>
-              <a:buChar char="o"/>
-              <a:tabLst/>
-              <a:defRPr/>
-            </a:pPr>
-            <a:r>
-              <a:rPr lang="en-US" sz="1100" dirty="0">
-                <a:effectLst/>
-                <a:latin typeface="+mn-lt"/>
-                <a:ea typeface="Calibri" panose="020F0502020204030204" pitchFamily="34" charset="0"/>
-                <a:cs typeface="Times New Roman" panose="02020603050405020304" pitchFamily="18" charset="0"/>
-              </a:rPr>
-              <a:t>Typing </a:t>
-            </a:r>
-            <a:r>
-              <a:rPr lang="en-US" sz="1100" dirty="0">
-                <a:effectLst/>
-                <a:latin typeface="+mn-lt"/>
-                <a:ea typeface="Calibri" panose="020F0502020204030204" pitchFamily="34" charset="0"/>
-                <a:cs typeface="LMRoman10-Regular"/>
-              </a:rPr>
-              <a:t>errors can help you gain experience in writing code it provides informative feedback when you</a:t>
-            </a:r>
-            <a:r>
-              <a:rPr lang="en-US" sz="1100" dirty="0">
-                <a:effectLst/>
-                <a:latin typeface="+mn-lt"/>
-                <a:ea typeface="Calibri" panose="020F0502020204030204" pitchFamily="34" charset="0"/>
-                <a:cs typeface="Times New Roman" panose="02020603050405020304" pitchFamily="18" charset="0"/>
-              </a:rPr>
-              <a:t> </a:t>
-            </a:r>
-            <a:r>
-              <a:rPr lang="en-US" sz="1100" dirty="0">
-                <a:effectLst/>
-                <a:latin typeface="+mn-lt"/>
-                <a:ea typeface="Calibri" panose="020F0502020204030204" pitchFamily="34" charset="0"/>
-                <a:cs typeface="LMRoman10-Regular"/>
-              </a:rPr>
-              <a:t>make mistakes. Making and correcting typing errors is an important skill to develop, particularly</a:t>
-            </a:r>
-            <a:r>
-              <a:rPr lang="en-US" sz="1100" dirty="0">
-                <a:effectLst/>
-                <a:latin typeface="+mn-lt"/>
-                <a:ea typeface="Calibri" panose="020F0502020204030204" pitchFamily="34" charset="0"/>
-                <a:cs typeface="Times New Roman" panose="02020603050405020304" pitchFamily="18" charset="0"/>
-              </a:rPr>
-              <a:t> </a:t>
-            </a:r>
-            <a:r>
-              <a:rPr lang="en-US" sz="1100" dirty="0">
-                <a:effectLst/>
-                <a:latin typeface="+mn-lt"/>
-                <a:ea typeface="Calibri" panose="020F0502020204030204" pitchFamily="34" charset="0"/>
-                <a:cs typeface="LMRoman10-Regular"/>
-              </a:rPr>
-              <a:t>when you are typing a lot of code for your own data analysis.</a:t>
-            </a:r>
-          </a:p>
-          <a:p>
-            <a:pPr marL="1257300" marR="0" lvl="2" indent="-342900" algn="l" defTabSz="914400" rtl="0" eaLnBrk="1" fontAlgn="auto" latinLnBrk="0" hangingPunct="1">
-              <a:lnSpc>
-                <a:spcPct val="100000"/>
-              </a:lnSpc>
-              <a:spcBef>
-                <a:spcPts val="0"/>
-              </a:spcBef>
-              <a:spcAft>
-                <a:spcPts val="0"/>
-              </a:spcAft>
-              <a:buClrTx/>
-              <a:buSzTx/>
-              <a:buFont typeface="Courier New" panose="02070309020205020404" pitchFamily="49" charset="0"/>
-              <a:buChar char="o"/>
-              <a:tabLst/>
-              <a:defRPr/>
-            </a:pPr>
-            <a:r>
-              <a:rPr lang="en-US" sz="1100" dirty="0">
-                <a:effectLst/>
-                <a:latin typeface="+mn-lt"/>
-                <a:ea typeface="Calibri" panose="020F0502020204030204" pitchFamily="34" charset="0"/>
-                <a:cs typeface="Times New Roman" panose="02020603050405020304" pitchFamily="18" charset="0"/>
-              </a:rPr>
-              <a:t>Copying </a:t>
-            </a:r>
-            <a:r>
-              <a:rPr lang="en-US" sz="1100" dirty="0">
-                <a:effectLst/>
-                <a:latin typeface="+mn-lt"/>
-                <a:ea typeface="Calibri" panose="020F0502020204030204" pitchFamily="34" charset="0"/>
-                <a:cs typeface="LMRoman10-Regular"/>
-              </a:rPr>
-              <a:t>and pasting code may give you the impression that you know what you are doing when – in reality – you probably do not fully understand what the individual blocks of code are actually doing.</a:t>
-            </a:r>
-            <a:r>
-              <a:rPr lang="en-US" sz="1100" dirty="0">
-                <a:effectLst/>
-                <a:latin typeface="+mn-lt"/>
-                <a:ea typeface="Calibri" panose="020F0502020204030204" pitchFamily="34" charset="0"/>
-                <a:cs typeface="Times New Roman" panose="02020603050405020304" pitchFamily="18" charset="0"/>
-              </a:rPr>
-              <a:t> </a:t>
-            </a:r>
-            <a:r>
-              <a:rPr lang="en-US" sz="1100" dirty="0">
-                <a:effectLst/>
-                <a:latin typeface="+mn-lt"/>
-                <a:ea typeface="Calibri" panose="020F0502020204030204" pitchFamily="34" charset="0"/>
-                <a:cs typeface="LMRoman10-Regular"/>
-              </a:rPr>
-              <a:t>Furthermore, this problem will just get worse as you deal with increasingly longer and more complicated</a:t>
-            </a:r>
-            <a:r>
-              <a:rPr lang="en-US" sz="1100" dirty="0">
-                <a:effectLst/>
-                <a:latin typeface="+mn-lt"/>
-                <a:ea typeface="Calibri" panose="020F0502020204030204" pitchFamily="34" charset="0"/>
-                <a:cs typeface="Times New Roman" panose="02020603050405020304" pitchFamily="18" charset="0"/>
-              </a:rPr>
-              <a:t> s</a:t>
-            </a:r>
-            <a:r>
-              <a:rPr lang="en-US" sz="1100" dirty="0">
-                <a:effectLst/>
-                <a:latin typeface="+mn-lt"/>
-                <a:ea typeface="Calibri" panose="020F0502020204030204" pitchFamily="34" charset="0"/>
-                <a:cs typeface="LMRoman10-Regular"/>
-              </a:rPr>
-              <a:t>cripts.</a:t>
-            </a:r>
-          </a:p>
-          <a:p>
-            <a:pPr marL="342900" marR="0" lvl="0" indent="-342900" algn="l" defTabSz="914400" rtl="0" eaLnBrk="1" fontAlgn="auto" latinLnBrk="0" hangingPunct="1">
-              <a:lnSpc>
-                <a:spcPct val="100000"/>
-              </a:lnSpc>
-              <a:spcBef>
-                <a:spcPts val="0"/>
-              </a:spcBef>
-              <a:spcAft>
-                <a:spcPts val="0"/>
-              </a:spcAft>
-              <a:buClrTx/>
-              <a:buSzTx/>
-              <a:buFont typeface="+mj-lt"/>
-              <a:buAutoNum type="arabicPeriod"/>
-              <a:tabLst/>
-              <a:defRPr/>
-            </a:pPr>
-            <a:r>
-              <a:rPr lang="en-US" sz="1100" b="1" dirty="0">
-                <a:effectLst/>
-                <a:latin typeface="+mn-lt"/>
-                <a:ea typeface="Calibri" panose="020F0502020204030204" pitchFamily="34" charset="0"/>
-                <a:cs typeface="LMRoman12-Bold"/>
-              </a:rPr>
-              <a:t>Study code block-by-block, line-by-line</a:t>
-            </a:r>
-          </a:p>
-          <a:p>
-            <a:pPr marL="800100" marR="0" lvl="1" indent="-342900" algn="l" defTabSz="914400" rtl="0" eaLnBrk="1" fontAlgn="auto" latinLnBrk="0" hangingPunct="1">
-              <a:lnSpc>
-                <a:spcPct val="100000"/>
-              </a:lnSpc>
-              <a:spcBef>
-                <a:spcPts val="0"/>
-              </a:spcBef>
-              <a:spcAft>
-                <a:spcPts val="0"/>
-              </a:spcAft>
-              <a:buClrTx/>
-              <a:buSzTx/>
-              <a:buFont typeface="Courier New" panose="02070309020205020404" pitchFamily="49" charset="0"/>
-              <a:buChar char="o"/>
-              <a:tabLst/>
-              <a:defRPr/>
-            </a:pPr>
-            <a:r>
-              <a:rPr lang="en-US" sz="1100" dirty="0">
-                <a:effectLst/>
-                <a:latin typeface="+mn-lt"/>
-                <a:ea typeface="Calibri" panose="020F0502020204030204" pitchFamily="34" charset="0"/>
-                <a:cs typeface="LMRoman10-Regular"/>
-              </a:rPr>
-              <a:t>This means running one block of code at a time and making sure that you understand why the output is what</a:t>
-            </a:r>
-            <a:r>
-              <a:rPr lang="en-US" sz="1100" dirty="0">
-                <a:effectLst/>
-                <a:latin typeface="+mn-lt"/>
-                <a:ea typeface="Calibri" panose="020F0502020204030204" pitchFamily="34" charset="0"/>
-                <a:cs typeface="Times New Roman" panose="02020603050405020304" pitchFamily="18" charset="0"/>
-              </a:rPr>
-              <a:t> </a:t>
-            </a:r>
-            <a:r>
-              <a:rPr lang="en-US" sz="1100" dirty="0">
-                <a:effectLst/>
-                <a:latin typeface="+mn-lt"/>
-                <a:ea typeface="Calibri" panose="020F0502020204030204" pitchFamily="34" charset="0"/>
-                <a:cs typeface="LMRoman10-Regular"/>
-              </a:rPr>
-              <a:t>it is. If things are not clear, it is important to spend more time with that piece of the code. Here are some</a:t>
-            </a:r>
-            <a:r>
-              <a:rPr lang="en-US" sz="1100" dirty="0">
-                <a:effectLst/>
-                <a:latin typeface="+mn-lt"/>
-                <a:ea typeface="Calibri" panose="020F0502020204030204" pitchFamily="34" charset="0"/>
-                <a:cs typeface="Times New Roman" panose="02020603050405020304" pitchFamily="18" charset="0"/>
-              </a:rPr>
-              <a:t> </a:t>
-            </a:r>
-            <a:r>
-              <a:rPr lang="en-US" sz="1100" dirty="0">
-                <a:effectLst/>
-                <a:latin typeface="+mn-lt"/>
-                <a:ea typeface="Calibri" panose="020F0502020204030204" pitchFamily="34" charset="0"/>
-                <a:cs typeface="LMRoman10-Regular"/>
-              </a:rPr>
-              <a:t>tricks that are often helpful to understand a particular piece of code:</a:t>
-            </a:r>
-          </a:p>
-          <a:p>
-            <a:pPr marL="1257300" marR="0" lvl="2" indent="-342900" algn="l" defTabSz="914400" rtl="0" eaLnBrk="1" fontAlgn="auto" latinLnBrk="0" hangingPunct="1">
-              <a:lnSpc>
-                <a:spcPct val="100000"/>
-              </a:lnSpc>
-              <a:spcBef>
-                <a:spcPts val="0"/>
-              </a:spcBef>
-              <a:spcAft>
-                <a:spcPts val="0"/>
-              </a:spcAft>
-              <a:buClrTx/>
-              <a:buSzTx/>
-              <a:buFont typeface="Courier New" panose="02070309020205020404" pitchFamily="49" charset="0"/>
-              <a:buChar char="o"/>
-              <a:tabLst/>
-              <a:defRPr/>
-            </a:pPr>
-            <a:r>
-              <a:rPr lang="en-US" sz="1100" dirty="0">
-                <a:effectLst/>
-                <a:latin typeface="+mn-lt"/>
-                <a:ea typeface="Calibri" panose="020F0502020204030204" pitchFamily="34" charset="0"/>
-                <a:cs typeface="LMRoman10-Regular"/>
-              </a:rPr>
-              <a:t>Break a line of code into its components and try to understand the individual pieces.  Sometimes functions are nested within functions.</a:t>
-            </a:r>
-            <a:endParaRPr lang="en-US" sz="1100" dirty="0">
-              <a:effectLst/>
-              <a:latin typeface="+mn-lt"/>
-              <a:ea typeface="Calibri" panose="020F0502020204030204" pitchFamily="34" charset="0"/>
-              <a:cs typeface="Times New Roman" panose="02020603050405020304" pitchFamily="18" charset="0"/>
-            </a:endParaRPr>
-          </a:p>
-          <a:p>
-            <a:pPr marL="1257300" marR="0" lvl="2" indent="-342900" algn="l" defTabSz="914400" rtl="0" eaLnBrk="1" fontAlgn="auto" latinLnBrk="0" hangingPunct="1">
-              <a:lnSpc>
-                <a:spcPct val="100000"/>
-              </a:lnSpc>
-              <a:spcBef>
-                <a:spcPts val="0"/>
-              </a:spcBef>
-              <a:spcAft>
-                <a:spcPts val="0"/>
-              </a:spcAft>
-              <a:buClrTx/>
-              <a:buSzTx/>
-              <a:buFont typeface="Courier New" panose="02070309020205020404" pitchFamily="49" charset="0"/>
-              <a:buChar char="o"/>
-              <a:tabLst/>
-              <a:defRPr/>
-            </a:pPr>
-            <a:r>
-              <a:rPr lang="en-US" sz="1100" dirty="0">
-                <a:effectLst/>
-                <a:latin typeface="+mn-lt"/>
-                <a:ea typeface="Calibri" panose="020F0502020204030204" pitchFamily="34" charset="0"/>
-                <a:cs typeface="LMRoman10-Regular"/>
-              </a:rPr>
-              <a:t>Document what each block is doing. Clear documentation is critical as you may not remember what you did when you come back to a piece of code at some point in the future. As a wise programmer once said, “Write code for the future you.” Documentation is also useful when you want to adapt or reuse code in some other way. In situations like this, you will immediately know what a specific chunk of code does because it has been clearly documented.  </a:t>
-            </a:r>
-            <a:r>
-              <a:rPr lang="en-US" sz="1100" b="1" dirty="0">
-                <a:solidFill>
-                  <a:schemeClr val="tx1">
-                    <a:lumMod val="75000"/>
-                    <a:lumOff val="25000"/>
-                  </a:schemeClr>
-                </a:solidFill>
-                <a:effectLst/>
-                <a:latin typeface="+mn-lt"/>
-                <a:ea typeface="Calibri" panose="020F0502020204030204" pitchFamily="34" charset="0"/>
-                <a:cs typeface="LMRoman10-Regular"/>
-              </a:rPr>
-              <a:t>Donald Knuth </a:t>
-            </a:r>
-            <a:r>
-              <a:rPr lang="en-US" sz="1100" dirty="0">
-                <a:effectLst/>
-                <a:latin typeface="+mn-lt"/>
-                <a:ea typeface="Calibri" panose="020F0502020204030204" pitchFamily="34" charset="0"/>
-                <a:cs typeface="LMRoman10-Regular"/>
-              </a:rPr>
-              <a:t>– Literate Programming</a:t>
-            </a:r>
-            <a:endParaRPr lang="en-US" sz="1100" dirty="0">
-              <a:effectLst/>
-              <a:latin typeface="+mn-lt"/>
-              <a:ea typeface="Calibri" panose="020F0502020204030204" pitchFamily="34" charset="0"/>
-              <a:cs typeface="Times New Roman" panose="02020603050405020304" pitchFamily="18" charset="0"/>
-            </a:endParaRPr>
-          </a:p>
-          <a:p>
-            <a:pPr marL="1257300" marR="0" lvl="2" indent="-342900" algn="l" defTabSz="914400" rtl="0" eaLnBrk="1" fontAlgn="auto" latinLnBrk="0" hangingPunct="1">
-              <a:lnSpc>
-                <a:spcPct val="100000"/>
-              </a:lnSpc>
-              <a:spcBef>
-                <a:spcPts val="0"/>
-              </a:spcBef>
-              <a:spcAft>
-                <a:spcPts val="0"/>
-              </a:spcAft>
-              <a:buClrTx/>
-              <a:buSzTx/>
-              <a:buFont typeface="Courier New" panose="02070309020205020404" pitchFamily="49" charset="0"/>
-              <a:buChar char="o"/>
-              <a:tabLst/>
-              <a:defRPr/>
-            </a:pPr>
-            <a:r>
-              <a:rPr lang="en-US" sz="1100" dirty="0">
-                <a:effectLst/>
-                <a:latin typeface="+mn-lt"/>
-                <a:ea typeface="Calibri" panose="020F0502020204030204" pitchFamily="34" charset="0"/>
-                <a:cs typeface="LMRoman10-Regular"/>
-              </a:rPr>
-              <a:t>Perform mini experiments: create a simpler example in which you can tinker with the code and see what happens to the output.</a:t>
-            </a:r>
-            <a:endParaRPr lang="en-US" sz="1100" dirty="0">
-              <a:effectLst/>
-              <a:latin typeface="+mn-lt"/>
-              <a:ea typeface="Calibri" panose="020F0502020204030204" pitchFamily="34" charset="0"/>
-              <a:cs typeface="Times New Roman" panose="02020603050405020304" pitchFamily="18" charset="0"/>
-            </a:endParaRPr>
-          </a:p>
-          <a:p>
-            <a:pPr marL="342900" marR="0" lvl="0" indent="-342900" algn="l" defTabSz="914400" rtl="0" eaLnBrk="1" fontAlgn="auto" latinLnBrk="0" hangingPunct="1">
-              <a:lnSpc>
-                <a:spcPct val="100000"/>
-              </a:lnSpc>
-              <a:spcBef>
-                <a:spcPts val="0"/>
-              </a:spcBef>
-              <a:spcAft>
-                <a:spcPts val="0"/>
-              </a:spcAft>
-              <a:buClrTx/>
-              <a:buSzTx/>
-              <a:buFont typeface="+mj-lt"/>
-              <a:buAutoNum type="arabicPeriod"/>
-              <a:tabLst/>
-              <a:defRPr/>
-            </a:pPr>
-            <a:r>
-              <a:rPr lang="en-US" sz="1100" b="1" dirty="0">
-                <a:effectLst/>
-                <a:latin typeface="+mn-lt"/>
-                <a:ea typeface="Calibri" panose="020F0502020204030204" pitchFamily="34" charset="0"/>
-                <a:cs typeface="LMRoman12-Bold"/>
-              </a:rPr>
-              <a:t>Use the internet to find answers</a:t>
-            </a:r>
-          </a:p>
-          <a:p>
-            <a:pPr marL="800100" marR="0" lvl="1" indent="-342900" algn="l" defTabSz="914400" rtl="0" eaLnBrk="1" fontAlgn="auto" latinLnBrk="0" hangingPunct="1">
-              <a:lnSpc>
-                <a:spcPct val="100000"/>
-              </a:lnSpc>
-              <a:spcBef>
-                <a:spcPts val="0"/>
-              </a:spcBef>
-              <a:spcAft>
-                <a:spcPts val="0"/>
-              </a:spcAft>
-              <a:buClrTx/>
-              <a:buSzTx/>
-              <a:buFont typeface="Courier New" panose="02070309020205020404" pitchFamily="49" charset="0"/>
-              <a:buChar char="o"/>
-              <a:tabLst/>
-              <a:defRPr/>
-            </a:pPr>
-            <a:r>
-              <a:rPr lang="en-US" sz="1100" dirty="0">
-                <a:effectLst/>
-                <a:latin typeface="+mn-lt"/>
-                <a:ea typeface="Calibri" panose="020F0502020204030204" pitchFamily="34" charset="0"/>
-                <a:cs typeface="LMRoman10-Regular"/>
-              </a:rPr>
-              <a:t>Everybody (from novice to more experienced users) relies on the internet when they don’t understand</a:t>
-            </a:r>
-            <a:r>
-              <a:rPr lang="en-US" sz="1100" dirty="0">
-                <a:effectLst/>
-                <a:latin typeface="+mn-lt"/>
-                <a:ea typeface="Calibri" panose="020F0502020204030204" pitchFamily="34" charset="0"/>
-                <a:cs typeface="Times New Roman" panose="02020603050405020304" pitchFamily="18" charset="0"/>
-              </a:rPr>
-              <a:t> </a:t>
-            </a:r>
-            <a:r>
-              <a:rPr lang="en-US" sz="1100" dirty="0">
-                <a:effectLst/>
-                <a:latin typeface="+mn-lt"/>
-                <a:ea typeface="Calibri" panose="020F0502020204030204" pitchFamily="34" charset="0"/>
-                <a:cs typeface="LMRoman10-Regular"/>
-              </a:rPr>
-              <a:t>something. It is likely that other people have already asked (and received useful answers) for the problem</a:t>
-            </a:r>
-            <a:r>
-              <a:rPr lang="en-US" sz="1100" dirty="0">
-                <a:effectLst/>
-                <a:latin typeface="+mn-lt"/>
-                <a:ea typeface="Calibri" panose="020F0502020204030204" pitchFamily="34" charset="0"/>
-                <a:cs typeface="Times New Roman" panose="02020603050405020304" pitchFamily="18" charset="0"/>
-              </a:rPr>
-              <a:t> </a:t>
-            </a:r>
-            <a:r>
-              <a:rPr lang="en-US" sz="1100" dirty="0">
-                <a:effectLst/>
-                <a:latin typeface="+mn-lt"/>
-                <a:ea typeface="Calibri" panose="020F0502020204030204" pitchFamily="34" charset="0"/>
-                <a:cs typeface="LMRoman10-Regular"/>
-              </a:rPr>
-              <a:t>that you are facing. However, finding the exact piece of information that you need might be hard, especially</a:t>
-            </a:r>
-            <a:r>
-              <a:rPr lang="en-US" sz="1100" dirty="0">
-                <a:effectLst/>
-                <a:latin typeface="+mn-lt"/>
-                <a:ea typeface="Calibri" panose="020F0502020204030204" pitchFamily="34" charset="0"/>
-                <a:cs typeface="Times New Roman" panose="02020603050405020304" pitchFamily="18" charset="0"/>
-              </a:rPr>
-              <a:t> </a:t>
-            </a:r>
-            <a:r>
-              <a:rPr lang="en-US" sz="1100" dirty="0">
-                <a:effectLst/>
-                <a:latin typeface="+mn-lt"/>
-                <a:ea typeface="Calibri" panose="020F0502020204030204" pitchFamily="34" charset="0"/>
-                <a:cs typeface="LMRoman10-Regular"/>
-              </a:rPr>
-              <a:t>if you don’t use the correct terms/key words. Learning how to search for the information that you need is</a:t>
-            </a:r>
-            <a:r>
-              <a:rPr lang="en-US" sz="1100" dirty="0">
-                <a:effectLst/>
-                <a:latin typeface="+mn-lt"/>
-                <a:ea typeface="Calibri" panose="020F0502020204030204" pitchFamily="34" charset="0"/>
-                <a:cs typeface="Times New Roman" panose="02020603050405020304" pitchFamily="18" charset="0"/>
-              </a:rPr>
-              <a:t> </a:t>
-            </a:r>
-            <a:r>
-              <a:rPr lang="en-US" sz="1100" dirty="0">
-                <a:effectLst/>
-                <a:latin typeface="+mn-lt"/>
-                <a:ea typeface="Calibri" panose="020F0502020204030204" pitchFamily="34" charset="0"/>
-                <a:cs typeface="LMRoman10-Regular"/>
-              </a:rPr>
-              <a:t>a skill that also takes practice. “</a:t>
-            </a:r>
-            <a:r>
-              <a:rPr lang="en-US" sz="1100" dirty="0" err="1">
-                <a:effectLst/>
-                <a:latin typeface="+mn-lt"/>
-                <a:ea typeface="Calibri" panose="020F0502020204030204" pitchFamily="34" charset="0"/>
-                <a:cs typeface="LMRoman10-Regular"/>
-              </a:rPr>
-              <a:t>Stackoverflow</a:t>
-            </a:r>
-            <a:r>
-              <a:rPr lang="en-US" sz="1100" dirty="0">
-                <a:effectLst/>
-                <a:latin typeface="+mn-lt"/>
-                <a:ea typeface="Calibri" panose="020F0502020204030204" pitchFamily="34" charset="0"/>
-                <a:cs typeface="LMRoman10-Regular"/>
-              </a:rPr>
-              <a:t>” and existing </a:t>
-            </a:r>
-            <a:r>
-              <a:rPr lang="en-US" sz="1100" dirty="0" err="1">
-                <a:effectLst/>
-                <a:latin typeface="+mn-lt"/>
-                <a:ea typeface="Calibri" panose="020F0502020204030204" pitchFamily="34" charset="0"/>
-                <a:cs typeface="LMRoman10-Regular"/>
-              </a:rPr>
-              <a:t>cheatsheets</a:t>
-            </a:r>
-            <a:r>
-              <a:rPr lang="en-US" sz="1100" dirty="0">
-                <a:effectLst/>
-                <a:latin typeface="+mn-lt"/>
-                <a:ea typeface="Calibri" panose="020F0502020204030204" pitchFamily="34" charset="0"/>
-                <a:cs typeface="LMRoman10-Regular"/>
-              </a:rPr>
-              <a:t> can be very helpful.</a:t>
-            </a:r>
-          </a:p>
-          <a:p>
-            <a:pPr marL="342900" marR="0" lvl="0" indent="-342900" algn="l" defTabSz="914400" rtl="0" eaLnBrk="1" fontAlgn="auto" latinLnBrk="0" hangingPunct="1">
-              <a:lnSpc>
-                <a:spcPct val="100000"/>
-              </a:lnSpc>
-              <a:spcBef>
-                <a:spcPts val="0"/>
-              </a:spcBef>
-              <a:spcAft>
-                <a:spcPts val="0"/>
-              </a:spcAft>
-              <a:buClrTx/>
-              <a:buSzTx/>
-              <a:buFont typeface="+mj-lt"/>
-              <a:buAutoNum type="arabicPeriod"/>
-              <a:tabLst/>
-              <a:defRPr/>
-            </a:pPr>
-            <a:r>
-              <a:rPr lang="en-US" sz="1100" b="1" dirty="0">
-                <a:effectLst/>
-                <a:latin typeface="+mn-lt"/>
-                <a:ea typeface="Calibri" panose="020F0502020204030204" pitchFamily="34" charset="0"/>
-                <a:cs typeface="LMRoman10-Regular"/>
-              </a:rPr>
-              <a:t>Ask for Help</a:t>
-            </a:r>
-          </a:p>
-          <a:p>
-            <a:pPr marL="800100" marR="0" lvl="1" indent="-342900" algn="l" defTabSz="914400" rtl="0" eaLnBrk="1" fontAlgn="auto" latinLnBrk="0" hangingPunct="1">
-              <a:lnSpc>
-                <a:spcPct val="100000"/>
-              </a:lnSpc>
-              <a:spcBef>
-                <a:spcPts val="0"/>
-              </a:spcBef>
-              <a:spcAft>
-                <a:spcPts val="0"/>
-              </a:spcAft>
-              <a:buClrTx/>
-              <a:buSzTx/>
-              <a:buFont typeface="Courier New" panose="02070309020205020404" pitchFamily="49" charset="0"/>
-              <a:buChar char="o"/>
-              <a:tabLst/>
-              <a:defRPr/>
-            </a:pPr>
-            <a:r>
-              <a:rPr lang="en-US" sz="1100" b="0" dirty="0">
-                <a:effectLst/>
-                <a:latin typeface="+mn-lt"/>
-                <a:ea typeface="Calibri" panose="020F0502020204030204" pitchFamily="34" charset="0"/>
-                <a:cs typeface="LMRoman10-Regular"/>
-              </a:rPr>
-              <a:t>We’re all learning.  And some days, I feel like I’m the one who has the most to learn.  Alcoa story.</a:t>
-            </a:r>
-          </a:p>
-          <a:p>
-            <a:pPr marL="342900" marR="0" lvl="0" indent="-342900" algn="l" defTabSz="914400" rtl="0" eaLnBrk="1" fontAlgn="auto" latinLnBrk="0" hangingPunct="1">
-              <a:lnSpc>
-                <a:spcPct val="100000"/>
-              </a:lnSpc>
-              <a:spcBef>
-                <a:spcPts val="0"/>
-              </a:spcBef>
-              <a:spcAft>
-                <a:spcPts val="0"/>
-              </a:spcAft>
-              <a:buClrTx/>
-              <a:buSzTx/>
-              <a:buFont typeface="+mj-lt"/>
-              <a:buAutoNum type="arabicPeriod"/>
-              <a:tabLst/>
-              <a:defRPr/>
-            </a:pPr>
-            <a:r>
-              <a:rPr lang="en-US" sz="1100" b="1" dirty="0">
-                <a:effectLst/>
-                <a:latin typeface="+mn-lt"/>
-                <a:ea typeface="Calibri" panose="020F0502020204030204" pitchFamily="34" charset="0"/>
-                <a:cs typeface="LMRoman12-Bold"/>
-              </a:rPr>
-              <a:t>Take your time</a:t>
-            </a:r>
-          </a:p>
-          <a:p>
-            <a:pPr marL="800100" marR="0" lvl="1" indent="-342900" algn="l" defTabSz="914400" rtl="0" eaLnBrk="1" fontAlgn="auto" latinLnBrk="0" hangingPunct="1">
-              <a:lnSpc>
-                <a:spcPct val="100000"/>
-              </a:lnSpc>
-              <a:spcBef>
-                <a:spcPts val="0"/>
-              </a:spcBef>
-              <a:spcAft>
-                <a:spcPts val="0"/>
-              </a:spcAft>
-              <a:buClrTx/>
-              <a:buSzTx/>
-              <a:buFont typeface="Courier New" panose="02070309020205020404" pitchFamily="49" charset="0"/>
-              <a:buChar char="o"/>
-              <a:tabLst/>
-              <a:defRPr/>
-            </a:pPr>
-            <a:r>
-              <a:rPr lang="en-US" sz="1100" dirty="0">
-                <a:effectLst/>
-                <a:latin typeface="+mn-lt"/>
-                <a:ea typeface="Calibri" panose="020F0502020204030204" pitchFamily="34" charset="0"/>
-                <a:cs typeface="LMRoman10-Regular"/>
-              </a:rPr>
-              <a:t>It is important to realize that it takes time to learn AI. What this implies is that you should not</a:t>
-            </a:r>
-            <a:r>
-              <a:rPr lang="en-US" sz="1100" dirty="0">
-                <a:effectLst/>
-                <a:latin typeface="+mn-lt"/>
-                <a:ea typeface="Calibri" panose="020F0502020204030204" pitchFamily="34" charset="0"/>
-                <a:cs typeface="Times New Roman" panose="02020603050405020304" pitchFamily="18" charset="0"/>
-              </a:rPr>
-              <a:t> </a:t>
-            </a:r>
-            <a:r>
-              <a:rPr lang="en-US" sz="1100" dirty="0">
-                <a:effectLst/>
-                <a:latin typeface="+mn-lt"/>
-                <a:ea typeface="Calibri" panose="020F0502020204030204" pitchFamily="34" charset="0"/>
-                <a:cs typeface="LMRoman10-Regular"/>
-              </a:rPr>
-              <a:t>rush to get things done if you want to master this skill. In particular, everybody goes through some level of</a:t>
-            </a:r>
-            <a:r>
-              <a:rPr lang="en-US" sz="1100" dirty="0">
-                <a:effectLst/>
-                <a:latin typeface="+mn-lt"/>
-                <a:ea typeface="Calibri" panose="020F0502020204030204" pitchFamily="34" charset="0"/>
-                <a:cs typeface="Times New Roman" panose="02020603050405020304" pitchFamily="18" charset="0"/>
-              </a:rPr>
-              <a:t> </a:t>
-            </a:r>
-            <a:r>
-              <a:rPr lang="en-US" sz="1100" dirty="0">
-                <a:effectLst/>
-                <a:latin typeface="+mn-lt"/>
-                <a:ea typeface="Calibri" panose="020F0502020204030204" pitchFamily="34" charset="0"/>
-                <a:cs typeface="LMRoman10-Regular"/>
-              </a:rPr>
-              <a:t>struggle and frustration when learning AI. However, once you have mastered it, you will be amazed</a:t>
-            </a:r>
-            <a:r>
-              <a:rPr lang="en-US" sz="1100" dirty="0">
-                <a:effectLst/>
-                <a:latin typeface="+mn-lt"/>
-                <a:ea typeface="Calibri" panose="020F0502020204030204" pitchFamily="34" charset="0"/>
-                <a:cs typeface="Times New Roman" panose="02020603050405020304" pitchFamily="18" charset="0"/>
-              </a:rPr>
-              <a:t> </a:t>
-            </a:r>
-            <a:r>
-              <a:rPr lang="en-US" sz="1100" dirty="0">
-                <a:effectLst/>
-                <a:latin typeface="+mn-lt"/>
-                <a:ea typeface="Calibri" panose="020F0502020204030204" pitchFamily="34" charset="0"/>
-                <a:cs typeface="LMRoman10-Regular"/>
-              </a:rPr>
-              <a:t>by what this skill can do for you.</a:t>
-            </a:r>
-            <a:endParaRPr lang="en-US" sz="1100" dirty="0">
-              <a:effectLst/>
-              <a:latin typeface="+mn-lt"/>
-              <a:ea typeface="Calibri" panose="020F0502020204030204" pitchFamily="34" charset="0"/>
-              <a:cs typeface="Times New Roman" panose="02020603050405020304" pitchFamily="18" charset="0"/>
-            </a:endParaRPr>
-          </a:p>
-          <a:p>
-            <a:pPr marL="342900" marR="0" lvl="0" indent="-342900" algn="l" defTabSz="914400" rtl="0" eaLnBrk="1" fontAlgn="auto" latinLnBrk="0" hangingPunct="1">
-              <a:lnSpc>
-                <a:spcPct val="100000"/>
-              </a:lnSpc>
-              <a:spcBef>
-                <a:spcPts val="0"/>
-              </a:spcBef>
-              <a:spcAft>
-                <a:spcPts val="0"/>
-              </a:spcAft>
-              <a:buClrTx/>
-              <a:buSzTx/>
-              <a:buFont typeface="+mj-lt"/>
-              <a:buAutoNum type="arabicPeriod"/>
-              <a:tabLst/>
-              <a:defRPr/>
-            </a:pPr>
-            <a:endParaRPr lang="en-US" sz="1800" dirty="0">
-              <a:effectLst/>
-              <a:latin typeface="Calibri" panose="020F0502020204030204" pitchFamily="34" charset="0"/>
-              <a:ea typeface="Calibri" panose="020F0502020204030204" pitchFamily="34" charset="0"/>
-              <a:cs typeface="Times New Roman" panose="02020603050405020304" pitchFamily="18" charset="0"/>
-            </a:endParaRPr>
-          </a:p>
-          <a:p>
-            <a:pPr marL="800100" marR="0" lvl="1" indent="-342900" algn="l" defTabSz="914400" rtl="0" eaLnBrk="1" fontAlgn="auto" latinLnBrk="0" hangingPunct="1">
-              <a:lnSpc>
-                <a:spcPct val="100000"/>
-              </a:lnSpc>
-              <a:spcBef>
-                <a:spcPts val="0"/>
-              </a:spcBef>
-              <a:spcAft>
-                <a:spcPts val="0"/>
-              </a:spcAft>
-              <a:buClrTx/>
-              <a:buSzTx/>
-              <a:buFont typeface="Courier New" panose="02070309020205020404" pitchFamily="49" charset="0"/>
-              <a:buChar char="o"/>
-              <a:tabLst/>
-              <a:defRPr/>
-            </a:pPr>
-            <a:endParaRPr lang="en-US" sz="1800" dirty="0">
-              <a:effectLst/>
-              <a:latin typeface="Calibri" panose="020F0502020204030204" pitchFamily="34" charset="0"/>
-              <a:ea typeface="Calibri" panose="020F0502020204030204" pitchFamily="34" charset="0"/>
-              <a:cs typeface="Times New Roman" panose="02020603050405020304" pitchFamily="18" charset="0"/>
-            </a:endParaRPr>
-          </a:p>
-          <a:p>
-            <a:pPr marL="800100" marR="0" lvl="1" indent="-342900" algn="l" defTabSz="914400" rtl="0" eaLnBrk="1" fontAlgn="auto" latinLnBrk="0" hangingPunct="1">
-              <a:lnSpc>
-                <a:spcPct val="100000"/>
-              </a:lnSpc>
-              <a:spcBef>
-                <a:spcPts val="0"/>
-              </a:spcBef>
-              <a:spcAft>
-                <a:spcPts val="0"/>
-              </a:spcAft>
-              <a:buClrTx/>
-              <a:buSzTx/>
-              <a:buFont typeface="+mj-lt"/>
-              <a:buAutoNum type="arabicPeriod"/>
-              <a:tabLst/>
-              <a:defRPr/>
-            </a:pPr>
-            <a:endParaRPr lang="en-US" sz="1800" dirty="0">
-              <a:effectLst/>
-              <a:latin typeface="Calibri" panose="020F0502020204030204" pitchFamily="34" charset="0"/>
-              <a:ea typeface="Calibri" panose="020F0502020204030204" pitchFamily="34" charset="0"/>
-              <a:cs typeface="Times New Roman" panose="02020603050405020304" pitchFamily="18" charset="0"/>
-            </a:endParaRPr>
-          </a:p>
-          <a:p>
-            <a:pPr marL="800100" marR="0" lvl="1" indent="-342900" algn="l" defTabSz="914400" rtl="0" eaLnBrk="1" fontAlgn="auto" latinLnBrk="0" hangingPunct="1">
-              <a:lnSpc>
-                <a:spcPct val="100000"/>
-              </a:lnSpc>
-              <a:spcBef>
-                <a:spcPts val="0"/>
-              </a:spcBef>
-              <a:spcAft>
-                <a:spcPts val="0"/>
-              </a:spcAft>
-              <a:buClrTx/>
-              <a:buSzTx/>
-              <a:buFont typeface="Courier New" panose="02070309020205020404" pitchFamily="49" charset="0"/>
-              <a:buChar char="o"/>
-              <a:tabLst/>
-              <a:defRPr/>
-            </a:pPr>
-            <a:endParaRPr lang="en-US" sz="1800" dirty="0">
-              <a:effectLst/>
-              <a:latin typeface="Times New Roman" panose="02020603050405020304" pitchFamily="18" charset="0"/>
-              <a:ea typeface="Times New Roman" panose="02020603050405020304" pitchFamily="18" charset="0"/>
-            </a:endParaRPr>
-          </a:p>
-          <a:p>
             <a:endParaRPr lang="en-US" dirty="0"/>
           </a:p>
         </p:txBody>
@@ -2453,7 +1534,7 @@
           <a:p>
             <a:fld id="{3148858F-F1DB-4027-9C85-CCA6849540DD}" type="slidenum">
               <a:rPr lang="en-US" smtClean="0"/>
-              <a:t>4</a:t>
+              <a:t>5</a:t>
             </a:fld>
             <a:endParaRPr lang="en-US"/>
           </a:p>
@@ -2462,7 +1543,7 @@
     </p:spTree>
     <p:extLst>
       <p:ext uri="{BB962C8B-B14F-4D97-AF65-F5344CB8AC3E}">
-        <p14:creationId xmlns:p14="http://schemas.microsoft.com/office/powerpoint/2010/main" val="1955762856"/>
+        <p14:creationId xmlns:p14="http://schemas.microsoft.com/office/powerpoint/2010/main" val="1218542571"/>
       </p:ext>
     </p:extLst>
   </p:cSld>
@@ -2516,6 +1597,945 @@
           <a:bodyPr/>
           <a:lstStyle/>
           <a:p>
+            <a:pPr marL="342900" marR="0" lvl="0" indent="-342900" algn="l" defTabSz="914400" rtl="0" eaLnBrk="1" fontAlgn="auto" latinLnBrk="0" hangingPunct="1">
+              <a:lnSpc>
+                <a:spcPct val="100000"/>
+              </a:lnSpc>
+              <a:spcBef>
+                <a:spcPts val="0"/>
+              </a:spcBef>
+              <a:spcAft>
+                <a:spcPts val="0"/>
+              </a:spcAft>
+              <a:buClrTx/>
+              <a:buSzTx/>
+              <a:buFontTx/>
+              <a:buAutoNum type="arabicPeriod"/>
+              <a:tabLst/>
+              <a:defRPr/>
+            </a:pPr>
+            <a:r>
+              <a:rPr lang="en-US" sz="1100" b="1" dirty="0">
+                <a:solidFill>
+                  <a:srgbClr val="24292F"/>
+                </a:solidFill>
+                <a:effectLst>
+                  <a:outerShdw blurRad="38100" dist="38100" dir="2700000" algn="tl">
+                    <a:srgbClr val="000000">
+                      <a:alpha val="43137"/>
+                    </a:srgbClr>
+                  </a:outerShdw>
+                </a:effectLst>
+                <a:latin typeface="+mn-lt"/>
+                <a:ea typeface="Times New Roman" panose="02020603050405020304" pitchFamily="18" charset="0"/>
+              </a:rPr>
+              <a:t>Focus</a:t>
+            </a:r>
+          </a:p>
+          <a:p>
+            <a:pPr marL="800100" marR="0" lvl="1" indent="-342900" algn="l" defTabSz="914400" rtl="0" eaLnBrk="1" fontAlgn="auto" latinLnBrk="0" hangingPunct="1">
+              <a:lnSpc>
+                <a:spcPct val="100000"/>
+              </a:lnSpc>
+              <a:spcBef>
+                <a:spcPts val="0"/>
+              </a:spcBef>
+              <a:spcAft>
+                <a:spcPts val="0"/>
+              </a:spcAft>
+              <a:buClrTx/>
+              <a:buSzTx/>
+              <a:buFont typeface="Courier New" panose="02070309020205020404" pitchFamily="49" charset="0"/>
+              <a:buChar char="o"/>
+              <a:tabLst/>
+              <a:defRPr/>
+            </a:pPr>
+            <a:r>
+              <a:rPr lang="en-US" sz="1100" dirty="0">
+                <a:solidFill>
+                  <a:srgbClr val="24292F"/>
+                </a:solidFill>
+                <a:effectLst/>
+                <a:latin typeface="+mn-lt"/>
+                <a:ea typeface="Times New Roman" panose="02020603050405020304" pitchFamily="18" charset="0"/>
+              </a:rPr>
+              <a:t>So often, students think they can learn AI programming while multi-tasking on Facebook or texting friends on their cell phone. After programming for 30 years, I've learned one thing. You'll learn AI much faster if you can devote focused, uninterrupted time to practice.</a:t>
+            </a:r>
+          </a:p>
+          <a:p>
+            <a:pPr marL="342900" marR="0" lvl="0" indent="-342900" algn="l" defTabSz="914400" rtl="0" eaLnBrk="1" fontAlgn="auto" latinLnBrk="0" hangingPunct="1">
+              <a:lnSpc>
+                <a:spcPct val="100000"/>
+              </a:lnSpc>
+              <a:spcBef>
+                <a:spcPts val="0"/>
+              </a:spcBef>
+              <a:spcAft>
+                <a:spcPts val="0"/>
+              </a:spcAft>
+              <a:buClrTx/>
+              <a:buSzTx/>
+              <a:buFontTx/>
+              <a:buAutoNum type="arabicPeriod"/>
+              <a:tabLst/>
+              <a:defRPr/>
+            </a:pPr>
+            <a:r>
+              <a:rPr lang="en-US" sz="1100" b="1" dirty="0">
+                <a:effectLst/>
+                <a:latin typeface="+mn-lt"/>
+                <a:ea typeface="Calibri" panose="020F0502020204030204" pitchFamily="34" charset="0"/>
+                <a:cs typeface="LMRoman12-Bold"/>
+              </a:rPr>
+              <a:t>Avoid the “copy and paste” approach to writing code</a:t>
+            </a:r>
+          </a:p>
+          <a:p>
+            <a:pPr marL="800100" marR="0" lvl="1" indent="-342900" algn="l" defTabSz="914400" rtl="0" eaLnBrk="1" fontAlgn="auto" latinLnBrk="0" hangingPunct="1">
+              <a:lnSpc>
+                <a:spcPct val="100000"/>
+              </a:lnSpc>
+              <a:spcBef>
+                <a:spcPts val="0"/>
+              </a:spcBef>
+              <a:spcAft>
+                <a:spcPts val="0"/>
+              </a:spcAft>
+              <a:buClrTx/>
+              <a:buSzTx/>
+              <a:buFont typeface="Courier New" panose="02070309020205020404" pitchFamily="49" charset="0"/>
+              <a:buChar char="o"/>
+              <a:tabLst/>
+              <a:defRPr/>
+            </a:pPr>
+            <a:r>
+              <a:rPr lang="en-US" sz="1100" dirty="0">
+                <a:effectLst/>
+                <a:latin typeface="+mn-lt"/>
+                <a:ea typeface="Calibri" panose="020F0502020204030204" pitchFamily="34" charset="0"/>
+                <a:cs typeface="LMRoman10-Regular"/>
+              </a:rPr>
+              <a:t>Although copying and pasting may help you to avoid typing errors, it can also interfere with your learning</a:t>
+            </a:r>
+            <a:r>
+              <a:rPr lang="en-US" sz="1100" dirty="0">
+                <a:effectLst/>
+                <a:latin typeface="+mn-lt"/>
+                <a:ea typeface="Calibri" panose="020F0502020204030204" pitchFamily="34" charset="0"/>
+                <a:cs typeface="Times New Roman" panose="02020603050405020304" pitchFamily="18" charset="0"/>
+              </a:rPr>
+              <a:t> </a:t>
+            </a:r>
+            <a:r>
+              <a:rPr lang="en-US" sz="1100" dirty="0">
+                <a:effectLst/>
+                <a:latin typeface="+mn-lt"/>
+                <a:ea typeface="Calibri" panose="020F0502020204030204" pitchFamily="34" charset="0"/>
+                <a:cs typeface="LMRoman10-Regular"/>
+              </a:rPr>
+              <a:t>process for two reasons:</a:t>
+            </a:r>
+          </a:p>
+          <a:p>
+            <a:pPr marL="1257300" marR="0" lvl="2" indent="-342900" algn="l" defTabSz="914400" rtl="0" eaLnBrk="1" fontAlgn="auto" latinLnBrk="0" hangingPunct="1">
+              <a:lnSpc>
+                <a:spcPct val="100000"/>
+              </a:lnSpc>
+              <a:spcBef>
+                <a:spcPts val="0"/>
+              </a:spcBef>
+              <a:spcAft>
+                <a:spcPts val="0"/>
+              </a:spcAft>
+              <a:buClrTx/>
+              <a:buSzTx/>
+              <a:buFont typeface="Courier New" panose="02070309020205020404" pitchFamily="49" charset="0"/>
+              <a:buChar char="o"/>
+              <a:tabLst/>
+              <a:defRPr/>
+            </a:pPr>
+            <a:r>
+              <a:rPr lang="en-US" sz="1100" dirty="0">
+                <a:effectLst/>
+                <a:latin typeface="+mn-lt"/>
+                <a:ea typeface="Calibri" panose="020F0502020204030204" pitchFamily="34" charset="0"/>
+                <a:cs typeface="Times New Roman" panose="02020603050405020304" pitchFamily="18" charset="0"/>
+              </a:rPr>
+              <a:t>Typing </a:t>
+            </a:r>
+            <a:r>
+              <a:rPr lang="en-US" sz="1100" dirty="0">
+                <a:effectLst/>
+                <a:latin typeface="+mn-lt"/>
+                <a:ea typeface="Calibri" panose="020F0502020204030204" pitchFamily="34" charset="0"/>
+                <a:cs typeface="LMRoman10-Regular"/>
+              </a:rPr>
+              <a:t>errors can help you gain experience in writing code it provides informative feedback when you</a:t>
+            </a:r>
+            <a:r>
+              <a:rPr lang="en-US" sz="1100" dirty="0">
+                <a:effectLst/>
+                <a:latin typeface="+mn-lt"/>
+                <a:ea typeface="Calibri" panose="020F0502020204030204" pitchFamily="34" charset="0"/>
+                <a:cs typeface="Times New Roman" panose="02020603050405020304" pitchFamily="18" charset="0"/>
+              </a:rPr>
+              <a:t> </a:t>
+            </a:r>
+            <a:r>
+              <a:rPr lang="en-US" sz="1100" dirty="0">
+                <a:effectLst/>
+                <a:latin typeface="+mn-lt"/>
+                <a:ea typeface="Calibri" panose="020F0502020204030204" pitchFamily="34" charset="0"/>
+                <a:cs typeface="LMRoman10-Regular"/>
+              </a:rPr>
+              <a:t>make mistakes. Making and correcting typing errors is an important skill to develop, particularly</a:t>
+            </a:r>
+            <a:r>
+              <a:rPr lang="en-US" sz="1100" dirty="0">
+                <a:effectLst/>
+                <a:latin typeface="+mn-lt"/>
+                <a:ea typeface="Calibri" panose="020F0502020204030204" pitchFamily="34" charset="0"/>
+                <a:cs typeface="Times New Roman" panose="02020603050405020304" pitchFamily="18" charset="0"/>
+              </a:rPr>
+              <a:t> </a:t>
+            </a:r>
+            <a:r>
+              <a:rPr lang="en-US" sz="1100" dirty="0">
+                <a:effectLst/>
+                <a:latin typeface="+mn-lt"/>
+                <a:ea typeface="Calibri" panose="020F0502020204030204" pitchFamily="34" charset="0"/>
+                <a:cs typeface="LMRoman10-Regular"/>
+              </a:rPr>
+              <a:t>when you are typing a lot of code for your own data analysis.</a:t>
+            </a:r>
+          </a:p>
+          <a:p>
+            <a:pPr marL="1257300" marR="0" lvl="2" indent="-342900" algn="l" defTabSz="914400" rtl="0" eaLnBrk="1" fontAlgn="auto" latinLnBrk="0" hangingPunct="1">
+              <a:lnSpc>
+                <a:spcPct val="100000"/>
+              </a:lnSpc>
+              <a:spcBef>
+                <a:spcPts val="0"/>
+              </a:spcBef>
+              <a:spcAft>
+                <a:spcPts val="0"/>
+              </a:spcAft>
+              <a:buClrTx/>
+              <a:buSzTx/>
+              <a:buFont typeface="Courier New" panose="02070309020205020404" pitchFamily="49" charset="0"/>
+              <a:buChar char="o"/>
+              <a:tabLst/>
+              <a:defRPr/>
+            </a:pPr>
+            <a:r>
+              <a:rPr lang="en-US" sz="1100" dirty="0">
+                <a:effectLst/>
+                <a:latin typeface="+mn-lt"/>
+                <a:ea typeface="Calibri" panose="020F0502020204030204" pitchFamily="34" charset="0"/>
+                <a:cs typeface="Times New Roman" panose="02020603050405020304" pitchFamily="18" charset="0"/>
+              </a:rPr>
+              <a:t>Copying </a:t>
+            </a:r>
+            <a:r>
+              <a:rPr lang="en-US" sz="1100" dirty="0">
+                <a:effectLst/>
+                <a:latin typeface="+mn-lt"/>
+                <a:ea typeface="Calibri" panose="020F0502020204030204" pitchFamily="34" charset="0"/>
+                <a:cs typeface="LMRoman10-Regular"/>
+              </a:rPr>
+              <a:t>and pasting code may give you the impression that you know what you are doing when – in reality – you probably do not fully understand what the individual blocks of code are actually doing.</a:t>
+            </a:r>
+            <a:r>
+              <a:rPr lang="en-US" sz="1100" dirty="0">
+                <a:effectLst/>
+                <a:latin typeface="+mn-lt"/>
+                <a:ea typeface="Calibri" panose="020F0502020204030204" pitchFamily="34" charset="0"/>
+                <a:cs typeface="Times New Roman" panose="02020603050405020304" pitchFamily="18" charset="0"/>
+              </a:rPr>
+              <a:t> </a:t>
+            </a:r>
+            <a:r>
+              <a:rPr lang="en-US" sz="1100" dirty="0">
+                <a:effectLst/>
+                <a:latin typeface="+mn-lt"/>
+                <a:ea typeface="Calibri" panose="020F0502020204030204" pitchFamily="34" charset="0"/>
+                <a:cs typeface="LMRoman10-Regular"/>
+              </a:rPr>
+              <a:t>Furthermore, this problem will just get worse as you deal with increasingly longer and more complicated</a:t>
+            </a:r>
+            <a:r>
+              <a:rPr lang="en-US" sz="1100" dirty="0">
+                <a:effectLst/>
+                <a:latin typeface="+mn-lt"/>
+                <a:ea typeface="Calibri" panose="020F0502020204030204" pitchFamily="34" charset="0"/>
+                <a:cs typeface="Times New Roman" panose="02020603050405020304" pitchFamily="18" charset="0"/>
+              </a:rPr>
+              <a:t> s</a:t>
+            </a:r>
+            <a:r>
+              <a:rPr lang="en-US" sz="1100" dirty="0">
+                <a:effectLst/>
+                <a:latin typeface="+mn-lt"/>
+                <a:ea typeface="Calibri" panose="020F0502020204030204" pitchFamily="34" charset="0"/>
+                <a:cs typeface="LMRoman10-Regular"/>
+              </a:rPr>
+              <a:t>cripts.</a:t>
+            </a:r>
+          </a:p>
+          <a:p>
+            <a:pPr marL="342900" marR="0" lvl="0" indent="-342900" algn="l" defTabSz="914400" rtl="0" eaLnBrk="1" fontAlgn="auto" latinLnBrk="0" hangingPunct="1">
+              <a:lnSpc>
+                <a:spcPct val="100000"/>
+              </a:lnSpc>
+              <a:spcBef>
+                <a:spcPts val="0"/>
+              </a:spcBef>
+              <a:spcAft>
+                <a:spcPts val="0"/>
+              </a:spcAft>
+              <a:buClrTx/>
+              <a:buSzTx/>
+              <a:buFont typeface="+mj-lt"/>
+              <a:buAutoNum type="arabicPeriod"/>
+              <a:tabLst/>
+              <a:defRPr/>
+            </a:pPr>
+            <a:r>
+              <a:rPr lang="en-US" sz="1100" b="1" dirty="0">
+                <a:effectLst/>
+                <a:latin typeface="+mn-lt"/>
+                <a:ea typeface="Calibri" panose="020F0502020204030204" pitchFamily="34" charset="0"/>
+                <a:cs typeface="LMRoman12-Bold"/>
+              </a:rPr>
+              <a:t>Study code block-by-block, line-by-line</a:t>
+            </a:r>
+          </a:p>
+          <a:p>
+            <a:pPr marL="800100" marR="0" lvl="1" indent="-342900" algn="l" defTabSz="914400" rtl="0" eaLnBrk="1" fontAlgn="auto" latinLnBrk="0" hangingPunct="1">
+              <a:lnSpc>
+                <a:spcPct val="100000"/>
+              </a:lnSpc>
+              <a:spcBef>
+                <a:spcPts val="0"/>
+              </a:spcBef>
+              <a:spcAft>
+                <a:spcPts val="0"/>
+              </a:spcAft>
+              <a:buClrTx/>
+              <a:buSzTx/>
+              <a:buFont typeface="Courier New" panose="02070309020205020404" pitchFamily="49" charset="0"/>
+              <a:buChar char="o"/>
+              <a:tabLst/>
+              <a:defRPr/>
+            </a:pPr>
+            <a:r>
+              <a:rPr lang="en-US" sz="1100" dirty="0">
+                <a:effectLst/>
+                <a:latin typeface="+mn-lt"/>
+                <a:ea typeface="Calibri" panose="020F0502020204030204" pitchFamily="34" charset="0"/>
+                <a:cs typeface="LMRoman10-Regular"/>
+              </a:rPr>
+              <a:t>This means running one block of code at a time and making sure that you understand why the output is what</a:t>
+            </a:r>
+            <a:r>
+              <a:rPr lang="en-US" sz="1100" dirty="0">
+                <a:effectLst/>
+                <a:latin typeface="+mn-lt"/>
+                <a:ea typeface="Calibri" panose="020F0502020204030204" pitchFamily="34" charset="0"/>
+                <a:cs typeface="Times New Roman" panose="02020603050405020304" pitchFamily="18" charset="0"/>
+              </a:rPr>
+              <a:t> </a:t>
+            </a:r>
+            <a:r>
+              <a:rPr lang="en-US" sz="1100" dirty="0">
+                <a:effectLst/>
+                <a:latin typeface="+mn-lt"/>
+                <a:ea typeface="Calibri" panose="020F0502020204030204" pitchFamily="34" charset="0"/>
+                <a:cs typeface="LMRoman10-Regular"/>
+              </a:rPr>
+              <a:t>it is. If things are not clear, it is important to spend more time with that piece of the code. Here are some</a:t>
+            </a:r>
+            <a:r>
+              <a:rPr lang="en-US" sz="1100" dirty="0">
+                <a:effectLst/>
+                <a:latin typeface="+mn-lt"/>
+                <a:ea typeface="Calibri" panose="020F0502020204030204" pitchFamily="34" charset="0"/>
+                <a:cs typeface="Times New Roman" panose="02020603050405020304" pitchFamily="18" charset="0"/>
+              </a:rPr>
+              <a:t> </a:t>
+            </a:r>
+            <a:r>
+              <a:rPr lang="en-US" sz="1100" dirty="0">
+                <a:effectLst/>
+                <a:latin typeface="+mn-lt"/>
+                <a:ea typeface="Calibri" panose="020F0502020204030204" pitchFamily="34" charset="0"/>
+                <a:cs typeface="LMRoman10-Regular"/>
+              </a:rPr>
+              <a:t>tricks that are often helpful to understand a particular piece of code:</a:t>
+            </a:r>
+          </a:p>
+          <a:p>
+            <a:pPr marL="1257300" marR="0" lvl="2" indent="-342900" algn="l" defTabSz="914400" rtl="0" eaLnBrk="1" fontAlgn="auto" latinLnBrk="0" hangingPunct="1">
+              <a:lnSpc>
+                <a:spcPct val="100000"/>
+              </a:lnSpc>
+              <a:spcBef>
+                <a:spcPts val="0"/>
+              </a:spcBef>
+              <a:spcAft>
+                <a:spcPts val="0"/>
+              </a:spcAft>
+              <a:buClrTx/>
+              <a:buSzTx/>
+              <a:buFont typeface="Courier New" panose="02070309020205020404" pitchFamily="49" charset="0"/>
+              <a:buChar char="o"/>
+              <a:tabLst/>
+              <a:defRPr/>
+            </a:pPr>
+            <a:r>
+              <a:rPr lang="en-US" sz="1100" dirty="0">
+                <a:effectLst/>
+                <a:latin typeface="+mn-lt"/>
+                <a:ea typeface="Calibri" panose="020F0502020204030204" pitchFamily="34" charset="0"/>
+                <a:cs typeface="LMRoman10-Regular"/>
+              </a:rPr>
+              <a:t>Break a line of code into its components and try to understand the individual pieces.  Sometimes functions are nested within functions.</a:t>
+            </a:r>
+            <a:endParaRPr lang="en-US" sz="1100" dirty="0">
+              <a:effectLst/>
+              <a:latin typeface="+mn-lt"/>
+              <a:ea typeface="Calibri" panose="020F0502020204030204" pitchFamily="34" charset="0"/>
+              <a:cs typeface="Times New Roman" panose="02020603050405020304" pitchFamily="18" charset="0"/>
+            </a:endParaRPr>
+          </a:p>
+          <a:p>
+            <a:pPr marL="1257300" marR="0" lvl="2" indent="-342900" algn="l" defTabSz="914400" rtl="0" eaLnBrk="1" fontAlgn="auto" latinLnBrk="0" hangingPunct="1">
+              <a:lnSpc>
+                <a:spcPct val="100000"/>
+              </a:lnSpc>
+              <a:spcBef>
+                <a:spcPts val="0"/>
+              </a:spcBef>
+              <a:spcAft>
+                <a:spcPts val="0"/>
+              </a:spcAft>
+              <a:buClrTx/>
+              <a:buSzTx/>
+              <a:buFont typeface="Courier New" panose="02070309020205020404" pitchFamily="49" charset="0"/>
+              <a:buChar char="o"/>
+              <a:tabLst/>
+              <a:defRPr/>
+            </a:pPr>
+            <a:r>
+              <a:rPr lang="en-US" sz="1100" dirty="0">
+                <a:effectLst/>
+                <a:latin typeface="+mn-lt"/>
+                <a:ea typeface="Calibri" panose="020F0502020204030204" pitchFamily="34" charset="0"/>
+                <a:cs typeface="LMRoman10-Regular"/>
+              </a:rPr>
+              <a:t>Document what each block is doing. Clear documentation is critical as you may not remember what you did when you come back to a piece of code at some point in the future. As a wise programmer once said, “Write code for the future you.” Documentation is also useful when you want to adapt or reuse code in some other way. In situations like this, you will immediately know what a specific chunk of code does because it has been clearly documented.  </a:t>
+            </a:r>
+            <a:r>
+              <a:rPr lang="en-US" sz="1100" b="1" dirty="0">
+                <a:solidFill>
+                  <a:schemeClr val="tx1">
+                    <a:lumMod val="75000"/>
+                    <a:lumOff val="25000"/>
+                  </a:schemeClr>
+                </a:solidFill>
+                <a:effectLst/>
+                <a:latin typeface="+mn-lt"/>
+                <a:ea typeface="Calibri" panose="020F0502020204030204" pitchFamily="34" charset="0"/>
+                <a:cs typeface="LMRoman10-Regular"/>
+              </a:rPr>
+              <a:t>Donald Knuth </a:t>
+            </a:r>
+            <a:r>
+              <a:rPr lang="en-US" sz="1100" dirty="0">
+                <a:effectLst/>
+                <a:latin typeface="+mn-lt"/>
+                <a:ea typeface="Calibri" panose="020F0502020204030204" pitchFamily="34" charset="0"/>
+                <a:cs typeface="LMRoman10-Regular"/>
+              </a:rPr>
+              <a:t>– Literate Programming</a:t>
+            </a:r>
+            <a:endParaRPr lang="en-US" sz="1100" dirty="0">
+              <a:effectLst/>
+              <a:latin typeface="+mn-lt"/>
+              <a:ea typeface="Calibri" panose="020F0502020204030204" pitchFamily="34" charset="0"/>
+              <a:cs typeface="Times New Roman" panose="02020603050405020304" pitchFamily="18" charset="0"/>
+            </a:endParaRPr>
+          </a:p>
+          <a:p>
+            <a:pPr marL="1257300" marR="0" lvl="2" indent="-342900" algn="l" defTabSz="914400" rtl="0" eaLnBrk="1" fontAlgn="auto" latinLnBrk="0" hangingPunct="1">
+              <a:lnSpc>
+                <a:spcPct val="100000"/>
+              </a:lnSpc>
+              <a:spcBef>
+                <a:spcPts val="0"/>
+              </a:spcBef>
+              <a:spcAft>
+                <a:spcPts val="0"/>
+              </a:spcAft>
+              <a:buClrTx/>
+              <a:buSzTx/>
+              <a:buFont typeface="Courier New" panose="02070309020205020404" pitchFamily="49" charset="0"/>
+              <a:buChar char="o"/>
+              <a:tabLst/>
+              <a:defRPr/>
+            </a:pPr>
+            <a:r>
+              <a:rPr lang="en-US" sz="1100" dirty="0">
+                <a:effectLst/>
+                <a:latin typeface="+mn-lt"/>
+                <a:ea typeface="Calibri" panose="020F0502020204030204" pitchFamily="34" charset="0"/>
+                <a:cs typeface="LMRoman10-Regular"/>
+              </a:rPr>
+              <a:t>Perform mini experiments: create a simpler example in which you can tinker with the code and see what happens to the output.</a:t>
+            </a:r>
+            <a:endParaRPr lang="en-US" sz="1100" dirty="0">
+              <a:effectLst/>
+              <a:latin typeface="+mn-lt"/>
+              <a:ea typeface="Calibri" panose="020F0502020204030204" pitchFamily="34" charset="0"/>
+              <a:cs typeface="Times New Roman" panose="02020603050405020304" pitchFamily="18" charset="0"/>
+            </a:endParaRPr>
+          </a:p>
+          <a:p>
+            <a:pPr marL="342900" marR="0" lvl="0" indent="-342900" algn="l" defTabSz="914400" rtl="0" eaLnBrk="1" fontAlgn="auto" latinLnBrk="0" hangingPunct="1">
+              <a:lnSpc>
+                <a:spcPct val="100000"/>
+              </a:lnSpc>
+              <a:spcBef>
+                <a:spcPts val="0"/>
+              </a:spcBef>
+              <a:spcAft>
+                <a:spcPts val="0"/>
+              </a:spcAft>
+              <a:buClrTx/>
+              <a:buSzTx/>
+              <a:buFont typeface="+mj-lt"/>
+              <a:buAutoNum type="arabicPeriod"/>
+              <a:tabLst/>
+              <a:defRPr/>
+            </a:pPr>
+            <a:r>
+              <a:rPr lang="en-US" sz="1100" b="1" dirty="0">
+                <a:effectLst/>
+                <a:latin typeface="+mn-lt"/>
+                <a:ea typeface="Calibri" panose="020F0502020204030204" pitchFamily="34" charset="0"/>
+                <a:cs typeface="LMRoman12-Bold"/>
+              </a:rPr>
+              <a:t>Use the internet to find answers</a:t>
+            </a:r>
+          </a:p>
+          <a:p>
+            <a:pPr marL="800100" marR="0" lvl="1" indent="-342900" algn="l" defTabSz="914400" rtl="0" eaLnBrk="1" fontAlgn="auto" latinLnBrk="0" hangingPunct="1">
+              <a:lnSpc>
+                <a:spcPct val="100000"/>
+              </a:lnSpc>
+              <a:spcBef>
+                <a:spcPts val="0"/>
+              </a:spcBef>
+              <a:spcAft>
+                <a:spcPts val="0"/>
+              </a:spcAft>
+              <a:buClrTx/>
+              <a:buSzTx/>
+              <a:buFont typeface="Courier New" panose="02070309020205020404" pitchFamily="49" charset="0"/>
+              <a:buChar char="o"/>
+              <a:tabLst/>
+              <a:defRPr/>
+            </a:pPr>
+            <a:r>
+              <a:rPr lang="en-US" sz="1100" dirty="0">
+                <a:effectLst/>
+                <a:latin typeface="+mn-lt"/>
+                <a:ea typeface="Calibri" panose="020F0502020204030204" pitchFamily="34" charset="0"/>
+                <a:cs typeface="LMRoman10-Regular"/>
+              </a:rPr>
+              <a:t>Everybody (from novice to more experienced users) relies on the internet when they don’t understand</a:t>
+            </a:r>
+            <a:r>
+              <a:rPr lang="en-US" sz="1100" dirty="0">
+                <a:effectLst/>
+                <a:latin typeface="+mn-lt"/>
+                <a:ea typeface="Calibri" panose="020F0502020204030204" pitchFamily="34" charset="0"/>
+                <a:cs typeface="Times New Roman" panose="02020603050405020304" pitchFamily="18" charset="0"/>
+              </a:rPr>
+              <a:t> </a:t>
+            </a:r>
+            <a:r>
+              <a:rPr lang="en-US" sz="1100" dirty="0">
+                <a:effectLst/>
+                <a:latin typeface="+mn-lt"/>
+                <a:ea typeface="Calibri" panose="020F0502020204030204" pitchFamily="34" charset="0"/>
+                <a:cs typeface="LMRoman10-Regular"/>
+              </a:rPr>
+              <a:t>something. It is likely that other people have already asked (and received useful answers) for the problem</a:t>
+            </a:r>
+            <a:r>
+              <a:rPr lang="en-US" sz="1100" dirty="0">
+                <a:effectLst/>
+                <a:latin typeface="+mn-lt"/>
+                <a:ea typeface="Calibri" panose="020F0502020204030204" pitchFamily="34" charset="0"/>
+                <a:cs typeface="Times New Roman" panose="02020603050405020304" pitchFamily="18" charset="0"/>
+              </a:rPr>
+              <a:t> </a:t>
+            </a:r>
+            <a:r>
+              <a:rPr lang="en-US" sz="1100" dirty="0">
+                <a:effectLst/>
+                <a:latin typeface="+mn-lt"/>
+                <a:ea typeface="Calibri" panose="020F0502020204030204" pitchFamily="34" charset="0"/>
+                <a:cs typeface="LMRoman10-Regular"/>
+              </a:rPr>
+              <a:t>that you are facing. However, finding the exact piece of information that you need might be hard, especially</a:t>
+            </a:r>
+            <a:r>
+              <a:rPr lang="en-US" sz="1100" dirty="0">
+                <a:effectLst/>
+                <a:latin typeface="+mn-lt"/>
+                <a:ea typeface="Calibri" panose="020F0502020204030204" pitchFamily="34" charset="0"/>
+                <a:cs typeface="Times New Roman" panose="02020603050405020304" pitchFamily="18" charset="0"/>
+              </a:rPr>
+              <a:t> </a:t>
+            </a:r>
+            <a:r>
+              <a:rPr lang="en-US" sz="1100" dirty="0">
+                <a:effectLst/>
+                <a:latin typeface="+mn-lt"/>
+                <a:ea typeface="Calibri" panose="020F0502020204030204" pitchFamily="34" charset="0"/>
+                <a:cs typeface="LMRoman10-Regular"/>
+              </a:rPr>
+              <a:t>if you don’t use the correct terms/key words. Learning how to search for the information that you need is</a:t>
+            </a:r>
+            <a:r>
+              <a:rPr lang="en-US" sz="1100" dirty="0">
+                <a:effectLst/>
+                <a:latin typeface="+mn-lt"/>
+                <a:ea typeface="Calibri" panose="020F0502020204030204" pitchFamily="34" charset="0"/>
+                <a:cs typeface="Times New Roman" panose="02020603050405020304" pitchFamily="18" charset="0"/>
+              </a:rPr>
+              <a:t> </a:t>
+            </a:r>
+            <a:r>
+              <a:rPr lang="en-US" sz="1100" dirty="0">
+                <a:effectLst/>
+                <a:latin typeface="+mn-lt"/>
+                <a:ea typeface="Calibri" panose="020F0502020204030204" pitchFamily="34" charset="0"/>
+                <a:cs typeface="LMRoman10-Regular"/>
+              </a:rPr>
+              <a:t>a skill that also takes practice. “</a:t>
+            </a:r>
+            <a:r>
+              <a:rPr lang="en-US" sz="1100" dirty="0" err="1">
+                <a:effectLst/>
+                <a:latin typeface="+mn-lt"/>
+                <a:ea typeface="Calibri" panose="020F0502020204030204" pitchFamily="34" charset="0"/>
+                <a:cs typeface="LMRoman10-Regular"/>
+              </a:rPr>
+              <a:t>Stackoverflow</a:t>
+            </a:r>
+            <a:r>
+              <a:rPr lang="en-US" sz="1100" dirty="0">
+                <a:effectLst/>
+                <a:latin typeface="+mn-lt"/>
+                <a:ea typeface="Calibri" panose="020F0502020204030204" pitchFamily="34" charset="0"/>
+                <a:cs typeface="LMRoman10-Regular"/>
+              </a:rPr>
+              <a:t>” and existing </a:t>
+            </a:r>
+            <a:r>
+              <a:rPr lang="en-US" sz="1100" dirty="0" err="1">
+                <a:effectLst/>
+                <a:latin typeface="+mn-lt"/>
+                <a:ea typeface="Calibri" panose="020F0502020204030204" pitchFamily="34" charset="0"/>
+                <a:cs typeface="LMRoman10-Regular"/>
+              </a:rPr>
+              <a:t>cheatsheets</a:t>
+            </a:r>
+            <a:r>
+              <a:rPr lang="en-US" sz="1100" dirty="0">
+                <a:effectLst/>
+                <a:latin typeface="+mn-lt"/>
+                <a:ea typeface="Calibri" panose="020F0502020204030204" pitchFamily="34" charset="0"/>
+                <a:cs typeface="LMRoman10-Regular"/>
+              </a:rPr>
+              <a:t> can be very helpful.</a:t>
+            </a:r>
+          </a:p>
+          <a:p>
+            <a:pPr marL="342900" marR="0" lvl="0" indent="-342900" algn="l" defTabSz="914400" rtl="0" eaLnBrk="1" fontAlgn="auto" latinLnBrk="0" hangingPunct="1">
+              <a:lnSpc>
+                <a:spcPct val="100000"/>
+              </a:lnSpc>
+              <a:spcBef>
+                <a:spcPts val="0"/>
+              </a:spcBef>
+              <a:spcAft>
+                <a:spcPts val="0"/>
+              </a:spcAft>
+              <a:buClrTx/>
+              <a:buSzTx/>
+              <a:buFont typeface="+mj-lt"/>
+              <a:buAutoNum type="arabicPeriod"/>
+              <a:tabLst/>
+              <a:defRPr/>
+            </a:pPr>
+            <a:r>
+              <a:rPr lang="en-US" sz="1100" b="1" dirty="0">
+                <a:effectLst/>
+                <a:latin typeface="+mn-lt"/>
+                <a:ea typeface="Calibri" panose="020F0502020204030204" pitchFamily="34" charset="0"/>
+                <a:cs typeface="LMRoman10-Regular"/>
+              </a:rPr>
+              <a:t>Ask for Help</a:t>
+            </a:r>
+          </a:p>
+          <a:p>
+            <a:pPr marL="800100" marR="0" lvl="1" indent="-342900" algn="l" defTabSz="914400" rtl="0" eaLnBrk="1" fontAlgn="auto" latinLnBrk="0" hangingPunct="1">
+              <a:lnSpc>
+                <a:spcPct val="100000"/>
+              </a:lnSpc>
+              <a:spcBef>
+                <a:spcPts val="0"/>
+              </a:spcBef>
+              <a:spcAft>
+                <a:spcPts val="0"/>
+              </a:spcAft>
+              <a:buClrTx/>
+              <a:buSzTx/>
+              <a:buFont typeface="Courier New" panose="02070309020205020404" pitchFamily="49" charset="0"/>
+              <a:buChar char="o"/>
+              <a:tabLst/>
+              <a:defRPr/>
+            </a:pPr>
+            <a:r>
+              <a:rPr lang="en-US" sz="1100" b="0" dirty="0">
+                <a:effectLst/>
+                <a:latin typeface="+mn-lt"/>
+                <a:ea typeface="Calibri" panose="020F0502020204030204" pitchFamily="34" charset="0"/>
+                <a:cs typeface="LMRoman10-Regular"/>
+              </a:rPr>
+              <a:t>We’re all learning.  And some days, I feel like I’m the one who has the most to learn.  Alcoa story.</a:t>
+            </a:r>
+          </a:p>
+          <a:p>
+            <a:pPr marL="342900" marR="0" lvl="0" indent="-342900" algn="l" defTabSz="914400" rtl="0" eaLnBrk="1" fontAlgn="auto" latinLnBrk="0" hangingPunct="1">
+              <a:lnSpc>
+                <a:spcPct val="100000"/>
+              </a:lnSpc>
+              <a:spcBef>
+                <a:spcPts val="0"/>
+              </a:spcBef>
+              <a:spcAft>
+                <a:spcPts val="0"/>
+              </a:spcAft>
+              <a:buClrTx/>
+              <a:buSzTx/>
+              <a:buFont typeface="+mj-lt"/>
+              <a:buAutoNum type="arabicPeriod"/>
+              <a:tabLst/>
+              <a:defRPr/>
+            </a:pPr>
+            <a:r>
+              <a:rPr lang="en-US" sz="1100" b="1" dirty="0">
+                <a:effectLst/>
+                <a:latin typeface="+mn-lt"/>
+                <a:ea typeface="Calibri" panose="020F0502020204030204" pitchFamily="34" charset="0"/>
+                <a:cs typeface="LMRoman12-Bold"/>
+              </a:rPr>
+              <a:t>Take your time</a:t>
+            </a:r>
+          </a:p>
+          <a:p>
+            <a:pPr marL="800100" marR="0" lvl="1" indent="-342900" algn="l" defTabSz="914400" rtl="0" eaLnBrk="1" fontAlgn="auto" latinLnBrk="0" hangingPunct="1">
+              <a:lnSpc>
+                <a:spcPct val="100000"/>
+              </a:lnSpc>
+              <a:spcBef>
+                <a:spcPts val="0"/>
+              </a:spcBef>
+              <a:spcAft>
+                <a:spcPts val="0"/>
+              </a:spcAft>
+              <a:buClrTx/>
+              <a:buSzTx/>
+              <a:buFont typeface="Courier New" panose="02070309020205020404" pitchFamily="49" charset="0"/>
+              <a:buChar char="o"/>
+              <a:tabLst/>
+              <a:defRPr/>
+            </a:pPr>
+            <a:r>
+              <a:rPr lang="en-US" sz="1100" dirty="0">
+                <a:effectLst/>
+                <a:latin typeface="+mn-lt"/>
+                <a:ea typeface="Calibri" panose="020F0502020204030204" pitchFamily="34" charset="0"/>
+                <a:cs typeface="LMRoman10-Regular"/>
+              </a:rPr>
+              <a:t>It is important to realize that it takes time to learn AI. What this implies is that you should not</a:t>
+            </a:r>
+            <a:r>
+              <a:rPr lang="en-US" sz="1100" dirty="0">
+                <a:effectLst/>
+                <a:latin typeface="+mn-lt"/>
+                <a:ea typeface="Calibri" panose="020F0502020204030204" pitchFamily="34" charset="0"/>
+                <a:cs typeface="Times New Roman" panose="02020603050405020304" pitchFamily="18" charset="0"/>
+              </a:rPr>
+              <a:t> </a:t>
+            </a:r>
+            <a:r>
+              <a:rPr lang="en-US" sz="1100" dirty="0">
+                <a:effectLst/>
+                <a:latin typeface="+mn-lt"/>
+                <a:ea typeface="Calibri" panose="020F0502020204030204" pitchFamily="34" charset="0"/>
+                <a:cs typeface="LMRoman10-Regular"/>
+              </a:rPr>
+              <a:t>rush to get things done if you want to master this skill. In particular, everybody goes through some level of</a:t>
+            </a:r>
+            <a:r>
+              <a:rPr lang="en-US" sz="1100" dirty="0">
+                <a:effectLst/>
+                <a:latin typeface="+mn-lt"/>
+                <a:ea typeface="Calibri" panose="020F0502020204030204" pitchFamily="34" charset="0"/>
+                <a:cs typeface="Times New Roman" panose="02020603050405020304" pitchFamily="18" charset="0"/>
+              </a:rPr>
+              <a:t> </a:t>
+            </a:r>
+            <a:r>
+              <a:rPr lang="en-US" sz="1100" dirty="0">
+                <a:effectLst/>
+                <a:latin typeface="+mn-lt"/>
+                <a:ea typeface="Calibri" panose="020F0502020204030204" pitchFamily="34" charset="0"/>
+                <a:cs typeface="LMRoman10-Regular"/>
+              </a:rPr>
+              <a:t>struggle and frustration when learning AI. However, once you have mastered it, you will be amazed</a:t>
+            </a:r>
+            <a:r>
+              <a:rPr lang="en-US" sz="1100" dirty="0">
+                <a:effectLst/>
+                <a:latin typeface="+mn-lt"/>
+                <a:ea typeface="Calibri" panose="020F0502020204030204" pitchFamily="34" charset="0"/>
+                <a:cs typeface="Times New Roman" panose="02020603050405020304" pitchFamily="18" charset="0"/>
+              </a:rPr>
+              <a:t> </a:t>
+            </a:r>
+            <a:r>
+              <a:rPr lang="en-US" sz="1100" dirty="0">
+                <a:effectLst/>
+                <a:latin typeface="+mn-lt"/>
+                <a:ea typeface="Calibri" panose="020F0502020204030204" pitchFamily="34" charset="0"/>
+                <a:cs typeface="LMRoman10-Regular"/>
+              </a:rPr>
+              <a:t>by what this skill can do for you.</a:t>
+            </a:r>
+            <a:endParaRPr lang="en-US" sz="1100" dirty="0">
+              <a:effectLst/>
+              <a:latin typeface="+mn-lt"/>
+              <a:ea typeface="Calibri" panose="020F0502020204030204" pitchFamily="34" charset="0"/>
+              <a:cs typeface="Times New Roman" panose="02020603050405020304" pitchFamily="18" charset="0"/>
+            </a:endParaRPr>
+          </a:p>
+          <a:p>
+            <a:pPr marL="342900" marR="0" lvl="0" indent="-342900" algn="l" defTabSz="914400" rtl="0" eaLnBrk="1" fontAlgn="auto" latinLnBrk="0" hangingPunct="1">
+              <a:lnSpc>
+                <a:spcPct val="100000"/>
+              </a:lnSpc>
+              <a:spcBef>
+                <a:spcPts val="0"/>
+              </a:spcBef>
+              <a:spcAft>
+                <a:spcPts val="0"/>
+              </a:spcAft>
+              <a:buClrTx/>
+              <a:buSzTx/>
+              <a:buFont typeface="+mj-lt"/>
+              <a:buAutoNum type="arabicPeriod"/>
+              <a:tabLst/>
+              <a:defRPr/>
+            </a:pPr>
+            <a:endParaRPr lang="en-US" sz="1800" dirty="0">
+              <a:effectLst/>
+              <a:latin typeface="Calibri" panose="020F0502020204030204" pitchFamily="34" charset="0"/>
+              <a:ea typeface="Calibri" panose="020F0502020204030204" pitchFamily="34" charset="0"/>
+              <a:cs typeface="Times New Roman" panose="02020603050405020304" pitchFamily="18" charset="0"/>
+            </a:endParaRPr>
+          </a:p>
+          <a:p>
+            <a:pPr marL="800100" marR="0" lvl="1" indent="-342900" algn="l" defTabSz="914400" rtl="0" eaLnBrk="1" fontAlgn="auto" latinLnBrk="0" hangingPunct="1">
+              <a:lnSpc>
+                <a:spcPct val="100000"/>
+              </a:lnSpc>
+              <a:spcBef>
+                <a:spcPts val="0"/>
+              </a:spcBef>
+              <a:spcAft>
+                <a:spcPts val="0"/>
+              </a:spcAft>
+              <a:buClrTx/>
+              <a:buSzTx/>
+              <a:buFont typeface="Courier New" panose="02070309020205020404" pitchFamily="49" charset="0"/>
+              <a:buChar char="o"/>
+              <a:tabLst/>
+              <a:defRPr/>
+            </a:pPr>
+            <a:endParaRPr lang="en-US" sz="1800" dirty="0">
+              <a:effectLst/>
+              <a:latin typeface="Calibri" panose="020F0502020204030204" pitchFamily="34" charset="0"/>
+              <a:ea typeface="Calibri" panose="020F0502020204030204" pitchFamily="34" charset="0"/>
+              <a:cs typeface="Times New Roman" panose="02020603050405020304" pitchFamily="18" charset="0"/>
+            </a:endParaRPr>
+          </a:p>
+          <a:p>
+            <a:pPr marL="800100" marR="0" lvl="1" indent="-342900" algn="l" defTabSz="914400" rtl="0" eaLnBrk="1" fontAlgn="auto" latinLnBrk="0" hangingPunct="1">
+              <a:lnSpc>
+                <a:spcPct val="100000"/>
+              </a:lnSpc>
+              <a:spcBef>
+                <a:spcPts val="0"/>
+              </a:spcBef>
+              <a:spcAft>
+                <a:spcPts val="0"/>
+              </a:spcAft>
+              <a:buClrTx/>
+              <a:buSzTx/>
+              <a:buFont typeface="+mj-lt"/>
+              <a:buAutoNum type="arabicPeriod"/>
+              <a:tabLst/>
+              <a:defRPr/>
+            </a:pPr>
+            <a:endParaRPr lang="en-US" sz="1800" dirty="0">
+              <a:effectLst/>
+              <a:latin typeface="Calibri" panose="020F0502020204030204" pitchFamily="34" charset="0"/>
+              <a:ea typeface="Calibri" panose="020F0502020204030204" pitchFamily="34" charset="0"/>
+              <a:cs typeface="Times New Roman" panose="02020603050405020304" pitchFamily="18" charset="0"/>
+            </a:endParaRPr>
+          </a:p>
+          <a:p>
+            <a:pPr marL="800100" marR="0" lvl="1" indent="-342900" algn="l" defTabSz="914400" rtl="0" eaLnBrk="1" fontAlgn="auto" latinLnBrk="0" hangingPunct="1">
+              <a:lnSpc>
+                <a:spcPct val="100000"/>
+              </a:lnSpc>
+              <a:spcBef>
+                <a:spcPts val="0"/>
+              </a:spcBef>
+              <a:spcAft>
+                <a:spcPts val="0"/>
+              </a:spcAft>
+              <a:buClrTx/>
+              <a:buSzTx/>
+              <a:buFont typeface="Courier New" panose="02070309020205020404" pitchFamily="49" charset="0"/>
+              <a:buChar char="o"/>
+              <a:tabLst/>
+              <a:defRPr/>
+            </a:pPr>
+            <a:endParaRPr lang="en-US" sz="1800" dirty="0">
+              <a:effectLst/>
+              <a:latin typeface="Times New Roman" panose="02020603050405020304" pitchFamily="18" charset="0"/>
+              <a:ea typeface="Times New Roman" panose="02020603050405020304" pitchFamily="18" charset="0"/>
+            </a:endParaRPr>
+          </a:p>
+          <a:p>
             <a:endParaRPr lang="en-US" dirty="0"/>
           </a:p>
         </p:txBody>
@@ -2537,7 +2557,7 @@
           <a:p>
             <a:fld id="{3148858F-F1DB-4027-9C85-CCA6849540DD}" type="slidenum">
               <a:rPr lang="en-US" smtClean="0"/>
-              <a:t>5</a:t>
+              <a:t>6</a:t>
             </a:fld>
             <a:endParaRPr lang="en-US"/>
           </a:p>
@@ -2546,7 +2566,7 @@
     </p:spTree>
     <p:extLst>
       <p:ext uri="{BB962C8B-B14F-4D97-AF65-F5344CB8AC3E}">
-        <p14:creationId xmlns:p14="http://schemas.microsoft.com/office/powerpoint/2010/main" val="771029687"/>
+        <p14:creationId xmlns:p14="http://schemas.microsoft.com/office/powerpoint/2010/main" val="1955762856"/>
       </p:ext>
     </p:extLst>
   </p:cSld>
@@ -2600,27 +2620,7 @@
           <a:bodyPr/>
           <a:lstStyle/>
           <a:p>
-            <a:pPr marL="0" marR="0" lvl="0" indent="0" algn="l" defTabSz="914400" rtl="0" eaLnBrk="1" fontAlgn="auto" latinLnBrk="0" hangingPunct="1">
-              <a:lnSpc>
-                <a:spcPct val="100000"/>
-              </a:lnSpc>
-              <a:spcBef>
-                <a:spcPts val="0"/>
-              </a:spcBef>
-              <a:spcAft>
-                <a:spcPts val="0"/>
-              </a:spcAft>
-              <a:buClrTx/>
-              <a:buSzTx/>
-              <a:buFontTx/>
-              <a:buNone/>
-              <a:tabLst/>
-              <a:defRPr/>
-            </a:pPr>
-            <a:r>
-              <a:rPr lang="en-US" dirty="0"/>
-              <a:t>Setup Instructions…</a:t>
-            </a:r>
+            <a:endParaRPr lang="en-US" dirty="0"/>
           </a:p>
         </p:txBody>
       </p:sp>
@@ -2641,7 +2641,7 @@
           <a:p>
             <a:fld id="{3148858F-F1DB-4027-9C85-CCA6849540DD}" type="slidenum">
               <a:rPr lang="en-US" smtClean="0"/>
-              <a:t>6</a:t>
+              <a:t>7</a:t>
             </a:fld>
             <a:endParaRPr lang="en-US"/>
           </a:p>
@@ -2650,7 +2650,7 @@
     </p:spTree>
     <p:extLst>
       <p:ext uri="{BB962C8B-B14F-4D97-AF65-F5344CB8AC3E}">
-        <p14:creationId xmlns:p14="http://schemas.microsoft.com/office/powerpoint/2010/main" val="1279646560"/>
+        <p14:creationId xmlns:p14="http://schemas.microsoft.com/office/powerpoint/2010/main" val="771029687"/>
       </p:ext>
     </p:extLst>
   </p:cSld>
@@ -2704,25 +2704,6 @@
           <a:bodyPr/>
           <a:lstStyle/>
           <a:p>
-            <a:r>
-              <a:rPr lang="en-US" baseline="0" dirty="0"/>
-              <a:t>In computer science, a variable is a named location in memory.  Consider this clear plastic container with a variety of objects in it.  Each object is a specific size and takes up a certain amount of space.  Now think of this container as your computer’s memory.  Each time you create and assign a specific value to a variable, the software allocates space in memory large enough to contain whatever you assign to it.  Or using a container analogy,  it creates a box to hold its value.  The variable’s </a:t>
-            </a:r>
-            <a:r>
-              <a:rPr lang="en-US" b="1" baseline="0" dirty="0"/>
-              <a:t>datatype </a:t>
-            </a:r>
-            <a:r>
-              <a:rPr lang="en-US" b="0" baseline="0" dirty="0"/>
-              <a:t>determines the amount of memory required to hold it, just as we see in this picture.  </a:t>
-            </a:r>
-            <a:r>
-              <a:rPr lang="en-US" baseline="0" dirty="0"/>
-              <a:t>Behind the name you use for a variable, there’s a hidden address or pointer to its location or compartment in memory.</a:t>
-            </a:r>
-            <a:endParaRPr lang="en-US" dirty="0"/>
-          </a:p>
-          <a:p>
             <a:pPr marL="0" marR="0" lvl="0" indent="0" algn="l" defTabSz="914400" rtl="0" eaLnBrk="1" fontAlgn="auto" latinLnBrk="0" hangingPunct="1">
               <a:lnSpc>
                 <a:spcPct val="100000"/>
@@ -2740,7 +2721,10 @@
               <a:tabLst/>
               <a:defRPr/>
             </a:pPr>
-            <a:endParaRPr lang="en-US" dirty="0"/>
+            <a:r>
+              <a:rPr lang="en-US" dirty="0"/>
+              <a:t>Setup Instructions…</a:t>
+            </a:r>
           </a:p>
         </p:txBody>
       </p:sp>
@@ -2761,7 +2745,7 @@
           <a:p>
             <a:fld id="{3148858F-F1DB-4027-9C85-CCA6849540DD}" type="slidenum">
               <a:rPr lang="en-US" smtClean="0"/>
-              <a:t>7</a:t>
+              <a:t>8</a:t>
             </a:fld>
             <a:endParaRPr lang="en-US"/>
           </a:p>
@@ -2770,7 +2754,7 @@
     </p:spTree>
     <p:extLst>
       <p:ext uri="{BB962C8B-B14F-4D97-AF65-F5344CB8AC3E}">
-        <p14:creationId xmlns:p14="http://schemas.microsoft.com/office/powerpoint/2010/main" val="2360977460"/>
+        <p14:creationId xmlns:p14="http://schemas.microsoft.com/office/powerpoint/2010/main" val="1279646560"/>
       </p:ext>
     </p:extLst>
   </p:cSld>
@@ -2824,27 +2808,23 @@
           <a:bodyPr/>
           <a:lstStyle/>
           <a:p>
-            <a:pPr marL="0" marR="0" lvl="0" indent="0" algn="l" defTabSz="914400" rtl="0" eaLnBrk="1" fontAlgn="auto" latinLnBrk="0" hangingPunct="1">
-              <a:lnSpc>
-                <a:spcPct val="100000"/>
-              </a:lnSpc>
-              <a:spcBef>
-                <a:spcPts val="0"/>
-              </a:spcBef>
-              <a:spcAft>
-                <a:spcPts val="0"/>
-              </a:spcAft>
-              <a:buClrTx/>
-              <a:buSzTx/>
-              <a:buFontTx/>
-              <a:buNone/>
-              <a:tabLst/>
-              <a:defRPr/>
-            </a:pPr>
-            <a:r>
-              <a:rPr lang="en-US" dirty="0"/>
-              <a:t>And this graphic shows Python’s datatypes.</a:t>
-            </a:r>
+            <a:r>
+              <a:rPr lang="en-US" baseline="0" dirty="0"/>
+              <a:t>In computer science, a variable is a named location in memory.  Consider this clear plastic container with a variety of objects in it.  Each object is a specific size and takes up a certain amount of space.  Now think of this container as your computer’s memory.  Each time you create and assign a specific value to a variable, the software allocates space in memory large enough to contain whatever you assign to it.  Or using a container analogy,  it creates a box to hold its value.  The variable’s </a:t>
+            </a:r>
+            <a:r>
+              <a:rPr lang="en-US" b="1" baseline="0" dirty="0"/>
+              <a:t>datatype </a:t>
+            </a:r>
+            <a:r>
+              <a:rPr lang="en-US" b="0" baseline="0" dirty="0"/>
+              <a:t>determines the amount of memory required to hold it, just as we see in this picture.  </a:t>
+            </a:r>
+            <a:r>
+              <a:rPr lang="en-US" baseline="0" dirty="0"/>
+              <a:t>Behind the name you use for a variable, there’s a hidden address or pointer to its location or compartment in memory.</a:t>
+            </a:r>
+            <a:endParaRPr lang="en-US" dirty="0"/>
           </a:p>
           <a:p>
             <a:pPr marL="0" marR="0" lvl="0" indent="0" algn="l" defTabSz="914400" rtl="0" eaLnBrk="1" fontAlgn="auto" latinLnBrk="0" hangingPunct="1">
@@ -2866,29 +2846,6 @@
             </a:pPr>
             <a:endParaRPr lang="en-US" dirty="0"/>
           </a:p>
-          <a:p>
-            <a:pPr marL="0" marR="0" lvl="0" indent="0" algn="l" defTabSz="914400" rtl="0" eaLnBrk="1" fontAlgn="auto" latinLnBrk="0" hangingPunct="1">
-              <a:lnSpc>
-                <a:spcPct val="100000"/>
-              </a:lnSpc>
-              <a:spcBef>
-                <a:spcPts val="0"/>
-              </a:spcBef>
-              <a:spcAft>
-                <a:spcPts val="0"/>
-              </a:spcAft>
-              <a:buClrTx/>
-              <a:buSzTx/>
-              <a:buFontTx/>
-              <a:buNone/>
-              <a:tabLst/>
-              <a:defRPr/>
-            </a:pPr>
-            <a:r>
-              <a:rPr lang="en-US" dirty="0"/>
-              <a:t>https://pynative.com/python-data-types/</a:t>
-            </a:r>
-          </a:p>
         </p:txBody>
       </p:sp>
       <p:sp>
@@ -2908,7 +2865,7 @@
           <a:p>
             <a:fld id="{3148858F-F1DB-4027-9C85-CCA6849540DD}" type="slidenum">
               <a:rPr lang="en-US" smtClean="0"/>
-              <a:t>8</a:t>
+              <a:t>9</a:t>
             </a:fld>
             <a:endParaRPr lang="en-US"/>
           </a:p>
@@ -2917,7 +2874,7 @@
     </p:spTree>
     <p:extLst>
       <p:ext uri="{BB962C8B-B14F-4D97-AF65-F5344CB8AC3E}">
-        <p14:creationId xmlns:p14="http://schemas.microsoft.com/office/powerpoint/2010/main" val="62286822"/>
+        <p14:creationId xmlns:p14="http://schemas.microsoft.com/office/powerpoint/2010/main" val="2360977460"/>
       </p:ext>
     </p:extLst>
   </p:cSld>
@@ -2990,7 +2947,50 @@
             </a:pPr>
             <a:r>
               <a:rPr lang="en-US" dirty="0"/>
-              <a:t>Adam naming the animals in the Biblical story.  Variable naming and standards are critically important.</a:t>
+              <a:t>And this graphic shows Python’s datatypes.</a:t>
+            </a:r>
+          </a:p>
+          <a:p>
+            <a:pPr marL="0" marR="0" lvl="0" indent="0" algn="l" defTabSz="914400" rtl="0" eaLnBrk="1" fontAlgn="auto" latinLnBrk="0" hangingPunct="1">
+              <a:lnSpc>
+                <a:spcPct val="100000"/>
+              </a:lnSpc>
+              <a:spcBef>
+                <a:spcPts val="0"/>
+              </a:spcBef>
+              <a:spcAft>
+                <a:spcPts val="0"/>
+              </a:spcAft>
+              <a:buClrTx/>
+              <a:buSzTx/>
+              <a:buFontTx/>
+              <a:buNone/>
+              <a:tabLst/>
+              <a:defRPr/>
+            </a:pPr>
+            <a:endParaRPr lang="en-US" dirty="0"/>
+          </a:p>
+          <a:p>
+            <a:pPr marL="0" marR="0" lvl="0" indent="0" algn="l" defTabSz="914400" rtl="0" eaLnBrk="1" fontAlgn="auto" latinLnBrk="0" hangingPunct="1">
+              <a:lnSpc>
+                <a:spcPct val="100000"/>
+              </a:lnSpc>
+              <a:spcBef>
+                <a:spcPts val="0"/>
+              </a:spcBef>
+              <a:spcAft>
+                <a:spcPts val="0"/>
+              </a:spcAft>
+              <a:buClrTx/>
+              <a:buSzTx/>
+              <a:buFontTx/>
+              <a:buNone/>
+              <a:tabLst/>
+              <a:defRPr/>
+            </a:pPr>
+            <a:r>
+              <a:rPr lang="en-US" dirty="0"/>
+              <a:t>https://pynative.com/python-data-types/</a:t>
             </a:r>
           </a:p>
         </p:txBody>
@@ -3012,7 +3012,7 @@
           <a:p>
             <a:fld id="{3148858F-F1DB-4027-9C85-CCA6849540DD}" type="slidenum">
               <a:rPr lang="en-US" smtClean="0"/>
-              <a:t>9</a:t>
+              <a:t>10</a:t>
             </a:fld>
             <a:endParaRPr lang="en-US"/>
           </a:p>
@@ -3021,7 +3021,7 @@
     </p:spTree>
     <p:extLst>
       <p:ext uri="{BB962C8B-B14F-4D97-AF65-F5344CB8AC3E}">
-        <p14:creationId xmlns:p14="http://schemas.microsoft.com/office/powerpoint/2010/main" val="828379136"/>
+        <p14:creationId xmlns:p14="http://schemas.microsoft.com/office/powerpoint/2010/main" val="62286822"/>
       </p:ext>
     </p:extLst>
   </p:cSld>
@@ -6361,6 +6361,338 @@
       </p:grpSpPr>
       <p:pic>
         <p:nvPicPr>
+          <p:cNvPr id="1026" name="Picture 2" descr="Python Data Types – PYnative">
+            <a:extLst>
+              <a:ext uri="{FF2B5EF4-FFF2-40B4-BE49-F238E27FC236}">
+                <a16:creationId xmlns:a16="http://schemas.microsoft.com/office/drawing/2014/main" id="{56597BF9-7BA9-4FF7-95D0-F8C4362F5209}"/>
+              </a:ext>
+            </a:extLst>
+          </p:cNvPr>
+          <p:cNvPicPr>
+            <a:picLocks noChangeAspect="1" noChangeArrowheads="1"/>
+          </p:cNvPicPr>
+          <p:nvPr/>
+        </p:nvPicPr>
+        <p:blipFill>
+          <a:blip r:embed="rId3">
+            <a:extLst>
+              <a:ext uri="{28A0092B-C50C-407E-A947-70E740481C1C}">
+                <a14:useLocalDpi xmlns:a14="http://schemas.microsoft.com/office/drawing/2010/main" val="0"/>
+              </a:ext>
+            </a:extLst>
+          </a:blip>
+          <a:srcRect/>
+          <a:stretch>
+            <a:fillRect/>
+          </a:stretch>
+        </p:blipFill>
+        <p:spPr bwMode="auto">
+          <a:xfrm>
+            <a:off x="3152775" y="862012"/>
+            <a:ext cx="5886450" cy="5133975"/>
+          </a:xfrm>
+          <a:prstGeom prst="rect">
+            <a:avLst/>
+          </a:prstGeom>
+          <a:noFill/>
+          <a:extLst>
+            <a:ext uri="{909E8E84-426E-40DD-AFC4-6F175D3DCCD1}">
+              <a14:hiddenFill xmlns:a14="http://schemas.microsoft.com/office/drawing/2010/main">
+                <a:solidFill>
+                  <a:srgbClr val="FFFFFF"/>
+                </a:solidFill>
+              </a14:hiddenFill>
+            </a:ext>
+          </a:extLst>
+        </p:spPr>
+      </p:pic>
+      <p:sp>
+        <p:nvSpPr>
+          <p:cNvPr id="3" name="TextBox 2">
+            <a:extLst>
+              <a:ext uri="{FF2B5EF4-FFF2-40B4-BE49-F238E27FC236}">
+                <a16:creationId xmlns:a16="http://schemas.microsoft.com/office/drawing/2014/main" id="{A187EEFE-7DF5-468D-A426-71737BD128AA}"/>
+              </a:ext>
+            </a:extLst>
+          </p:cNvPr>
+          <p:cNvSpPr txBox="1"/>
+          <p:nvPr/>
+        </p:nvSpPr>
+        <p:spPr>
+          <a:xfrm>
+            <a:off x="0" y="6550223"/>
+            <a:ext cx="12192000" cy="307777"/>
+          </a:xfrm>
+          <a:prstGeom prst="rect">
+            <a:avLst/>
+          </a:prstGeom>
+          <a:noFill/>
+        </p:spPr>
+        <p:txBody>
+          <a:bodyPr wrap="square" rtlCol="0">
+            <a:spAutoFit/>
+          </a:bodyPr>
+          <a:lstStyle/>
+          <a:p>
+            <a:pPr marL="0" marR="0" lvl="0" indent="0" algn="l" defTabSz="914400" rtl="0" eaLnBrk="1" fontAlgn="auto" latinLnBrk="0" hangingPunct="1">
+              <a:lnSpc>
+                <a:spcPct val="100000"/>
+              </a:lnSpc>
+              <a:spcBef>
+                <a:spcPts val="0"/>
+              </a:spcBef>
+              <a:spcAft>
+                <a:spcPts val="0"/>
+              </a:spcAft>
+              <a:buClrTx/>
+              <a:buSzTx/>
+              <a:buFontTx/>
+              <a:buNone/>
+              <a:tabLst/>
+              <a:defRPr/>
+            </a:pPr>
+            <a:r>
+              <a:rPr lang="en-US" sz="1400" dirty="0">
+                <a:solidFill>
+                  <a:schemeClr val="tx1">
+                    <a:lumMod val="65000"/>
+                    <a:lumOff val="35000"/>
+                  </a:schemeClr>
+                </a:solidFill>
+                <a:latin typeface="+mj-lt"/>
+                <a:ea typeface="Verdana" panose="020B0604030504040204" pitchFamily="34" charset="0"/>
+              </a:rPr>
+              <a:t>Image Credit: </a:t>
+            </a:r>
+            <a:r>
+              <a:rPr lang="en-US" sz="1400" dirty="0">
+                <a:solidFill>
+                  <a:schemeClr val="tx1">
+                    <a:lumMod val="65000"/>
+                    <a:lumOff val="35000"/>
+                  </a:schemeClr>
+                </a:solidFill>
+                <a:latin typeface="+mj-lt"/>
+              </a:rPr>
+              <a:t>https://pynative.com/python-data-types/</a:t>
+            </a:r>
+          </a:p>
+        </p:txBody>
+      </p:sp>
+    </p:spTree>
+    <p:extLst>
+      <p:ext uri="{BB962C8B-B14F-4D97-AF65-F5344CB8AC3E}">
+        <p14:creationId xmlns:p14="http://schemas.microsoft.com/office/powerpoint/2010/main" val="170311557"/>
+      </p:ext>
+    </p:extLst>
+  </p:cSld>
+  <p:clrMapOvr>
+    <a:masterClrMapping/>
+  </p:clrMapOvr>
+  <mc:AlternateContent xmlns:mc="http://schemas.openxmlformats.org/markup-compatibility/2006" xmlns:p14="http://schemas.microsoft.com/office/powerpoint/2010/main">
+    <mc:Choice Requires="p14">
+      <p:transition spd="med" p14:dur="700">
+        <p:fade/>
+      </p:transition>
+    </mc:Choice>
+    <mc:Fallback xmlns="">
+      <p:transition spd="med">
+        <p:fade/>
+      </p:transition>
+    </mc:Fallback>
+  </mc:AlternateContent>
+</p:sld>
+</file>
+
+<file path=ppt/slides/slide11.xml><?xml version="1.0" encoding="utf-8"?>
+<p:sld xmlns:a="http://schemas.openxmlformats.org/drawingml/2006/main" xmlns:r="http://schemas.openxmlformats.org/officeDocument/2006/relationships" xmlns:p="http://schemas.openxmlformats.org/presentationml/2006/main">
+  <p:cSld>
+    <p:spTree>
+      <p:nvGrpSpPr>
+        <p:cNvPr id="1" name=""/>
+        <p:cNvGrpSpPr/>
+        <p:nvPr/>
+      </p:nvGrpSpPr>
+      <p:grpSpPr>
+        <a:xfrm>
+          <a:off x="0" y="0"/>
+          <a:ext cx="0" cy="0"/>
+          <a:chOff x="0" y="0"/>
+          <a:chExt cx="0" cy="0"/>
+        </a:xfrm>
+      </p:grpSpPr>
+      <p:pic>
+        <p:nvPicPr>
+          <p:cNvPr id="2050" name="Picture 2" descr="Icon of Adam Naming the Animals - 15th c. Meteora - (1AA10) - Uncut  Mountain Supply">
+            <a:extLst>
+              <a:ext uri="{FF2B5EF4-FFF2-40B4-BE49-F238E27FC236}">
+                <a16:creationId xmlns:a16="http://schemas.microsoft.com/office/drawing/2014/main" id="{A8A604AE-38F9-4BA8-858C-E33429DF7680}"/>
+              </a:ext>
+            </a:extLst>
+          </p:cNvPr>
+          <p:cNvPicPr>
+            <a:picLocks noChangeAspect="1" noChangeArrowheads="1"/>
+          </p:cNvPicPr>
+          <p:nvPr/>
+        </p:nvPicPr>
+        <p:blipFill>
+          <a:blip r:embed="rId3">
+            <a:extLst>
+              <a:ext uri="{28A0092B-C50C-407E-A947-70E740481C1C}">
+                <a14:useLocalDpi xmlns:a14="http://schemas.microsoft.com/office/drawing/2010/main" val="0"/>
+              </a:ext>
+            </a:extLst>
+          </a:blip>
+          <a:srcRect/>
+          <a:stretch>
+            <a:fillRect/>
+          </a:stretch>
+        </p:blipFill>
+        <p:spPr bwMode="auto">
+          <a:xfrm>
+            <a:off x="2785598" y="1290062"/>
+            <a:ext cx="6620804" cy="4277875"/>
+          </a:xfrm>
+          <a:prstGeom prst="rect">
+            <a:avLst/>
+          </a:prstGeom>
+          <a:noFill/>
+          <a:ln w="3175">
+            <a:solidFill>
+              <a:schemeClr val="tx1">
+                <a:lumMod val="75000"/>
+                <a:lumOff val="25000"/>
+              </a:schemeClr>
+            </a:solidFill>
+          </a:ln>
+          <a:effectLst>
+            <a:outerShdw blurRad="50800" dist="38100" dir="2700000" algn="tl" rotWithShape="0">
+              <a:prstClr val="black">
+                <a:alpha val="40000"/>
+              </a:prstClr>
+            </a:outerShdw>
+          </a:effectLst>
+          <a:extLst>
+            <a:ext uri="{909E8E84-426E-40DD-AFC4-6F175D3DCCD1}">
+              <a14:hiddenFill xmlns:a14="http://schemas.microsoft.com/office/drawing/2010/main">
+                <a:solidFill>
+                  <a:srgbClr val="FFFFFF"/>
+                </a:solidFill>
+              </a14:hiddenFill>
+            </a:ext>
+          </a:extLst>
+        </p:spPr>
+      </p:pic>
+      <p:sp>
+        <p:nvSpPr>
+          <p:cNvPr id="6" name="TextBox 5">
+            <a:extLst>
+              <a:ext uri="{FF2B5EF4-FFF2-40B4-BE49-F238E27FC236}">
+                <a16:creationId xmlns:a16="http://schemas.microsoft.com/office/drawing/2014/main" id="{29F3E589-6F1A-4BB3-B969-F58FCA3DE9E0}"/>
+              </a:ext>
+            </a:extLst>
+          </p:cNvPr>
+          <p:cNvSpPr txBox="1"/>
+          <p:nvPr/>
+        </p:nvSpPr>
+        <p:spPr>
+          <a:xfrm>
+            <a:off x="0" y="6550223"/>
+            <a:ext cx="12192000" cy="307777"/>
+          </a:xfrm>
+          <a:prstGeom prst="rect">
+            <a:avLst/>
+          </a:prstGeom>
+          <a:noFill/>
+        </p:spPr>
+        <p:txBody>
+          <a:bodyPr wrap="square" rtlCol="0">
+            <a:spAutoFit/>
+          </a:bodyPr>
+          <a:lstStyle/>
+          <a:p>
+            <a:r>
+              <a:rPr lang="en-US" sz="1400" dirty="0">
+                <a:solidFill>
+                  <a:schemeClr val="tx1">
+                    <a:lumMod val="65000"/>
+                    <a:lumOff val="35000"/>
+                  </a:schemeClr>
+                </a:solidFill>
+                <a:latin typeface="+mj-lt"/>
+                <a:ea typeface="Verdana" panose="020B0604030504040204" pitchFamily="34" charset="0"/>
+              </a:rPr>
+              <a:t>Image Credit: </a:t>
+            </a:r>
+            <a:r>
+              <a:rPr lang="en-US" sz="1400" dirty="0">
+                <a:solidFill>
+                  <a:schemeClr val="tx1">
+                    <a:lumMod val="65000"/>
+                    <a:lumOff val="35000"/>
+                  </a:schemeClr>
+                </a:solidFill>
+                <a:latin typeface="+mj-lt"/>
+              </a:rPr>
+              <a:t>https://www.uncutmountainsupply.com/icons/of-saints/by-name/a/icon-of-adam-naming-the-animals-15th-c-meteora-1aa10/</a:t>
+            </a:r>
+            <a:endParaRPr lang="en-US" sz="1400" dirty="0">
+              <a:solidFill>
+                <a:schemeClr val="tx1">
+                  <a:lumMod val="65000"/>
+                  <a:lumOff val="35000"/>
+                </a:schemeClr>
+              </a:solidFill>
+              <a:latin typeface="+mj-lt"/>
+              <a:ea typeface="Verdana" panose="020B0604030504040204" pitchFamily="34" charset="0"/>
+            </a:endParaRPr>
+          </a:p>
+        </p:txBody>
+      </p:sp>
+    </p:spTree>
+    <p:extLst>
+      <p:ext uri="{BB962C8B-B14F-4D97-AF65-F5344CB8AC3E}">
+        <p14:creationId xmlns:p14="http://schemas.microsoft.com/office/powerpoint/2010/main" val="4083169647"/>
+      </p:ext>
+    </p:extLst>
+  </p:cSld>
+  <p:clrMapOvr>
+    <a:masterClrMapping/>
+  </p:clrMapOvr>
+  <mc:AlternateContent xmlns:mc="http://schemas.openxmlformats.org/markup-compatibility/2006" xmlns:p14="http://schemas.microsoft.com/office/powerpoint/2010/main">
+    <mc:Choice Requires="p14">
+      <p:transition spd="med" p14:dur="700">
+        <p:fade/>
+      </p:transition>
+    </mc:Choice>
+    <mc:Fallback xmlns="">
+      <p:transition spd="med">
+        <p:fade/>
+      </p:transition>
+    </mc:Fallback>
+  </mc:AlternateContent>
+</p:sld>
+</file>
+
+<file path=ppt/slides/slide12.xml><?xml version="1.0" encoding="utf-8"?>
+<p:sld xmlns:a="http://schemas.openxmlformats.org/drawingml/2006/main" xmlns:r="http://schemas.openxmlformats.org/officeDocument/2006/relationships" xmlns:p="http://schemas.openxmlformats.org/presentationml/2006/main">
+  <p:cSld>
+    <p:spTree>
+      <p:nvGrpSpPr>
+        <p:cNvPr id="1" name=""/>
+        <p:cNvGrpSpPr/>
+        <p:nvPr/>
+      </p:nvGrpSpPr>
+      <p:grpSpPr>
+        <a:xfrm>
+          <a:off x="0" y="0"/>
+          <a:ext cx="0" cy="0"/>
+          <a:chOff x="0" y="0"/>
+          <a:chExt cx="0" cy="0"/>
+        </a:xfrm>
+      </p:grpSpPr>
+      <p:pic>
+        <p:nvPicPr>
           <p:cNvPr id="6" name="Picture 5">
             <a:extLst>
               <a:ext uri="{FF2B5EF4-FFF2-40B4-BE49-F238E27FC236}">
@@ -6414,7 +6746,7 @@
 </p:sld>
 </file>
 
-<file path=ppt/slides/slide11.xml><?xml version="1.0" encoding="utf-8"?>
+<file path=ppt/slides/slide13.xml><?xml version="1.0" encoding="utf-8"?>
 <p:sld xmlns:a="http://schemas.openxmlformats.org/drawingml/2006/main" xmlns:r="http://schemas.openxmlformats.org/officeDocument/2006/relationships" xmlns:p="http://schemas.openxmlformats.org/presentationml/2006/main">
   <p:cSld>
     <p:spTree>
@@ -6503,7 +6835,7 @@
 </p:sld>
 </file>
 
-<file path=ppt/slides/slide12.xml><?xml version="1.0" encoding="utf-8"?>
+<file path=ppt/slides/slide14.xml><?xml version="1.0" encoding="utf-8"?>
 <p:sld xmlns:a="http://schemas.openxmlformats.org/drawingml/2006/main" xmlns:r="http://schemas.openxmlformats.org/officeDocument/2006/relationships" xmlns:p="http://schemas.openxmlformats.org/presentationml/2006/main">
   <p:cSld>
     <p:spTree>
@@ -6575,7 +6907,7 @@
 </p:sld>
 </file>
 
-<file path=ppt/slides/slide13.xml><?xml version="1.0" encoding="utf-8"?>
+<file path=ppt/slides/slide15.xml><?xml version="1.0" encoding="utf-8"?>
 <p:sld xmlns:a="http://schemas.openxmlformats.org/drawingml/2006/main" xmlns:r="http://schemas.openxmlformats.org/officeDocument/2006/relationships" xmlns:p="http://schemas.openxmlformats.org/presentationml/2006/main">
   <p:cSld>
     <p:spTree>
@@ -6651,312 +6983,6 @@
     <p:extLst>
       <p:ext uri="{BB962C8B-B14F-4D97-AF65-F5344CB8AC3E}">
         <p14:creationId xmlns:p14="http://schemas.microsoft.com/office/powerpoint/2010/main" val="2021418747"/>
-      </p:ext>
-    </p:extLst>
-  </p:cSld>
-  <p:clrMapOvr>
-    <a:masterClrMapping/>
-  </p:clrMapOvr>
-  <mc:AlternateContent xmlns:mc="http://schemas.openxmlformats.org/markup-compatibility/2006" xmlns:p14="http://schemas.microsoft.com/office/powerpoint/2010/main">
-    <mc:Choice Requires="p14">
-      <p:transition spd="med" p14:dur="700">
-        <p:fade/>
-      </p:transition>
-    </mc:Choice>
-    <mc:Fallback xmlns="">
-      <p:transition spd="med">
-        <p:fade/>
-      </p:transition>
-    </mc:Fallback>
-  </mc:AlternateContent>
-</p:sld>
-</file>
-
-<file path=ppt/slides/slide14.xml><?xml version="1.0" encoding="utf-8"?>
-<p:sld xmlns:a="http://schemas.openxmlformats.org/drawingml/2006/main" xmlns:r="http://schemas.openxmlformats.org/officeDocument/2006/relationships" xmlns:p="http://schemas.openxmlformats.org/presentationml/2006/main">
-  <p:cSld>
-    <p:spTree>
-      <p:nvGrpSpPr>
-        <p:cNvPr id="1" name=""/>
-        <p:cNvGrpSpPr/>
-        <p:nvPr/>
-      </p:nvGrpSpPr>
-      <p:grpSpPr>
-        <a:xfrm>
-          <a:off x="0" y="0"/>
-          <a:ext cx="0" cy="0"/>
-          <a:chOff x="0" y="0"/>
-          <a:chExt cx="0" cy="0"/>
-        </a:xfrm>
-      </p:grpSpPr>
-      <p:pic>
-        <p:nvPicPr>
-          <p:cNvPr id="1026" name="Picture 2" descr="Python Datatype conversion">
-            <a:extLst>
-              <a:ext uri="{FF2B5EF4-FFF2-40B4-BE49-F238E27FC236}">
-                <a16:creationId xmlns:a16="http://schemas.microsoft.com/office/drawing/2014/main" id="{C5A4E410-78DF-44F2-BB04-9461EED29C66}"/>
-              </a:ext>
-            </a:extLst>
-          </p:cNvPr>
-          <p:cNvPicPr>
-            <a:picLocks noChangeAspect="1" noChangeArrowheads="1"/>
-          </p:cNvPicPr>
-          <p:nvPr/>
-        </p:nvPicPr>
-        <p:blipFill>
-          <a:blip r:embed="rId3">
-            <a:extLst>
-              <a:ext uri="{28A0092B-C50C-407E-A947-70E740481C1C}">
-                <a14:useLocalDpi xmlns:a14="http://schemas.microsoft.com/office/drawing/2010/main" val="0"/>
-              </a:ext>
-            </a:extLst>
-          </a:blip>
-          <a:srcRect/>
-          <a:stretch>
-            <a:fillRect/>
-          </a:stretch>
-        </p:blipFill>
-        <p:spPr bwMode="auto">
-          <a:xfrm>
-            <a:off x="2400255" y="2404008"/>
-            <a:ext cx="7391489" cy="2049983"/>
-          </a:xfrm>
-          <a:prstGeom prst="rect">
-            <a:avLst/>
-          </a:prstGeom>
-          <a:noFill/>
-          <a:extLst>
-            <a:ext uri="{909E8E84-426E-40DD-AFC4-6F175D3DCCD1}">
-              <a14:hiddenFill xmlns:a14="http://schemas.microsoft.com/office/drawing/2010/main">
-                <a:solidFill>
-                  <a:srgbClr val="FFFFFF"/>
-                </a:solidFill>
-              </a14:hiddenFill>
-            </a:ext>
-          </a:extLst>
-        </p:spPr>
-      </p:pic>
-      <p:pic>
-        <p:nvPicPr>
-          <p:cNvPr id="4" name="Picture 3">
-            <a:extLst>
-              <a:ext uri="{FF2B5EF4-FFF2-40B4-BE49-F238E27FC236}">
-                <a16:creationId xmlns:a16="http://schemas.microsoft.com/office/drawing/2014/main" id="{D20A1309-E55E-44DB-9811-96C67DA5C666}"/>
-              </a:ext>
-            </a:extLst>
-          </p:cNvPr>
-          <p:cNvPicPr>
-            <a:picLocks noChangeAspect="1"/>
-          </p:cNvPicPr>
-          <p:nvPr/>
-        </p:nvPicPr>
-        <p:blipFill>
-          <a:blip r:embed="rId4">
-            <a:extLst>
-              <a:ext uri="{28A0092B-C50C-407E-A947-70E740481C1C}">
-                <a14:useLocalDpi xmlns:a14="http://schemas.microsoft.com/office/drawing/2010/main" val="0"/>
-              </a:ext>
-            </a:extLst>
-          </a:blip>
-          <a:stretch>
-            <a:fillRect/>
-          </a:stretch>
-        </p:blipFill>
-        <p:spPr>
-          <a:xfrm>
-            <a:off x="10066897" y="4529137"/>
-            <a:ext cx="2116085" cy="2328862"/>
-          </a:xfrm>
-          <a:prstGeom prst="rect">
-            <a:avLst/>
-          </a:prstGeom>
-        </p:spPr>
-      </p:pic>
-      <p:sp>
-        <p:nvSpPr>
-          <p:cNvPr id="8" name="TextBox 7">
-            <a:extLst>
-              <a:ext uri="{FF2B5EF4-FFF2-40B4-BE49-F238E27FC236}">
-                <a16:creationId xmlns:a16="http://schemas.microsoft.com/office/drawing/2014/main" id="{FBA9AB83-FE78-48D0-8549-1BCE5EAB6D3A}"/>
-              </a:ext>
-            </a:extLst>
-          </p:cNvPr>
-          <p:cNvSpPr txBox="1"/>
-          <p:nvPr/>
-        </p:nvSpPr>
-        <p:spPr>
-          <a:xfrm>
-            <a:off x="0" y="6550223"/>
-            <a:ext cx="12192000" cy="307777"/>
-          </a:xfrm>
-          <a:prstGeom prst="rect">
-            <a:avLst/>
-          </a:prstGeom>
-          <a:noFill/>
-        </p:spPr>
-        <p:txBody>
-          <a:bodyPr wrap="square" rtlCol="0">
-            <a:spAutoFit/>
-          </a:bodyPr>
-          <a:lstStyle/>
-          <a:p>
-            <a:r>
-              <a:rPr lang="en-US" sz="1400" dirty="0">
-                <a:solidFill>
-                  <a:schemeClr val="tx1">
-                    <a:lumMod val="65000"/>
-                    <a:lumOff val="35000"/>
-                  </a:schemeClr>
-                </a:solidFill>
-                <a:latin typeface="+mj-lt"/>
-                <a:ea typeface="Verdana" panose="020B0604030504040204" pitchFamily="34" charset="0"/>
-              </a:rPr>
-              <a:t>Image Credit: </a:t>
-            </a:r>
-            <a:r>
-              <a:rPr lang="en-US" sz="1400" dirty="0">
-                <a:solidFill>
-                  <a:schemeClr val="tx1">
-                    <a:lumMod val="65000"/>
-                    <a:lumOff val="35000"/>
-                  </a:schemeClr>
-                </a:solidFill>
-              </a:rPr>
-              <a:t>https://www.vectorstock.com/royalty-free-vector/cartoon-wizard-vector-1693529</a:t>
-            </a:r>
-            <a:endParaRPr lang="en-US" sz="1400" dirty="0">
-              <a:solidFill>
-                <a:schemeClr val="tx1">
-                  <a:lumMod val="65000"/>
-                  <a:lumOff val="35000"/>
-                </a:schemeClr>
-              </a:solidFill>
-              <a:latin typeface="+mj-lt"/>
-              <a:ea typeface="Verdana" panose="020B0604030504040204" pitchFamily="34" charset="0"/>
-            </a:endParaRPr>
-          </a:p>
-        </p:txBody>
-      </p:sp>
-    </p:spTree>
-    <p:extLst>
-      <p:ext uri="{BB962C8B-B14F-4D97-AF65-F5344CB8AC3E}">
-        <p14:creationId xmlns:p14="http://schemas.microsoft.com/office/powerpoint/2010/main" val="3192052037"/>
-      </p:ext>
-    </p:extLst>
-  </p:cSld>
-  <p:clrMapOvr>
-    <a:masterClrMapping/>
-  </p:clrMapOvr>
-  <mc:AlternateContent xmlns:mc="http://schemas.openxmlformats.org/markup-compatibility/2006" xmlns:p14="http://schemas.microsoft.com/office/powerpoint/2010/main">
-    <mc:Choice Requires="p14">
-      <p:transition spd="med" p14:dur="700">
-        <p:fade/>
-      </p:transition>
-    </mc:Choice>
-    <mc:Fallback xmlns="">
-      <p:transition spd="med">
-        <p:fade/>
-      </p:transition>
-    </mc:Fallback>
-  </mc:AlternateContent>
-</p:sld>
-</file>
-
-<file path=ppt/slides/slide15.xml><?xml version="1.0" encoding="utf-8"?>
-<p:sld xmlns:a="http://schemas.openxmlformats.org/drawingml/2006/main" xmlns:r="http://schemas.openxmlformats.org/officeDocument/2006/relationships" xmlns:p="http://schemas.openxmlformats.org/presentationml/2006/main">
-  <p:cSld>
-    <p:spTree>
-      <p:nvGrpSpPr>
-        <p:cNvPr id="1" name=""/>
-        <p:cNvGrpSpPr/>
-        <p:nvPr/>
-      </p:nvGrpSpPr>
-      <p:grpSpPr>
-        <a:xfrm>
-          <a:off x="0" y="0"/>
-          <a:ext cx="0" cy="0"/>
-          <a:chOff x="0" y="0"/>
-          <a:chExt cx="0" cy="0"/>
-        </a:xfrm>
-      </p:grpSpPr>
-      <p:sp>
-        <p:nvSpPr>
-          <p:cNvPr id="2" name="Title 1">
-            <a:extLst>
-              <a:ext uri="{FF2B5EF4-FFF2-40B4-BE49-F238E27FC236}">
-                <a16:creationId xmlns:a16="http://schemas.microsoft.com/office/drawing/2014/main" id="{8306FF31-301F-43F0-8202-A782726E446A}"/>
-              </a:ext>
-            </a:extLst>
-          </p:cNvPr>
-          <p:cNvSpPr>
-            <a:spLocks noGrp="1"/>
-          </p:cNvSpPr>
-          <p:nvPr>
-            <p:ph type="title"/>
-          </p:nvPr>
-        </p:nvSpPr>
-        <p:spPr>
-          <a:xfrm>
-            <a:off x="0" y="365127"/>
-            <a:ext cx="12191999" cy="827416"/>
-          </a:xfrm>
-        </p:spPr>
-        <p:txBody>
-          <a:bodyPr>
-            <a:normAutofit/>
-          </a:bodyPr>
-          <a:lstStyle/>
-          <a:p>
-            <a:pPr algn="ctr"/>
-            <a:r>
-              <a:rPr lang="en-US" sz="4000" dirty="0">
-                <a:latin typeface="Palatino Linotype" panose="02040502050505030304" pitchFamily="18" charset="0"/>
-                <a:cs typeface="Segoe UI Light" panose="020B0502040204020203" pitchFamily="34" charset="0"/>
-              </a:rPr>
-              <a:t>Architecture (Interpreted Languages)</a:t>
-            </a:r>
-          </a:p>
-        </p:txBody>
-      </p:sp>
-      <p:pic>
-        <p:nvPicPr>
-          <p:cNvPr id="5" name="Content Placeholder 12">
-            <a:extLst>
-              <a:ext uri="{FF2B5EF4-FFF2-40B4-BE49-F238E27FC236}">
-                <a16:creationId xmlns:a16="http://schemas.microsoft.com/office/drawing/2014/main" id="{67D6BD1D-3F09-4338-B1FF-CD4EABF496E1}"/>
-              </a:ext>
-            </a:extLst>
-          </p:cNvPr>
-          <p:cNvPicPr>
-            <a:picLocks noGrp="1" noChangeAspect="1"/>
-          </p:cNvPicPr>
-          <p:nvPr>
-            <p:ph idx="1"/>
-          </p:nvPr>
-        </p:nvPicPr>
-        <p:blipFill>
-          <a:blip r:embed="rId3">
-            <a:extLst>
-              <a:ext uri="{28A0092B-C50C-407E-A947-70E740481C1C}">
-                <a14:useLocalDpi xmlns:a14="http://schemas.microsoft.com/office/drawing/2010/main" val="0"/>
-              </a:ext>
-            </a:extLst>
-          </a:blip>
-          <a:stretch>
-            <a:fillRect/>
-          </a:stretch>
-        </p:blipFill>
-        <p:spPr>
-          <a:xfrm>
-            <a:off x="813319" y="1982277"/>
-            <a:ext cx="10149431" cy="3437166"/>
-          </a:xfrm>
-        </p:spPr>
-      </p:pic>
-    </p:spTree>
-    <p:extLst>
-      <p:ext uri="{BB962C8B-B14F-4D97-AF65-F5344CB8AC3E}">
-        <p14:creationId xmlns:p14="http://schemas.microsoft.com/office/powerpoint/2010/main" val="791954200"/>
       </p:ext>
     </p:extLst>
   </p:cSld>
@@ -6997,10 +7023,316 @@
       </p:grpSpPr>
       <p:pic>
         <p:nvPicPr>
-          <p:cNvPr id="9" name="Picture 8">
-            <a:extLst>
-              <a:ext uri="{FF2B5EF4-FFF2-40B4-BE49-F238E27FC236}">
-                <a16:creationId xmlns:a16="http://schemas.microsoft.com/office/drawing/2014/main" id="{B21E0DAA-D2AE-AB92-1388-B9FA0D2D49FF}"/>
+          <p:cNvPr id="1026" name="Picture 2" descr="Python Datatype conversion">
+            <a:extLst>
+              <a:ext uri="{FF2B5EF4-FFF2-40B4-BE49-F238E27FC236}">
+                <a16:creationId xmlns:a16="http://schemas.microsoft.com/office/drawing/2014/main" id="{C5A4E410-78DF-44F2-BB04-9461EED29C66}"/>
+              </a:ext>
+            </a:extLst>
+          </p:cNvPr>
+          <p:cNvPicPr>
+            <a:picLocks noChangeAspect="1" noChangeArrowheads="1"/>
+          </p:cNvPicPr>
+          <p:nvPr/>
+        </p:nvPicPr>
+        <p:blipFill>
+          <a:blip r:embed="rId3">
+            <a:extLst>
+              <a:ext uri="{28A0092B-C50C-407E-A947-70E740481C1C}">
+                <a14:useLocalDpi xmlns:a14="http://schemas.microsoft.com/office/drawing/2010/main" val="0"/>
+              </a:ext>
+            </a:extLst>
+          </a:blip>
+          <a:srcRect/>
+          <a:stretch>
+            <a:fillRect/>
+          </a:stretch>
+        </p:blipFill>
+        <p:spPr bwMode="auto">
+          <a:xfrm>
+            <a:off x="2400255" y="2404008"/>
+            <a:ext cx="7391489" cy="2049983"/>
+          </a:xfrm>
+          <a:prstGeom prst="rect">
+            <a:avLst/>
+          </a:prstGeom>
+          <a:noFill/>
+          <a:extLst>
+            <a:ext uri="{909E8E84-426E-40DD-AFC4-6F175D3DCCD1}">
+              <a14:hiddenFill xmlns:a14="http://schemas.microsoft.com/office/drawing/2010/main">
+                <a:solidFill>
+                  <a:srgbClr val="FFFFFF"/>
+                </a:solidFill>
+              </a14:hiddenFill>
+            </a:ext>
+          </a:extLst>
+        </p:spPr>
+      </p:pic>
+      <p:pic>
+        <p:nvPicPr>
+          <p:cNvPr id="4" name="Picture 3">
+            <a:extLst>
+              <a:ext uri="{FF2B5EF4-FFF2-40B4-BE49-F238E27FC236}">
+                <a16:creationId xmlns:a16="http://schemas.microsoft.com/office/drawing/2014/main" id="{D20A1309-E55E-44DB-9811-96C67DA5C666}"/>
+              </a:ext>
+            </a:extLst>
+          </p:cNvPr>
+          <p:cNvPicPr>
+            <a:picLocks noChangeAspect="1"/>
+          </p:cNvPicPr>
+          <p:nvPr/>
+        </p:nvPicPr>
+        <p:blipFill>
+          <a:blip r:embed="rId4">
+            <a:extLst>
+              <a:ext uri="{28A0092B-C50C-407E-A947-70E740481C1C}">
+                <a14:useLocalDpi xmlns:a14="http://schemas.microsoft.com/office/drawing/2010/main" val="0"/>
+              </a:ext>
+            </a:extLst>
+          </a:blip>
+          <a:stretch>
+            <a:fillRect/>
+          </a:stretch>
+        </p:blipFill>
+        <p:spPr>
+          <a:xfrm>
+            <a:off x="10066897" y="4529137"/>
+            <a:ext cx="2116085" cy="2328862"/>
+          </a:xfrm>
+          <a:prstGeom prst="rect">
+            <a:avLst/>
+          </a:prstGeom>
+        </p:spPr>
+      </p:pic>
+      <p:sp>
+        <p:nvSpPr>
+          <p:cNvPr id="8" name="TextBox 7">
+            <a:extLst>
+              <a:ext uri="{FF2B5EF4-FFF2-40B4-BE49-F238E27FC236}">
+                <a16:creationId xmlns:a16="http://schemas.microsoft.com/office/drawing/2014/main" id="{FBA9AB83-FE78-48D0-8549-1BCE5EAB6D3A}"/>
+              </a:ext>
+            </a:extLst>
+          </p:cNvPr>
+          <p:cNvSpPr txBox="1"/>
+          <p:nvPr/>
+        </p:nvSpPr>
+        <p:spPr>
+          <a:xfrm>
+            <a:off x="0" y="6550223"/>
+            <a:ext cx="12192000" cy="307777"/>
+          </a:xfrm>
+          <a:prstGeom prst="rect">
+            <a:avLst/>
+          </a:prstGeom>
+          <a:noFill/>
+        </p:spPr>
+        <p:txBody>
+          <a:bodyPr wrap="square" rtlCol="0">
+            <a:spAutoFit/>
+          </a:bodyPr>
+          <a:lstStyle/>
+          <a:p>
+            <a:r>
+              <a:rPr lang="en-US" sz="1400" dirty="0">
+                <a:solidFill>
+                  <a:schemeClr val="tx1">
+                    <a:lumMod val="65000"/>
+                    <a:lumOff val="35000"/>
+                  </a:schemeClr>
+                </a:solidFill>
+                <a:latin typeface="+mj-lt"/>
+                <a:ea typeface="Verdana" panose="020B0604030504040204" pitchFamily="34" charset="0"/>
+              </a:rPr>
+              <a:t>Image Credit: </a:t>
+            </a:r>
+            <a:r>
+              <a:rPr lang="en-US" sz="1400" dirty="0">
+                <a:solidFill>
+                  <a:schemeClr val="tx1">
+                    <a:lumMod val="65000"/>
+                    <a:lumOff val="35000"/>
+                  </a:schemeClr>
+                </a:solidFill>
+              </a:rPr>
+              <a:t>https://www.vectorstock.com/royalty-free-vector/cartoon-wizard-vector-1693529</a:t>
+            </a:r>
+            <a:endParaRPr lang="en-US" sz="1400" dirty="0">
+              <a:solidFill>
+                <a:schemeClr val="tx1">
+                  <a:lumMod val="65000"/>
+                  <a:lumOff val="35000"/>
+                </a:schemeClr>
+              </a:solidFill>
+              <a:latin typeface="+mj-lt"/>
+              <a:ea typeface="Verdana" panose="020B0604030504040204" pitchFamily="34" charset="0"/>
+            </a:endParaRPr>
+          </a:p>
+        </p:txBody>
+      </p:sp>
+    </p:spTree>
+    <p:extLst>
+      <p:ext uri="{BB962C8B-B14F-4D97-AF65-F5344CB8AC3E}">
+        <p14:creationId xmlns:p14="http://schemas.microsoft.com/office/powerpoint/2010/main" val="3192052037"/>
+      </p:ext>
+    </p:extLst>
+  </p:cSld>
+  <p:clrMapOvr>
+    <a:masterClrMapping/>
+  </p:clrMapOvr>
+  <mc:AlternateContent xmlns:mc="http://schemas.openxmlformats.org/markup-compatibility/2006" xmlns:p14="http://schemas.microsoft.com/office/powerpoint/2010/main">
+    <mc:Choice Requires="p14">
+      <p:transition spd="med" p14:dur="700">
+        <p:fade/>
+      </p:transition>
+    </mc:Choice>
+    <mc:Fallback xmlns="">
+      <p:transition spd="med">
+        <p:fade/>
+      </p:transition>
+    </mc:Fallback>
+  </mc:AlternateContent>
+</p:sld>
+</file>
+
+<file path=ppt/slides/slide17.xml><?xml version="1.0" encoding="utf-8"?>
+<p:sld xmlns:a="http://schemas.openxmlformats.org/drawingml/2006/main" xmlns:r="http://schemas.openxmlformats.org/officeDocument/2006/relationships" xmlns:p="http://schemas.openxmlformats.org/presentationml/2006/main">
+  <p:cSld>
+    <p:spTree>
+      <p:nvGrpSpPr>
+        <p:cNvPr id="1" name=""/>
+        <p:cNvGrpSpPr/>
+        <p:nvPr/>
+      </p:nvGrpSpPr>
+      <p:grpSpPr>
+        <a:xfrm>
+          <a:off x="0" y="0"/>
+          <a:ext cx="0" cy="0"/>
+          <a:chOff x="0" y="0"/>
+          <a:chExt cx="0" cy="0"/>
+        </a:xfrm>
+      </p:grpSpPr>
+      <p:sp>
+        <p:nvSpPr>
+          <p:cNvPr id="2" name="Title 1">
+            <a:extLst>
+              <a:ext uri="{FF2B5EF4-FFF2-40B4-BE49-F238E27FC236}">
+                <a16:creationId xmlns:a16="http://schemas.microsoft.com/office/drawing/2014/main" id="{8306FF31-301F-43F0-8202-A782726E446A}"/>
+              </a:ext>
+            </a:extLst>
+          </p:cNvPr>
+          <p:cNvSpPr>
+            <a:spLocks noGrp="1"/>
+          </p:cNvSpPr>
+          <p:nvPr>
+            <p:ph type="title"/>
+          </p:nvPr>
+        </p:nvSpPr>
+        <p:spPr>
+          <a:xfrm>
+            <a:off x="0" y="365127"/>
+            <a:ext cx="12191999" cy="827416"/>
+          </a:xfrm>
+        </p:spPr>
+        <p:txBody>
+          <a:bodyPr>
+            <a:normAutofit/>
+          </a:bodyPr>
+          <a:lstStyle/>
+          <a:p>
+            <a:pPr algn="ctr"/>
+            <a:r>
+              <a:rPr lang="en-US" sz="4000" dirty="0">
+                <a:latin typeface="Palatino Linotype" panose="02040502050505030304" pitchFamily="18" charset="0"/>
+                <a:cs typeface="Segoe UI Light" panose="020B0502040204020203" pitchFamily="34" charset="0"/>
+              </a:rPr>
+              <a:t>Architecture (Interpreted Languages)</a:t>
+            </a:r>
+          </a:p>
+        </p:txBody>
+      </p:sp>
+      <p:pic>
+        <p:nvPicPr>
+          <p:cNvPr id="5" name="Content Placeholder 12">
+            <a:extLst>
+              <a:ext uri="{FF2B5EF4-FFF2-40B4-BE49-F238E27FC236}">
+                <a16:creationId xmlns:a16="http://schemas.microsoft.com/office/drawing/2014/main" id="{67D6BD1D-3F09-4338-B1FF-CD4EABF496E1}"/>
+              </a:ext>
+            </a:extLst>
+          </p:cNvPr>
+          <p:cNvPicPr>
+            <a:picLocks noGrp="1" noChangeAspect="1"/>
+          </p:cNvPicPr>
+          <p:nvPr>
+            <p:ph idx="1"/>
+          </p:nvPr>
+        </p:nvPicPr>
+        <p:blipFill>
+          <a:blip r:embed="rId3">
+            <a:extLst>
+              <a:ext uri="{28A0092B-C50C-407E-A947-70E740481C1C}">
+                <a14:useLocalDpi xmlns:a14="http://schemas.microsoft.com/office/drawing/2010/main" val="0"/>
+              </a:ext>
+            </a:extLst>
+          </a:blip>
+          <a:stretch>
+            <a:fillRect/>
+          </a:stretch>
+        </p:blipFill>
+        <p:spPr>
+          <a:xfrm>
+            <a:off x="813319" y="1982277"/>
+            <a:ext cx="10149431" cy="3437166"/>
+          </a:xfrm>
+        </p:spPr>
+      </p:pic>
+    </p:spTree>
+    <p:extLst>
+      <p:ext uri="{BB962C8B-B14F-4D97-AF65-F5344CB8AC3E}">
+        <p14:creationId xmlns:p14="http://schemas.microsoft.com/office/powerpoint/2010/main" val="791954200"/>
+      </p:ext>
+    </p:extLst>
+  </p:cSld>
+  <p:clrMapOvr>
+    <a:masterClrMapping/>
+  </p:clrMapOvr>
+  <mc:AlternateContent xmlns:mc="http://schemas.openxmlformats.org/markup-compatibility/2006" xmlns:p14="http://schemas.microsoft.com/office/powerpoint/2010/main">
+    <mc:Choice Requires="p14">
+      <p:transition spd="med" p14:dur="700">
+        <p:fade/>
+      </p:transition>
+    </mc:Choice>
+    <mc:Fallback xmlns="">
+      <p:transition spd="med">
+        <p:fade/>
+      </p:transition>
+    </mc:Fallback>
+  </mc:AlternateContent>
+</p:sld>
+</file>
+
+<file path=ppt/slides/slide2.xml><?xml version="1.0" encoding="utf-8"?>
+<p:sld xmlns:a="http://schemas.openxmlformats.org/drawingml/2006/main" xmlns:r="http://schemas.openxmlformats.org/officeDocument/2006/relationships" xmlns:p="http://schemas.openxmlformats.org/presentationml/2006/main">
+  <p:cSld>
+    <p:spTree>
+      <p:nvGrpSpPr>
+        <p:cNvPr id="1" name=""/>
+        <p:cNvGrpSpPr/>
+        <p:nvPr/>
+      </p:nvGrpSpPr>
+      <p:grpSpPr>
+        <a:xfrm>
+          <a:off x="0" y="0"/>
+          <a:ext cx="0" cy="0"/>
+          <a:chOff x="0" y="0"/>
+          <a:chExt cx="0" cy="0"/>
+        </a:xfrm>
+      </p:grpSpPr>
+      <p:pic>
+        <p:nvPicPr>
+          <p:cNvPr id="3" name="Picture 2">
+            <a:extLst>
+              <a:ext uri="{FF2B5EF4-FFF2-40B4-BE49-F238E27FC236}">
+                <a16:creationId xmlns:a16="http://schemas.microsoft.com/office/drawing/2014/main" id="{BF587613-F93D-2D34-3C37-414D671E7BB2}"/>
               </a:ext>
             </a:extLst>
           </p:cNvPr>
@@ -7017,8 +7349,8 @@
         </p:blipFill>
         <p:spPr>
           <a:xfrm>
-            <a:off x="2003058" y="185351"/>
-            <a:ext cx="8185883" cy="6227004"/>
+            <a:off x="1529787" y="0"/>
+            <a:ext cx="9132425" cy="6858000"/>
           </a:xfrm>
           <a:prstGeom prst="rect">
             <a:avLst/>
@@ -7050,7 +7382,7 @@
 </p:sld>
 </file>
 
-<file path=ppt/slides/slide17.xml><?xml version="1.0" encoding="utf-8"?>
+<file path=ppt/slides/slide3.xml><?xml version="1.0" encoding="utf-8"?>
 <p:sld xmlns:a="http://schemas.openxmlformats.org/drawingml/2006/main" xmlns:r="http://schemas.openxmlformats.org/officeDocument/2006/relationships" xmlns:p="http://schemas.openxmlformats.org/presentationml/2006/main">
   <p:cSld>
     <p:bg>
@@ -7217,7 +7549,7 @@
 </p:sld>
 </file>
 
-<file path=ppt/slides/slide2.xml><?xml version="1.0" encoding="utf-8"?>
+<file path=ppt/slides/slide4.xml><?xml version="1.0" encoding="utf-8"?>
 <p:sld xmlns:a="http://schemas.openxmlformats.org/drawingml/2006/main" xmlns:r="http://schemas.openxmlformats.org/officeDocument/2006/relationships" xmlns:p="http://schemas.openxmlformats.org/presentationml/2006/main">
   <p:cSld>
     <p:spTree>
@@ -7453,7 +7785,7 @@
 </p:sld>
 </file>
 
-<file path=ppt/slides/slide3.xml><?xml version="1.0" encoding="utf-8"?>
+<file path=ppt/slides/slide5.xml><?xml version="1.0" encoding="utf-8"?>
 <p:sld xmlns:a="http://schemas.openxmlformats.org/drawingml/2006/main" xmlns:r="http://schemas.openxmlformats.org/officeDocument/2006/relationships" xmlns:p="http://schemas.openxmlformats.org/presentationml/2006/main">
   <p:cSld>
     <p:spTree>
@@ -7656,7 +7988,7 @@
 </p:sld>
 </file>
 
-<file path=ppt/slides/slide4.xml><?xml version="1.0" encoding="utf-8"?>
+<file path=ppt/slides/slide6.xml><?xml version="1.0" encoding="utf-8"?>
 <p:sld xmlns:a="http://schemas.openxmlformats.org/drawingml/2006/main" xmlns:r="http://schemas.openxmlformats.org/officeDocument/2006/relationships" xmlns:p="http://schemas.openxmlformats.org/presentationml/2006/main">
   <p:cSld>
     <p:spTree>
@@ -8394,7 +8726,7 @@
 </p:sld>
 </file>
 
-<file path=ppt/slides/slide5.xml><?xml version="1.0" encoding="utf-8"?>
+<file path=ppt/slides/slide7.xml><?xml version="1.0" encoding="utf-8"?>
 <p:sld xmlns:a="http://schemas.openxmlformats.org/drawingml/2006/main" xmlns:r="http://schemas.openxmlformats.org/officeDocument/2006/relationships" xmlns:p="http://schemas.openxmlformats.org/presentationml/2006/main">
   <p:cSld>
     <p:spTree>
@@ -8533,7 +8865,7 @@
 </p:sld>
 </file>
 
-<file path=ppt/slides/slide6.xml><?xml version="1.0" encoding="utf-8"?>
+<file path=ppt/slides/slide8.xml><?xml version="1.0" encoding="utf-8"?>
 <p:sld xmlns:a="http://schemas.openxmlformats.org/drawingml/2006/main" xmlns:r="http://schemas.openxmlformats.org/officeDocument/2006/relationships" xmlns:p="http://schemas.openxmlformats.org/presentationml/2006/main">
   <p:cSld>
     <p:spTree>
@@ -8622,7 +8954,7 @@
 </p:sld>
 </file>
 
-<file path=ppt/slides/slide7.xml><?xml version="1.0" encoding="utf-8"?>
+<file path=ppt/slides/slide9.xml><?xml version="1.0" encoding="utf-8"?>
 <p:sld xmlns:a="http://schemas.openxmlformats.org/drawingml/2006/main" xmlns:r="http://schemas.openxmlformats.org/officeDocument/2006/relationships" xmlns:p="http://schemas.openxmlformats.org/presentationml/2006/main">
   <p:cSld>
     <p:spTree>
@@ -8726,338 +9058,6 @@
     <p:extLst>
       <p:ext uri="{BB962C8B-B14F-4D97-AF65-F5344CB8AC3E}">
         <p14:creationId xmlns:p14="http://schemas.microsoft.com/office/powerpoint/2010/main" val="337556145"/>
-      </p:ext>
-    </p:extLst>
-  </p:cSld>
-  <p:clrMapOvr>
-    <a:masterClrMapping/>
-  </p:clrMapOvr>
-  <mc:AlternateContent xmlns:mc="http://schemas.openxmlformats.org/markup-compatibility/2006" xmlns:p14="http://schemas.microsoft.com/office/powerpoint/2010/main">
-    <mc:Choice Requires="p14">
-      <p:transition spd="med" p14:dur="700">
-        <p:fade/>
-      </p:transition>
-    </mc:Choice>
-    <mc:Fallback xmlns="">
-      <p:transition spd="med">
-        <p:fade/>
-      </p:transition>
-    </mc:Fallback>
-  </mc:AlternateContent>
-</p:sld>
-</file>
-
-<file path=ppt/slides/slide8.xml><?xml version="1.0" encoding="utf-8"?>
-<p:sld xmlns:a="http://schemas.openxmlformats.org/drawingml/2006/main" xmlns:r="http://schemas.openxmlformats.org/officeDocument/2006/relationships" xmlns:p="http://schemas.openxmlformats.org/presentationml/2006/main">
-  <p:cSld>
-    <p:spTree>
-      <p:nvGrpSpPr>
-        <p:cNvPr id="1" name=""/>
-        <p:cNvGrpSpPr/>
-        <p:nvPr/>
-      </p:nvGrpSpPr>
-      <p:grpSpPr>
-        <a:xfrm>
-          <a:off x="0" y="0"/>
-          <a:ext cx="0" cy="0"/>
-          <a:chOff x="0" y="0"/>
-          <a:chExt cx="0" cy="0"/>
-        </a:xfrm>
-      </p:grpSpPr>
-      <p:pic>
-        <p:nvPicPr>
-          <p:cNvPr id="1026" name="Picture 2" descr="Python Data Types – PYnative">
-            <a:extLst>
-              <a:ext uri="{FF2B5EF4-FFF2-40B4-BE49-F238E27FC236}">
-                <a16:creationId xmlns:a16="http://schemas.microsoft.com/office/drawing/2014/main" id="{56597BF9-7BA9-4FF7-95D0-F8C4362F5209}"/>
-              </a:ext>
-            </a:extLst>
-          </p:cNvPr>
-          <p:cNvPicPr>
-            <a:picLocks noChangeAspect="1" noChangeArrowheads="1"/>
-          </p:cNvPicPr>
-          <p:nvPr/>
-        </p:nvPicPr>
-        <p:blipFill>
-          <a:blip r:embed="rId3">
-            <a:extLst>
-              <a:ext uri="{28A0092B-C50C-407E-A947-70E740481C1C}">
-                <a14:useLocalDpi xmlns:a14="http://schemas.microsoft.com/office/drawing/2010/main" val="0"/>
-              </a:ext>
-            </a:extLst>
-          </a:blip>
-          <a:srcRect/>
-          <a:stretch>
-            <a:fillRect/>
-          </a:stretch>
-        </p:blipFill>
-        <p:spPr bwMode="auto">
-          <a:xfrm>
-            <a:off x="3152775" y="862012"/>
-            <a:ext cx="5886450" cy="5133975"/>
-          </a:xfrm>
-          <a:prstGeom prst="rect">
-            <a:avLst/>
-          </a:prstGeom>
-          <a:noFill/>
-          <a:extLst>
-            <a:ext uri="{909E8E84-426E-40DD-AFC4-6F175D3DCCD1}">
-              <a14:hiddenFill xmlns:a14="http://schemas.microsoft.com/office/drawing/2010/main">
-                <a:solidFill>
-                  <a:srgbClr val="FFFFFF"/>
-                </a:solidFill>
-              </a14:hiddenFill>
-            </a:ext>
-          </a:extLst>
-        </p:spPr>
-      </p:pic>
-      <p:sp>
-        <p:nvSpPr>
-          <p:cNvPr id="3" name="TextBox 2">
-            <a:extLst>
-              <a:ext uri="{FF2B5EF4-FFF2-40B4-BE49-F238E27FC236}">
-                <a16:creationId xmlns:a16="http://schemas.microsoft.com/office/drawing/2014/main" id="{A187EEFE-7DF5-468D-A426-71737BD128AA}"/>
-              </a:ext>
-            </a:extLst>
-          </p:cNvPr>
-          <p:cNvSpPr txBox="1"/>
-          <p:nvPr/>
-        </p:nvSpPr>
-        <p:spPr>
-          <a:xfrm>
-            <a:off x="0" y="6550223"/>
-            <a:ext cx="12192000" cy="307777"/>
-          </a:xfrm>
-          <a:prstGeom prst="rect">
-            <a:avLst/>
-          </a:prstGeom>
-          <a:noFill/>
-        </p:spPr>
-        <p:txBody>
-          <a:bodyPr wrap="square" rtlCol="0">
-            <a:spAutoFit/>
-          </a:bodyPr>
-          <a:lstStyle/>
-          <a:p>
-            <a:pPr marL="0" marR="0" lvl="0" indent="0" algn="l" defTabSz="914400" rtl="0" eaLnBrk="1" fontAlgn="auto" latinLnBrk="0" hangingPunct="1">
-              <a:lnSpc>
-                <a:spcPct val="100000"/>
-              </a:lnSpc>
-              <a:spcBef>
-                <a:spcPts val="0"/>
-              </a:spcBef>
-              <a:spcAft>
-                <a:spcPts val="0"/>
-              </a:spcAft>
-              <a:buClrTx/>
-              <a:buSzTx/>
-              <a:buFontTx/>
-              <a:buNone/>
-              <a:tabLst/>
-              <a:defRPr/>
-            </a:pPr>
-            <a:r>
-              <a:rPr lang="en-US" sz="1400" dirty="0">
-                <a:solidFill>
-                  <a:schemeClr val="tx1">
-                    <a:lumMod val="65000"/>
-                    <a:lumOff val="35000"/>
-                  </a:schemeClr>
-                </a:solidFill>
-                <a:latin typeface="+mj-lt"/>
-                <a:ea typeface="Verdana" panose="020B0604030504040204" pitchFamily="34" charset="0"/>
-              </a:rPr>
-              <a:t>Image Credit: </a:t>
-            </a:r>
-            <a:r>
-              <a:rPr lang="en-US" sz="1400" dirty="0">
-                <a:solidFill>
-                  <a:schemeClr val="tx1">
-                    <a:lumMod val="65000"/>
-                    <a:lumOff val="35000"/>
-                  </a:schemeClr>
-                </a:solidFill>
-                <a:latin typeface="+mj-lt"/>
-              </a:rPr>
-              <a:t>https://pynative.com/python-data-types/</a:t>
-            </a:r>
-          </a:p>
-        </p:txBody>
-      </p:sp>
-    </p:spTree>
-    <p:extLst>
-      <p:ext uri="{BB962C8B-B14F-4D97-AF65-F5344CB8AC3E}">
-        <p14:creationId xmlns:p14="http://schemas.microsoft.com/office/powerpoint/2010/main" val="170311557"/>
-      </p:ext>
-    </p:extLst>
-  </p:cSld>
-  <p:clrMapOvr>
-    <a:masterClrMapping/>
-  </p:clrMapOvr>
-  <mc:AlternateContent xmlns:mc="http://schemas.openxmlformats.org/markup-compatibility/2006" xmlns:p14="http://schemas.microsoft.com/office/powerpoint/2010/main">
-    <mc:Choice Requires="p14">
-      <p:transition spd="med" p14:dur="700">
-        <p:fade/>
-      </p:transition>
-    </mc:Choice>
-    <mc:Fallback xmlns="">
-      <p:transition spd="med">
-        <p:fade/>
-      </p:transition>
-    </mc:Fallback>
-  </mc:AlternateContent>
-</p:sld>
-</file>
-
-<file path=ppt/slides/slide9.xml><?xml version="1.0" encoding="utf-8"?>
-<p:sld xmlns:a="http://schemas.openxmlformats.org/drawingml/2006/main" xmlns:r="http://schemas.openxmlformats.org/officeDocument/2006/relationships" xmlns:p="http://schemas.openxmlformats.org/presentationml/2006/main">
-  <p:cSld>
-    <p:spTree>
-      <p:nvGrpSpPr>
-        <p:cNvPr id="1" name=""/>
-        <p:cNvGrpSpPr/>
-        <p:nvPr/>
-      </p:nvGrpSpPr>
-      <p:grpSpPr>
-        <a:xfrm>
-          <a:off x="0" y="0"/>
-          <a:ext cx="0" cy="0"/>
-          <a:chOff x="0" y="0"/>
-          <a:chExt cx="0" cy="0"/>
-        </a:xfrm>
-      </p:grpSpPr>
-      <p:pic>
-        <p:nvPicPr>
-          <p:cNvPr id="2050" name="Picture 2" descr="Icon of Adam Naming the Animals - 15th c. Meteora - (1AA10) - Uncut  Mountain Supply">
-            <a:extLst>
-              <a:ext uri="{FF2B5EF4-FFF2-40B4-BE49-F238E27FC236}">
-                <a16:creationId xmlns:a16="http://schemas.microsoft.com/office/drawing/2014/main" id="{A8A604AE-38F9-4BA8-858C-E33429DF7680}"/>
-              </a:ext>
-            </a:extLst>
-          </p:cNvPr>
-          <p:cNvPicPr>
-            <a:picLocks noChangeAspect="1" noChangeArrowheads="1"/>
-          </p:cNvPicPr>
-          <p:nvPr/>
-        </p:nvPicPr>
-        <p:blipFill>
-          <a:blip r:embed="rId3">
-            <a:extLst>
-              <a:ext uri="{28A0092B-C50C-407E-A947-70E740481C1C}">
-                <a14:useLocalDpi xmlns:a14="http://schemas.microsoft.com/office/drawing/2010/main" val="0"/>
-              </a:ext>
-            </a:extLst>
-          </a:blip>
-          <a:srcRect/>
-          <a:stretch>
-            <a:fillRect/>
-          </a:stretch>
-        </p:blipFill>
-        <p:spPr bwMode="auto">
-          <a:xfrm>
-            <a:off x="2785598" y="1290062"/>
-            <a:ext cx="6620804" cy="4277875"/>
-          </a:xfrm>
-          <a:prstGeom prst="rect">
-            <a:avLst/>
-          </a:prstGeom>
-          <a:noFill/>
-          <a:ln w="3175">
-            <a:solidFill>
-              <a:schemeClr val="tx1">
-                <a:lumMod val="75000"/>
-                <a:lumOff val="25000"/>
-              </a:schemeClr>
-            </a:solidFill>
-          </a:ln>
-          <a:effectLst>
-            <a:outerShdw blurRad="50800" dist="38100" dir="2700000" algn="tl" rotWithShape="0">
-              <a:prstClr val="black">
-                <a:alpha val="40000"/>
-              </a:prstClr>
-            </a:outerShdw>
-          </a:effectLst>
-          <a:extLst>
-            <a:ext uri="{909E8E84-426E-40DD-AFC4-6F175D3DCCD1}">
-              <a14:hiddenFill xmlns:a14="http://schemas.microsoft.com/office/drawing/2010/main">
-                <a:solidFill>
-                  <a:srgbClr val="FFFFFF"/>
-                </a:solidFill>
-              </a14:hiddenFill>
-            </a:ext>
-          </a:extLst>
-        </p:spPr>
-      </p:pic>
-      <p:sp>
-        <p:nvSpPr>
-          <p:cNvPr id="6" name="TextBox 5">
-            <a:extLst>
-              <a:ext uri="{FF2B5EF4-FFF2-40B4-BE49-F238E27FC236}">
-                <a16:creationId xmlns:a16="http://schemas.microsoft.com/office/drawing/2014/main" id="{29F3E589-6F1A-4BB3-B969-F58FCA3DE9E0}"/>
-              </a:ext>
-            </a:extLst>
-          </p:cNvPr>
-          <p:cNvSpPr txBox="1"/>
-          <p:nvPr/>
-        </p:nvSpPr>
-        <p:spPr>
-          <a:xfrm>
-            <a:off x="0" y="6550223"/>
-            <a:ext cx="12192000" cy="307777"/>
-          </a:xfrm>
-          <a:prstGeom prst="rect">
-            <a:avLst/>
-          </a:prstGeom>
-          <a:noFill/>
-        </p:spPr>
-        <p:txBody>
-          <a:bodyPr wrap="square" rtlCol="0">
-            <a:spAutoFit/>
-          </a:bodyPr>
-          <a:lstStyle/>
-          <a:p>
-            <a:r>
-              <a:rPr lang="en-US" sz="1400" dirty="0">
-                <a:solidFill>
-                  <a:schemeClr val="tx1">
-                    <a:lumMod val="65000"/>
-                    <a:lumOff val="35000"/>
-                  </a:schemeClr>
-                </a:solidFill>
-                <a:latin typeface="+mj-lt"/>
-                <a:ea typeface="Verdana" panose="020B0604030504040204" pitchFamily="34" charset="0"/>
-              </a:rPr>
-              <a:t>Image Credit: </a:t>
-            </a:r>
-            <a:r>
-              <a:rPr lang="en-US" sz="1400" dirty="0">
-                <a:solidFill>
-                  <a:schemeClr val="tx1">
-                    <a:lumMod val="65000"/>
-                    <a:lumOff val="35000"/>
-                  </a:schemeClr>
-                </a:solidFill>
-                <a:latin typeface="+mj-lt"/>
-              </a:rPr>
-              <a:t>https://www.uncutmountainsupply.com/icons/of-saints/by-name/a/icon-of-adam-naming-the-animals-15th-c-meteora-1aa10/</a:t>
-            </a:r>
-            <a:endParaRPr lang="en-US" sz="1400" dirty="0">
-              <a:solidFill>
-                <a:schemeClr val="tx1">
-                  <a:lumMod val="65000"/>
-                  <a:lumOff val="35000"/>
-                </a:schemeClr>
-              </a:solidFill>
-              <a:latin typeface="+mj-lt"/>
-              <a:ea typeface="Verdana" panose="020B0604030504040204" pitchFamily="34" charset="0"/>
-            </a:endParaRPr>
-          </a:p>
-        </p:txBody>
-      </p:sp>
-    </p:spTree>
-    <p:extLst>
-      <p:ext uri="{BB962C8B-B14F-4D97-AF65-F5344CB8AC3E}">
-        <p14:creationId xmlns:p14="http://schemas.microsoft.com/office/powerpoint/2010/main" val="4083169647"/>
       </p:ext>
     </p:extLst>
   </p:cSld>

</xml_diff>

<commit_message>
Updates for 09.27.22 workshop.
</commit_message>
<xml_diff>
--- a/presentations/01_py_intro.pptx
+++ b/presentations/01_py_intro.pptx
@@ -5,26 +5,25 @@
     <p:sldMasterId id="2147483648" r:id="rId1"/>
   </p:sldMasterIdLst>
   <p:notesMasterIdLst>
-    <p:notesMasterId r:id="rId19"/>
+    <p:notesMasterId r:id="rId18"/>
   </p:notesMasterIdLst>
   <p:sldIdLst>
     <p:sldId id="324" r:id="rId2"/>
-    <p:sldId id="325" r:id="rId3"/>
-    <p:sldId id="328" r:id="rId4"/>
-    <p:sldId id="266" r:id="rId5"/>
-    <p:sldId id="326" r:id="rId6"/>
-    <p:sldId id="304" r:id="rId7"/>
-    <p:sldId id="327" r:id="rId8"/>
-    <p:sldId id="323" r:id="rId9"/>
-    <p:sldId id="282" r:id="rId10"/>
-    <p:sldId id="277" r:id="rId11"/>
-    <p:sldId id="280" r:id="rId12"/>
-    <p:sldId id="278" r:id="rId13"/>
-    <p:sldId id="287" r:id="rId14"/>
-    <p:sldId id="296" r:id="rId15"/>
-    <p:sldId id="289" r:id="rId16"/>
-    <p:sldId id="293" r:id="rId17"/>
-    <p:sldId id="276" r:id="rId18"/>
+    <p:sldId id="266" r:id="rId3"/>
+    <p:sldId id="326" r:id="rId4"/>
+    <p:sldId id="304" r:id="rId5"/>
+    <p:sldId id="327" r:id="rId6"/>
+    <p:sldId id="323" r:id="rId7"/>
+    <p:sldId id="282" r:id="rId8"/>
+    <p:sldId id="277" r:id="rId9"/>
+    <p:sldId id="280" r:id="rId10"/>
+    <p:sldId id="278" r:id="rId11"/>
+    <p:sldId id="287" r:id="rId12"/>
+    <p:sldId id="296" r:id="rId13"/>
+    <p:sldId id="289" r:id="rId14"/>
+    <p:sldId id="293" r:id="rId15"/>
+    <p:sldId id="276" r:id="rId16"/>
+    <p:sldId id="328" r:id="rId17"/>
   </p:sldIdLst>
   <p:sldSz cx="12192000" cy="6858000"/>
   <p:notesSz cx="6858000" cy="9144000"/>
@@ -224,7 +223,7 @@
           <a:p>
             <a:fld id="{FD93C9B2-20F6-4DB1-B471-224337D0AC79}" type="datetimeFigureOut">
               <a:rPr lang="en-US" smtClean="0"/>
-              <a:t>8/17/2022</a:t>
+              <a:t>9/26/2022</a:t>
             </a:fld>
             <a:endParaRPr lang="en-US"/>
           </a:p>
@@ -643,10 +642,7 @@
               <a:tabLst/>
               <a:defRPr/>
             </a:pPr>
-            <a:r>
-              <a:rPr lang="en-US" dirty="0"/>
-              <a:t>Adam naming the animals in the Biblical story.  Variable naming and standards are critically important.</a:t>
-            </a:r>
+            <a:endParaRPr lang="en-US" dirty="0"/>
           </a:p>
         </p:txBody>
       </p:sp>
@@ -667,7 +663,7 @@
           <a:p>
             <a:fld id="{3148858F-F1DB-4027-9C85-CCA6849540DD}" type="slidenum">
               <a:rPr lang="en-US" smtClean="0"/>
-              <a:t>11</a:t>
+              <a:t>10</a:t>
             </a:fld>
             <a:endParaRPr lang="en-US"/>
           </a:p>
@@ -676,7 +672,7 @@
     </p:spTree>
     <p:extLst>
       <p:ext uri="{BB962C8B-B14F-4D97-AF65-F5344CB8AC3E}">
-        <p14:creationId xmlns:p14="http://schemas.microsoft.com/office/powerpoint/2010/main" val="828379136"/>
+        <p14:creationId xmlns:p14="http://schemas.microsoft.com/office/powerpoint/2010/main" val="4054386845"/>
       </p:ext>
     </p:extLst>
   </p:cSld>
@@ -768,7 +764,7 @@
           <a:p>
             <a:fld id="{3148858F-F1DB-4027-9C85-CCA6849540DD}" type="slidenum">
               <a:rPr lang="en-US" smtClean="0"/>
-              <a:t>12</a:t>
+              <a:t>11</a:t>
             </a:fld>
             <a:endParaRPr lang="en-US"/>
           </a:p>
@@ -777,7 +773,7 @@
     </p:spTree>
     <p:extLst>
       <p:ext uri="{BB962C8B-B14F-4D97-AF65-F5344CB8AC3E}">
-        <p14:creationId xmlns:p14="http://schemas.microsoft.com/office/powerpoint/2010/main" val="4054386845"/>
+        <p14:creationId xmlns:p14="http://schemas.microsoft.com/office/powerpoint/2010/main" val="2996454508"/>
       </p:ext>
     </p:extLst>
   </p:cSld>
@@ -869,7 +865,7 @@
           <a:p>
             <a:fld id="{3148858F-F1DB-4027-9C85-CCA6849540DD}" type="slidenum">
               <a:rPr lang="en-US" smtClean="0"/>
-              <a:t>13</a:t>
+              <a:t>12</a:t>
             </a:fld>
             <a:endParaRPr lang="en-US"/>
           </a:p>
@@ -878,7 +874,7 @@
     </p:spTree>
     <p:extLst>
       <p:ext uri="{BB962C8B-B14F-4D97-AF65-F5344CB8AC3E}">
-        <p14:creationId xmlns:p14="http://schemas.microsoft.com/office/powerpoint/2010/main" val="2996454508"/>
+        <p14:creationId xmlns:p14="http://schemas.microsoft.com/office/powerpoint/2010/main" val="30799508"/>
       </p:ext>
     </p:extLst>
   </p:cSld>
@@ -970,7 +966,7 @@
           <a:p>
             <a:fld id="{3148858F-F1DB-4027-9C85-CCA6849540DD}" type="slidenum">
               <a:rPr lang="en-US" smtClean="0"/>
-              <a:t>14</a:t>
+              <a:t>13</a:t>
             </a:fld>
             <a:endParaRPr lang="en-US"/>
           </a:p>
@@ -979,7 +975,7 @@
     </p:spTree>
     <p:extLst>
       <p:ext uri="{BB962C8B-B14F-4D97-AF65-F5344CB8AC3E}">
-        <p14:creationId xmlns:p14="http://schemas.microsoft.com/office/powerpoint/2010/main" val="30799508"/>
+        <p14:creationId xmlns:p14="http://schemas.microsoft.com/office/powerpoint/2010/main" val="555085068"/>
       </p:ext>
     </p:extLst>
   </p:cSld>
@@ -1071,7 +1067,7 @@
           <a:p>
             <a:fld id="{3148858F-F1DB-4027-9C85-CCA6849540DD}" type="slidenum">
               <a:rPr lang="en-US" smtClean="0"/>
-              <a:t>15</a:t>
+              <a:t>14</a:t>
             </a:fld>
             <a:endParaRPr lang="en-US"/>
           </a:p>
@@ -1080,7 +1076,7 @@
     </p:spTree>
     <p:extLst>
       <p:ext uri="{BB962C8B-B14F-4D97-AF65-F5344CB8AC3E}">
-        <p14:creationId xmlns:p14="http://schemas.microsoft.com/office/powerpoint/2010/main" val="555085068"/>
+        <p14:creationId xmlns:p14="http://schemas.microsoft.com/office/powerpoint/2010/main" val="651591465"/>
       </p:ext>
     </p:extLst>
   </p:cSld>
@@ -1151,7 +1147,10 @@
               <a:tabLst/>
               <a:defRPr/>
             </a:pPr>
-            <a:endParaRPr lang="en-US" dirty="0"/>
+            <a:r>
+              <a:rPr lang="en-US" dirty="0"/>
+              <a:t>Interpreted languages are much slower than compiled languages.  When performance matters, an interpreted language may not be the best solution.  If that’s the case with you, Nvidia provides the Cuda development environment which supports the C and C++ languages.  These are compiled languages as opposed to interpreted. </a:t>
+            </a:r>
           </a:p>
         </p:txBody>
       </p:sp>
@@ -1172,111 +1171,7 @@
           <a:p>
             <a:fld id="{3148858F-F1DB-4027-9C85-CCA6849540DD}" type="slidenum">
               <a:rPr lang="en-US" smtClean="0"/>
-              <a:t>16</a:t>
-            </a:fld>
-            <a:endParaRPr lang="en-US"/>
-          </a:p>
-        </p:txBody>
-      </p:sp>
-    </p:spTree>
-    <p:extLst>
-      <p:ext uri="{BB962C8B-B14F-4D97-AF65-F5344CB8AC3E}">
-        <p14:creationId xmlns:p14="http://schemas.microsoft.com/office/powerpoint/2010/main" val="651591465"/>
-      </p:ext>
-    </p:extLst>
-  </p:cSld>
-  <p:clrMapOvr>
-    <a:masterClrMapping/>
-  </p:clrMapOvr>
-</p:notes>
-</file>
-
-<file path=ppt/notesSlides/notesSlide16.xml><?xml version="1.0" encoding="utf-8"?>
-<p:notes xmlns:a="http://schemas.openxmlformats.org/drawingml/2006/main" xmlns:r="http://schemas.openxmlformats.org/officeDocument/2006/relationships" xmlns:p="http://schemas.openxmlformats.org/presentationml/2006/main">
-  <p:cSld>
-    <p:spTree>
-      <p:nvGrpSpPr>
-        <p:cNvPr id="1" name=""/>
-        <p:cNvGrpSpPr/>
-        <p:nvPr/>
-      </p:nvGrpSpPr>
-      <p:grpSpPr>
-        <a:xfrm>
-          <a:off x="0" y="0"/>
-          <a:ext cx="0" cy="0"/>
-          <a:chOff x="0" y="0"/>
-          <a:chExt cx="0" cy="0"/>
-        </a:xfrm>
-      </p:grpSpPr>
-      <p:sp>
-        <p:nvSpPr>
-          <p:cNvPr id="2" name="Slide Image Placeholder 1"/>
-          <p:cNvSpPr>
-            <a:spLocks noGrp="1" noRot="1" noChangeAspect="1"/>
-          </p:cNvSpPr>
-          <p:nvPr>
-            <p:ph type="sldImg"/>
-          </p:nvPr>
-        </p:nvSpPr>
-        <p:spPr/>
-      </p:sp>
-      <p:sp>
-        <p:nvSpPr>
-          <p:cNvPr id="3" name="Notes Placeholder 2"/>
-          <p:cNvSpPr>
-            <a:spLocks noGrp="1"/>
-          </p:cNvSpPr>
-          <p:nvPr>
-            <p:ph type="body" idx="1"/>
-          </p:nvPr>
-        </p:nvSpPr>
-        <p:spPr/>
-        <p:txBody>
-          <a:bodyPr/>
-          <a:lstStyle/>
-          <a:p>
-            <a:pPr marL="0" marR="0" lvl="0" indent="0" algn="l" defTabSz="914400" rtl="0" eaLnBrk="1" fontAlgn="auto" latinLnBrk="0" hangingPunct="1">
-              <a:lnSpc>
-                <a:spcPct val="100000"/>
-              </a:lnSpc>
-              <a:spcBef>
-                <a:spcPts val="0"/>
-              </a:spcBef>
-              <a:spcAft>
-                <a:spcPts val="0"/>
-              </a:spcAft>
-              <a:buClrTx/>
-              <a:buSzTx/>
-              <a:buFontTx/>
-              <a:buNone/>
-              <a:tabLst/>
-              <a:defRPr/>
-            </a:pPr>
-            <a:r>
-              <a:rPr lang="en-US" dirty="0"/>
-              <a:t>Interpreted languages are much slower than compiled languages.  When performance matters, an interpreted language may not be the best solution.  If that’s the case with you, Nvidia provides the Cuda development environment which supports the C and C++ languages.  These are compiled languages as opposed to interpreted. </a:t>
-            </a:r>
-          </a:p>
-        </p:txBody>
-      </p:sp>
-      <p:sp>
-        <p:nvSpPr>
-          <p:cNvPr id="4" name="Slide Number Placeholder 3"/>
-          <p:cNvSpPr>
-            <a:spLocks noGrp="1"/>
-          </p:cNvSpPr>
-          <p:nvPr>
-            <p:ph type="sldNum" sz="quarter" idx="5"/>
-          </p:nvPr>
-        </p:nvSpPr>
-        <p:spPr/>
-        <p:txBody>
-          <a:bodyPr/>
-          <a:lstStyle/>
-          <a:p>
-            <a:fld id="{3148858F-F1DB-4027-9C85-CCA6849540DD}" type="slidenum">
-              <a:rPr lang="en-US" smtClean="0"/>
-              <a:t>17</a:t>
+              <a:t>15</a:t>
             </a:fld>
             <a:endParaRPr lang="en-US"/>
           </a:p>
@@ -1339,6 +1234,12 @@
           <a:bodyPr/>
           <a:lstStyle/>
           <a:p>
+            <a:r>
+              <a:rPr lang="en-US" dirty="0"/>
+              <a:t>The learning objectives for each Python session can be found here: https://github.com/PracticumAI/python</a:t>
+            </a:r>
+          </a:p>
+          <a:p>
             <a:endParaRPr lang="en-US" dirty="0"/>
           </a:p>
         </p:txBody>
@@ -1369,7 +1270,7 @@
     </p:spTree>
     <p:extLst>
       <p:ext uri="{BB962C8B-B14F-4D97-AF65-F5344CB8AC3E}">
-        <p14:creationId xmlns:p14="http://schemas.microsoft.com/office/powerpoint/2010/main" val="2558055240"/>
+        <p14:creationId xmlns:p14="http://schemas.microsoft.com/office/powerpoint/2010/main" val="1207792633"/>
       </p:ext>
     </p:extLst>
   </p:cSld>
@@ -1423,12 +1324,6 @@
           <a:bodyPr/>
           <a:lstStyle/>
           <a:p>
-            <a:r>
-              <a:rPr lang="en-US" dirty="0"/>
-              <a:t>The learning objectives for each Python session can be found here: https://github.com/PracticumAI/python</a:t>
-            </a:r>
-          </a:p>
-          <a:p>
             <a:endParaRPr lang="en-US" dirty="0"/>
           </a:p>
         </p:txBody>
@@ -1450,7 +1345,7 @@
           <a:p>
             <a:fld id="{3148858F-F1DB-4027-9C85-CCA6849540DD}" type="slidenum">
               <a:rPr lang="en-US" smtClean="0"/>
-              <a:t>4</a:t>
+              <a:t>3</a:t>
             </a:fld>
             <a:endParaRPr lang="en-US"/>
           </a:p>
@@ -1459,7 +1354,7 @@
     </p:spTree>
     <p:extLst>
       <p:ext uri="{BB962C8B-B14F-4D97-AF65-F5344CB8AC3E}">
-        <p14:creationId xmlns:p14="http://schemas.microsoft.com/office/powerpoint/2010/main" val="1207792633"/>
+        <p14:creationId xmlns:p14="http://schemas.microsoft.com/office/powerpoint/2010/main" val="1218542571"/>
       </p:ext>
     </p:extLst>
   </p:cSld>
@@ -1513,6 +1408,945 @@
           <a:bodyPr/>
           <a:lstStyle/>
           <a:p>
+            <a:pPr marL="342900" marR="0" lvl="0" indent="-342900" algn="l" defTabSz="914400" rtl="0" eaLnBrk="1" fontAlgn="auto" latinLnBrk="0" hangingPunct="1">
+              <a:lnSpc>
+                <a:spcPct val="100000"/>
+              </a:lnSpc>
+              <a:spcBef>
+                <a:spcPts val="0"/>
+              </a:spcBef>
+              <a:spcAft>
+                <a:spcPts val="0"/>
+              </a:spcAft>
+              <a:buClrTx/>
+              <a:buSzTx/>
+              <a:buFontTx/>
+              <a:buAutoNum type="arabicPeriod"/>
+              <a:tabLst/>
+              <a:defRPr/>
+            </a:pPr>
+            <a:r>
+              <a:rPr lang="en-US" sz="1100" b="1" dirty="0">
+                <a:solidFill>
+                  <a:srgbClr val="24292F"/>
+                </a:solidFill>
+                <a:effectLst>
+                  <a:outerShdw blurRad="38100" dist="38100" dir="2700000" algn="tl">
+                    <a:srgbClr val="000000">
+                      <a:alpha val="43137"/>
+                    </a:srgbClr>
+                  </a:outerShdw>
+                </a:effectLst>
+                <a:latin typeface="+mn-lt"/>
+                <a:ea typeface="Times New Roman" panose="02020603050405020304" pitchFamily="18" charset="0"/>
+              </a:rPr>
+              <a:t>Focus</a:t>
+            </a:r>
+          </a:p>
+          <a:p>
+            <a:pPr marL="800100" marR="0" lvl="1" indent="-342900" algn="l" defTabSz="914400" rtl="0" eaLnBrk="1" fontAlgn="auto" latinLnBrk="0" hangingPunct="1">
+              <a:lnSpc>
+                <a:spcPct val="100000"/>
+              </a:lnSpc>
+              <a:spcBef>
+                <a:spcPts val="0"/>
+              </a:spcBef>
+              <a:spcAft>
+                <a:spcPts val="0"/>
+              </a:spcAft>
+              <a:buClrTx/>
+              <a:buSzTx/>
+              <a:buFont typeface="Courier New" panose="02070309020205020404" pitchFamily="49" charset="0"/>
+              <a:buChar char="o"/>
+              <a:tabLst/>
+              <a:defRPr/>
+            </a:pPr>
+            <a:r>
+              <a:rPr lang="en-US" sz="1100" dirty="0">
+                <a:solidFill>
+                  <a:srgbClr val="24292F"/>
+                </a:solidFill>
+                <a:effectLst/>
+                <a:latin typeface="+mn-lt"/>
+                <a:ea typeface="Times New Roman" panose="02020603050405020304" pitchFamily="18" charset="0"/>
+              </a:rPr>
+              <a:t>So often, students think they can learn AI programming while multi-tasking on Facebook or texting friends on their cell phone. After programming for 30 years, I've learned one thing. You'll learn AI much faster if you can devote focused, uninterrupted time to practice.</a:t>
+            </a:r>
+          </a:p>
+          <a:p>
+            <a:pPr marL="342900" marR="0" lvl="0" indent="-342900" algn="l" defTabSz="914400" rtl="0" eaLnBrk="1" fontAlgn="auto" latinLnBrk="0" hangingPunct="1">
+              <a:lnSpc>
+                <a:spcPct val="100000"/>
+              </a:lnSpc>
+              <a:spcBef>
+                <a:spcPts val="0"/>
+              </a:spcBef>
+              <a:spcAft>
+                <a:spcPts val="0"/>
+              </a:spcAft>
+              <a:buClrTx/>
+              <a:buSzTx/>
+              <a:buFontTx/>
+              <a:buAutoNum type="arabicPeriod"/>
+              <a:tabLst/>
+              <a:defRPr/>
+            </a:pPr>
+            <a:r>
+              <a:rPr lang="en-US" sz="1100" b="1" dirty="0">
+                <a:effectLst/>
+                <a:latin typeface="+mn-lt"/>
+                <a:ea typeface="Calibri" panose="020F0502020204030204" pitchFamily="34" charset="0"/>
+                <a:cs typeface="LMRoman12-Bold"/>
+              </a:rPr>
+              <a:t>Avoid the “copy and paste” approach to writing code</a:t>
+            </a:r>
+          </a:p>
+          <a:p>
+            <a:pPr marL="800100" marR="0" lvl="1" indent="-342900" algn="l" defTabSz="914400" rtl="0" eaLnBrk="1" fontAlgn="auto" latinLnBrk="0" hangingPunct="1">
+              <a:lnSpc>
+                <a:spcPct val="100000"/>
+              </a:lnSpc>
+              <a:spcBef>
+                <a:spcPts val="0"/>
+              </a:spcBef>
+              <a:spcAft>
+                <a:spcPts val="0"/>
+              </a:spcAft>
+              <a:buClrTx/>
+              <a:buSzTx/>
+              <a:buFont typeface="Courier New" panose="02070309020205020404" pitchFamily="49" charset="0"/>
+              <a:buChar char="o"/>
+              <a:tabLst/>
+              <a:defRPr/>
+            </a:pPr>
+            <a:r>
+              <a:rPr lang="en-US" sz="1100" dirty="0">
+                <a:effectLst/>
+                <a:latin typeface="+mn-lt"/>
+                <a:ea typeface="Calibri" panose="020F0502020204030204" pitchFamily="34" charset="0"/>
+                <a:cs typeface="LMRoman10-Regular"/>
+              </a:rPr>
+              <a:t>Although copying and pasting may help you to avoid typing errors, it can also interfere with your learning</a:t>
+            </a:r>
+            <a:r>
+              <a:rPr lang="en-US" sz="1100" dirty="0">
+                <a:effectLst/>
+                <a:latin typeface="+mn-lt"/>
+                <a:ea typeface="Calibri" panose="020F0502020204030204" pitchFamily="34" charset="0"/>
+                <a:cs typeface="Times New Roman" panose="02020603050405020304" pitchFamily="18" charset="0"/>
+              </a:rPr>
+              <a:t> </a:t>
+            </a:r>
+            <a:r>
+              <a:rPr lang="en-US" sz="1100" dirty="0">
+                <a:effectLst/>
+                <a:latin typeface="+mn-lt"/>
+                <a:ea typeface="Calibri" panose="020F0502020204030204" pitchFamily="34" charset="0"/>
+                <a:cs typeface="LMRoman10-Regular"/>
+              </a:rPr>
+              <a:t>process for two reasons:</a:t>
+            </a:r>
+          </a:p>
+          <a:p>
+            <a:pPr marL="1257300" marR="0" lvl="2" indent="-342900" algn="l" defTabSz="914400" rtl="0" eaLnBrk="1" fontAlgn="auto" latinLnBrk="0" hangingPunct="1">
+              <a:lnSpc>
+                <a:spcPct val="100000"/>
+              </a:lnSpc>
+              <a:spcBef>
+                <a:spcPts val="0"/>
+              </a:spcBef>
+              <a:spcAft>
+                <a:spcPts val="0"/>
+              </a:spcAft>
+              <a:buClrTx/>
+              <a:buSzTx/>
+              <a:buFont typeface="Courier New" panose="02070309020205020404" pitchFamily="49" charset="0"/>
+              <a:buChar char="o"/>
+              <a:tabLst/>
+              <a:defRPr/>
+            </a:pPr>
+            <a:r>
+              <a:rPr lang="en-US" sz="1100" dirty="0">
+                <a:effectLst/>
+                <a:latin typeface="+mn-lt"/>
+                <a:ea typeface="Calibri" panose="020F0502020204030204" pitchFamily="34" charset="0"/>
+                <a:cs typeface="Times New Roman" panose="02020603050405020304" pitchFamily="18" charset="0"/>
+              </a:rPr>
+              <a:t>Typing </a:t>
+            </a:r>
+            <a:r>
+              <a:rPr lang="en-US" sz="1100" dirty="0">
+                <a:effectLst/>
+                <a:latin typeface="+mn-lt"/>
+                <a:ea typeface="Calibri" panose="020F0502020204030204" pitchFamily="34" charset="0"/>
+                <a:cs typeface="LMRoman10-Regular"/>
+              </a:rPr>
+              <a:t>errors can help you gain experience in writing code it provides informative feedback when you</a:t>
+            </a:r>
+            <a:r>
+              <a:rPr lang="en-US" sz="1100" dirty="0">
+                <a:effectLst/>
+                <a:latin typeface="+mn-lt"/>
+                <a:ea typeface="Calibri" panose="020F0502020204030204" pitchFamily="34" charset="0"/>
+                <a:cs typeface="Times New Roman" panose="02020603050405020304" pitchFamily="18" charset="0"/>
+              </a:rPr>
+              <a:t> </a:t>
+            </a:r>
+            <a:r>
+              <a:rPr lang="en-US" sz="1100" dirty="0">
+                <a:effectLst/>
+                <a:latin typeface="+mn-lt"/>
+                <a:ea typeface="Calibri" panose="020F0502020204030204" pitchFamily="34" charset="0"/>
+                <a:cs typeface="LMRoman10-Regular"/>
+              </a:rPr>
+              <a:t>make mistakes. Making and correcting typing errors is an important skill to develop, particularly</a:t>
+            </a:r>
+            <a:r>
+              <a:rPr lang="en-US" sz="1100" dirty="0">
+                <a:effectLst/>
+                <a:latin typeface="+mn-lt"/>
+                <a:ea typeface="Calibri" panose="020F0502020204030204" pitchFamily="34" charset="0"/>
+                <a:cs typeface="Times New Roman" panose="02020603050405020304" pitchFamily="18" charset="0"/>
+              </a:rPr>
+              <a:t> </a:t>
+            </a:r>
+            <a:r>
+              <a:rPr lang="en-US" sz="1100" dirty="0">
+                <a:effectLst/>
+                <a:latin typeface="+mn-lt"/>
+                <a:ea typeface="Calibri" panose="020F0502020204030204" pitchFamily="34" charset="0"/>
+                <a:cs typeface="LMRoman10-Regular"/>
+              </a:rPr>
+              <a:t>when you are typing a lot of code for your own data analysis.</a:t>
+            </a:r>
+          </a:p>
+          <a:p>
+            <a:pPr marL="1257300" marR="0" lvl="2" indent="-342900" algn="l" defTabSz="914400" rtl="0" eaLnBrk="1" fontAlgn="auto" latinLnBrk="0" hangingPunct="1">
+              <a:lnSpc>
+                <a:spcPct val="100000"/>
+              </a:lnSpc>
+              <a:spcBef>
+                <a:spcPts val="0"/>
+              </a:spcBef>
+              <a:spcAft>
+                <a:spcPts val="0"/>
+              </a:spcAft>
+              <a:buClrTx/>
+              <a:buSzTx/>
+              <a:buFont typeface="Courier New" panose="02070309020205020404" pitchFamily="49" charset="0"/>
+              <a:buChar char="o"/>
+              <a:tabLst/>
+              <a:defRPr/>
+            </a:pPr>
+            <a:r>
+              <a:rPr lang="en-US" sz="1100" dirty="0">
+                <a:effectLst/>
+                <a:latin typeface="+mn-lt"/>
+                <a:ea typeface="Calibri" panose="020F0502020204030204" pitchFamily="34" charset="0"/>
+                <a:cs typeface="Times New Roman" panose="02020603050405020304" pitchFamily="18" charset="0"/>
+              </a:rPr>
+              <a:t>Copying </a:t>
+            </a:r>
+            <a:r>
+              <a:rPr lang="en-US" sz="1100" dirty="0">
+                <a:effectLst/>
+                <a:latin typeface="+mn-lt"/>
+                <a:ea typeface="Calibri" panose="020F0502020204030204" pitchFamily="34" charset="0"/>
+                <a:cs typeface="LMRoman10-Regular"/>
+              </a:rPr>
+              <a:t>and pasting code may give you the impression that you know what you are doing when – in reality – you probably do not fully understand what the individual blocks of code are actually doing.</a:t>
+            </a:r>
+            <a:r>
+              <a:rPr lang="en-US" sz="1100" dirty="0">
+                <a:effectLst/>
+                <a:latin typeface="+mn-lt"/>
+                <a:ea typeface="Calibri" panose="020F0502020204030204" pitchFamily="34" charset="0"/>
+                <a:cs typeface="Times New Roman" panose="02020603050405020304" pitchFamily="18" charset="0"/>
+              </a:rPr>
+              <a:t> </a:t>
+            </a:r>
+            <a:r>
+              <a:rPr lang="en-US" sz="1100" dirty="0">
+                <a:effectLst/>
+                <a:latin typeface="+mn-lt"/>
+                <a:ea typeface="Calibri" panose="020F0502020204030204" pitchFamily="34" charset="0"/>
+                <a:cs typeface="LMRoman10-Regular"/>
+              </a:rPr>
+              <a:t>Furthermore, this problem will just get worse as you deal with increasingly longer and more complicated</a:t>
+            </a:r>
+            <a:r>
+              <a:rPr lang="en-US" sz="1100" dirty="0">
+                <a:effectLst/>
+                <a:latin typeface="+mn-lt"/>
+                <a:ea typeface="Calibri" panose="020F0502020204030204" pitchFamily="34" charset="0"/>
+                <a:cs typeface="Times New Roman" panose="02020603050405020304" pitchFamily="18" charset="0"/>
+              </a:rPr>
+              <a:t> s</a:t>
+            </a:r>
+            <a:r>
+              <a:rPr lang="en-US" sz="1100" dirty="0">
+                <a:effectLst/>
+                <a:latin typeface="+mn-lt"/>
+                <a:ea typeface="Calibri" panose="020F0502020204030204" pitchFamily="34" charset="0"/>
+                <a:cs typeface="LMRoman10-Regular"/>
+              </a:rPr>
+              <a:t>cripts.</a:t>
+            </a:r>
+          </a:p>
+          <a:p>
+            <a:pPr marL="342900" marR="0" lvl="0" indent="-342900" algn="l" defTabSz="914400" rtl="0" eaLnBrk="1" fontAlgn="auto" latinLnBrk="0" hangingPunct="1">
+              <a:lnSpc>
+                <a:spcPct val="100000"/>
+              </a:lnSpc>
+              <a:spcBef>
+                <a:spcPts val="0"/>
+              </a:spcBef>
+              <a:spcAft>
+                <a:spcPts val="0"/>
+              </a:spcAft>
+              <a:buClrTx/>
+              <a:buSzTx/>
+              <a:buFont typeface="+mj-lt"/>
+              <a:buAutoNum type="arabicPeriod"/>
+              <a:tabLst/>
+              <a:defRPr/>
+            </a:pPr>
+            <a:r>
+              <a:rPr lang="en-US" sz="1100" b="1" dirty="0">
+                <a:effectLst/>
+                <a:latin typeface="+mn-lt"/>
+                <a:ea typeface="Calibri" panose="020F0502020204030204" pitchFamily="34" charset="0"/>
+                <a:cs typeface="LMRoman12-Bold"/>
+              </a:rPr>
+              <a:t>Study code block-by-block, line-by-line</a:t>
+            </a:r>
+          </a:p>
+          <a:p>
+            <a:pPr marL="800100" marR="0" lvl="1" indent="-342900" algn="l" defTabSz="914400" rtl="0" eaLnBrk="1" fontAlgn="auto" latinLnBrk="0" hangingPunct="1">
+              <a:lnSpc>
+                <a:spcPct val="100000"/>
+              </a:lnSpc>
+              <a:spcBef>
+                <a:spcPts val="0"/>
+              </a:spcBef>
+              <a:spcAft>
+                <a:spcPts val="0"/>
+              </a:spcAft>
+              <a:buClrTx/>
+              <a:buSzTx/>
+              <a:buFont typeface="Courier New" panose="02070309020205020404" pitchFamily="49" charset="0"/>
+              <a:buChar char="o"/>
+              <a:tabLst/>
+              <a:defRPr/>
+            </a:pPr>
+            <a:r>
+              <a:rPr lang="en-US" sz="1100" dirty="0">
+                <a:effectLst/>
+                <a:latin typeface="+mn-lt"/>
+                <a:ea typeface="Calibri" panose="020F0502020204030204" pitchFamily="34" charset="0"/>
+                <a:cs typeface="LMRoman10-Regular"/>
+              </a:rPr>
+              <a:t>This means running one block of code at a time and making sure that you understand why the output is what</a:t>
+            </a:r>
+            <a:r>
+              <a:rPr lang="en-US" sz="1100" dirty="0">
+                <a:effectLst/>
+                <a:latin typeface="+mn-lt"/>
+                <a:ea typeface="Calibri" panose="020F0502020204030204" pitchFamily="34" charset="0"/>
+                <a:cs typeface="Times New Roman" panose="02020603050405020304" pitchFamily="18" charset="0"/>
+              </a:rPr>
+              <a:t> </a:t>
+            </a:r>
+            <a:r>
+              <a:rPr lang="en-US" sz="1100" dirty="0">
+                <a:effectLst/>
+                <a:latin typeface="+mn-lt"/>
+                <a:ea typeface="Calibri" panose="020F0502020204030204" pitchFamily="34" charset="0"/>
+                <a:cs typeface="LMRoman10-Regular"/>
+              </a:rPr>
+              <a:t>it is. If things are not clear, it is important to spend more time with that piece of the code. Here are some</a:t>
+            </a:r>
+            <a:r>
+              <a:rPr lang="en-US" sz="1100" dirty="0">
+                <a:effectLst/>
+                <a:latin typeface="+mn-lt"/>
+                <a:ea typeface="Calibri" panose="020F0502020204030204" pitchFamily="34" charset="0"/>
+                <a:cs typeface="Times New Roman" panose="02020603050405020304" pitchFamily="18" charset="0"/>
+              </a:rPr>
+              <a:t> </a:t>
+            </a:r>
+            <a:r>
+              <a:rPr lang="en-US" sz="1100" dirty="0">
+                <a:effectLst/>
+                <a:latin typeface="+mn-lt"/>
+                <a:ea typeface="Calibri" panose="020F0502020204030204" pitchFamily="34" charset="0"/>
+                <a:cs typeface="LMRoman10-Regular"/>
+              </a:rPr>
+              <a:t>tricks that are often helpful to understand a particular piece of code:</a:t>
+            </a:r>
+          </a:p>
+          <a:p>
+            <a:pPr marL="1257300" marR="0" lvl="2" indent="-342900" algn="l" defTabSz="914400" rtl="0" eaLnBrk="1" fontAlgn="auto" latinLnBrk="0" hangingPunct="1">
+              <a:lnSpc>
+                <a:spcPct val="100000"/>
+              </a:lnSpc>
+              <a:spcBef>
+                <a:spcPts val="0"/>
+              </a:spcBef>
+              <a:spcAft>
+                <a:spcPts val="0"/>
+              </a:spcAft>
+              <a:buClrTx/>
+              <a:buSzTx/>
+              <a:buFont typeface="Courier New" panose="02070309020205020404" pitchFamily="49" charset="0"/>
+              <a:buChar char="o"/>
+              <a:tabLst/>
+              <a:defRPr/>
+            </a:pPr>
+            <a:r>
+              <a:rPr lang="en-US" sz="1100" dirty="0">
+                <a:effectLst/>
+                <a:latin typeface="+mn-lt"/>
+                <a:ea typeface="Calibri" panose="020F0502020204030204" pitchFamily="34" charset="0"/>
+                <a:cs typeface="LMRoman10-Regular"/>
+              </a:rPr>
+              <a:t>Break a line of code into its components and try to understand the individual pieces.  Sometimes functions are nested within functions.</a:t>
+            </a:r>
+            <a:endParaRPr lang="en-US" sz="1100" dirty="0">
+              <a:effectLst/>
+              <a:latin typeface="+mn-lt"/>
+              <a:ea typeface="Calibri" panose="020F0502020204030204" pitchFamily="34" charset="0"/>
+              <a:cs typeface="Times New Roman" panose="02020603050405020304" pitchFamily="18" charset="0"/>
+            </a:endParaRPr>
+          </a:p>
+          <a:p>
+            <a:pPr marL="1257300" marR="0" lvl="2" indent="-342900" algn="l" defTabSz="914400" rtl="0" eaLnBrk="1" fontAlgn="auto" latinLnBrk="0" hangingPunct="1">
+              <a:lnSpc>
+                <a:spcPct val="100000"/>
+              </a:lnSpc>
+              <a:spcBef>
+                <a:spcPts val="0"/>
+              </a:spcBef>
+              <a:spcAft>
+                <a:spcPts val="0"/>
+              </a:spcAft>
+              <a:buClrTx/>
+              <a:buSzTx/>
+              <a:buFont typeface="Courier New" panose="02070309020205020404" pitchFamily="49" charset="0"/>
+              <a:buChar char="o"/>
+              <a:tabLst/>
+              <a:defRPr/>
+            </a:pPr>
+            <a:r>
+              <a:rPr lang="en-US" sz="1100" dirty="0">
+                <a:effectLst/>
+                <a:latin typeface="+mn-lt"/>
+                <a:ea typeface="Calibri" panose="020F0502020204030204" pitchFamily="34" charset="0"/>
+                <a:cs typeface="LMRoman10-Regular"/>
+              </a:rPr>
+              <a:t>Document what each block is doing. Clear documentation is critical as you may not remember what you did when you come back to a piece of code at some point in the future. As a wise programmer once said, “Write code for the future you.” Documentation is also useful when you want to adapt or reuse code in some other way. In situations like this, you will immediately know what a specific chunk of code does because it has been clearly documented.  </a:t>
+            </a:r>
+            <a:r>
+              <a:rPr lang="en-US" sz="1100" b="1" dirty="0">
+                <a:solidFill>
+                  <a:schemeClr val="tx1">
+                    <a:lumMod val="75000"/>
+                    <a:lumOff val="25000"/>
+                  </a:schemeClr>
+                </a:solidFill>
+                <a:effectLst/>
+                <a:latin typeface="+mn-lt"/>
+                <a:ea typeface="Calibri" panose="020F0502020204030204" pitchFamily="34" charset="0"/>
+                <a:cs typeface="LMRoman10-Regular"/>
+              </a:rPr>
+              <a:t>Donald Knuth </a:t>
+            </a:r>
+            <a:r>
+              <a:rPr lang="en-US" sz="1100" dirty="0">
+                <a:effectLst/>
+                <a:latin typeface="+mn-lt"/>
+                <a:ea typeface="Calibri" panose="020F0502020204030204" pitchFamily="34" charset="0"/>
+                <a:cs typeface="LMRoman10-Regular"/>
+              </a:rPr>
+              <a:t>– Literate Programming</a:t>
+            </a:r>
+            <a:endParaRPr lang="en-US" sz="1100" dirty="0">
+              <a:effectLst/>
+              <a:latin typeface="+mn-lt"/>
+              <a:ea typeface="Calibri" panose="020F0502020204030204" pitchFamily="34" charset="0"/>
+              <a:cs typeface="Times New Roman" panose="02020603050405020304" pitchFamily="18" charset="0"/>
+            </a:endParaRPr>
+          </a:p>
+          <a:p>
+            <a:pPr marL="1257300" marR="0" lvl="2" indent="-342900" algn="l" defTabSz="914400" rtl="0" eaLnBrk="1" fontAlgn="auto" latinLnBrk="0" hangingPunct="1">
+              <a:lnSpc>
+                <a:spcPct val="100000"/>
+              </a:lnSpc>
+              <a:spcBef>
+                <a:spcPts val="0"/>
+              </a:spcBef>
+              <a:spcAft>
+                <a:spcPts val="0"/>
+              </a:spcAft>
+              <a:buClrTx/>
+              <a:buSzTx/>
+              <a:buFont typeface="Courier New" panose="02070309020205020404" pitchFamily="49" charset="0"/>
+              <a:buChar char="o"/>
+              <a:tabLst/>
+              <a:defRPr/>
+            </a:pPr>
+            <a:r>
+              <a:rPr lang="en-US" sz="1100" dirty="0">
+                <a:effectLst/>
+                <a:latin typeface="+mn-lt"/>
+                <a:ea typeface="Calibri" panose="020F0502020204030204" pitchFamily="34" charset="0"/>
+                <a:cs typeface="LMRoman10-Regular"/>
+              </a:rPr>
+              <a:t>Perform mini experiments: create a simpler example in which you can tinker with the code and see what happens to the output.</a:t>
+            </a:r>
+            <a:endParaRPr lang="en-US" sz="1100" dirty="0">
+              <a:effectLst/>
+              <a:latin typeface="+mn-lt"/>
+              <a:ea typeface="Calibri" panose="020F0502020204030204" pitchFamily="34" charset="0"/>
+              <a:cs typeface="Times New Roman" panose="02020603050405020304" pitchFamily="18" charset="0"/>
+            </a:endParaRPr>
+          </a:p>
+          <a:p>
+            <a:pPr marL="342900" marR="0" lvl="0" indent="-342900" algn="l" defTabSz="914400" rtl="0" eaLnBrk="1" fontAlgn="auto" latinLnBrk="0" hangingPunct="1">
+              <a:lnSpc>
+                <a:spcPct val="100000"/>
+              </a:lnSpc>
+              <a:spcBef>
+                <a:spcPts val="0"/>
+              </a:spcBef>
+              <a:spcAft>
+                <a:spcPts val="0"/>
+              </a:spcAft>
+              <a:buClrTx/>
+              <a:buSzTx/>
+              <a:buFont typeface="+mj-lt"/>
+              <a:buAutoNum type="arabicPeriod"/>
+              <a:tabLst/>
+              <a:defRPr/>
+            </a:pPr>
+            <a:r>
+              <a:rPr lang="en-US" sz="1100" b="1" dirty="0">
+                <a:effectLst/>
+                <a:latin typeface="+mn-lt"/>
+                <a:ea typeface="Calibri" panose="020F0502020204030204" pitchFamily="34" charset="0"/>
+                <a:cs typeface="LMRoman12-Bold"/>
+              </a:rPr>
+              <a:t>Use the internet to find answers</a:t>
+            </a:r>
+          </a:p>
+          <a:p>
+            <a:pPr marL="800100" marR="0" lvl="1" indent="-342900" algn="l" defTabSz="914400" rtl="0" eaLnBrk="1" fontAlgn="auto" latinLnBrk="0" hangingPunct="1">
+              <a:lnSpc>
+                <a:spcPct val="100000"/>
+              </a:lnSpc>
+              <a:spcBef>
+                <a:spcPts val="0"/>
+              </a:spcBef>
+              <a:spcAft>
+                <a:spcPts val="0"/>
+              </a:spcAft>
+              <a:buClrTx/>
+              <a:buSzTx/>
+              <a:buFont typeface="Courier New" panose="02070309020205020404" pitchFamily="49" charset="0"/>
+              <a:buChar char="o"/>
+              <a:tabLst/>
+              <a:defRPr/>
+            </a:pPr>
+            <a:r>
+              <a:rPr lang="en-US" sz="1100" dirty="0">
+                <a:effectLst/>
+                <a:latin typeface="+mn-lt"/>
+                <a:ea typeface="Calibri" panose="020F0502020204030204" pitchFamily="34" charset="0"/>
+                <a:cs typeface="LMRoman10-Regular"/>
+              </a:rPr>
+              <a:t>Everybody (from novice to more experienced users) relies on the internet when they don’t understand</a:t>
+            </a:r>
+            <a:r>
+              <a:rPr lang="en-US" sz="1100" dirty="0">
+                <a:effectLst/>
+                <a:latin typeface="+mn-lt"/>
+                <a:ea typeface="Calibri" panose="020F0502020204030204" pitchFamily="34" charset="0"/>
+                <a:cs typeface="Times New Roman" panose="02020603050405020304" pitchFamily="18" charset="0"/>
+              </a:rPr>
+              <a:t> </a:t>
+            </a:r>
+            <a:r>
+              <a:rPr lang="en-US" sz="1100" dirty="0">
+                <a:effectLst/>
+                <a:latin typeface="+mn-lt"/>
+                <a:ea typeface="Calibri" panose="020F0502020204030204" pitchFamily="34" charset="0"/>
+                <a:cs typeface="LMRoman10-Regular"/>
+              </a:rPr>
+              <a:t>something. It is likely that other people have already asked (and received useful answers) for the problem</a:t>
+            </a:r>
+            <a:r>
+              <a:rPr lang="en-US" sz="1100" dirty="0">
+                <a:effectLst/>
+                <a:latin typeface="+mn-lt"/>
+                <a:ea typeface="Calibri" panose="020F0502020204030204" pitchFamily="34" charset="0"/>
+                <a:cs typeface="Times New Roman" panose="02020603050405020304" pitchFamily="18" charset="0"/>
+              </a:rPr>
+              <a:t> </a:t>
+            </a:r>
+            <a:r>
+              <a:rPr lang="en-US" sz="1100" dirty="0">
+                <a:effectLst/>
+                <a:latin typeface="+mn-lt"/>
+                <a:ea typeface="Calibri" panose="020F0502020204030204" pitchFamily="34" charset="0"/>
+                <a:cs typeface="LMRoman10-Regular"/>
+              </a:rPr>
+              <a:t>that you are facing. However, finding the exact piece of information that you need might be hard, especially</a:t>
+            </a:r>
+            <a:r>
+              <a:rPr lang="en-US" sz="1100" dirty="0">
+                <a:effectLst/>
+                <a:latin typeface="+mn-lt"/>
+                <a:ea typeface="Calibri" panose="020F0502020204030204" pitchFamily="34" charset="0"/>
+                <a:cs typeface="Times New Roman" panose="02020603050405020304" pitchFamily="18" charset="0"/>
+              </a:rPr>
+              <a:t> </a:t>
+            </a:r>
+            <a:r>
+              <a:rPr lang="en-US" sz="1100" dirty="0">
+                <a:effectLst/>
+                <a:latin typeface="+mn-lt"/>
+                <a:ea typeface="Calibri" panose="020F0502020204030204" pitchFamily="34" charset="0"/>
+                <a:cs typeface="LMRoman10-Regular"/>
+              </a:rPr>
+              <a:t>if you don’t use the correct terms/key words. Learning how to search for the information that you need is</a:t>
+            </a:r>
+            <a:r>
+              <a:rPr lang="en-US" sz="1100" dirty="0">
+                <a:effectLst/>
+                <a:latin typeface="+mn-lt"/>
+                <a:ea typeface="Calibri" panose="020F0502020204030204" pitchFamily="34" charset="0"/>
+                <a:cs typeface="Times New Roman" panose="02020603050405020304" pitchFamily="18" charset="0"/>
+              </a:rPr>
+              <a:t> </a:t>
+            </a:r>
+            <a:r>
+              <a:rPr lang="en-US" sz="1100" dirty="0">
+                <a:effectLst/>
+                <a:latin typeface="+mn-lt"/>
+                <a:ea typeface="Calibri" panose="020F0502020204030204" pitchFamily="34" charset="0"/>
+                <a:cs typeface="LMRoman10-Regular"/>
+              </a:rPr>
+              <a:t>a skill that also takes practice. “</a:t>
+            </a:r>
+            <a:r>
+              <a:rPr lang="en-US" sz="1100" dirty="0" err="1">
+                <a:effectLst/>
+                <a:latin typeface="+mn-lt"/>
+                <a:ea typeface="Calibri" panose="020F0502020204030204" pitchFamily="34" charset="0"/>
+                <a:cs typeface="LMRoman10-Regular"/>
+              </a:rPr>
+              <a:t>Stackoverflow</a:t>
+            </a:r>
+            <a:r>
+              <a:rPr lang="en-US" sz="1100" dirty="0">
+                <a:effectLst/>
+                <a:latin typeface="+mn-lt"/>
+                <a:ea typeface="Calibri" panose="020F0502020204030204" pitchFamily="34" charset="0"/>
+                <a:cs typeface="LMRoman10-Regular"/>
+              </a:rPr>
+              <a:t>” and existing </a:t>
+            </a:r>
+            <a:r>
+              <a:rPr lang="en-US" sz="1100" dirty="0" err="1">
+                <a:effectLst/>
+                <a:latin typeface="+mn-lt"/>
+                <a:ea typeface="Calibri" panose="020F0502020204030204" pitchFamily="34" charset="0"/>
+                <a:cs typeface="LMRoman10-Regular"/>
+              </a:rPr>
+              <a:t>cheatsheets</a:t>
+            </a:r>
+            <a:r>
+              <a:rPr lang="en-US" sz="1100" dirty="0">
+                <a:effectLst/>
+                <a:latin typeface="+mn-lt"/>
+                <a:ea typeface="Calibri" panose="020F0502020204030204" pitchFamily="34" charset="0"/>
+                <a:cs typeface="LMRoman10-Regular"/>
+              </a:rPr>
+              <a:t> can be very helpful.</a:t>
+            </a:r>
+          </a:p>
+          <a:p>
+            <a:pPr marL="342900" marR="0" lvl="0" indent="-342900" algn="l" defTabSz="914400" rtl="0" eaLnBrk="1" fontAlgn="auto" latinLnBrk="0" hangingPunct="1">
+              <a:lnSpc>
+                <a:spcPct val="100000"/>
+              </a:lnSpc>
+              <a:spcBef>
+                <a:spcPts val="0"/>
+              </a:spcBef>
+              <a:spcAft>
+                <a:spcPts val="0"/>
+              </a:spcAft>
+              <a:buClrTx/>
+              <a:buSzTx/>
+              <a:buFont typeface="+mj-lt"/>
+              <a:buAutoNum type="arabicPeriod"/>
+              <a:tabLst/>
+              <a:defRPr/>
+            </a:pPr>
+            <a:r>
+              <a:rPr lang="en-US" sz="1100" b="1" dirty="0">
+                <a:effectLst/>
+                <a:latin typeface="+mn-lt"/>
+                <a:ea typeface="Calibri" panose="020F0502020204030204" pitchFamily="34" charset="0"/>
+                <a:cs typeface="LMRoman10-Regular"/>
+              </a:rPr>
+              <a:t>Ask for Help</a:t>
+            </a:r>
+          </a:p>
+          <a:p>
+            <a:pPr marL="800100" marR="0" lvl="1" indent="-342900" algn="l" defTabSz="914400" rtl="0" eaLnBrk="1" fontAlgn="auto" latinLnBrk="0" hangingPunct="1">
+              <a:lnSpc>
+                <a:spcPct val="100000"/>
+              </a:lnSpc>
+              <a:spcBef>
+                <a:spcPts val="0"/>
+              </a:spcBef>
+              <a:spcAft>
+                <a:spcPts val="0"/>
+              </a:spcAft>
+              <a:buClrTx/>
+              <a:buSzTx/>
+              <a:buFont typeface="Courier New" panose="02070309020205020404" pitchFamily="49" charset="0"/>
+              <a:buChar char="o"/>
+              <a:tabLst/>
+              <a:defRPr/>
+            </a:pPr>
+            <a:r>
+              <a:rPr lang="en-US" sz="1100" b="0" dirty="0">
+                <a:effectLst/>
+                <a:latin typeface="+mn-lt"/>
+                <a:ea typeface="Calibri" panose="020F0502020204030204" pitchFamily="34" charset="0"/>
+                <a:cs typeface="LMRoman10-Regular"/>
+              </a:rPr>
+              <a:t>We’re all learning.  And some days, I feel like I’m the one who has the most to learn.  Alcoa story.</a:t>
+            </a:r>
+          </a:p>
+          <a:p>
+            <a:pPr marL="342900" marR="0" lvl="0" indent="-342900" algn="l" defTabSz="914400" rtl="0" eaLnBrk="1" fontAlgn="auto" latinLnBrk="0" hangingPunct="1">
+              <a:lnSpc>
+                <a:spcPct val="100000"/>
+              </a:lnSpc>
+              <a:spcBef>
+                <a:spcPts val="0"/>
+              </a:spcBef>
+              <a:spcAft>
+                <a:spcPts val="0"/>
+              </a:spcAft>
+              <a:buClrTx/>
+              <a:buSzTx/>
+              <a:buFont typeface="+mj-lt"/>
+              <a:buAutoNum type="arabicPeriod"/>
+              <a:tabLst/>
+              <a:defRPr/>
+            </a:pPr>
+            <a:r>
+              <a:rPr lang="en-US" sz="1100" b="1" dirty="0">
+                <a:effectLst/>
+                <a:latin typeface="+mn-lt"/>
+                <a:ea typeface="Calibri" panose="020F0502020204030204" pitchFamily="34" charset="0"/>
+                <a:cs typeface="LMRoman12-Bold"/>
+              </a:rPr>
+              <a:t>Take your time</a:t>
+            </a:r>
+          </a:p>
+          <a:p>
+            <a:pPr marL="800100" marR="0" lvl="1" indent="-342900" algn="l" defTabSz="914400" rtl="0" eaLnBrk="1" fontAlgn="auto" latinLnBrk="0" hangingPunct="1">
+              <a:lnSpc>
+                <a:spcPct val="100000"/>
+              </a:lnSpc>
+              <a:spcBef>
+                <a:spcPts val="0"/>
+              </a:spcBef>
+              <a:spcAft>
+                <a:spcPts val="0"/>
+              </a:spcAft>
+              <a:buClrTx/>
+              <a:buSzTx/>
+              <a:buFont typeface="Courier New" panose="02070309020205020404" pitchFamily="49" charset="0"/>
+              <a:buChar char="o"/>
+              <a:tabLst/>
+              <a:defRPr/>
+            </a:pPr>
+            <a:r>
+              <a:rPr lang="en-US" sz="1100" dirty="0">
+                <a:effectLst/>
+                <a:latin typeface="+mn-lt"/>
+                <a:ea typeface="Calibri" panose="020F0502020204030204" pitchFamily="34" charset="0"/>
+                <a:cs typeface="LMRoman10-Regular"/>
+              </a:rPr>
+              <a:t>It is important to realize that it takes time to learn AI. What this implies is that you should not</a:t>
+            </a:r>
+            <a:r>
+              <a:rPr lang="en-US" sz="1100" dirty="0">
+                <a:effectLst/>
+                <a:latin typeface="+mn-lt"/>
+                <a:ea typeface="Calibri" panose="020F0502020204030204" pitchFamily="34" charset="0"/>
+                <a:cs typeface="Times New Roman" panose="02020603050405020304" pitchFamily="18" charset="0"/>
+              </a:rPr>
+              <a:t> </a:t>
+            </a:r>
+            <a:r>
+              <a:rPr lang="en-US" sz="1100" dirty="0">
+                <a:effectLst/>
+                <a:latin typeface="+mn-lt"/>
+                <a:ea typeface="Calibri" panose="020F0502020204030204" pitchFamily="34" charset="0"/>
+                <a:cs typeface="LMRoman10-Regular"/>
+              </a:rPr>
+              <a:t>rush to get things done if you want to master this skill. In particular, everybody goes through some level of</a:t>
+            </a:r>
+            <a:r>
+              <a:rPr lang="en-US" sz="1100" dirty="0">
+                <a:effectLst/>
+                <a:latin typeface="+mn-lt"/>
+                <a:ea typeface="Calibri" panose="020F0502020204030204" pitchFamily="34" charset="0"/>
+                <a:cs typeface="Times New Roman" panose="02020603050405020304" pitchFamily="18" charset="0"/>
+              </a:rPr>
+              <a:t> </a:t>
+            </a:r>
+            <a:r>
+              <a:rPr lang="en-US" sz="1100" dirty="0">
+                <a:effectLst/>
+                <a:latin typeface="+mn-lt"/>
+                <a:ea typeface="Calibri" panose="020F0502020204030204" pitchFamily="34" charset="0"/>
+                <a:cs typeface="LMRoman10-Regular"/>
+              </a:rPr>
+              <a:t>struggle and frustration when learning AI. However, once you have mastered it, you will be amazed</a:t>
+            </a:r>
+            <a:r>
+              <a:rPr lang="en-US" sz="1100" dirty="0">
+                <a:effectLst/>
+                <a:latin typeface="+mn-lt"/>
+                <a:ea typeface="Calibri" panose="020F0502020204030204" pitchFamily="34" charset="0"/>
+                <a:cs typeface="Times New Roman" panose="02020603050405020304" pitchFamily="18" charset="0"/>
+              </a:rPr>
+              <a:t> </a:t>
+            </a:r>
+            <a:r>
+              <a:rPr lang="en-US" sz="1100" dirty="0">
+                <a:effectLst/>
+                <a:latin typeface="+mn-lt"/>
+                <a:ea typeface="Calibri" panose="020F0502020204030204" pitchFamily="34" charset="0"/>
+                <a:cs typeface="LMRoman10-Regular"/>
+              </a:rPr>
+              <a:t>by what this skill can do for you.</a:t>
+            </a:r>
+            <a:endParaRPr lang="en-US" sz="1100" dirty="0">
+              <a:effectLst/>
+              <a:latin typeface="+mn-lt"/>
+              <a:ea typeface="Calibri" panose="020F0502020204030204" pitchFamily="34" charset="0"/>
+              <a:cs typeface="Times New Roman" panose="02020603050405020304" pitchFamily="18" charset="0"/>
+            </a:endParaRPr>
+          </a:p>
+          <a:p>
+            <a:pPr marL="342900" marR="0" lvl="0" indent="-342900" algn="l" defTabSz="914400" rtl="0" eaLnBrk="1" fontAlgn="auto" latinLnBrk="0" hangingPunct="1">
+              <a:lnSpc>
+                <a:spcPct val="100000"/>
+              </a:lnSpc>
+              <a:spcBef>
+                <a:spcPts val="0"/>
+              </a:spcBef>
+              <a:spcAft>
+                <a:spcPts val="0"/>
+              </a:spcAft>
+              <a:buClrTx/>
+              <a:buSzTx/>
+              <a:buFont typeface="+mj-lt"/>
+              <a:buAutoNum type="arabicPeriod"/>
+              <a:tabLst/>
+              <a:defRPr/>
+            </a:pPr>
+            <a:endParaRPr lang="en-US" sz="1800" dirty="0">
+              <a:effectLst/>
+              <a:latin typeface="Calibri" panose="020F0502020204030204" pitchFamily="34" charset="0"/>
+              <a:ea typeface="Calibri" panose="020F0502020204030204" pitchFamily="34" charset="0"/>
+              <a:cs typeface="Times New Roman" panose="02020603050405020304" pitchFamily="18" charset="0"/>
+            </a:endParaRPr>
+          </a:p>
+          <a:p>
+            <a:pPr marL="800100" marR="0" lvl="1" indent="-342900" algn="l" defTabSz="914400" rtl="0" eaLnBrk="1" fontAlgn="auto" latinLnBrk="0" hangingPunct="1">
+              <a:lnSpc>
+                <a:spcPct val="100000"/>
+              </a:lnSpc>
+              <a:spcBef>
+                <a:spcPts val="0"/>
+              </a:spcBef>
+              <a:spcAft>
+                <a:spcPts val="0"/>
+              </a:spcAft>
+              <a:buClrTx/>
+              <a:buSzTx/>
+              <a:buFont typeface="Courier New" panose="02070309020205020404" pitchFamily="49" charset="0"/>
+              <a:buChar char="o"/>
+              <a:tabLst/>
+              <a:defRPr/>
+            </a:pPr>
+            <a:endParaRPr lang="en-US" sz="1800" dirty="0">
+              <a:effectLst/>
+              <a:latin typeface="Calibri" panose="020F0502020204030204" pitchFamily="34" charset="0"/>
+              <a:ea typeface="Calibri" panose="020F0502020204030204" pitchFamily="34" charset="0"/>
+              <a:cs typeface="Times New Roman" panose="02020603050405020304" pitchFamily="18" charset="0"/>
+            </a:endParaRPr>
+          </a:p>
+          <a:p>
+            <a:pPr marL="800100" marR="0" lvl="1" indent="-342900" algn="l" defTabSz="914400" rtl="0" eaLnBrk="1" fontAlgn="auto" latinLnBrk="0" hangingPunct="1">
+              <a:lnSpc>
+                <a:spcPct val="100000"/>
+              </a:lnSpc>
+              <a:spcBef>
+                <a:spcPts val="0"/>
+              </a:spcBef>
+              <a:spcAft>
+                <a:spcPts val="0"/>
+              </a:spcAft>
+              <a:buClrTx/>
+              <a:buSzTx/>
+              <a:buFont typeface="+mj-lt"/>
+              <a:buAutoNum type="arabicPeriod"/>
+              <a:tabLst/>
+              <a:defRPr/>
+            </a:pPr>
+            <a:endParaRPr lang="en-US" sz="1800" dirty="0">
+              <a:effectLst/>
+              <a:latin typeface="Calibri" panose="020F0502020204030204" pitchFamily="34" charset="0"/>
+              <a:ea typeface="Calibri" panose="020F0502020204030204" pitchFamily="34" charset="0"/>
+              <a:cs typeface="Times New Roman" panose="02020603050405020304" pitchFamily="18" charset="0"/>
+            </a:endParaRPr>
+          </a:p>
+          <a:p>
+            <a:pPr marL="800100" marR="0" lvl="1" indent="-342900" algn="l" defTabSz="914400" rtl="0" eaLnBrk="1" fontAlgn="auto" latinLnBrk="0" hangingPunct="1">
+              <a:lnSpc>
+                <a:spcPct val="100000"/>
+              </a:lnSpc>
+              <a:spcBef>
+                <a:spcPts val="0"/>
+              </a:spcBef>
+              <a:spcAft>
+                <a:spcPts val="0"/>
+              </a:spcAft>
+              <a:buClrTx/>
+              <a:buSzTx/>
+              <a:buFont typeface="Courier New" panose="02070309020205020404" pitchFamily="49" charset="0"/>
+              <a:buChar char="o"/>
+              <a:tabLst/>
+              <a:defRPr/>
+            </a:pPr>
+            <a:endParaRPr lang="en-US" sz="1800" dirty="0">
+              <a:effectLst/>
+              <a:latin typeface="Times New Roman" panose="02020603050405020304" pitchFamily="18" charset="0"/>
+              <a:ea typeface="Times New Roman" panose="02020603050405020304" pitchFamily="18" charset="0"/>
+            </a:endParaRPr>
+          </a:p>
+          <a:p>
             <a:endParaRPr lang="en-US" dirty="0"/>
           </a:p>
         </p:txBody>
@@ -1534,7 +2368,7 @@
           <a:p>
             <a:fld id="{3148858F-F1DB-4027-9C85-CCA6849540DD}" type="slidenum">
               <a:rPr lang="en-US" smtClean="0"/>
-              <a:t>5</a:t>
+              <a:t>4</a:t>
             </a:fld>
             <a:endParaRPr lang="en-US"/>
           </a:p>
@@ -1543,7 +2377,7 @@
     </p:spTree>
     <p:extLst>
       <p:ext uri="{BB962C8B-B14F-4D97-AF65-F5344CB8AC3E}">
-        <p14:creationId xmlns:p14="http://schemas.microsoft.com/office/powerpoint/2010/main" val="1218542571"/>
+        <p14:creationId xmlns:p14="http://schemas.microsoft.com/office/powerpoint/2010/main" val="1955762856"/>
       </p:ext>
     </p:extLst>
   </p:cSld>
@@ -1597,945 +2431,6 @@
           <a:bodyPr/>
           <a:lstStyle/>
           <a:p>
-            <a:pPr marL="342900" marR="0" lvl="0" indent="-342900" algn="l" defTabSz="914400" rtl="0" eaLnBrk="1" fontAlgn="auto" latinLnBrk="0" hangingPunct="1">
-              <a:lnSpc>
-                <a:spcPct val="100000"/>
-              </a:lnSpc>
-              <a:spcBef>
-                <a:spcPts val="0"/>
-              </a:spcBef>
-              <a:spcAft>
-                <a:spcPts val="0"/>
-              </a:spcAft>
-              <a:buClrTx/>
-              <a:buSzTx/>
-              <a:buFontTx/>
-              <a:buAutoNum type="arabicPeriod"/>
-              <a:tabLst/>
-              <a:defRPr/>
-            </a:pPr>
-            <a:r>
-              <a:rPr lang="en-US" sz="1100" b="1" dirty="0">
-                <a:solidFill>
-                  <a:srgbClr val="24292F"/>
-                </a:solidFill>
-                <a:effectLst>
-                  <a:outerShdw blurRad="38100" dist="38100" dir="2700000" algn="tl">
-                    <a:srgbClr val="000000">
-                      <a:alpha val="43137"/>
-                    </a:srgbClr>
-                  </a:outerShdw>
-                </a:effectLst>
-                <a:latin typeface="+mn-lt"/>
-                <a:ea typeface="Times New Roman" panose="02020603050405020304" pitchFamily="18" charset="0"/>
-              </a:rPr>
-              <a:t>Focus</a:t>
-            </a:r>
-          </a:p>
-          <a:p>
-            <a:pPr marL="800100" marR="0" lvl="1" indent="-342900" algn="l" defTabSz="914400" rtl="0" eaLnBrk="1" fontAlgn="auto" latinLnBrk="0" hangingPunct="1">
-              <a:lnSpc>
-                <a:spcPct val="100000"/>
-              </a:lnSpc>
-              <a:spcBef>
-                <a:spcPts val="0"/>
-              </a:spcBef>
-              <a:spcAft>
-                <a:spcPts val="0"/>
-              </a:spcAft>
-              <a:buClrTx/>
-              <a:buSzTx/>
-              <a:buFont typeface="Courier New" panose="02070309020205020404" pitchFamily="49" charset="0"/>
-              <a:buChar char="o"/>
-              <a:tabLst/>
-              <a:defRPr/>
-            </a:pPr>
-            <a:r>
-              <a:rPr lang="en-US" sz="1100" dirty="0">
-                <a:solidFill>
-                  <a:srgbClr val="24292F"/>
-                </a:solidFill>
-                <a:effectLst/>
-                <a:latin typeface="+mn-lt"/>
-                <a:ea typeface="Times New Roman" panose="02020603050405020304" pitchFamily="18" charset="0"/>
-              </a:rPr>
-              <a:t>So often, students think they can learn AI programming while multi-tasking on Facebook or texting friends on their cell phone. After programming for 30 years, I've learned one thing. You'll learn AI much faster if you can devote focused, uninterrupted time to practice.</a:t>
-            </a:r>
-          </a:p>
-          <a:p>
-            <a:pPr marL="342900" marR="0" lvl="0" indent="-342900" algn="l" defTabSz="914400" rtl="0" eaLnBrk="1" fontAlgn="auto" latinLnBrk="0" hangingPunct="1">
-              <a:lnSpc>
-                <a:spcPct val="100000"/>
-              </a:lnSpc>
-              <a:spcBef>
-                <a:spcPts val="0"/>
-              </a:spcBef>
-              <a:spcAft>
-                <a:spcPts val="0"/>
-              </a:spcAft>
-              <a:buClrTx/>
-              <a:buSzTx/>
-              <a:buFontTx/>
-              <a:buAutoNum type="arabicPeriod"/>
-              <a:tabLst/>
-              <a:defRPr/>
-            </a:pPr>
-            <a:r>
-              <a:rPr lang="en-US" sz="1100" b="1" dirty="0">
-                <a:effectLst/>
-                <a:latin typeface="+mn-lt"/>
-                <a:ea typeface="Calibri" panose="020F0502020204030204" pitchFamily="34" charset="0"/>
-                <a:cs typeface="LMRoman12-Bold"/>
-              </a:rPr>
-              <a:t>Avoid the “copy and paste” approach to writing code</a:t>
-            </a:r>
-          </a:p>
-          <a:p>
-            <a:pPr marL="800100" marR="0" lvl="1" indent="-342900" algn="l" defTabSz="914400" rtl="0" eaLnBrk="1" fontAlgn="auto" latinLnBrk="0" hangingPunct="1">
-              <a:lnSpc>
-                <a:spcPct val="100000"/>
-              </a:lnSpc>
-              <a:spcBef>
-                <a:spcPts val="0"/>
-              </a:spcBef>
-              <a:spcAft>
-                <a:spcPts val="0"/>
-              </a:spcAft>
-              <a:buClrTx/>
-              <a:buSzTx/>
-              <a:buFont typeface="Courier New" panose="02070309020205020404" pitchFamily="49" charset="0"/>
-              <a:buChar char="o"/>
-              <a:tabLst/>
-              <a:defRPr/>
-            </a:pPr>
-            <a:r>
-              <a:rPr lang="en-US" sz="1100" dirty="0">
-                <a:effectLst/>
-                <a:latin typeface="+mn-lt"/>
-                <a:ea typeface="Calibri" panose="020F0502020204030204" pitchFamily="34" charset="0"/>
-                <a:cs typeface="LMRoman10-Regular"/>
-              </a:rPr>
-              <a:t>Although copying and pasting may help you to avoid typing errors, it can also interfere with your learning</a:t>
-            </a:r>
-            <a:r>
-              <a:rPr lang="en-US" sz="1100" dirty="0">
-                <a:effectLst/>
-                <a:latin typeface="+mn-lt"/>
-                <a:ea typeface="Calibri" panose="020F0502020204030204" pitchFamily="34" charset="0"/>
-                <a:cs typeface="Times New Roman" panose="02020603050405020304" pitchFamily="18" charset="0"/>
-              </a:rPr>
-              <a:t> </a:t>
-            </a:r>
-            <a:r>
-              <a:rPr lang="en-US" sz="1100" dirty="0">
-                <a:effectLst/>
-                <a:latin typeface="+mn-lt"/>
-                <a:ea typeface="Calibri" panose="020F0502020204030204" pitchFamily="34" charset="0"/>
-                <a:cs typeface="LMRoman10-Regular"/>
-              </a:rPr>
-              <a:t>process for two reasons:</a:t>
-            </a:r>
-          </a:p>
-          <a:p>
-            <a:pPr marL="1257300" marR="0" lvl="2" indent="-342900" algn="l" defTabSz="914400" rtl="0" eaLnBrk="1" fontAlgn="auto" latinLnBrk="0" hangingPunct="1">
-              <a:lnSpc>
-                <a:spcPct val="100000"/>
-              </a:lnSpc>
-              <a:spcBef>
-                <a:spcPts val="0"/>
-              </a:spcBef>
-              <a:spcAft>
-                <a:spcPts val="0"/>
-              </a:spcAft>
-              <a:buClrTx/>
-              <a:buSzTx/>
-              <a:buFont typeface="Courier New" panose="02070309020205020404" pitchFamily="49" charset="0"/>
-              <a:buChar char="o"/>
-              <a:tabLst/>
-              <a:defRPr/>
-            </a:pPr>
-            <a:r>
-              <a:rPr lang="en-US" sz="1100" dirty="0">
-                <a:effectLst/>
-                <a:latin typeface="+mn-lt"/>
-                <a:ea typeface="Calibri" panose="020F0502020204030204" pitchFamily="34" charset="0"/>
-                <a:cs typeface="Times New Roman" panose="02020603050405020304" pitchFamily="18" charset="0"/>
-              </a:rPr>
-              <a:t>Typing </a:t>
-            </a:r>
-            <a:r>
-              <a:rPr lang="en-US" sz="1100" dirty="0">
-                <a:effectLst/>
-                <a:latin typeface="+mn-lt"/>
-                <a:ea typeface="Calibri" panose="020F0502020204030204" pitchFamily="34" charset="0"/>
-                <a:cs typeface="LMRoman10-Regular"/>
-              </a:rPr>
-              <a:t>errors can help you gain experience in writing code it provides informative feedback when you</a:t>
-            </a:r>
-            <a:r>
-              <a:rPr lang="en-US" sz="1100" dirty="0">
-                <a:effectLst/>
-                <a:latin typeface="+mn-lt"/>
-                <a:ea typeface="Calibri" panose="020F0502020204030204" pitchFamily="34" charset="0"/>
-                <a:cs typeface="Times New Roman" panose="02020603050405020304" pitchFamily="18" charset="0"/>
-              </a:rPr>
-              <a:t> </a:t>
-            </a:r>
-            <a:r>
-              <a:rPr lang="en-US" sz="1100" dirty="0">
-                <a:effectLst/>
-                <a:latin typeface="+mn-lt"/>
-                <a:ea typeface="Calibri" panose="020F0502020204030204" pitchFamily="34" charset="0"/>
-                <a:cs typeface="LMRoman10-Regular"/>
-              </a:rPr>
-              <a:t>make mistakes. Making and correcting typing errors is an important skill to develop, particularly</a:t>
-            </a:r>
-            <a:r>
-              <a:rPr lang="en-US" sz="1100" dirty="0">
-                <a:effectLst/>
-                <a:latin typeface="+mn-lt"/>
-                <a:ea typeface="Calibri" panose="020F0502020204030204" pitchFamily="34" charset="0"/>
-                <a:cs typeface="Times New Roman" panose="02020603050405020304" pitchFamily="18" charset="0"/>
-              </a:rPr>
-              <a:t> </a:t>
-            </a:r>
-            <a:r>
-              <a:rPr lang="en-US" sz="1100" dirty="0">
-                <a:effectLst/>
-                <a:latin typeface="+mn-lt"/>
-                <a:ea typeface="Calibri" panose="020F0502020204030204" pitchFamily="34" charset="0"/>
-                <a:cs typeface="LMRoman10-Regular"/>
-              </a:rPr>
-              <a:t>when you are typing a lot of code for your own data analysis.</a:t>
-            </a:r>
-          </a:p>
-          <a:p>
-            <a:pPr marL="1257300" marR="0" lvl="2" indent="-342900" algn="l" defTabSz="914400" rtl="0" eaLnBrk="1" fontAlgn="auto" latinLnBrk="0" hangingPunct="1">
-              <a:lnSpc>
-                <a:spcPct val="100000"/>
-              </a:lnSpc>
-              <a:spcBef>
-                <a:spcPts val="0"/>
-              </a:spcBef>
-              <a:spcAft>
-                <a:spcPts val="0"/>
-              </a:spcAft>
-              <a:buClrTx/>
-              <a:buSzTx/>
-              <a:buFont typeface="Courier New" panose="02070309020205020404" pitchFamily="49" charset="0"/>
-              <a:buChar char="o"/>
-              <a:tabLst/>
-              <a:defRPr/>
-            </a:pPr>
-            <a:r>
-              <a:rPr lang="en-US" sz="1100" dirty="0">
-                <a:effectLst/>
-                <a:latin typeface="+mn-lt"/>
-                <a:ea typeface="Calibri" panose="020F0502020204030204" pitchFamily="34" charset="0"/>
-                <a:cs typeface="Times New Roman" panose="02020603050405020304" pitchFamily="18" charset="0"/>
-              </a:rPr>
-              <a:t>Copying </a:t>
-            </a:r>
-            <a:r>
-              <a:rPr lang="en-US" sz="1100" dirty="0">
-                <a:effectLst/>
-                <a:latin typeface="+mn-lt"/>
-                <a:ea typeface="Calibri" panose="020F0502020204030204" pitchFamily="34" charset="0"/>
-                <a:cs typeface="LMRoman10-Regular"/>
-              </a:rPr>
-              <a:t>and pasting code may give you the impression that you know what you are doing when – in reality – you probably do not fully understand what the individual blocks of code are actually doing.</a:t>
-            </a:r>
-            <a:r>
-              <a:rPr lang="en-US" sz="1100" dirty="0">
-                <a:effectLst/>
-                <a:latin typeface="+mn-lt"/>
-                <a:ea typeface="Calibri" panose="020F0502020204030204" pitchFamily="34" charset="0"/>
-                <a:cs typeface="Times New Roman" panose="02020603050405020304" pitchFamily="18" charset="0"/>
-              </a:rPr>
-              <a:t> </a:t>
-            </a:r>
-            <a:r>
-              <a:rPr lang="en-US" sz="1100" dirty="0">
-                <a:effectLst/>
-                <a:latin typeface="+mn-lt"/>
-                <a:ea typeface="Calibri" panose="020F0502020204030204" pitchFamily="34" charset="0"/>
-                <a:cs typeface="LMRoman10-Regular"/>
-              </a:rPr>
-              <a:t>Furthermore, this problem will just get worse as you deal with increasingly longer and more complicated</a:t>
-            </a:r>
-            <a:r>
-              <a:rPr lang="en-US" sz="1100" dirty="0">
-                <a:effectLst/>
-                <a:latin typeface="+mn-lt"/>
-                <a:ea typeface="Calibri" panose="020F0502020204030204" pitchFamily="34" charset="0"/>
-                <a:cs typeface="Times New Roman" panose="02020603050405020304" pitchFamily="18" charset="0"/>
-              </a:rPr>
-              <a:t> s</a:t>
-            </a:r>
-            <a:r>
-              <a:rPr lang="en-US" sz="1100" dirty="0">
-                <a:effectLst/>
-                <a:latin typeface="+mn-lt"/>
-                <a:ea typeface="Calibri" panose="020F0502020204030204" pitchFamily="34" charset="0"/>
-                <a:cs typeface="LMRoman10-Regular"/>
-              </a:rPr>
-              <a:t>cripts.</a:t>
-            </a:r>
-          </a:p>
-          <a:p>
-            <a:pPr marL="342900" marR="0" lvl="0" indent="-342900" algn="l" defTabSz="914400" rtl="0" eaLnBrk="1" fontAlgn="auto" latinLnBrk="0" hangingPunct="1">
-              <a:lnSpc>
-                <a:spcPct val="100000"/>
-              </a:lnSpc>
-              <a:spcBef>
-                <a:spcPts val="0"/>
-              </a:spcBef>
-              <a:spcAft>
-                <a:spcPts val="0"/>
-              </a:spcAft>
-              <a:buClrTx/>
-              <a:buSzTx/>
-              <a:buFont typeface="+mj-lt"/>
-              <a:buAutoNum type="arabicPeriod"/>
-              <a:tabLst/>
-              <a:defRPr/>
-            </a:pPr>
-            <a:r>
-              <a:rPr lang="en-US" sz="1100" b="1" dirty="0">
-                <a:effectLst/>
-                <a:latin typeface="+mn-lt"/>
-                <a:ea typeface="Calibri" panose="020F0502020204030204" pitchFamily="34" charset="0"/>
-                <a:cs typeface="LMRoman12-Bold"/>
-              </a:rPr>
-              <a:t>Study code block-by-block, line-by-line</a:t>
-            </a:r>
-          </a:p>
-          <a:p>
-            <a:pPr marL="800100" marR="0" lvl="1" indent="-342900" algn="l" defTabSz="914400" rtl="0" eaLnBrk="1" fontAlgn="auto" latinLnBrk="0" hangingPunct="1">
-              <a:lnSpc>
-                <a:spcPct val="100000"/>
-              </a:lnSpc>
-              <a:spcBef>
-                <a:spcPts val="0"/>
-              </a:spcBef>
-              <a:spcAft>
-                <a:spcPts val="0"/>
-              </a:spcAft>
-              <a:buClrTx/>
-              <a:buSzTx/>
-              <a:buFont typeface="Courier New" panose="02070309020205020404" pitchFamily="49" charset="0"/>
-              <a:buChar char="o"/>
-              <a:tabLst/>
-              <a:defRPr/>
-            </a:pPr>
-            <a:r>
-              <a:rPr lang="en-US" sz="1100" dirty="0">
-                <a:effectLst/>
-                <a:latin typeface="+mn-lt"/>
-                <a:ea typeface="Calibri" panose="020F0502020204030204" pitchFamily="34" charset="0"/>
-                <a:cs typeface="LMRoman10-Regular"/>
-              </a:rPr>
-              <a:t>This means running one block of code at a time and making sure that you understand why the output is what</a:t>
-            </a:r>
-            <a:r>
-              <a:rPr lang="en-US" sz="1100" dirty="0">
-                <a:effectLst/>
-                <a:latin typeface="+mn-lt"/>
-                <a:ea typeface="Calibri" panose="020F0502020204030204" pitchFamily="34" charset="0"/>
-                <a:cs typeface="Times New Roman" panose="02020603050405020304" pitchFamily="18" charset="0"/>
-              </a:rPr>
-              <a:t> </a:t>
-            </a:r>
-            <a:r>
-              <a:rPr lang="en-US" sz="1100" dirty="0">
-                <a:effectLst/>
-                <a:latin typeface="+mn-lt"/>
-                <a:ea typeface="Calibri" panose="020F0502020204030204" pitchFamily="34" charset="0"/>
-                <a:cs typeface="LMRoman10-Regular"/>
-              </a:rPr>
-              <a:t>it is. If things are not clear, it is important to spend more time with that piece of the code. Here are some</a:t>
-            </a:r>
-            <a:r>
-              <a:rPr lang="en-US" sz="1100" dirty="0">
-                <a:effectLst/>
-                <a:latin typeface="+mn-lt"/>
-                <a:ea typeface="Calibri" panose="020F0502020204030204" pitchFamily="34" charset="0"/>
-                <a:cs typeface="Times New Roman" panose="02020603050405020304" pitchFamily="18" charset="0"/>
-              </a:rPr>
-              <a:t> </a:t>
-            </a:r>
-            <a:r>
-              <a:rPr lang="en-US" sz="1100" dirty="0">
-                <a:effectLst/>
-                <a:latin typeface="+mn-lt"/>
-                <a:ea typeface="Calibri" panose="020F0502020204030204" pitchFamily="34" charset="0"/>
-                <a:cs typeface="LMRoman10-Regular"/>
-              </a:rPr>
-              <a:t>tricks that are often helpful to understand a particular piece of code:</a:t>
-            </a:r>
-          </a:p>
-          <a:p>
-            <a:pPr marL="1257300" marR="0" lvl="2" indent="-342900" algn="l" defTabSz="914400" rtl="0" eaLnBrk="1" fontAlgn="auto" latinLnBrk="0" hangingPunct="1">
-              <a:lnSpc>
-                <a:spcPct val="100000"/>
-              </a:lnSpc>
-              <a:spcBef>
-                <a:spcPts val="0"/>
-              </a:spcBef>
-              <a:spcAft>
-                <a:spcPts val="0"/>
-              </a:spcAft>
-              <a:buClrTx/>
-              <a:buSzTx/>
-              <a:buFont typeface="Courier New" panose="02070309020205020404" pitchFamily="49" charset="0"/>
-              <a:buChar char="o"/>
-              <a:tabLst/>
-              <a:defRPr/>
-            </a:pPr>
-            <a:r>
-              <a:rPr lang="en-US" sz="1100" dirty="0">
-                <a:effectLst/>
-                <a:latin typeface="+mn-lt"/>
-                <a:ea typeface="Calibri" panose="020F0502020204030204" pitchFamily="34" charset="0"/>
-                <a:cs typeface="LMRoman10-Regular"/>
-              </a:rPr>
-              <a:t>Break a line of code into its components and try to understand the individual pieces.  Sometimes functions are nested within functions.</a:t>
-            </a:r>
-            <a:endParaRPr lang="en-US" sz="1100" dirty="0">
-              <a:effectLst/>
-              <a:latin typeface="+mn-lt"/>
-              <a:ea typeface="Calibri" panose="020F0502020204030204" pitchFamily="34" charset="0"/>
-              <a:cs typeface="Times New Roman" panose="02020603050405020304" pitchFamily="18" charset="0"/>
-            </a:endParaRPr>
-          </a:p>
-          <a:p>
-            <a:pPr marL="1257300" marR="0" lvl="2" indent="-342900" algn="l" defTabSz="914400" rtl="0" eaLnBrk="1" fontAlgn="auto" latinLnBrk="0" hangingPunct="1">
-              <a:lnSpc>
-                <a:spcPct val="100000"/>
-              </a:lnSpc>
-              <a:spcBef>
-                <a:spcPts val="0"/>
-              </a:spcBef>
-              <a:spcAft>
-                <a:spcPts val="0"/>
-              </a:spcAft>
-              <a:buClrTx/>
-              <a:buSzTx/>
-              <a:buFont typeface="Courier New" panose="02070309020205020404" pitchFamily="49" charset="0"/>
-              <a:buChar char="o"/>
-              <a:tabLst/>
-              <a:defRPr/>
-            </a:pPr>
-            <a:r>
-              <a:rPr lang="en-US" sz="1100" dirty="0">
-                <a:effectLst/>
-                <a:latin typeface="+mn-lt"/>
-                <a:ea typeface="Calibri" panose="020F0502020204030204" pitchFamily="34" charset="0"/>
-                <a:cs typeface="LMRoman10-Regular"/>
-              </a:rPr>
-              <a:t>Document what each block is doing. Clear documentation is critical as you may not remember what you did when you come back to a piece of code at some point in the future. As a wise programmer once said, “Write code for the future you.” Documentation is also useful when you want to adapt or reuse code in some other way. In situations like this, you will immediately know what a specific chunk of code does because it has been clearly documented.  </a:t>
-            </a:r>
-            <a:r>
-              <a:rPr lang="en-US" sz="1100" b="1" dirty="0">
-                <a:solidFill>
-                  <a:schemeClr val="tx1">
-                    <a:lumMod val="75000"/>
-                    <a:lumOff val="25000"/>
-                  </a:schemeClr>
-                </a:solidFill>
-                <a:effectLst/>
-                <a:latin typeface="+mn-lt"/>
-                <a:ea typeface="Calibri" panose="020F0502020204030204" pitchFamily="34" charset="0"/>
-                <a:cs typeface="LMRoman10-Regular"/>
-              </a:rPr>
-              <a:t>Donald Knuth </a:t>
-            </a:r>
-            <a:r>
-              <a:rPr lang="en-US" sz="1100" dirty="0">
-                <a:effectLst/>
-                <a:latin typeface="+mn-lt"/>
-                <a:ea typeface="Calibri" panose="020F0502020204030204" pitchFamily="34" charset="0"/>
-                <a:cs typeface="LMRoman10-Regular"/>
-              </a:rPr>
-              <a:t>– Literate Programming</a:t>
-            </a:r>
-            <a:endParaRPr lang="en-US" sz="1100" dirty="0">
-              <a:effectLst/>
-              <a:latin typeface="+mn-lt"/>
-              <a:ea typeface="Calibri" panose="020F0502020204030204" pitchFamily="34" charset="0"/>
-              <a:cs typeface="Times New Roman" panose="02020603050405020304" pitchFamily="18" charset="0"/>
-            </a:endParaRPr>
-          </a:p>
-          <a:p>
-            <a:pPr marL="1257300" marR="0" lvl="2" indent="-342900" algn="l" defTabSz="914400" rtl="0" eaLnBrk="1" fontAlgn="auto" latinLnBrk="0" hangingPunct="1">
-              <a:lnSpc>
-                <a:spcPct val="100000"/>
-              </a:lnSpc>
-              <a:spcBef>
-                <a:spcPts val="0"/>
-              </a:spcBef>
-              <a:spcAft>
-                <a:spcPts val="0"/>
-              </a:spcAft>
-              <a:buClrTx/>
-              <a:buSzTx/>
-              <a:buFont typeface="Courier New" panose="02070309020205020404" pitchFamily="49" charset="0"/>
-              <a:buChar char="o"/>
-              <a:tabLst/>
-              <a:defRPr/>
-            </a:pPr>
-            <a:r>
-              <a:rPr lang="en-US" sz="1100" dirty="0">
-                <a:effectLst/>
-                <a:latin typeface="+mn-lt"/>
-                <a:ea typeface="Calibri" panose="020F0502020204030204" pitchFamily="34" charset="0"/>
-                <a:cs typeface="LMRoman10-Regular"/>
-              </a:rPr>
-              <a:t>Perform mini experiments: create a simpler example in which you can tinker with the code and see what happens to the output.</a:t>
-            </a:r>
-            <a:endParaRPr lang="en-US" sz="1100" dirty="0">
-              <a:effectLst/>
-              <a:latin typeface="+mn-lt"/>
-              <a:ea typeface="Calibri" panose="020F0502020204030204" pitchFamily="34" charset="0"/>
-              <a:cs typeface="Times New Roman" panose="02020603050405020304" pitchFamily="18" charset="0"/>
-            </a:endParaRPr>
-          </a:p>
-          <a:p>
-            <a:pPr marL="342900" marR="0" lvl="0" indent="-342900" algn="l" defTabSz="914400" rtl="0" eaLnBrk="1" fontAlgn="auto" latinLnBrk="0" hangingPunct="1">
-              <a:lnSpc>
-                <a:spcPct val="100000"/>
-              </a:lnSpc>
-              <a:spcBef>
-                <a:spcPts val="0"/>
-              </a:spcBef>
-              <a:spcAft>
-                <a:spcPts val="0"/>
-              </a:spcAft>
-              <a:buClrTx/>
-              <a:buSzTx/>
-              <a:buFont typeface="+mj-lt"/>
-              <a:buAutoNum type="arabicPeriod"/>
-              <a:tabLst/>
-              <a:defRPr/>
-            </a:pPr>
-            <a:r>
-              <a:rPr lang="en-US" sz="1100" b="1" dirty="0">
-                <a:effectLst/>
-                <a:latin typeface="+mn-lt"/>
-                <a:ea typeface="Calibri" panose="020F0502020204030204" pitchFamily="34" charset="0"/>
-                <a:cs typeface="LMRoman12-Bold"/>
-              </a:rPr>
-              <a:t>Use the internet to find answers</a:t>
-            </a:r>
-          </a:p>
-          <a:p>
-            <a:pPr marL="800100" marR="0" lvl="1" indent="-342900" algn="l" defTabSz="914400" rtl="0" eaLnBrk="1" fontAlgn="auto" latinLnBrk="0" hangingPunct="1">
-              <a:lnSpc>
-                <a:spcPct val="100000"/>
-              </a:lnSpc>
-              <a:spcBef>
-                <a:spcPts val="0"/>
-              </a:spcBef>
-              <a:spcAft>
-                <a:spcPts val="0"/>
-              </a:spcAft>
-              <a:buClrTx/>
-              <a:buSzTx/>
-              <a:buFont typeface="Courier New" panose="02070309020205020404" pitchFamily="49" charset="0"/>
-              <a:buChar char="o"/>
-              <a:tabLst/>
-              <a:defRPr/>
-            </a:pPr>
-            <a:r>
-              <a:rPr lang="en-US" sz="1100" dirty="0">
-                <a:effectLst/>
-                <a:latin typeface="+mn-lt"/>
-                <a:ea typeface="Calibri" panose="020F0502020204030204" pitchFamily="34" charset="0"/>
-                <a:cs typeface="LMRoman10-Regular"/>
-              </a:rPr>
-              <a:t>Everybody (from novice to more experienced users) relies on the internet when they don’t understand</a:t>
-            </a:r>
-            <a:r>
-              <a:rPr lang="en-US" sz="1100" dirty="0">
-                <a:effectLst/>
-                <a:latin typeface="+mn-lt"/>
-                <a:ea typeface="Calibri" panose="020F0502020204030204" pitchFamily="34" charset="0"/>
-                <a:cs typeface="Times New Roman" panose="02020603050405020304" pitchFamily="18" charset="0"/>
-              </a:rPr>
-              <a:t> </a:t>
-            </a:r>
-            <a:r>
-              <a:rPr lang="en-US" sz="1100" dirty="0">
-                <a:effectLst/>
-                <a:latin typeface="+mn-lt"/>
-                <a:ea typeface="Calibri" panose="020F0502020204030204" pitchFamily="34" charset="0"/>
-                <a:cs typeface="LMRoman10-Regular"/>
-              </a:rPr>
-              <a:t>something. It is likely that other people have already asked (and received useful answers) for the problem</a:t>
-            </a:r>
-            <a:r>
-              <a:rPr lang="en-US" sz="1100" dirty="0">
-                <a:effectLst/>
-                <a:latin typeface="+mn-lt"/>
-                <a:ea typeface="Calibri" panose="020F0502020204030204" pitchFamily="34" charset="0"/>
-                <a:cs typeface="Times New Roman" panose="02020603050405020304" pitchFamily="18" charset="0"/>
-              </a:rPr>
-              <a:t> </a:t>
-            </a:r>
-            <a:r>
-              <a:rPr lang="en-US" sz="1100" dirty="0">
-                <a:effectLst/>
-                <a:latin typeface="+mn-lt"/>
-                <a:ea typeface="Calibri" panose="020F0502020204030204" pitchFamily="34" charset="0"/>
-                <a:cs typeface="LMRoman10-Regular"/>
-              </a:rPr>
-              <a:t>that you are facing. However, finding the exact piece of information that you need might be hard, especially</a:t>
-            </a:r>
-            <a:r>
-              <a:rPr lang="en-US" sz="1100" dirty="0">
-                <a:effectLst/>
-                <a:latin typeface="+mn-lt"/>
-                <a:ea typeface="Calibri" panose="020F0502020204030204" pitchFamily="34" charset="0"/>
-                <a:cs typeface="Times New Roman" panose="02020603050405020304" pitchFamily="18" charset="0"/>
-              </a:rPr>
-              <a:t> </a:t>
-            </a:r>
-            <a:r>
-              <a:rPr lang="en-US" sz="1100" dirty="0">
-                <a:effectLst/>
-                <a:latin typeface="+mn-lt"/>
-                <a:ea typeface="Calibri" panose="020F0502020204030204" pitchFamily="34" charset="0"/>
-                <a:cs typeface="LMRoman10-Regular"/>
-              </a:rPr>
-              <a:t>if you don’t use the correct terms/key words. Learning how to search for the information that you need is</a:t>
-            </a:r>
-            <a:r>
-              <a:rPr lang="en-US" sz="1100" dirty="0">
-                <a:effectLst/>
-                <a:latin typeface="+mn-lt"/>
-                <a:ea typeface="Calibri" panose="020F0502020204030204" pitchFamily="34" charset="0"/>
-                <a:cs typeface="Times New Roman" panose="02020603050405020304" pitchFamily="18" charset="0"/>
-              </a:rPr>
-              <a:t> </a:t>
-            </a:r>
-            <a:r>
-              <a:rPr lang="en-US" sz="1100" dirty="0">
-                <a:effectLst/>
-                <a:latin typeface="+mn-lt"/>
-                <a:ea typeface="Calibri" panose="020F0502020204030204" pitchFamily="34" charset="0"/>
-                <a:cs typeface="LMRoman10-Regular"/>
-              </a:rPr>
-              <a:t>a skill that also takes practice. “</a:t>
-            </a:r>
-            <a:r>
-              <a:rPr lang="en-US" sz="1100" dirty="0" err="1">
-                <a:effectLst/>
-                <a:latin typeface="+mn-lt"/>
-                <a:ea typeface="Calibri" panose="020F0502020204030204" pitchFamily="34" charset="0"/>
-                <a:cs typeface="LMRoman10-Regular"/>
-              </a:rPr>
-              <a:t>Stackoverflow</a:t>
-            </a:r>
-            <a:r>
-              <a:rPr lang="en-US" sz="1100" dirty="0">
-                <a:effectLst/>
-                <a:latin typeface="+mn-lt"/>
-                <a:ea typeface="Calibri" panose="020F0502020204030204" pitchFamily="34" charset="0"/>
-                <a:cs typeface="LMRoman10-Regular"/>
-              </a:rPr>
-              <a:t>” and existing </a:t>
-            </a:r>
-            <a:r>
-              <a:rPr lang="en-US" sz="1100" dirty="0" err="1">
-                <a:effectLst/>
-                <a:latin typeface="+mn-lt"/>
-                <a:ea typeface="Calibri" panose="020F0502020204030204" pitchFamily="34" charset="0"/>
-                <a:cs typeface="LMRoman10-Regular"/>
-              </a:rPr>
-              <a:t>cheatsheets</a:t>
-            </a:r>
-            <a:r>
-              <a:rPr lang="en-US" sz="1100" dirty="0">
-                <a:effectLst/>
-                <a:latin typeface="+mn-lt"/>
-                <a:ea typeface="Calibri" panose="020F0502020204030204" pitchFamily="34" charset="0"/>
-                <a:cs typeface="LMRoman10-Regular"/>
-              </a:rPr>
-              <a:t> can be very helpful.</a:t>
-            </a:r>
-          </a:p>
-          <a:p>
-            <a:pPr marL="342900" marR="0" lvl="0" indent="-342900" algn="l" defTabSz="914400" rtl="0" eaLnBrk="1" fontAlgn="auto" latinLnBrk="0" hangingPunct="1">
-              <a:lnSpc>
-                <a:spcPct val="100000"/>
-              </a:lnSpc>
-              <a:spcBef>
-                <a:spcPts val="0"/>
-              </a:spcBef>
-              <a:spcAft>
-                <a:spcPts val="0"/>
-              </a:spcAft>
-              <a:buClrTx/>
-              <a:buSzTx/>
-              <a:buFont typeface="+mj-lt"/>
-              <a:buAutoNum type="arabicPeriod"/>
-              <a:tabLst/>
-              <a:defRPr/>
-            </a:pPr>
-            <a:r>
-              <a:rPr lang="en-US" sz="1100" b="1" dirty="0">
-                <a:effectLst/>
-                <a:latin typeface="+mn-lt"/>
-                <a:ea typeface="Calibri" panose="020F0502020204030204" pitchFamily="34" charset="0"/>
-                <a:cs typeface="LMRoman10-Regular"/>
-              </a:rPr>
-              <a:t>Ask for Help</a:t>
-            </a:r>
-          </a:p>
-          <a:p>
-            <a:pPr marL="800100" marR="0" lvl="1" indent="-342900" algn="l" defTabSz="914400" rtl="0" eaLnBrk="1" fontAlgn="auto" latinLnBrk="0" hangingPunct="1">
-              <a:lnSpc>
-                <a:spcPct val="100000"/>
-              </a:lnSpc>
-              <a:spcBef>
-                <a:spcPts val="0"/>
-              </a:spcBef>
-              <a:spcAft>
-                <a:spcPts val="0"/>
-              </a:spcAft>
-              <a:buClrTx/>
-              <a:buSzTx/>
-              <a:buFont typeface="Courier New" panose="02070309020205020404" pitchFamily="49" charset="0"/>
-              <a:buChar char="o"/>
-              <a:tabLst/>
-              <a:defRPr/>
-            </a:pPr>
-            <a:r>
-              <a:rPr lang="en-US" sz="1100" b="0" dirty="0">
-                <a:effectLst/>
-                <a:latin typeface="+mn-lt"/>
-                <a:ea typeface="Calibri" panose="020F0502020204030204" pitchFamily="34" charset="0"/>
-                <a:cs typeface="LMRoman10-Regular"/>
-              </a:rPr>
-              <a:t>We’re all learning.  And some days, I feel like I’m the one who has the most to learn.  Alcoa story.</a:t>
-            </a:r>
-          </a:p>
-          <a:p>
-            <a:pPr marL="342900" marR="0" lvl="0" indent="-342900" algn="l" defTabSz="914400" rtl="0" eaLnBrk="1" fontAlgn="auto" latinLnBrk="0" hangingPunct="1">
-              <a:lnSpc>
-                <a:spcPct val="100000"/>
-              </a:lnSpc>
-              <a:spcBef>
-                <a:spcPts val="0"/>
-              </a:spcBef>
-              <a:spcAft>
-                <a:spcPts val="0"/>
-              </a:spcAft>
-              <a:buClrTx/>
-              <a:buSzTx/>
-              <a:buFont typeface="+mj-lt"/>
-              <a:buAutoNum type="arabicPeriod"/>
-              <a:tabLst/>
-              <a:defRPr/>
-            </a:pPr>
-            <a:r>
-              <a:rPr lang="en-US" sz="1100" b="1" dirty="0">
-                <a:effectLst/>
-                <a:latin typeface="+mn-lt"/>
-                <a:ea typeface="Calibri" panose="020F0502020204030204" pitchFamily="34" charset="0"/>
-                <a:cs typeface="LMRoman12-Bold"/>
-              </a:rPr>
-              <a:t>Take your time</a:t>
-            </a:r>
-          </a:p>
-          <a:p>
-            <a:pPr marL="800100" marR="0" lvl="1" indent="-342900" algn="l" defTabSz="914400" rtl="0" eaLnBrk="1" fontAlgn="auto" latinLnBrk="0" hangingPunct="1">
-              <a:lnSpc>
-                <a:spcPct val="100000"/>
-              </a:lnSpc>
-              <a:spcBef>
-                <a:spcPts val="0"/>
-              </a:spcBef>
-              <a:spcAft>
-                <a:spcPts val="0"/>
-              </a:spcAft>
-              <a:buClrTx/>
-              <a:buSzTx/>
-              <a:buFont typeface="Courier New" panose="02070309020205020404" pitchFamily="49" charset="0"/>
-              <a:buChar char="o"/>
-              <a:tabLst/>
-              <a:defRPr/>
-            </a:pPr>
-            <a:r>
-              <a:rPr lang="en-US" sz="1100" dirty="0">
-                <a:effectLst/>
-                <a:latin typeface="+mn-lt"/>
-                <a:ea typeface="Calibri" panose="020F0502020204030204" pitchFamily="34" charset="0"/>
-                <a:cs typeface="LMRoman10-Regular"/>
-              </a:rPr>
-              <a:t>It is important to realize that it takes time to learn AI. What this implies is that you should not</a:t>
-            </a:r>
-            <a:r>
-              <a:rPr lang="en-US" sz="1100" dirty="0">
-                <a:effectLst/>
-                <a:latin typeface="+mn-lt"/>
-                <a:ea typeface="Calibri" panose="020F0502020204030204" pitchFamily="34" charset="0"/>
-                <a:cs typeface="Times New Roman" panose="02020603050405020304" pitchFamily="18" charset="0"/>
-              </a:rPr>
-              <a:t> </a:t>
-            </a:r>
-            <a:r>
-              <a:rPr lang="en-US" sz="1100" dirty="0">
-                <a:effectLst/>
-                <a:latin typeface="+mn-lt"/>
-                <a:ea typeface="Calibri" panose="020F0502020204030204" pitchFamily="34" charset="0"/>
-                <a:cs typeface="LMRoman10-Regular"/>
-              </a:rPr>
-              <a:t>rush to get things done if you want to master this skill. In particular, everybody goes through some level of</a:t>
-            </a:r>
-            <a:r>
-              <a:rPr lang="en-US" sz="1100" dirty="0">
-                <a:effectLst/>
-                <a:latin typeface="+mn-lt"/>
-                <a:ea typeface="Calibri" panose="020F0502020204030204" pitchFamily="34" charset="0"/>
-                <a:cs typeface="Times New Roman" panose="02020603050405020304" pitchFamily="18" charset="0"/>
-              </a:rPr>
-              <a:t> </a:t>
-            </a:r>
-            <a:r>
-              <a:rPr lang="en-US" sz="1100" dirty="0">
-                <a:effectLst/>
-                <a:latin typeface="+mn-lt"/>
-                <a:ea typeface="Calibri" panose="020F0502020204030204" pitchFamily="34" charset="0"/>
-                <a:cs typeface="LMRoman10-Regular"/>
-              </a:rPr>
-              <a:t>struggle and frustration when learning AI. However, once you have mastered it, you will be amazed</a:t>
-            </a:r>
-            <a:r>
-              <a:rPr lang="en-US" sz="1100" dirty="0">
-                <a:effectLst/>
-                <a:latin typeface="+mn-lt"/>
-                <a:ea typeface="Calibri" panose="020F0502020204030204" pitchFamily="34" charset="0"/>
-                <a:cs typeface="Times New Roman" panose="02020603050405020304" pitchFamily="18" charset="0"/>
-              </a:rPr>
-              <a:t> </a:t>
-            </a:r>
-            <a:r>
-              <a:rPr lang="en-US" sz="1100" dirty="0">
-                <a:effectLst/>
-                <a:latin typeface="+mn-lt"/>
-                <a:ea typeface="Calibri" panose="020F0502020204030204" pitchFamily="34" charset="0"/>
-                <a:cs typeface="LMRoman10-Regular"/>
-              </a:rPr>
-              <a:t>by what this skill can do for you.</a:t>
-            </a:r>
-            <a:endParaRPr lang="en-US" sz="1100" dirty="0">
-              <a:effectLst/>
-              <a:latin typeface="+mn-lt"/>
-              <a:ea typeface="Calibri" panose="020F0502020204030204" pitchFamily="34" charset="0"/>
-              <a:cs typeface="Times New Roman" panose="02020603050405020304" pitchFamily="18" charset="0"/>
-            </a:endParaRPr>
-          </a:p>
-          <a:p>
-            <a:pPr marL="342900" marR="0" lvl="0" indent="-342900" algn="l" defTabSz="914400" rtl="0" eaLnBrk="1" fontAlgn="auto" latinLnBrk="0" hangingPunct="1">
-              <a:lnSpc>
-                <a:spcPct val="100000"/>
-              </a:lnSpc>
-              <a:spcBef>
-                <a:spcPts val="0"/>
-              </a:spcBef>
-              <a:spcAft>
-                <a:spcPts val="0"/>
-              </a:spcAft>
-              <a:buClrTx/>
-              <a:buSzTx/>
-              <a:buFont typeface="+mj-lt"/>
-              <a:buAutoNum type="arabicPeriod"/>
-              <a:tabLst/>
-              <a:defRPr/>
-            </a:pPr>
-            <a:endParaRPr lang="en-US" sz="1800" dirty="0">
-              <a:effectLst/>
-              <a:latin typeface="Calibri" panose="020F0502020204030204" pitchFamily="34" charset="0"/>
-              <a:ea typeface="Calibri" panose="020F0502020204030204" pitchFamily="34" charset="0"/>
-              <a:cs typeface="Times New Roman" panose="02020603050405020304" pitchFamily="18" charset="0"/>
-            </a:endParaRPr>
-          </a:p>
-          <a:p>
-            <a:pPr marL="800100" marR="0" lvl="1" indent="-342900" algn="l" defTabSz="914400" rtl="0" eaLnBrk="1" fontAlgn="auto" latinLnBrk="0" hangingPunct="1">
-              <a:lnSpc>
-                <a:spcPct val="100000"/>
-              </a:lnSpc>
-              <a:spcBef>
-                <a:spcPts val="0"/>
-              </a:spcBef>
-              <a:spcAft>
-                <a:spcPts val="0"/>
-              </a:spcAft>
-              <a:buClrTx/>
-              <a:buSzTx/>
-              <a:buFont typeface="Courier New" panose="02070309020205020404" pitchFamily="49" charset="0"/>
-              <a:buChar char="o"/>
-              <a:tabLst/>
-              <a:defRPr/>
-            </a:pPr>
-            <a:endParaRPr lang="en-US" sz="1800" dirty="0">
-              <a:effectLst/>
-              <a:latin typeface="Calibri" panose="020F0502020204030204" pitchFamily="34" charset="0"/>
-              <a:ea typeface="Calibri" panose="020F0502020204030204" pitchFamily="34" charset="0"/>
-              <a:cs typeface="Times New Roman" panose="02020603050405020304" pitchFamily="18" charset="0"/>
-            </a:endParaRPr>
-          </a:p>
-          <a:p>
-            <a:pPr marL="800100" marR="0" lvl="1" indent="-342900" algn="l" defTabSz="914400" rtl="0" eaLnBrk="1" fontAlgn="auto" latinLnBrk="0" hangingPunct="1">
-              <a:lnSpc>
-                <a:spcPct val="100000"/>
-              </a:lnSpc>
-              <a:spcBef>
-                <a:spcPts val="0"/>
-              </a:spcBef>
-              <a:spcAft>
-                <a:spcPts val="0"/>
-              </a:spcAft>
-              <a:buClrTx/>
-              <a:buSzTx/>
-              <a:buFont typeface="+mj-lt"/>
-              <a:buAutoNum type="arabicPeriod"/>
-              <a:tabLst/>
-              <a:defRPr/>
-            </a:pPr>
-            <a:endParaRPr lang="en-US" sz="1800" dirty="0">
-              <a:effectLst/>
-              <a:latin typeface="Calibri" panose="020F0502020204030204" pitchFamily="34" charset="0"/>
-              <a:ea typeface="Calibri" panose="020F0502020204030204" pitchFamily="34" charset="0"/>
-              <a:cs typeface="Times New Roman" panose="02020603050405020304" pitchFamily="18" charset="0"/>
-            </a:endParaRPr>
-          </a:p>
-          <a:p>
-            <a:pPr marL="800100" marR="0" lvl="1" indent="-342900" algn="l" defTabSz="914400" rtl="0" eaLnBrk="1" fontAlgn="auto" latinLnBrk="0" hangingPunct="1">
-              <a:lnSpc>
-                <a:spcPct val="100000"/>
-              </a:lnSpc>
-              <a:spcBef>
-                <a:spcPts val="0"/>
-              </a:spcBef>
-              <a:spcAft>
-                <a:spcPts val="0"/>
-              </a:spcAft>
-              <a:buClrTx/>
-              <a:buSzTx/>
-              <a:buFont typeface="Courier New" panose="02070309020205020404" pitchFamily="49" charset="0"/>
-              <a:buChar char="o"/>
-              <a:tabLst/>
-              <a:defRPr/>
-            </a:pPr>
-            <a:endParaRPr lang="en-US" sz="1800" dirty="0">
-              <a:effectLst/>
-              <a:latin typeface="Times New Roman" panose="02020603050405020304" pitchFamily="18" charset="0"/>
-              <a:ea typeface="Times New Roman" panose="02020603050405020304" pitchFamily="18" charset="0"/>
-            </a:endParaRPr>
-          </a:p>
-          <a:p>
             <a:endParaRPr lang="en-US" dirty="0"/>
           </a:p>
         </p:txBody>
@@ -2557,7 +2452,7 @@
           <a:p>
             <a:fld id="{3148858F-F1DB-4027-9C85-CCA6849540DD}" type="slidenum">
               <a:rPr lang="en-US" smtClean="0"/>
-              <a:t>6</a:t>
+              <a:t>5</a:t>
             </a:fld>
             <a:endParaRPr lang="en-US"/>
           </a:p>
@@ -2566,7 +2461,7 @@
     </p:spTree>
     <p:extLst>
       <p:ext uri="{BB962C8B-B14F-4D97-AF65-F5344CB8AC3E}">
-        <p14:creationId xmlns:p14="http://schemas.microsoft.com/office/powerpoint/2010/main" val="1955762856"/>
+        <p14:creationId xmlns:p14="http://schemas.microsoft.com/office/powerpoint/2010/main" val="771029687"/>
       </p:ext>
     </p:extLst>
   </p:cSld>
@@ -2620,7 +2515,27 @@
           <a:bodyPr/>
           <a:lstStyle/>
           <a:p>
-            <a:endParaRPr lang="en-US" dirty="0"/>
+            <a:pPr marL="0" marR="0" lvl="0" indent="0" algn="l" defTabSz="914400" rtl="0" eaLnBrk="1" fontAlgn="auto" latinLnBrk="0" hangingPunct="1">
+              <a:lnSpc>
+                <a:spcPct val="100000"/>
+              </a:lnSpc>
+              <a:spcBef>
+                <a:spcPts val="0"/>
+              </a:spcBef>
+              <a:spcAft>
+                <a:spcPts val="0"/>
+              </a:spcAft>
+              <a:buClrTx/>
+              <a:buSzTx/>
+              <a:buFontTx/>
+              <a:buNone/>
+              <a:tabLst/>
+              <a:defRPr/>
+            </a:pPr>
+            <a:r>
+              <a:rPr lang="en-US" dirty="0"/>
+              <a:t>Setup Instructions…</a:t>
+            </a:r>
           </a:p>
         </p:txBody>
       </p:sp>
@@ -2641,7 +2556,7 @@
           <a:p>
             <a:fld id="{3148858F-F1DB-4027-9C85-CCA6849540DD}" type="slidenum">
               <a:rPr lang="en-US" smtClean="0"/>
-              <a:t>7</a:t>
+              <a:t>6</a:t>
             </a:fld>
             <a:endParaRPr lang="en-US"/>
           </a:p>
@@ -2650,7 +2565,7 @@
     </p:spTree>
     <p:extLst>
       <p:ext uri="{BB962C8B-B14F-4D97-AF65-F5344CB8AC3E}">
-        <p14:creationId xmlns:p14="http://schemas.microsoft.com/office/powerpoint/2010/main" val="771029687"/>
+        <p14:creationId xmlns:p14="http://schemas.microsoft.com/office/powerpoint/2010/main" val="1279646560"/>
       </p:ext>
     </p:extLst>
   </p:cSld>
@@ -2704,6 +2619,25 @@
           <a:bodyPr/>
           <a:lstStyle/>
           <a:p>
+            <a:r>
+              <a:rPr lang="en-US" baseline="0" dirty="0"/>
+              <a:t>In computer science, a variable is a named location in memory.  Consider this clear plastic container with a variety of objects in it.  Each object is a specific size and takes up a certain amount of space.  Now think of this container as your computer’s memory.  Each time you create and assign a specific value to a variable, the software allocates space in memory large enough to contain whatever you assign to it.  Or using a container analogy,  it creates a box to hold its value.  The variable’s </a:t>
+            </a:r>
+            <a:r>
+              <a:rPr lang="en-US" b="1" baseline="0" dirty="0"/>
+              <a:t>datatype </a:t>
+            </a:r>
+            <a:r>
+              <a:rPr lang="en-US" b="0" baseline="0" dirty="0"/>
+              <a:t>determines the amount of memory required to hold it, just as we see in this picture.  </a:t>
+            </a:r>
+            <a:r>
+              <a:rPr lang="en-US" baseline="0" dirty="0"/>
+              <a:t>Behind the name you use for a variable, there’s a hidden address or pointer to its location or compartment in memory.</a:t>
+            </a:r>
+            <a:endParaRPr lang="en-US" dirty="0"/>
+          </a:p>
+          <a:p>
             <a:pPr marL="0" marR="0" lvl="0" indent="0" algn="l" defTabSz="914400" rtl="0" eaLnBrk="1" fontAlgn="auto" latinLnBrk="0" hangingPunct="1">
               <a:lnSpc>
                 <a:spcPct val="100000"/>
@@ -2721,10 +2655,7 @@
               <a:tabLst/>
               <a:defRPr/>
             </a:pPr>
-            <a:r>
-              <a:rPr lang="en-US" dirty="0"/>
-              <a:t>Setup Instructions…</a:t>
-            </a:r>
+            <a:endParaRPr lang="en-US" dirty="0"/>
           </a:p>
         </p:txBody>
       </p:sp>
@@ -2745,7 +2676,7 @@
           <a:p>
             <a:fld id="{3148858F-F1DB-4027-9C85-CCA6849540DD}" type="slidenum">
               <a:rPr lang="en-US" smtClean="0"/>
-              <a:t>8</a:t>
+              <a:t>7</a:t>
             </a:fld>
             <a:endParaRPr lang="en-US"/>
           </a:p>
@@ -2754,7 +2685,7 @@
     </p:spTree>
     <p:extLst>
       <p:ext uri="{BB962C8B-B14F-4D97-AF65-F5344CB8AC3E}">
-        <p14:creationId xmlns:p14="http://schemas.microsoft.com/office/powerpoint/2010/main" val="1279646560"/>
+        <p14:creationId xmlns:p14="http://schemas.microsoft.com/office/powerpoint/2010/main" val="2360977460"/>
       </p:ext>
     </p:extLst>
   </p:cSld>
@@ -2808,23 +2739,27 @@
           <a:bodyPr/>
           <a:lstStyle/>
           <a:p>
-            <a:r>
-              <a:rPr lang="en-US" baseline="0" dirty="0"/>
-              <a:t>In computer science, a variable is a named location in memory.  Consider this clear plastic container with a variety of objects in it.  Each object is a specific size and takes up a certain amount of space.  Now think of this container as your computer’s memory.  Each time you create and assign a specific value to a variable, the software allocates space in memory large enough to contain whatever you assign to it.  Or using a container analogy,  it creates a box to hold its value.  The variable’s </a:t>
-            </a:r>
-            <a:r>
-              <a:rPr lang="en-US" b="1" baseline="0" dirty="0"/>
-              <a:t>datatype </a:t>
-            </a:r>
-            <a:r>
-              <a:rPr lang="en-US" b="0" baseline="0" dirty="0"/>
-              <a:t>determines the amount of memory required to hold it, just as we see in this picture.  </a:t>
-            </a:r>
-            <a:r>
-              <a:rPr lang="en-US" baseline="0" dirty="0"/>
-              <a:t>Behind the name you use for a variable, there’s a hidden address or pointer to its location or compartment in memory.</a:t>
-            </a:r>
-            <a:endParaRPr lang="en-US" dirty="0"/>
+            <a:pPr marL="0" marR="0" lvl="0" indent="0" algn="l" defTabSz="914400" rtl="0" eaLnBrk="1" fontAlgn="auto" latinLnBrk="0" hangingPunct="1">
+              <a:lnSpc>
+                <a:spcPct val="100000"/>
+              </a:lnSpc>
+              <a:spcBef>
+                <a:spcPts val="0"/>
+              </a:spcBef>
+              <a:spcAft>
+                <a:spcPts val="0"/>
+              </a:spcAft>
+              <a:buClrTx/>
+              <a:buSzTx/>
+              <a:buFontTx/>
+              <a:buNone/>
+              <a:tabLst/>
+              <a:defRPr/>
+            </a:pPr>
+            <a:r>
+              <a:rPr lang="en-US" dirty="0"/>
+              <a:t>And this graphic shows Python’s datatypes.</a:t>
+            </a:r>
           </a:p>
           <a:p>
             <a:pPr marL="0" marR="0" lvl="0" indent="0" algn="l" defTabSz="914400" rtl="0" eaLnBrk="1" fontAlgn="auto" latinLnBrk="0" hangingPunct="1">
@@ -2846,6 +2781,29 @@
             </a:pPr>
             <a:endParaRPr lang="en-US" dirty="0"/>
           </a:p>
+          <a:p>
+            <a:pPr marL="0" marR="0" lvl="0" indent="0" algn="l" defTabSz="914400" rtl="0" eaLnBrk="1" fontAlgn="auto" latinLnBrk="0" hangingPunct="1">
+              <a:lnSpc>
+                <a:spcPct val="100000"/>
+              </a:lnSpc>
+              <a:spcBef>
+                <a:spcPts val="0"/>
+              </a:spcBef>
+              <a:spcAft>
+                <a:spcPts val="0"/>
+              </a:spcAft>
+              <a:buClrTx/>
+              <a:buSzTx/>
+              <a:buFontTx/>
+              <a:buNone/>
+              <a:tabLst/>
+              <a:defRPr/>
+            </a:pPr>
+            <a:r>
+              <a:rPr lang="en-US" dirty="0"/>
+              <a:t>https://pynative.com/python-data-types/</a:t>
+            </a:r>
+          </a:p>
         </p:txBody>
       </p:sp>
       <p:sp>
@@ -2865,7 +2823,7 @@
           <a:p>
             <a:fld id="{3148858F-F1DB-4027-9C85-CCA6849540DD}" type="slidenum">
               <a:rPr lang="en-US" smtClean="0"/>
-              <a:t>9</a:t>
+              <a:t>8</a:t>
             </a:fld>
             <a:endParaRPr lang="en-US"/>
           </a:p>
@@ -2874,7 +2832,7 @@
     </p:spTree>
     <p:extLst>
       <p:ext uri="{BB962C8B-B14F-4D97-AF65-F5344CB8AC3E}">
-        <p14:creationId xmlns:p14="http://schemas.microsoft.com/office/powerpoint/2010/main" val="2360977460"/>
+        <p14:creationId xmlns:p14="http://schemas.microsoft.com/office/powerpoint/2010/main" val="62286822"/>
       </p:ext>
     </p:extLst>
   </p:cSld>
@@ -2947,50 +2905,7 @@
             </a:pPr>
             <a:r>
               <a:rPr lang="en-US" dirty="0"/>
-              <a:t>And this graphic shows Python’s datatypes.</a:t>
-            </a:r>
-          </a:p>
-          <a:p>
-            <a:pPr marL="0" marR="0" lvl="0" indent="0" algn="l" defTabSz="914400" rtl="0" eaLnBrk="1" fontAlgn="auto" latinLnBrk="0" hangingPunct="1">
-              <a:lnSpc>
-                <a:spcPct val="100000"/>
-              </a:lnSpc>
-              <a:spcBef>
-                <a:spcPts val="0"/>
-              </a:spcBef>
-              <a:spcAft>
-                <a:spcPts val="0"/>
-              </a:spcAft>
-              <a:buClrTx/>
-              <a:buSzTx/>
-              <a:buFontTx/>
-              <a:buNone/>
-              <a:tabLst/>
-              <a:defRPr/>
-            </a:pPr>
-            <a:endParaRPr lang="en-US" dirty="0"/>
-          </a:p>
-          <a:p>
-            <a:pPr marL="0" marR="0" lvl="0" indent="0" algn="l" defTabSz="914400" rtl="0" eaLnBrk="1" fontAlgn="auto" latinLnBrk="0" hangingPunct="1">
-              <a:lnSpc>
-                <a:spcPct val="100000"/>
-              </a:lnSpc>
-              <a:spcBef>
-                <a:spcPts val="0"/>
-              </a:spcBef>
-              <a:spcAft>
-                <a:spcPts val="0"/>
-              </a:spcAft>
-              <a:buClrTx/>
-              <a:buSzTx/>
-              <a:buFontTx/>
-              <a:buNone/>
-              <a:tabLst/>
-              <a:defRPr/>
-            </a:pPr>
-            <a:r>
-              <a:rPr lang="en-US" dirty="0"/>
-              <a:t>https://pynative.com/python-data-types/</a:t>
+              <a:t>Adam naming the animals in the Biblical story.  Variable naming and standards are critically important.</a:t>
             </a:r>
           </a:p>
         </p:txBody>
@@ -3012,7 +2927,7 @@
           <a:p>
             <a:fld id="{3148858F-F1DB-4027-9C85-CCA6849540DD}" type="slidenum">
               <a:rPr lang="en-US" smtClean="0"/>
-              <a:t>10</a:t>
+              <a:t>9</a:t>
             </a:fld>
             <a:endParaRPr lang="en-US"/>
           </a:p>
@@ -3021,7 +2936,7 @@
     </p:spTree>
     <p:extLst>
       <p:ext uri="{BB962C8B-B14F-4D97-AF65-F5344CB8AC3E}">
-        <p14:creationId xmlns:p14="http://schemas.microsoft.com/office/powerpoint/2010/main" val="62286822"/>
+        <p14:creationId xmlns:p14="http://schemas.microsoft.com/office/powerpoint/2010/main" val="828379136"/>
       </p:ext>
     </p:extLst>
   </p:cSld>
@@ -3178,7 +3093,7 @@
           <a:p>
             <a:fld id="{C3F78080-8D0A-4BE8-A5B4-CB115102D524}" type="datetimeFigureOut">
               <a:rPr lang="en-US" smtClean="0"/>
-              <a:t>8/17/2022</a:t>
+              <a:t>9/26/2022</a:t>
             </a:fld>
             <a:endParaRPr lang="en-US"/>
           </a:p>
@@ -3376,7 +3291,7 @@
           <a:p>
             <a:fld id="{C3F78080-8D0A-4BE8-A5B4-CB115102D524}" type="datetimeFigureOut">
               <a:rPr lang="en-US" smtClean="0"/>
-              <a:t>8/17/2022</a:t>
+              <a:t>9/26/2022</a:t>
             </a:fld>
             <a:endParaRPr lang="en-US"/>
           </a:p>
@@ -3584,7 +3499,7 @@
           <a:p>
             <a:fld id="{C3F78080-8D0A-4BE8-A5B4-CB115102D524}" type="datetimeFigureOut">
               <a:rPr lang="en-US" smtClean="0"/>
-              <a:t>8/17/2022</a:t>
+              <a:t>9/26/2022</a:t>
             </a:fld>
             <a:endParaRPr lang="en-US"/>
           </a:p>
@@ -3782,7 +3697,7 @@
           <a:p>
             <a:fld id="{C3F78080-8D0A-4BE8-A5B4-CB115102D524}" type="datetimeFigureOut">
               <a:rPr lang="en-US" smtClean="0"/>
-              <a:t>8/17/2022</a:t>
+              <a:t>9/26/2022</a:t>
             </a:fld>
             <a:endParaRPr lang="en-US"/>
           </a:p>
@@ -4057,7 +3972,7 @@
           <a:p>
             <a:fld id="{C3F78080-8D0A-4BE8-A5B4-CB115102D524}" type="datetimeFigureOut">
               <a:rPr lang="en-US" smtClean="0"/>
-              <a:t>8/17/2022</a:t>
+              <a:t>9/26/2022</a:t>
             </a:fld>
             <a:endParaRPr lang="en-US"/>
           </a:p>
@@ -4322,7 +4237,7 @@
           <a:p>
             <a:fld id="{C3F78080-8D0A-4BE8-A5B4-CB115102D524}" type="datetimeFigureOut">
               <a:rPr lang="en-US" smtClean="0"/>
-              <a:t>8/17/2022</a:t>
+              <a:t>9/26/2022</a:t>
             </a:fld>
             <a:endParaRPr lang="en-US"/>
           </a:p>
@@ -4734,7 +4649,7 @@
           <a:p>
             <a:fld id="{C3F78080-8D0A-4BE8-A5B4-CB115102D524}" type="datetimeFigureOut">
               <a:rPr lang="en-US" smtClean="0"/>
-              <a:t>8/17/2022</a:t>
+              <a:t>9/26/2022</a:t>
             </a:fld>
             <a:endParaRPr lang="en-US"/>
           </a:p>
@@ -4875,7 +4790,7 @@
           <a:p>
             <a:fld id="{C3F78080-8D0A-4BE8-A5B4-CB115102D524}" type="datetimeFigureOut">
               <a:rPr lang="en-US" smtClean="0"/>
-              <a:t>8/17/2022</a:t>
+              <a:t>9/26/2022</a:t>
             </a:fld>
             <a:endParaRPr lang="en-US"/>
           </a:p>
@@ -4988,7 +4903,7 @@
           <a:p>
             <a:fld id="{C3F78080-8D0A-4BE8-A5B4-CB115102D524}" type="datetimeFigureOut">
               <a:rPr lang="en-US" smtClean="0"/>
-              <a:t>8/17/2022</a:t>
+              <a:t>9/26/2022</a:t>
             </a:fld>
             <a:endParaRPr lang="en-US"/>
           </a:p>
@@ -5299,7 +5214,7 @@
           <a:p>
             <a:fld id="{C3F78080-8D0A-4BE8-A5B4-CB115102D524}" type="datetimeFigureOut">
               <a:rPr lang="en-US" smtClean="0"/>
-              <a:t>8/17/2022</a:t>
+              <a:t>9/26/2022</a:t>
             </a:fld>
             <a:endParaRPr lang="en-US"/>
           </a:p>
@@ -5587,7 +5502,7 @@
           <a:p>
             <a:fld id="{C3F78080-8D0A-4BE8-A5B4-CB115102D524}" type="datetimeFigureOut">
               <a:rPr lang="en-US" smtClean="0"/>
-              <a:t>8/17/2022</a:t>
+              <a:t>9/26/2022</a:t>
             </a:fld>
             <a:endParaRPr lang="en-US"/>
           </a:p>
@@ -5828,7 +5743,7 @@
           <a:p>
             <a:fld id="{C3F78080-8D0A-4BE8-A5B4-CB115102D524}" type="datetimeFigureOut">
               <a:rPr lang="en-US" smtClean="0"/>
-              <a:t>8/17/2022</a:t>
+              <a:t>9/26/2022</a:t>
             </a:fld>
             <a:endParaRPr lang="en-US"/>
           </a:p>
@@ -6361,338 +6276,6 @@
       </p:grpSpPr>
       <p:pic>
         <p:nvPicPr>
-          <p:cNvPr id="1026" name="Picture 2" descr="Python Data Types – PYnative">
-            <a:extLst>
-              <a:ext uri="{FF2B5EF4-FFF2-40B4-BE49-F238E27FC236}">
-                <a16:creationId xmlns:a16="http://schemas.microsoft.com/office/drawing/2014/main" id="{56597BF9-7BA9-4FF7-95D0-F8C4362F5209}"/>
-              </a:ext>
-            </a:extLst>
-          </p:cNvPr>
-          <p:cNvPicPr>
-            <a:picLocks noChangeAspect="1" noChangeArrowheads="1"/>
-          </p:cNvPicPr>
-          <p:nvPr/>
-        </p:nvPicPr>
-        <p:blipFill>
-          <a:blip r:embed="rId3">
-            <a:extLst>
-              <a:ext uri="{28A0092B-C50C-407E-A947-70E740481C1C}">
-                <a14:useLocalDpi xmlns:a14="http://schemas.microsoft.com/office/drawing/2010/main" val="0"/>
-              </a:ext>
-            </a:extLst>
-          </a:blip>
-          <a:srcRect/>
-          <a:stretch>
-            <a:fillRect/>
-          </a:stretch>
-        </p:blipFill>
-        <p:spPr bwMode="auto">
-          <a:xfrm>
-            <a:off x="3152775" y="862012"/>
-            <a:ext cx="5886450" cy="5133975"/>
-          </a:xfrm>
-          <a:prstGeom prst="rect">
-            <a:avLst/>
-          </a:prstGeom>
-          <a:noFill/>
-          <a:extLst>
-            <a:ext uri="{909E8E84-426E-40DD-AFC4-6F175D3DCCD1}">
-              <a14:hiddenFill xmlns:a14="http://schemas.microsoft.com/office/drawing/2010/main">
-                <a:solidFill>
-                  <a:srgbClr val="FFFFFF"/>
-                </a:solidFill>
-              </a14:hiddenFill>
-            </a:ext>
-          </a:extLst>
-        </p:spPr>
-      </p:pic>
-      <p:sp>
-        <p:nvSpPr>
-          <p:cNvPr id="3" name="TextBox 2">
-            <a:extLst>
-              <a:ext uri="{FF2B5EF4-FFF2-40B4-BE49-F238E27FC236}">
-                <a16:creationId xmlns:a16="http://schemas.microsoft.com/office/drawing/2014/main" id="{A187EEFE-7DF5-468D-A426-71737BD128AA}"/>
-              </a:ext>
-            </a:extLst>
-          </p:cNvPr>
-          <p:cNvSpPr txBox="1"/>
-          <p:nvPr/>
-        </p:nvSpPr>
-        <p:spPr>
-          <a:xfrm>
-            <a:off x="0" y="6550223"/>
-            <a:ext cx="12192000" cy="307777"/>
-          </a:xfrm>
-          <a:prstGeom prst="rect">
-            <a:avLst/>
-          </a:prstGeom>
-          <a:noFill/>
-        </p:spPr>
-        <p:txBody>
-          <a:bodyPr wrap="square" rtlCol="0">
-            <a:spAutoFit/>
-          </a:bodyPr>
-          <a:lstStyle/>
-          <a:p>
-            <a:pPr marL="0" marR="0" lvl="0" indent="0" algn="l" defTabSz="914400" rtl="0" eaLnBrk="1" fontAlgn="auto" latinLnBrk="0" hangingPunct="1">
-              <a:lnSpc>
-                <a:spcPct val="100000"/>
-              </a:lnSpc>
-              <a:spcBef>
-                <a:spcPts val="0"/>
-              </a:spcBef>
-              <a:spcAft>
-                <a:spcPts val="0"/>
-              </a:spcAft>
-              <a:buClrTx/>
-              <a:buSzTx/>
-              <a:buFontTx/>
-              <a:buNone/>
-              <a:tabLst/>
-              <a:defRPr/>
-            </a:pPr>
-            <a:r>
-              <a:rPr lang="en-US" sz="1400" dirty="0">
-                <a:solidFill>
-                  <a:schemeClr val="tx1">
-                    <a:lumMod val="65000"/>
-                    <a:lumOff val="35000"/>
-                  </a:schemeClr>
-                </a:solidFill>
-                <a:latin typeface="+mj-lt"/>
-                <a:ea typeface="Verdana" panose="020B0604030504040204" pitchFamily="34" charset="0"/>
-              </a:rPr>
-              <a:t>Image Credit: </a:t>
-            </a:r>
-            <a:r>
-              <a:rPr lang="en-US" sz="1400" dirty="0">
-                <a:solidFill>
-                  <a:schemeClr val="tx1">
-                    <a:lumMod val="65000"/>
-                    <a:lumOff val="35000"/>
-                  </a:schemeClr>
-                </a:solidFill>
-                <a:latin typeface="+mj-lt"/>
-              </a:rPr>
-              <a:t>https://pynative.com/python-data-types/</a:t>
-            </a:r>
-          </a:p>
-        </p:txBody>
-      </p:sp>
-    </p:spTree>
-    <p:extLst>
-      <p:ext uri="{BB962C8B-B14F-4D97-AF65-F5344CB8AC3E}">
-        <p14:creationId xmlns:p14="http://schemas.microsoft.com/office/powerpoint/2010/main" val="170311557"/>
-      </p:ext>
-    </p:extLst>
-  </p:cSld>
-  <p:clrMapOvr>
-    <a:masterClrMapping/>
-  </p:clrMapOvr>
-  <mc:AlternateContent xmlns:mc="http://schemas.openxmlformats.org/markup-compatibility/2006" xmlns:p14="http://schemas.microsoft.com/office/powerpoint/2010/main">
-    <mc:Choice Requires="p14">
-      <p:transition spd="med" p14:dur="700">
-        <p:fade/>
-      </p:transition>
-    </mc:Choice>
-    <mc:Fallback xmlns="">
-      <p:transition spd="med">
-        <p:fade/>
-      </p:transition>
-    </mc:Fallback>
-  </mc:AlternateContent>
-</p:sld>
-</file>
-
-<file path=ppt/slides/slide11.xml><?xml version="1.0" encoding="utf-8"?>
-<p:sld xmlns:a="http://schemas.openxmlformats.org/drawingml/2006/main" xmlns:r="http://schemas.openxmlformats.org/officeDocument/2006/relationships" xmlns:p="http://schemas.openxmlformats.org/presentationml/2006/main">
-  <p:cSld>
-    <p:spTree>
-      <p:nvGrpSpPr>
-        <p:cNvPr id="1" name=""/>
-        <p:cNvGrpSpPr/>
-        <p:nvPr/>
-      </p:nvGrpSpPr>
-      <p:grpSpPr>
-        <a:xfrm>
-          <a:off x="0" y="0"/>
-          <a:ext cx="0" cy="0"/>
-          <a:chOff x="0" y="0"/>
-          <a:chExt cx="0" cy="0"/>
-        </a:xfrm>
-      </p:grpSpPr>
-      <p:pic>
-        <p:nvPicPr>
-          <p:cNvPr id="2050" name="Picture 2" descr="Icon of Adam Naming the Animals - 15th c. Meteora - (1AA10) - Uncut  Mountain Supply">
-            <a:extLst>
-              <a:ext uri="{FF2B5EF4-FFF2-40B4-BE49-F238E27FC236}">
-                <a16:creationId xmlns:a16="http://schemas.microsoft.com/office/drawing/2014/main" id="{A8A604AE-38F9-4BA8-858C-E33429DF7680}"/>
-              </a:ext>
-            </a:extLst>
-          </p:cNvPr>
-          <p:cNvPicPr>
-            <a:picLocks noChangeAspect="1" noChangeArrowheads="1"/>
-          </p:cNvPicPr>
-          <p:nvPr/>
-        </p:nvPicPr>
-        <p:blipFill>
-          <a:blip r:embed="rId3">
-            <a:extLst>
-              <a:ext uri="{28A0092B-C50C-407E-A947-70E740481C1C}">
-                <a14:useLocalDpi xmlns:a14="http://schemas.microsoft.com/office/drawing/2010/main" val="0"/>
-              </a:ext>
-            </a:extLst>
-          </a:blip>
-          <a:srcRect/>
-          <a:stretch>
-            <a:fillRect/>
-          </a:stretch>
-        </p:blipFill>
-        <p:spPr bwMode="auto">
-          <a:xfrm>
-            <a:off x="2785598" y="1290062"/>
-            <a:ext cx="6620804" cy="4277875"/>
-          </a:xfrm>
-          <a:prstGeom prst="rect">
-            <a:avLst/>
-          </a:prstGeom>
-          <a:noFill/>
-          <a:ln w="3175">
-            <a:solidFill>
-              <a:schemeClr val="tx1">
-                <a:lumMod val="75000"/>
-                <a:lumOff val="25000"/>
-              </a:schemeClr>
-            </a:solidFill>
-          </a:ln>
-          <a:effectLst>
-            <a:outerShdw blurRad="50800" dist="38100" dir="2700000" algn="tl" rotWithShape="0">
-              <a:prstClr val="black">
-                <a:alpha val="40000"/>
-              </a:prstClr>
-            </a:outerShdw>
-          </a:effectLst>
-          <a:extLst>
-            <a:ext uri="{909E8E84-426E-40DD-AFC4-6F175D3DCCD1}">
-              <a14:hiddenFill xmlns:a14="http://schemas.microsoft.com/office/drawing/2010/main">
-                <a:solidFill>
-                  <a:srgbClr val="FFFFFF"/>
-                </a:solidFill>
-              </a14:hiddenFill>
-            </a:ext>
-          </a:extLst>
-        </p:spPr>
-      </p:pic>
-      <p:sp>
-        <p:nvSpPr>
-          <p:cNvPr id="6" name="TextBox 5">
-            <a:extLst>
-              <a:ext uri="{FF2B5EF4-FFF2-40B4-BE49-F238E27FC236}">
-                <a16:creationId xmlns:a16="http://schemas.microsoft.com/office/drawing/2014/main" id="{29F3E589-6F1A-4BB3-B969-F58FCA3DE9E0}"/>
-              </a:ext>
-            </a:extLst>
-          </p:cNvPr>
-          <p:cNvSpPr txBox="1"/>
-          <p:nvPr/>
-        </p:nvSpPr>
-        <p:spPr>
-          <a:xfrm>
-            <a:off x="0" y="6550223"/>
-            <a:ext cx="12192000" cy="307777"/>
-          </a:xfrm>
-          <a:prstGeom prst="rect">
-            <a:avLst/>
-          </a:prstGeom>
-          <a:noFill/>
-        </p:spPr>
-        <p:txBody>
-          <a:bodyPr wrap="square" rtlCol="0">
-            <a:spAutoFit/>
-          </a:bodyPr>
-          <a:lstStyle/>
-          <a:p>
-            <a:r>
-              <a:rPr lang="en-US" sz="1400" dirty="0">
-                <a:solidFill>
-                  <a:schemeClr val="tx1">
-                    <a:lumMod val="65000"/>
-                    <a:lumOff val="35000"/>
-                  </a:schemeClr>
-                </a:solidFill>
-                <a:latin typeface="+mj-lt"/>
-                <a:ea typeface="Verdana" panose="020B0604030504040204" pitchFamily="34" charset="0"/>
-              </a:rPr>
-              <a:t>Image Credit: </a:t>
-            </a:r>
-            <a:r>
-              <a:rPr lang="en-US" sz="1400" dirty="0">
-                <a:solidFill>
-                  <a:schemeClr val="tx1">
-                    <a:lumMod val="65000"/>
-                    <a:lumOff val="35000"/>
-                  </a:schemeClr>
-                </a:solidFill>
-                <a:latin typeface="+mj-lt"/>
-              </a:rPr>
-              <a:t>https://www.uncutmountainsupply.com/icons/of-saints/by-name/a/icon-of-adam-naming-the-animals-15th-c-meteora-1aa10/</a:t>
-            </a:r>
-            <a:endParaRPr lang="en-US" sz="1400" dirty="0">
-              <a:solidFill>
-                <a:schemeClr val="tx1">
-                  <a:lumMod val="65000"/>
-                  <a:lumOff val="35000"/>
-                </a:schemeClr>
-              </a:solidFill>
-              <a:latin typeface="+mj-lt"/>
-              <a:ea typeface="Verdana" panose="020B0604030504040204" pitchFamily="34" charset="0"/>
-            </a:endParaRPr>
-          </a:p>
-        </p:txBody>
-      </p:sp>
-    </p:spTree>
-    <p:extLst>
-      <p:ext uri="{BB962C8B-B14F-4D97-AF65-F5344CB8AC3E}">
-        <p14:creationId xmlns:p14="http://schemas.microsoft.com/office/powerpoint/2010/main" val="4083169647"/>
-      </p:ext>
-    </p:extLst>
-  </p:cSld>
-  <p:clrMapOvr>
-    <a:masterClrMapping/>
-  </p:clrMapOvr>
-  <mc:AlternateContent xmlns:mc="http://schemas.openxmlformats.org/markup-compatibility/2006" xmlns:p14="http://schemas.microsoft.com/office/powerpoint/2010/main">
-    <mc:Choice Requires="p14">
-      <p:transition spd="med" p14:dur="700">
-        <p:fade/>
-      </p:transition>
-    </mc:Choice>
-    <mc:Fallback xmlns="">
-      <p:transition spd="med">
-        <p:fade/>
-      </p:transition>
-    </mc:Fallback>
-  </mc:AlternateContent>
-</p:sld>
-</file>
-
-<file path=ppt/slides/slide12.xml><?xml version="1.0" encoding="utf-8"?>
-<p:sld xmlns:a="http://schemas.openxmlformats.org/drawingml/2006/main" xmlns:r="http://schemas.openxmlformats.org/officeDocument/2006/relationships" xmlns:p="http://schemas.openxmlformats.org/presentationml/2006/main">
-  <p:cSld>
-    <p:spTree>
-      <p:nvGrpSpPr>
-        <p:cNvPr id="1" name=""/>
-        <p:cNvGrpSpPr/>
-        <p:nvPr/>
-      </p:nvGrpSpPr>
-      <p:grpSpPr>
-        <a:xfrm>
-          <a:off x="0" y="0"/>
-          <a:ext cx="0" cy="0"/>
-          <a:chOff x="0" y="0"/>
-          <a:chExt cx="0" cy="0"/>
-        </a:xfrm>
-      </p:grpSpPr>
-      <p:pic>
-        <p:nvPicPr>
           <p:cNvPr id="6" name="Picture 5">
             <a:extLst>
               <a:ext uri="{FF2B5EF4-FFF2-40B4-BE49-F238E27FC236}">
@@ -6746,7 +6329,7 @@
 </p:sld>
 </file>
 
-<file path=ppt/slides/slide13.xml><?xml version="1.0" encoding="utf-8"?>
+<file path=ppt/slides/slide11.xml><?xml version="1.0" encoding="utf-8"?>
 <p:sld xmlns:a="http://schemas.openxmlformats.org/drawingml/2006/main" xmlns:r="http://schemas.openxmlformats.org/officeDocument/2006/relationships" xmlns:p="http://schemas.openxmlformats.org/presentationml/2006/main">
   <p:cSld>
     <p:spTree>
@@ -6835,7 +6418,7 @@
 </p:sld>
 </file>
 
-<file path=ppt/slides/slide14.xml><?xml version="1.0" encoding="utf-8"?>
+<file path=ppt/slides/slide12.xml><?xml version="1.0" encoding="utf-8"?>
 <p:sld xmlns:a="http://schemas.openxmlformats.org/drawingml/2006/main" xmlns:r="http://schemas.openxmlformats.org/officeDocument/2006/relationships" xmlns:p="http://schemas.openxmlformats.org/presentationml/2006/main">
   <p:cSld>
     <p:spTree>
@@ -6907,7 +6490,7 @@
 </p:sld>
 </file>
 
-<file path=ppt/slides/slide15.xml><?xml version="1.0" encoding="utf-8"?>
+<file path=ppt/slides/slide13.xml><?xml version="1.0" encoding="utf-8"?>
 <p:sld xmlns:a="http://schemas.openxmlformats.org/drawingml/2006/main" xmlns:r="http://schemas.openxmlformats.org/officeDocument/2006/relationships" xmlns:p="http://schemas.openxmlformats.org/presentationml/2006/main">
   <p:cSld>
     <p:spTree>
@@ -6983,6 +6566,312 @@
     <p:extLst>
       <p:ext uri="{BB962C8B-B14F-4D97-AF65-F5344CB8AC3E}">
         <p14:creationId xmlns:p14="http://schemas.microsoft.com/office/powerpoint/2010/main" val="2021418747"/>
+      </p:ext>
+    </p:extLst>
+  </p:cSld>
+  <p:clrMapOvr>
+    <a:masterClrMapping/>
+  </p:clrMapOvr>
+  <mc:AlternateContent xmlns:mc="http://schemas.openxmlformats.org/markup-compatibility/2006" xmlns:p14="http://schemas.microsoft.com/office/powerpoint/2010/main">
+    <mc:Choice Requires="p14">
+      <p:transition spd="med" p14:dur="700">
+        <p:fade/>
+      </p:transition>
+    </mc:Choice>
+    <mc:Fallback xmlns="">
+      <p:transition spd="med">
+        <p:fade/>
+      </p:transition>
+    </mc:Fallback>
+  </mc:AlternateContent>
+</p:sld>
+</file>
+
+<file path=ppt/slides/slide14.xml><?xml version="1.0" encoding="utf-8"?>
+<p:sld xmlns:a="http://schemas.openxmlformats.org/drawingml/2006/main" xmlns:r="http://schemas.openxmlformats.org/officeDocument/2006/relationships" xmlns:p="http://schemas.openxmlformats.org/presentationml/2006/main">
+  <p:cSld>
+    <p:spTree>
+      <p:nvGrpSpPr>
+        <p:cNvPr id="1" name=""/>
+        <p:cNvGrpSpPr/>
+        <p:nvPr/>
+      </p:nvGrpSpPr>
+      <p:grpSpPr>
+        <a:xfrm>
+          <a:off x="0" y="0"/>
+          <a:ext cx="0" cy="0"/>
+          <a:chOff x="0" y="0"/>
+          <a:chExt cx="0" cy="0"/>
+        </a:xfrm>
+      </p:grpSpPr>
+      <p:pic>
+        <p:nvPicPr>
+          <p:cNvPr id="1026" name="Picture 2" descr="Python Datatype conversion">
+            <a:extLst>
+              <a:ext uri="{FF2B5EF4-FFF2-40B4-BE49-F238E27FC236}">
+                <a16:creationId xmlns:a16="http://schemas.microsoft.com/office/drawing/2014/main" id="{C5A4E410-78DF-44F2-BB04-9461EED29C66}"/>
+              </a:ext>
+            </a:extLst>
+          </p:cNvPr>
+          <p:cNvPicPr>
+            <a:picLocks noChangeAspect="1" noChangeArrowheads="1"/>
+          </p:cNvPicPr>
+          <p:nvPr/>
+        </p:nvPicPr>
+        <p:blipFill>
+          <a:blip r:embed="rId3">
+            <a:extLst>
+              <a:ext uri="{28A0092B-C50C-407E-A947-70E740481C1C}">
+                <a14:useLocalDpi xmlns:a14="http://schemas.microsoft.com/office/drawing/2010/main" val="0"/>
+              </a:ext>
+            </a:extLst>
+          </a:blip>
+          <a:srcRect/>
+          <a:stretch>
+            <a:fillRect/>
+          </a:stretch>
+        </p:blipFill>
+        <p:spPr bwMode="auto">
+          <a:xfrm>
+            <a:off x="2400255" y="2404008"/>
+            <a:ext cx="7391489" cy="2049983"/>
+          </a:xfrm>
+          <a:prstGeom prst="rect">
+            <a:avLst/>
+          </a:prstGeom>
+          <a:noFill/>
+          <a:extLst>
+            <a:ext uri="{909E8E84-426E-40DD-AFC4-6F175D3DCCD1}">
+              <a14:hiddenFill xmlns:a14="http://schemas.microsoft.com/office/drawing/2010/main">
+                <a:solidFill>
+                  <a:srgbClr val="FFFFFF"/>
+                </a:solidFill>
+              </a14:hiddenFill>
+            </a:ext>
+          </a:extLst>
+        </p:spPr>
+      </p:pic>
+      <p:pic>
+        <p:nvPicPr>
+          <p:cNvPr id="4" name="Picture 3">
+            <a:extLst>
+              <a:ext uri="{FF2B5EF4-FFF2-40B4-BE49-F238E27FC236}">
+                <a16:creationId xmlns:a16="http://schemas.microsoft.com/office/drawing/2014/main" id="{D20A1309-E55E-44DB-9811-96C67DA5C666}"/>
+              </a:ext>
+            </a:extLst>
+          </p:cNvPr>
+          <p:cNvPicPr>
+            <a:picLocks noChangeAspect="1"/>
+          </p:cNvPicPr>
+          <p:nvPr/>
+        </p:nvPicPr>
+        <p:blipFill>
+          <a:blip r:embed="rId4">
+            <a:extLst>
+              <a:ext uri="{28A0092B-C50C-407E-A947-70E740481C1C}">
+                <a14:useLocalDpi xmlns:a14="http://schemas.microsoft.com/office/drawing/2010/main" val="0"/>
+              </a:ext>
+            </a:extLst>
+          </a:blip>
+          <a:stretch>
+            <a:fillRect/>
+          </a:stretch>
+        </p:blipFill>
+        <p:spPr>
+          <a:xfrm>
+            <a:off x="10066897" y="4529137"/>
+            <a:ext cx="2116085" cy="2328862"/>
+          </a:xfrm>
+          <a:prstGeom prst="rect">
+            <a:avLst/>
+          </a:prstGeom>
+        </p:spPr>
+      </p:pic>
+      <p:sp>
+        <p:nvSpPr>
+          <p:cNvPr id="8" name="TextBox 7">
+            <a:extLst>
+              <a:ext uri="{FF2B5EF4-FFF2-40B4-BE49-F238E27FC236}">
+                <a16:creationId xmlns:a16="http://schemas.microsoft.com/office/drawing/2014/main" id="{FBA9AB83-FE78-48D0-8549-1BCE5EAB6D3A}"/>
+              </a:ext>
+            </a:extLst>
+          </p:cNvPr>
+          <p:cNvSpPr txBox="1"/>
+          <p:nvPr/>
+        </p:nvSpPr>
+        <p:spPr>
+          <a:xfrm>
+            <a:off x="0" y="6550223"/>
+            <a:ext cx="12192000" cy="307777"/>
+          </a:xfrm>
+          <a:prstGeom prst="rect">
+            <a:avLst/>
+          </a:prstGeom>
+          <a:noFill/>
+        </p:spPr>
+        <p:txBody>
+          <a:bodyPr wrap="square" rtlCol="0">
+            <a:spAutoFit/>
+          </a:bodyPr>
+          <a:lstStyle/>
+          <a:p>
+            <a:r>
+              <a:rPr lang="en-US" sz="1400" dirty="0">
+                <a:solidFill>
+                  <a:schemeClr val="tx1">
+                    <a:lumMod val="65000"/>
+                    <a:lumOff val="35000"/>
+                  </a:schemeClr>
+                </a:solidFill>
+                <a:latin typeface="+mj-lt"/>
+                <a:ea typeface="Verdana" panose="020B0604030504040204" pitchFamily="34" charset="0"/>
+              </a:rPr>
+              <a:t>Image Credit: </a:t>
+            </a:r>
+            <a:r>
+              <a:rPr lang="en-US" sz="1400" dirty="0">
+                <a:solidFill>
+                  <a:schemeClr val="tx1">
+                    <a:lumMod val="65000"/>
+                    <a:lumOff val="35000"/>
+                  </a:schemeClr>
+                </a:solidFill>
+              </a:rPr>
+              <a:t>https://www.vectorstock.com/royalty-free-vector/cartoon-wizard-vector-1693529</a:t>
+            </a:r>
+            <a:endParaRPr lang="en-US" sz="1400" dirty="0">
+              <a:solidFill>
+                <a:schemeClr val="tx1">
+                  <a:lumMod val="65000"/>
+                  <a:lumOff val="35000"/>
+                </a:schemeClr>
+              </a:solidFill>
+              <a:latin typeface="+mj-lt"/>
+              <a:ea typeface="Verdana" panose="020B0604030504040204" pitchFamily="34" charset="0"/>
+            </a:endParaRPr>
+          </a:p>
+        </p:txBody>
+      </p:sp>
+    </p:spTree>
+    <p:extLst>
+      <p:ext uri="{BB962C8B-B14F-4D97-AF65-F5344CB8AC3E}">
+        <p14:creationId xmlns:p14="http://schemas.microsoft.com/office/powerpoint/2010/main" val="3192052037"/>
+      </p:ext>
+    </p:extLst>
+  </p:cSld>
+  <p:clrMapOvr>
+    <a:masterClrMapping/>
+  </p:clrMapOvr>
+  <mc:AlternateContent xmlns:mc="http://schemas.openxmlformats.org/markup-compatibility/2006" xmlns:p14="http://schemas.microsoft.com/office/powerpoint/2010/main">
+    <mc:Choice Requires="p14">
+      <p:transition spd="med" p14:dur="700">
+        <p:fade/>
+      </p:transition>
+    </mc:Choice>
+    <mc:Fallback xmlns="">
+      <p:transition spd="med">
+        <p:fade/>
+      </p:transition>
+    </mc:Fallback>
+  </mc:AlternateContent>
+</p:sld>
+</file>
+
+<file path=ppt/slides/slide15.xml><?xml version="1.0" encoding="utf-8"?>
+<p:sld xmlns:a="http://schemas.openxmlformats.org/drawingml/2006/main" xmlns:r="http://schemas.openxmlformats.org/officeDocument/2006/relationships" xmlns:p="http://schemas.openxmlformats.org/presentationml/2006/main">
+  <p:cSld>
+    <p:spTree>
+      <p:nvGrpSpPr>
+        <p:cNvPr id="1" name=""/>
+        <p:cNvGrpSpPr/>
+        <p:nvPr/>
+      </p:nvGrpSpPr>
+      <p:grpSpPr>
+        <a:xfrm>
+          <a:off x="0" y="0"/>
+          <a:ext cx="0" cy="0"/>
+          <a:chOff x="0" y="0"/>
+          <a:chExt cx="0" cy="0"/>
+        </a:xfrm>
+      </p:grpSpPr>
+      <p:sp>
+        <p:nvSpPr>
+          <p:cNvPr id="2" name="Title 1">
+            <a:extLst>
+              <a:ext uri="{FF2B5EF4-FFF2-40B4-BE49-F238E27FC236}">
+                <a16:creationId xmlns:a16="http://schemas.microsoft.com/office/drawing/2014/main" id="{8306FF31-301F-43F0-8202-A782726E446A}"/>
+              </a:ext>
+            </a:extLst>
+          </p:cNvPr>
+          <p:cNvSpPr>
+            <a:spLocks noGrp="1"/>
+          </p:cNvSpPr>
+          <p:nvPr>
+            <p:ph type="title"/>
+          </p:nvPr>
+        </p:nvSpPr>
+        <p:spPr>
+          <a:xfrm>
+            <a:off x="0" y="365127"/>
+            <a:ext cx="12191999" cy="827416"/>
+          </a:xfrm>
+        </p:spPr>
+        <p:txBody>
+          <a:bodyPr>
+            <a:normAutofit/>
+          </a:bodyPr>
+          <a:lstStyle/>
+          <a:p>
+            <a:pPr algn="ctr"/>
+            <a:r>
+              <a:rPr lang="en-US" sz="4000" dirty="0">
+                <a:latin typeface="Palatino Linotype" panose="02040502050505030304" pitchFamily="18" charset="0"/>
+                <a:cs typeface="Segoe UI Light" panose="020B0502040204020203" pitchFamily="34" charset="0"/>
+              </a:rPr>
+              <a:t>Architecture (Interpreted Languages)</a:t>
+            </a:r>
+          </a:p>
+        </p:txBody>
+      </p:sp>
+      <p:pic>
+        <p:nvPicPr>
+          <p:cNvPr id="5" name="Content Placeholder 12">
+            <a:extLst>
+              <a:ext uri="{FF2B5EF4-FFF2-40B4-BE49-F238E27FC236}">
+                <a16:creationId xmlns:a16="http://schemas.microsoft.com/office/drawing/2014/main" id="{67D6BD1D-3F09-4338-B1FF-CD4EABF496E1}"/>
+              </a:ext>
+            </a:extLst>
+          </p:cNvPr>
+          <p:cNvPicPr>
+            <a:picLocks noGrp="1" noChangeAspect="1"/>
+          </p:cNvPicPr>
+          <p:nvPr>
+            <p:ph idx="1"/>
+          </p:nvPr>
+        </p:nvPicPr>
+        <p:blipFill>
+          <a:blip r:embed="rId3">
+            <a:extLst>
+              <a:ext uri="{28A0092B-C50C-407E-A947-70E740481C1C}">
+                <a14:useLocalDpi xmlns:a14="http://schemas.microsoft.com/office/drawing/2010/main" val="0"/>
+              </a:ext>
+            </a:extLst>
+          </a:blip>
+          <a:stretch>
+            <a:fillRect/>
+          </a:stretch>
+        </p:blipFill>
+        <p:spPr>
+          <a:xfrm>
+            <a:off x="813319" y="1982277"/>
+            <a:ext cx="10149431" cy="3437166"/>
+          </a:xfrm>
+        </p:spPr>
+      </p:pic>
+    </p:spTree>
+    <p:extLst>
+      <p:ext uri="{BB962C8B-B14F-4D97-AF65-F5344CB8AC3E}">
+        <p14:creationId xmlns:p14="http://schemas.microsoft.com/office/powerpoint/2010/main" val="791954200"/>
       </p:ext>
     </p:extLst>
   </p:cSld>
@@ -7021,292 +6910,66 @@
           <a:chExt cx="0" cy="0"/>
         </a:xfrm>
       </p:grpSpPr>
-      <p:pic>
-        <p:nvPicPr>
-          <p:cNvPr id="1026" name="Picture 2" descr="Python Datatype conversion">
-            <a:extLst>
-              <a:ext uri="{FF2B5EF4-FFF2-40B4-BE49-F238E27FC236}">
-                <a16:creationId xmlns:a16="http://schemas.microsoft.com/office/drawing/2014/main" id="{C5A4E410-78DF-44F2-BB04-9461EED29C66}"/>
-              </a:ext>
-            </a:extLst>
-          </p:cNvPr>
-          <p:cNvPicPr>
-            <a:picLocks noChangeAspect="1" noChangeArrowheads="1"/>
-          </p:cNvPicPr>
-          <p:nvPr/>
-        </p:nvPicPr>
-        <p:blipFill>
-          <a:blip r:embed="rId3">
-            <a:extLst>
-              <a:ext uri="{28A0092B-C50C-407E-A947-70E740481C1C}">
-                <a14:useLocalDpi xmlns:a14="http://schemas.microsoft.com/office/drawing/2010/main" val="0"/>
-              </a:ext>
-            </a:extLst>
-          </a:blip>
-          <a:srcRect/>
-          <a:stretch>
-            <a:fillRect/>
-          </a:stretch>
-        </p:blipFill>
-        <p:spPr bwMode="auto">
-          <a:xfrm>
-            <a:off x="2400255" y="2404008"/>
-            <a:ext cx="7391489" cy="2049983"/>
-          </a:xfrm>
-          <a:prstGeom prst="rect">
-            <a:avLst/>
-          </a:prstGeom>
-          <a:noFill/>
-          <a:extLst>
-            <a:ext uri="{909E8E84-426E-40DD-AFC4-6F175D3DCCD1}">
-              <a14:hiddenFill xmlns:a14="http://schemas.microsoft.com/office/drawing/2010/main">
-                <a:solidFill>
-                  <a:srgbClr val="FFFFFF"/>
-                </a:solidFill>
-              </a14:hiddenFill>
-            </a:ext>
-          </a:extLst>
-        </p:spPr>
-      </p:pic>
-      <p:pic>
-        <p:nvPicPr>
-          <p:cNvPr id="4" name="Picture 3">
-            <a:extLst>
-              <a:ext uri="{FF2B5EF4-FFF2-40B4-BE49-F238E27FC236}">
-                <a16:creationId xmlns:a16="http://schemas.microsoft.com/office/drawing/2014/main" id="{D20A1309-E55E-44DB-9811-96C67DA5C666}"/>
-              </a:ext>
-            </a:extLst>
-          </p:cNvPr>
-          <p:cNvPicPr>
-            <a:picLocks noChangeAspect="1"/>
-          </p:cNvPicPr>
-          <p:nvPr/>
-        </p:nvPicPr>
-        <p:blipFill>
-          <a:blip r:embed="rId4">
-            <a:extLst>
-              <a:ext uri="{28A0092B-C50C-407E-A947-70E740481C1C}">
-                <a14:useLocalDpi xmlns:a14="http://schemas.microsoft.com/office/drawing/2010/main" val="0"/>
-              </a:ext>
-            </a:extLst>
-          </a:blip>
-          <a:stretch>
-            <a:fillRect/>
-          </a:stretch>
-        </p:blipFill>
-        <p:spPr>
-          <a:xfrm>
-            <a:off x="10066897" y="4529137"/>
-            <a:ext cx="2116085" cy="2328862"/>
-          </a:xfrm>
-          <a:prstGeom prst="rect">
-            <a:avLst/>
-          </a:prstGeom>
-        </p:spPr>
-      </p:pic>
-      <p:sp>
-        <p:nvSpPr>
-          <p:cNvPr id="8" name="TextBox 7">
-            <a:extLst>
-              <a:ext uri="{FF2B5EF4-FFF2-40B4-BE49-F238E27FC236}">
-                <a16:creationId xmlns:a16="http://schemas.microsoft.com/office/drawing/2014/main" id="{FBA9AB83-FE78-48D0-8549-1BCE5EAB6D3A}"/>
-              </a:ext>
-            </a:extLst>
-          </p:cNvPr>
-          <p:cNvSpPr txBox="1"/>
-          <p:nvPr/>
-        </p:nvSpPr>
-        <p:spPr>
-          <a:xfrm>
-            <a:off x="0" y="6550223"/>
-            <a:ext cx="12192000" cy="307777"/>
-          </a:xfrm>
-          <a:prstGeom prst="rect">
-            <a:avLst/>
-          </a:prstGeom>
-          <a:noFill/>
-        </p:spPr>
-        <p:txBody>
-          <a:bodyPr wrap="square" rtlCol="0">
-            <a:spAutoFit/>
-          </a:bodyPr>
-          <a:lstStyle/>
-          <a:p>
-            <a:r>
-              <a:rPr lang="en-US" sz="1400" dirty="0">
-                <a:solidFill>
-                  <a:schemeClr val="tx1">
-                    <a:lumMod val="65000"/>
-                    <a:lumOff val="35000"/>
-                  </a:schemeClr>
-                </a:solidFill>
-                <a:latin typeface="+mj-lt"/>
-                <a:ea typeface="Verdana" panose="020B0604030504040204" pitchFamily="34" charset="0"/>
-              </a:rPr>
-              <a:t>Image Credit: </a:t>
-            </a:r>
-            <a:r>
-              <a:rPr lang="en-US" sz="1400" dirty="0">
-                <a:solidFill>
-                  <a:schemeClr val="tx1">
-                    <a:lumMod val="65000"/>
-                    <a:lumOff val="35000"/>
-                  </a:schemeClr>
-                </a:solidFill>
-              </a:rPr>
-              <a:t>https://www.vectorstock.com/royalty-free-vector/cartoon-wizard-vector-1693529</a:t>
-            </a:r>
-            <a:endParaRPr lang="en-US" sz="1400" dirty="0">
-              <a:solidFill>
-                <a:schemeClr val="tx1">
-                  <a:lumMod val="65000"/>
-                  <a:lumOff val="35000"/>
-                </a:schemeClr>
-              </a:solidFill>
-              <a:latin typeface="+mj-lt"/>
-              <a:ea typeface="Verdana" panose="020B0604030504040204" pitchFamily="34" charset="0"/>
-            </a:endParaRPr>
+      <p:sp>
+        <p:nvSpPr>
+          <p:cNvPr id="2" name="Title 1">
+            <a:extLst>
+              <a:ext uri="{FF2B5EF4-FFF2-40B4-BE49-F238E27FC236}">
+                <a16:creationId xmlns:a16="http://schemas.microsoft.com/office/drawing/2014/main" id="{E572A712-B415-4A2E-7599-A6167150739A}"/>
+              </a:ext>
+            </a:extLst>
+          </p:cNvPr>
+          <p:cNvSpPr>
+            <a:spLocks noGrp="1"/>
+          </p:cNvSpPr>
+          <p:nvPr>
+            <p:ph type="title"/>
+          </p:nvPr>
+        </p:nvSpPr>
+        <p:spPr/>
+        <p:txBody>
+          <a:bodyPr/>
+          <a:lstStyle/>
+          <a:p>
+            <a:endParaRPr lang="en-US"/>
+          </a:p>
+        </p:txBody>
+      </p:sp>
+      <p:sp>
+        <p:nvSpPr>
+          <p:cNvPr id="3" name="Content Placeholder 2">
+            <a:extLst>
+              <a:ext uri="{FF2B5EF4-FFF2-40B4-BE49-F238E27FC236}">
+                <a16:creationId xmlns:a16="http://schemas.microsoft.com/office/drawing/2014/main" id="{5B6CACE9-0FC0-9826-3B3C-E9376F8D983A}"/>
+              </a:ext>
+            </a:extLst>
+          </p:cNvPr>
+          <p:cNvSpPr>
+            <a:spLocks noGrp="1"/>
+          </p:cNvSpPr>
+          <p:nvPr>
+            <p:ph idx="1"/>
+          </p:nvPr>
+        </p:nvSpPr>
+        <p:spPr/>
+        <p:txBody>
+          <a:bodyPr/>
+          <a:lstStyle/>
+          <a:p>
+            <a:endParaRPr lang="en-US"/>
           </a:p>
         </p:txBody>
       </p:sp>
     </p:spTree>
     <p:extLst>
       <p:ext uri="{BB962C8B-B14F-4D97-AF65-F5344CB8AC3E}">
-        <p14:creationId xmlns:p14="http://schemas.microsoft.com/office/powerpoint/2010/main" val="3192052037"/>
+        <p14:creationId xmlns:p14="http://schemas.microsoft.com/office/powerpoint/2010/main" val="2552202046"/>
       </p:ext>
     </p:extLst>
   </p:cSld>
   <p:clrMapOvr>
     <a:masterClrMapping/>
   </p:clrMapOvr>
-  <mc:AlternateContent xmlns:mc="http://schemas.openxmlformats.org/markup-compatibility/2006" xmlns:p14="http://schemas.microsoft.com/office/powerpoint/2010/main">
-    <mc:Choice Requires="p14">
-      <p:transition spd="med" p14:dur="700">
-        <p:fade/>
-      </p:transition>
-    </mc:Choice>
-    <mc:Fallback xmlns="">
-      <p:transition spd="med">
-        <p:fade/>
-      </p:transition>
-    </mc:Fallback>
-  </mc:AlternateContent>
-</p:sld>
-</file>
-
-<file path=ppt/slides/slide17.xml><?xml version="1.0" encoding="utf-8"?>
-<p:sld xmlns:a="http://schemas.openxmlformats.org/drawingml/2006/main" xmlns:r="http://schemas.openxmlformats.org/officeDocument/2006/relationships" xmlns:p="http://schemas.openxmlformats.org/presentationml/2006/main">
-  <p:cSld>
-    <p:spTree>
-      <p:nvGrpSpPr>
-        <p:cNvPr id="1" name=""/>
-        <p:cNvGrpSpPr/>
-        <p:nvPr/>
-      </p:nvGrpSpPr>
-      <p:grpSpPr>
-        <a:xfrm>
-          <a:off x="0" y="0"/>
-          <a:ext cx="0" cy="0"/>
-          <a:chOff x="0" y="0"/>
-          <a:chExt cx="0" cy="0"/>
-        </a:xfrm>
-      </p:grpSpPr>
-      <p:sp>
-        <p:nvSpPr>
-          <p:cNvPr id="2" name="Title 1">
-            <a:extLst>
-              <a:ext uri="{FF2B5EF4-FFF2-40B4-BE49-F238E27FC236}">
-                <a16:creationId xmlns:a16="http://schemas.microsoft.com/office/drawing/2014/main" id="{8306FF31-301F-43F0-8202-A782726E446A}"/>
-              </a:ext>
-            </a:extLst>
-          </p:cNvPr>
-          <p:cNvSpPr>
-            <a:spLocks noGrp="1"/>
-          </p:cNvSpPr>
-          <p:nvPr>
-            <p:ph type="title"/>
-          </p:nvPr>
-        </p:nvSpPr>
-        <p:spPr>
-          <a:xfrm>
-            <a:off x="0" y="365127"/>
-            <a:ext cx="12191999" cy="827416"/>
-          </a:xfrm>
-        </p:spPr>
-        <p:txBody>
-          <a:bodyPr>
-            <a:normAutofit/>
-          </a:bodyPr>
-          <a:lstStyle/>
-          <a:p>
-            <a:pPr algn="ctr"/>
-            <a:r>
-              <a:rPr lang="en-US" sz="4000" dirty="0">
-                <a:latin typeface="Palatino Linotype" panose="02040502050505030304" pitchFamily="18" charset="0"/>
-                <a:cs typeface="Segoe UI Light" panose="020B0502040204020203" pitchFamily="34" charset="0"/>
-              </a:rPr>
-              <a:t>Architecture (Interpreted Languages)</a:t>
-            </a:r>
-          </a:p>
-        </p:txBody>
-      </p:sp>
-      <p:pic>
-        <p:nvPicPr>
-          <p:cNvPr id="5" name="Content Placeholder 12">
-            <a:extLst>
-              <a:ext uri="{FF2B5EF4-FFF2-40B4-BE49-F238E27FC236}">
-                <a16:creationId xmlns:a16="http://schemas.microsoft.com/office/drawing/2014/main" id="{67D6BD1D-3F09-4338-B1FF-CD4EABF496E1}"/>
-              </a:ext>
-            </a:extLst>
-          </p:cNvPr>
-          <p:cNvPicPr>
-            <a:picLocks noGrp="1" noChangeAspect="1"/>
-          </p:cNvPicPr>
-          <p:nvPr>
-            <p:ph idx="1"/>
-          </p:nvPr>
-        </p:nvPicPr>
-        <p:blipFill>
-          <a:blip r:embed="rId3">
-            <a:extLst>
-              <a:ext uri="{28A0092B-C50C-407E-A947-70E740481C1C}">
-                <a14:useLocalDpi xmlns:a14="http://schemas.microsoft.com/office/drawing/2010/main" val="0"/>
-              </a:ext>
-            </a:extLst>
-          </a:blip>
-          <a:stretch>
-            <a:fillRect/>
-          </a:stretch>
-        </p:blipFill>
-        <p:spPr>
-          <a:xfrm>
-            <a:off x="813319" y="1982277"/>
-            <a:ext cx="10149431" cy="3437166"/>
-          </a:xfrm>
-        </p:spPr>
-      </p:pic>
-    </p:spTree>
-    <p:extLst>
-      <p:ext uri="{BB962C8B-B14F-4D97-AF65-F5344CB8AC3E}">
-        <p14:creationId xmlns:p14="http://schemas.microsoft.com/office/powerpoint/2010/main" val="791954200"/>
-      </p:ext>
-    </p:extLst>
-  </p:cSld>
-  <p:clrMapOvr>
-    <a:masterClrMapping/>
-  </p:clrMapOvr>
-  <mc:AlternateContent xmlns:mc="http://schemas.openxmlformats.org/markup-compatibility/2006" xmlns:p14="http://schemas.microsoft.com/office/powerpoint/2010/main">
-    <mc:Choice Requires="p14">
-      <p:transition spd="med" p14:dur="700">
-        <p:fade/>
-      </p:transition>
-    </mc:Choice>
-    <mc:Fallback xmlns="">
-      <p:transition spd="med">
-        <p:fade/>
-      </p:transition>
-    </mc:Fallback>
-  </mc:AlternateContent>
 </p:sld>
 </file>
 
@@ -7327,245 +6990,6 @@
           <a:chExt cx="0" cy="0"/>
         </a:xfrm>
       </p:grpSpPr>
-      <p:pic>
-        <p:nvPicPr>
-          <p:cNvPr id="3" name="Picture 2">
-            <a:extLst>
-              <a:ext uri="{FF2B5EF4-FFF2-40B4-BE49-F238E27FC236}">
-                <a16:creationId xmlns:a16="http://schemas.microsoft.com/office/drawing/2014/main" id="{BF587613-F93D-2D34-3C37-414D671E7BB2}"/>
-              </a:ext>
-            </a:extLst>
-          </p:cNvPr>
-          <p:cNvPicPr>
-            <a:picLocks noChangeAspect="1"/>
-          </p:cNvPicPr>
-          <p:nvPr/>
-        </p:nvPicPr>
-        <p:blipFill>
-          <a:blip r:embed="rId3"/>
-          <a:stretch>
-            <a:fillRect/>
-          </a:stretch>
-        </p:blipFill>
-        <p:spPr>
-          <a:xfrm>
-            <a:off x="1529787" y="0"/>
-            <a:ext cx="9132425" cy="6858000"/>
-          </a:xfrm>
-          <a:prstGeom prst="rect">
-            <a:avLst/>
-          </a:prstGeom>
-        </p:spPr>
-      </p:pic>
-    </p:spTree>
-    <p:extLst>
-      <p:ext uri="{BB962C8B-B14F-4D97-AF65-F5344CB8AC3E}">
-        <p14:creationId xmlns:p14="http://schemas.microsoft.com/office/powerpoint/2010/main" val="1262685859"/>
-      </p:ext>
-    </p:extLst>
-  </p:cSld>
-  <p:clrMapOvr>
-    <a:masterClrMapping/>
-  </p:clrMapOvr>
-  <mc:AlternateContent xmlns:mc="http://schemas.openxmlformats.org/markup-compatibility/2006" xmlns:p14="http://schemas.microsoft.com/office/powerpoint/2010/main">
-    <mc:Choice Requires="p14">
-      <p:transition spd="med" p14:dur="700">
-        <p:fade/>
-      </p:transition>
-    </mc:Choice>
-    <mc:Fallback xmlns="">
-      <p:transition spd="med">
-        <p:fade/>
-      </p:transition>
-    </mc:Fallback>
-  </mc:AlternateContent>
-</p:sld>
-</file>
-
-<file path=ppt/slides/slide3.xml><?xml version="1.0" encoding="utf-8"?>
-<p:sld xmlns:a="http://schemas.openxmlformats.org/drawingml/2006/main" xmlns:r="http://schemas.openxmlformats.org/officeDocument/2006/relationships" xmlns:p="http://schemas.openxmlformats.org/presentationml/2006/main">
-  <p:cSld>
-    <p:bg>
-      <p:bgPr>
-        <a:solidFill>
-          <a:schemeClr val="bg1"/>
-        </a:solidFill>
-        <a:effectLst/>
-      </p:bgPr>
-    </p:bg>
-    <p:spTree>
-      <p:nvGrpSpPr>
-        <p:cNvPr id="1" name=""/>
-        <p:cNvGrpSpPr/>
-        <p:nvPr/>
-      </p:nvGrpSpPr>
-      <p:grpSpPr>
-        <a:xfrm>
-          <a:off x="0" y="0"/>
-          <a:ext cx="0" cy="0"/>
-          <a:chOff x="0" y="0"/>
-          <a:chExt cx="0" cy="0"/>
-        </a:xfrm>
-      </p:grpSpPr>
-      <p:pic>
-        <p:nvPicPr>
-          <p:cNvPr id="5" name="Picture 4" descr="A picture containing ground&#10;&#10;Description automatically generated">
-            <a:extLst>
-              <a:ext uri="{FF2B5EF4-FFF2-40B4-BE49-F238E27FC236}">
-                <a16:creationId xmlns:a16="http://schemas.microsoft.com/office/drawing/2014/main" id="{DA361941-1FBD-42B6-9C00-937616D8B9CC}"/>
-              </a:ext>
-            </a:extLst>
-          </p:cNvPr>
-          <p:cNvPicPr>
-            <a:picLocks noChangeAspect="1"/>
-          </p:cNvPicPr>
-          <p:nvPr/>
-        </p:nvPicPr>
-        <p:blipFill>
-          <a:blip r:embed="rId2">
-            <a:extLst>
-              <a:ext uri="{28A0092B-C50C-407E-A947-70E740481C1C}">
-                <a14:useLocalDpi xmlns:a14="http://schemas.microsoft.com/office/drawing/2010/main" val="0"/>
-              </a:ext>
-            </a:extLst>
-          </a:blip>
-          <a:stretch>
-            <a:fillRect/>
-          </a:stretch>
-        </p:blipFill>
-        <p:spPr>
-          <a:xfrm>
-            <a:off x="1256313" y="1510369"/>
-            <a:ext cx="2505161" cy="3340215"/>
-          </a:xfrm>
-          <a:prstGeom prst="rect">
-            <a:avLst/>
-          </a:prstGeom>
-          <a:effectLst>
-            <a:outerShdw blurRad="50800" dist="38100" dir="2700000" algn="tl" rotWithShape="0">
-              <a:prstClr val="black">
-                <a:alpha val="40000"/>
-              </a:prstClr>
-            </a:outerShdw>
-          </a:effectLst>
-        </p:spPr>
-      </p:pic>
-      <p:pic>
-        <p:nvPicPr>
-          <p:cNvPr id="7" name="Picture 6" descr="A picture containing ground, person&#10;&#10;Description automatically generated">
-            <a:extLst>
-              <a:ext uri="{FF2B5EF4-FFF2-40B4-BE49-F238E27FC236}">
-                <a16:creationId xmlns:a16="http://schemas.microsoft.com/office/drawing/2014/main" id="{EDD1EDE0-E05A-AE06-0344-45844863362C}"/>
-              </a:ext>
-            </a:extLst>
-          </p:cNvPr>
-          <p:cNvPicPr>
-            <a:picLocks noChangeAspect="1"/>
-          </p:cNvPicPr>
-          <p:nvPr/>
-        </p:nvPicPr>
-        <p:blipFill>
-          <a:blip r:embed="rId3">
-            <a:extLst>
-              <a:ext uri="{28A0092B-C50C-407E-A947-70E740481C1C}">
-                <a14:useLocalDpi xmlns:a14="http://schemas.microsoft.com/office/drawing/2010/main" val="0"/>
-              </a:ext>
-            </a:extLst>
-          </a:blip>
-          <a:stretch>
-            <a:fillRect/>
-          </a:stretch>
-        </p:blipFill>
-        <p:spPr>
-          <a:xfrm>
-            <a:off x="4944580" y="1510370"/>
-            <a:ext cx="2505161" cy="3340215"/>
-          </a:xfrm>
-          <a:prstGeom prst="rect">
-            <a:avLst/>
-          </a:prstGeom>
-          <a:effectLst>
-            <a:outerShdw blurRad="50800" dist="38100" dir="2700000" algn="tl" rotWithShape="0">
-              <a:prstClr val="black">
-                <a:alpha val="40000"/>
-              </a:prstClr>
-            </a:outerShdw>
-          </a:effectLst>
-        </p:spPr>
-      </p:pic>
-      <p:pic>
-        <p:nvPicPr>
-          <p:cNvPr id="9" name="Picture 8" descr="A person in a garment&#10;&#10;Description automatically generated with medium confidence">
-            <a:extLst>
-              <a:ext uri="{FF2B5EF4-FFF2-40B4-BE49-F238E27FC236}">
-                <a16:creationId xmlns:a16="http://schemas.microsoft.com/office/drawing/2014/main" id="{83240B77-D4CE-03B3-8DF7-D10E578E2AA0}"/>
-              </a:ext>
-            </a:extLst>
-          </p:cNvPr>
-          <p:cNvPicPr>
-            <a:picLocks noChangeAspect="1"/>
-          </p:cNvPicPr>
-          <p:nvPr/>
-        </p:nvPicPr>
-        <p:blipFill>
-          <a:blip r:embed="rId4">
-            <a:extLst>
-              <a:ext uri="{28A0092B-C50C-407E-A947-70E740481C1C}">
-                <a14:useLocalDpi xmlns:a14="http://schemas.microsoft.com/office/drawing/2010/main" val="0"/>
-              </a:ext>
-            </a:extLst>
-          </a:blip>
-          <a:stretch>
-            <a:fillRect/>
-          </a:stretch>
-        </p:blipFill>
-        <p:spPr>
-          <a:xfrm>
-            <a:off x="8501964" y="1510371"/>
-            <a:ext cx="2505161" cy="3340215"/>
-          </a:xfrm>
-          <a:prstGeom prst="rect">
-            <a:avLst/>
-          </a:prstGeom>
-          <a:effectLst>
-            <a:outerShdw blurRad="50800" dist="38100" dir="2700000" algn="tl" rotWithShape="0">
-              <a:prstClr val="black">
-                <a:alpha val="40000"/>
-              </a:prstClr>
-            </a:outerShdw>
-          </a:effectLst>
-        </p:spPr>
-      </p:pic>
-    </p:spTree>
-    <p:extLst>
-      <p:ext uri="{BB962C8B-B14F-4D97-AF65-F5344CB8AC3E}">
-        <p14:creationId xmlns:p14="http://schemas.microsoft.com/office/powerpoint/2010/main" val="3909552314"/>
-      </p:ext>
-    </p:extLst>
-  </p:cSld>
-  <p:clrMapOvr>
-    <a:masterClrMapping/>
-  </p:clrMapOvr>
-</p:sld>
-</file>
-
-<file path=ppt/slides/slide4.xml><?xml version="1.0" encoding="utf-8"?>
-<p:sld xmlns:a="http://schemas.openxmlformats.org/drawingml/2006/main" xmlns:r="http://schemas.openxmlformats.org/officeDocument/2006/relationships" xmlns:p="http://schemas.openxmlformats.org/presentationml/2006/main">
-  <p:cSld>
-    <p:spTree>
-      <p:nvGrpSpPr>
-        <p:cNvPr id="1" name=""/>
-        <p:cNvGrpSpPr/>
-        <p:nvPr/>
-      </p:nvGrpSpPr>
-      <p:grpSpPr>
-        <a:xfrm>
-          <a:off x="0" y="0"/>
-          <a:ext cx="0" cy="0"/>
-          <a:chOff x="0" y="0"/>
-          <a:chExt cx="0" cy="0"/>
-        </a:xfrm>
-      </p:grpSpPr>
       <p:sp>
         <p:nvSpPr>
           <p:cNvPr id="2" name="Title 1">
@@ -7606,7 +7030,7 @@
                 <a:latin typeface="Palatino Linotype" panose="02040502050505030304" pitchFamily="18" charset="0"/>
                 <a:cs typeface="Segoe UI Light" panose="020B0502040204020203" pitchFamily="34" charset="0"/>
               </a:rPr>
-              <a:t>Today’s Agenda</a:t>
+              <a:t>Python Workshop Series</a:t>
             </a:r>
           </a:p>
         </p:txBody>
@@ -7630,7 +7054,7 @@
         <p:spPr/>
         <p:txBody>
           <a:bodyPr>
-            <a:normAutofit lnSpcReduction="10000"/>
+            <a:normAutofit/>
           </a:bodyPr>
           <a:lstStyle/>
           <a:p>
@@ -7672,27 +7096,25 @@
                 </a:solidFill>
                 <a:latin typeface="Palatino Linotype" panose="02040502050505030304" pitchFamily="18" charset="0"/>
               </a:rPr>
-              <a:t>Python Intro (Part II) &amp; Libraries  </a:t>
-            </a:r>
-            <a:r>
-              <a:rPr lang="en-US" sz="2400" dirty="0">
-                <a:solidFill>
-                  <a:schemeClr val="tx1">
-                    <a:lumMod val="75000"/>
-                    <a:lumOff val="25000"/>
-                  </a:schemeClr>
-                </a:solidFill>
-                <a:latin typeface="Palatino Linotype" panose="02040502050505030304" pitchFamily="18" charset="0"/>
-              </a:rPr>
-              <a:t>(Subhash Nerella)</a:t>
-            </a:r>
-          </a:p>
-          <a:p>
-            <a:pPr marL="0" indent="0">
+              <a:t>Python Intro (Part II) &amp; Libraries</a:t>
+            </a:r>
+            <a:endParaRPr lang="en-US" sz="4000" dirty="0">
+              <a:solidFill>
+                <a:schemeClr val="tx1">
+                  <a:lumMod val="75000"/>
+                  <a:lumOff val="25000"/>
+                </a:schemeClr>
+              </a:solidFill>
+              <a:latin typeface="Palatino Linotype" panose="02040502050505030304" pitchFamily="18" charset="0"/>
+            </a:endParaRPr>
+          </a:p>
+          <a:p>
+            <a:pPr marL="514350" indent="-514350">
               <a:lnSpc>
                 <a:spcPct val="150000"/>
               </a:lnSpc>
-              <a:buNone/>
+              <a:buFont typeface="+mj-lt"/>
+              <a:buAutoNum type="arabicPeriod"/>
             </a:pPr>
             <a:r>
               <a:rPr lang="en-US" sz="3200" dirty="0">
@@ -7704,18 +7126,7 @@
                 </a:solidFill>
                 <a:latin typeface="Palatino Linotype" panose="02040502050505030304" pitchFamily="18" charset="0"/>
               </a:rPr>
-              <a:t>				</a:t>
-            </a:r>
-            <a:r>
-              <a:rPr lang="en-US" sz="4000" dirty="0">
-                <a:solidFill>
-                  <a:schemeClr val="accent1">
-                    <a:lumMod val="75000"/>
-                  </a:schemeClr>
-                </a:solidFill>
-                <a:latin typeface="Palatino Linotype" panose="02040502050505030304" pitchFamily="18" charset="0"/>
-              </a:rPr>
-              <a:t>Tomorrow</a:t>
+              <a:t>Loops, Conditionals, Functions</a:t>
             </a:r>
           </a:p>
           <a:p>
@@ -7729,28 +7140,9 @@
             <a:r>
               <a:rPr lang="en-US" sz="3200" dirty="0">
                 <a:solidFill>
-                  <a:schemeClr val="accent1">
+                  <a:schemeClr val="tx1">
                     <a:lumMod val="75000"/>
-                  </a:schemeClr>
-                </a:solidFill>
-                <a:latin typeface="Palatino Linotype" panose="02040502050505030304" pitchFamily="18" charset="0"/>
-              </a:rPr>
-              <a:t>Loops, Conditionals, Functions</a:t>
-            </a:r>
-          </a:p>
-          <a:p>
-            <a:pPr marL="514350" indent="-514350">
-              <a:lnSpc>
-                <a:spcPct val="150000"/>
-              </a:lnSpc>
-              <a:buFont typeface="+mj-lt"/>
-              <a:buAutoNum type="arabicPeriod"/>
-            </a:pPr>
-            <a:r>
-              <a:rPr lang="en-US" sz="3200" dirty="0">
-                <a:solidFill>
-                  <a:schemeClr val="accent1">
-                    <a:lumMod val="75000"/>
+                    <a:lumOff val="25000"/>
                   </a:schemeClr>
                 </a:solidFill>
                 <a:latin typeface="Palatino Linotype" panose="02040502050505030304" pitchFamily="18" charset="0"/>
@@ -7785,7 +7177,7 @@
 </p:sld>
 </file>
 
-<file path=ppt/slides/slide5.xml><?xml version="1.0" encoding="utf-8"?>
+<file path=ppt/slides/slide3.xml><?xml version="1.0" encoding="utf-8"?>
 <p:sld xmlns:a="http://schemas.openxmlformats.org/drawingml/2006/main" xmlns:r="http://schemas.openxmlformats.org/officeDocument/2006/relationships" xmlns:p="http://schemas.openxmlformats.org/presentationml/2006/main">
   <p:cSld>
     <p:spTree>
@@ -7988,7 +7380,7 @@
 </p:sld>
 </file>
 
-<file path=ppt/slides/slide6.xml><?xml version="1.0" encoding="utf-8"?>
+<file path=ppt/slides/slide4.xml><?xml version="1.0" encoding="utf-8"?>
 <p:sld xmlns:a="http://schemas.openxmlformats.org/drawingml/2006/main" xmlns:r="http://schemas.openxmlformats.org/officeDocument/2006/relationships" xmlns:p="http://schemas.openxmlformats.org/presentationml/2006/main">
   <p:cSld>
     <p:spTree>
@@ -8726,7 +8118,7 @@
 </p:sld>
 </file>
 
-<file path=ppt/slides/slide7.xml><?xml version="1.0" encoding="utf-8"?>
+<file path=ppt/slides/slide5.xml><?xml version="1.0" encoding="utf-8"?>
 <p:sld xmlns:a="http://schemas.openxmlformats.org/drawingml/2006/main" xmlns:r="http://schemas.openxmlformats.org/officeDocument/2006/relationships" xmlns:p="http://schemas.openxmlformats.org/presentationml/2006/main">
   <p:cSld>
     <p:spTree>
@@ -8772,8 +8164,8 @@
         </p:blipFill>
         <p:spPr bwMode="auto">
           <a:xfrm>
-            <a:off x="1961647" y="1047750"/>
-            <a:ext cx="3086100" cy="4762500"/>
+            <a:off x="1719398" y="1738484"/>
+            <a:ext cx="2190908" cy="3381031"/>
           </a:xfrm>
           <a:prstGeom prst="rect">
             <a:avLst/>
@@ -8825,8 +8217,8 @@
         </p:blipFill>
         <p:spPr>
           <a:xfrm>
-            <a:off x="7026444" y="1057275"/>
-            <a:ext cx="3171825" cy="4752975"/>
+            <a:off x="5029578" y="1738484"/>
+            <a:ext cx="2256279" cy="3381031"/>
           </a:xfrm>
           <a:prstGeom prst="rect">
             <a:avLst/>
@@ -8838,6 +8230,60 @@
               </a:prstClr>
             </a:outerShdw>
           </a:effectLst>
+        </p:spPr>
+      </p:pic>
+      <p:pic>
+        <p:nvPicPr>
+          <p:cNvPr id="1026" name="Picture 2" descr="The Myth of Artificial Intelligence: Why Computers Can’t Think the Way We Do by [Erik J. Larson]">
+            <a:extLst>
+              <a:ext uri="{FF2B5EF4-FFF2-40B4-BE49-F238E27FC236}">
+                <a16:creationId xmlns:a16="http://schemas.microsoft.com/office/drawing/2014/main" id="{4C852AB5-B5EE-F094-02DA-3EF5C6A37A2C}"/>
+              </a:ext>
+            </a:extLst>
+          </p:cNvPr>
+          <p:cNvPicPr>
+            <a:picLocks noChangeAspect="1" noChangeArrowheads="1"/>
+          </p:cNvPicPr>
+          <p:nvPr/>
+        </p:nvPicPr>
+        <p:blipFill>
+          <a:blip r:embed="rId5">
+            <a:extLst>
+              <a:ext uri="{28A0092B-C50C-407E-A947-70E740481C1C}">
+                <a14:useLocalDpi xmlns:a14="http://schemas.microsoft.com/office/drawing/2010/main" val="0"/>
+              </a:ext>
+            </a:extLst>
+          </a:blip>
+          <a:srcRect/>
+          <a:stretch>
+            <a:fillRect/>
+          </a:stretch>
+        </p:blipFill>
+        <p:spPr bwMode="auto">
+          <a:xfrm>
+            <a:off x="8405129" y="1738484"/>
+            <a:ext cx="2256279" cy="3377663"/>
+          </a:xfrm>
+          <a:prstGeom prst="rect">
+            <a:avLst/>
+          </a:prstGeom>
+          <a:noFill/>
+          <a:effectLst>
+            <a:outerShdw blurRad="50800" dist="38100" dir="2700000" algn="tl" rotWithShape="0">
+              <a:prstClr val="black">
+                <a:alpha val="40000"/>
+              </a:prstClr>
+            </a:outerShdw>
+          </a:effectLst>
+          <a:extLst>
+            <a:ext uri="{909E8E84-426E-40DD-AFC4-6F175D3DCCD1}">
+              <a14:hiddenFill xmlns:a14="http://schemas.microsoft.com/office/drawing/2010/main">
+                <a:solidFill>
+                  <a:srgbClr val="FFFFFF"/>
+                </a:solidFill>
+              </a14:hiddenFill>
+            </a:ext>
+          </a:extLst>
         </p:spPr>
       </p:pic>
     </p:spTree>
@@ -8865,7 +8311,7 @@
 </p:sld>
 </file>
 
-<file path=ppt/slides/slide8.xml><?xml version="1.0" encoding="utf-8"?>
+<file path=ppt/slides/slide6.xml><?xml version="1.0" encoding="utf-8"?>
 <p:sld xmlns:a="http://schemas.openxmlformats.org/drawingml/2006/main" xmlns:r="http://schemas.openxmlformats.org/officeDocument/2006/relationships" xmlns:p="http://schemas.openxmlformats.org/presentationml/2006/main">
   <p:cSld>
     <p:spTree>
@@ -8954,7 +8400,7 @@
 </p:sld>
 </file>
 
-<file path=ppt/slides/slide9.xml><?xml version="1.0" encoding="utf-8"?>
+<file path=ppt/slides/slide7.xml><?xml version="1.0" encoding="utf-8"?>
 <p:sld xmlns:a="http://schemas.openxmlformats.org/drawingml/2006/main" xmlns:r="http://schemas.openxmlformats.org/officeDocument/2006/relationships" xmlns:p="http://schemas.openxmlformats.org/presentationml/2006/main">
   <p:cSld>
     <p:spTree>
@@ -9058,6 +8504,338 @@
     <p:extLst>
       <p:ext uri="{BB962C8B-B14F-4D97-AF65-F5344CB8AC3E}">
         <p14:creationId xmlns:p14="http://schemas.microsoft.com/office/powerpoint/2010/main" val="337556145"/>
+      </p:ext>
+    </p:extLst>
+  </p:cSld>
+  <p:clrMapOvr>
+    <a:masterClrMapping/>
+  </p:clrMapOvr>
+  <mc:AlternateContent xmlns:mc="http://schemas.openxmlformats.org/markup-compatibility/2006" xmlns:p14="http://schemas.microsoft.com/office/powerpoint/2010/main">
+    <mc:Choice Requires="p14">
+      <p:transition spd="med" p14:dur="700">
+        <p:fade/>
+      </p:transition>
+    </mc:Choice>
+    <mc:Fallback xmlns="">
+      <p:transition spd="med">
+        <p:fade/>
+      </p:transition>
+    </mc:Fallback>
+  </mc:AlternateContent>
+</p:sld>
+</file>
+
+<file path=ppt/slides/slide8.xml><?xml version="1.0" encoding="utf-8"?>
+<p:sld xmlns:a="http://schemas.openxmlformats.org/drawingml/2006/main" xmlns:r="http://schemas.openxmlformats.org/officeDocument/2006/relationships" xmlns:p="http://schemas.openxmlformats.org/presentationml/2006/main">
+  <p:cSld>
+    <p:spTree>
+      <p:nvGrpSpPr>
+        <p:cNvPr id="1" name=""/>
+        <p:cNvGrpSpPr/>
+        <p:nvPr/>
+      </p:nvGrpSpPr>
+      <p:grpSpPr>
+        <a:xfrm>
+          <a:off x="0" y="0"/>
+          <a:ext cx="0" cy="0"/>
+          <a:chOff x="0" y="0"/>
+          <a:chExt cx="0" cy="0"/>
+        </a:xfrm>
+      </p:grpSpPr>
+      <p:pic>
+        <p:nvPicPr>
+          <p:cNvPr id="1026" name="Picture 2" descr="Python Data Types – PYnative">
+            <a:extLst>
+              <a:ext uri="{FF2B5EF4-FFF2-40B4-BE49-F238E27FC236}">
+                <a16:creationId xmlns:a16="http://schemas.microsoft.com/office/drawing/2014/main" id="{56597BF9-7BA9-4FF7-95D0-F8C4362F5209}"/>
+              </a:ext>
+            </a:extLst>
+          </p:cNvPr>
+          <p:cNvPicPr>
+            <a:picLocks noChangeAspect="1" noChangeArrowheads="1"/>
+          </p:cNvPicPr>
+          <p:nvPr/>
+        </p:nvPicPr>
+        <p:blipFill>
+          <a:blip r:embed="rId3">
+            <a:extLst>
+              <a:ext uri="{28A0092B-C50C-407E-A947-70E740481C1C}">
+                <a14:useLocalDpi xmlns:a14="http://schemas.microsoft.com/office/drawing/2010/main" val="0"/>
+              </a:ext>
+            </a:extLst>
+          </a:blip>
+          <a:srcRect/>
+          <a:stretch>
+            <a:fillRect/>
+          </a:stretch>
+        </p:blipFill>
+        <p:spPr bwMode="auto">
+          <a:xfrm>
+            <a:off x="3152775" y="862012"/>
+            <a:ext cx="5886450" cy="5133975"/>
+          </a:xfrm>
+          <a:prstGeom prst="rect">
+            <a:avLst/>
+          </a:prstGeom>
+          <a:noFill/>
+          <a:extLst>
+            <a:ext uri="{909E8E84-426E-40DD-AFC4-6F175D3DCCD1}">
+              <a14:hiddenFill xmlns:a14="http://schemas.microsoft.com/office/drawing/2010/main">
+                <a:solidFill>
+                  <a:srgbClr val="FFFFFF"/>
+                </a:solidFill>
+              </a14:hiddenFill>
+            </a:ext>
+          </a:extLst>
+        </p:spPr>
+      </p:pic>
+      <p:sp>
+        <p:nvSpPr>
+          <p:cNvPr id="3" name="TextBox 2">
+            <a:extLst>
+              <a:ext uri="{FF2B5EF4-FFF2-40B4-BE49-F238E27FC236}">
+                <a16:creationId xmlns:a16="http://schemas.microsoft.com/office/drawing/2014/main" id="{A187EEFE-7DF5-468D-A426-71737BD128AA}"/>
+              </a:ext>
+            </a:extLst>
+          </p:cNvPr>
+          <p:cNvSpPr txBox="1"/>
+          <p:nvPr/>
+        </p:nvSpPr>
+        <p:spPr>
+          <a:xfrm>
+            <a:off x="0" y="6550223"/>
+            <a:ext cx="12192000" cy="307777"/>
+          </a:xfrm>
+          <a:prstGeom prst="rect">
+            <a:avLst/>
+          </a:prstGeom>
+          <a:noFill/>
+        </p:spPr>
+        <p:txBody>
+          <a:bodyPr wrap="square" rtlCol="0">
+            <a:spAutoFit/>
+          </a:bodyPr>
+          <a:lstStyle/>
+          <a:p>
+            <a:pPr marL="0" marR="0" lvl="0" indent="0" algn="l" defTabSz="914400" rtl="0" eaLnBrk="1" fontAlgn="auto" latinLnBrk="0" hangingPunct="1">
+              <a:lnSpc>
+                <a:spcPct val="100000"/>
+              </a:lnSpc>
+              <a:spcBef>
+                <a:spcPts val="0"/>
+              </a:spcBef>
+              <a:spcAft>
+                <a:spcPts val="0"/>
+              </a:spcAft>
+              <a:buClrTx/>
+              <a:buSzTx/>
+              <a:buFontTx/>
+              <a:buNone/>
+              <a:tabLst/>
+              <a:defRPr/>
+            </a:pPr>
+            <a:r>
+              <a:rPr lang="en-US" sz="1400" dirty="0">
+                <a:solidFill>
+                  <a:schemeClr val="tx1">
+                    <a:lumMod val="65000"/>
+                    <a:lumOff val="35000"/>
+                  </a:schemeClr>
+                </a:solidFill>
+                <a:latin typeface="+mj-lt"/>
+                <a:ea typeface="Verdana" panose="020B0604030504040204" pitchFamily="34" charset="0"/>
+              </a:rPr>
+              <a:t>Image Credit: </a:t>
+            </a:r>
+            <a:r>
+              <a:rPr lang="en-US" sz="1400" dirty="0">
+                <a:solidFill>
+                  <a:schemeClr val="tx1">
+                    <a:lumMod val="65000"/>
+                    <a:lumOff val="35000"/>
+                  </a:schemeClr>
+                </a:solidFill>
+                <a:latin typeface="+mj-lt"/>
+              </a:rPr>
+              <a:t>https://pynative.com/python-data-types/</a:t>
+            </a:r>
+          </a:p>
+        </p:txBody>
+      </p:sp>
+    </p:spTree>
+    <p:extLst>
+      <p:ext uri="{BB962C8B-B14F-4D97-AF65-F5344CB8AC3E}">
+        <p14:creationId xmlns:p14="http://schemas.microsoft.com/office/powerpoint/2010/main" val="170311557"/>
+      </p:ext>
+    </p:extLst>
+  </p:cSld>
+  <p:clrMapOvr>
+    <a:masterClrMapping/>
+  </p:clrMapOvr>
+  <mc:AlternateContent xmlns:mc="http://schemas.openxmlformats.org/markup-compatibility/2006" xmlns:p14="http://schemas.microsoft.com/office/powerpoint/2010/main">
+    <mc:Choice Requires="p14">
+      <p:transition spd="med" p14:dur="700">
+        <p:fade/>
+      </p:transition>
+    </mc:Choice>
+    <mc:Fallback xmlns="">
+      <p:transition spd="med">
+        <p:fade/>
+      </p:transition>
+    </mc:Fallback>
+  </mc:AlternateContent>
+</p:sld>
+</file>
+
+<file path=ppt/slides/slide9.xml><?xml version="1.0" encoding="utf-8"?>
+<p:sld xmlns:a="http://schemas.openxmlformats.org/drawingml/2006/main" xmlns:r="http://schemas.openxmlformats.org/officeDocument/2006/relationships" xmlns:p="http://schemas.openxmlformats.org/presentationml/2006/main">
+  <p:cSld>
+    <p:spTree>
+      <p:nvGrpSpPr>
+        <p:cNvPr id="1" name=""/>
+        <p:cNvGrpSpPr/>
+        <p:nvPr/>
+      </p:nvGrpSpPr>
+      <p:grpSpPr>
+        <a:xfrm>
+          <a:off x="0" y="0"/>
+          <a:ext cx="0" cy="0"/>
+          <a:chOff x="0" y="0"/>
+          <a:chExt cx="0" cy="0"/>
+        </a:xfrm>
+      </p:grpSpPr>
+      <p:pic>
+        <p:nvPicPr>
+          <p:cNvPr id="2050" name="Picture 2" descr="Icon of Adam Naming the Animals - 15th c. Meteora - (1AA10) - Uncut  Mountain Supply">
+            <a:extLst>
+              <a:ext uri="{FF2B5EF4-FFF2-40B4-BE49-F238E27FC236}">
+                <a16:creationId xmlns:a16="http://schemas.microsoft.com/office/drawing/2014/main" id="{A8A604AE-38F9-4BA8-858C-E33429DF7680}"/>
+              </a:ext>
+            </a:extLst>
+          </p:cNvPr>
+          <p:cNvPicPr>
+            <a:picLocks noChangeAspect="1" noChangeArrowheads="1"/>
+          </p:cNvPicPr>
+          <p:nvPr/>
+        </p:nvPicPr>
+        <p:blipFill>
+          <a:blip r:embed="rId3">
+            <a:extLst>
+              <a:ext uri="{28A0092B-C50C-407E-A947-70E740481C1C}">
+                <a14:useLocalDpi xmlns:a14="http://schemas.microsoft.com/office/drawing/2010/main" val="0"/>
+              </a:ext>
+            </a:extLst>
+          </a:blip>
+          <a:srcRect/>
+          <a:stretch>
+            <a:fillRect/>
+          </a:stretch>
+        </p:blipFill>
+        <p:spPr bwMode="auto">
+          <a:xfrm>
+            <a:off x="2785598" y="1290062"/>
+            <a:ext cx="6620804" cy="4277875"/>
+          </a:xfrm>
+          <a:prstGeom prst="rect">
+            <a:avLst/>
+          </a:prstGeom>
+          <a:noFill/>
+          <a:ln w="3175">
+            <a:solidFill>
+              <a:schemeClr val="tx1">
+                <a:lumMod val="75000"/>
+                <a:lumOff val="25000"/>
+              </a:schemeClr>
+            </a:solidFill>
+          </a:ln>
+          <a:effectLst>
+            <a:outerShdw blurRad="50800" dist="38100" dir="2700000" algn="tl" rotWithShape="0">
+              <a:prstClr val="black">
+                <a:alpha val="40000"/>
+              </a:prstClr>
+            </a:outerShdw>
+          </a:effectLst>
+          <a:extLst>
+            <a:ext uri="{909E8E84-426E-40DD-AFC4-6F175D3DCCD1}">
+              <a14:hiddenFill xmlns:a14="http://schemas.microsoft.com/office/drawing/2010/main">
+                <a:solidFill>
+                  <a:srgbClr val="FFFFFF"/>
+                </a:solidFill>
+              </a14:hiddenFill>
+            </a:ext>
+          </a:extLst>
+        </p:spPr>
+      </p:pic>
+      <p:sp>
+        <p:nvSpPr>
+          <p:cNvPr id="6" name="TextBox 5">
+            <a:extLst>
+              <a:ext uri="{FF2B5EF4-FFF2-40B4-BE49-F238E27FC236}">
+                <a16:creationId xmlns:a16="http://schemas.microsoft.com/office/drawing/2014/main" id="{29F3E589-6F1A-4BB3-B969-F58FCA3DE9E0}"/>
+              </a:ext>
+            </a:extLst>
+          </p:cNvPr>
+          <p:cNvSpPr txBox="1"/>
+          <p:nvPr/>
+        </p:nvSpPr>
+        <p:spPr>
+          <a:xfrm>
+            <a:off x="0" y="6550223"/>
+            <a:ext cx="12192000" cy="307777"/>
+          </a:xfrm>
+          <a:prstGeom prst="rect">
+            <a:avLst/>
+          </a:prstGeom>
+          <a:noFill/>
+        </p:spPr>
+        <p:txBody>
+          <a:bodyPr wrap="square" rtlCol="0">
+            <a:spAutoFit/>
+          </a:bodyPr>
+          <a:lstStyle/>
+          <a:p>
+            <a:r>
+              <a:rPr lang="en-US" sz="1400" dirty="0">
+                <a:solidFill>
+                  <a:schemeClr val="tx1">
+                    <a:lumMod val="65000"/>
+                    <a:lumOff val="35000"/>
+                  </a:schemeClr>
+                </a:solidFill>
+                <a:latin typeface="+mj-lt"/>
+                <a:ea typeface="Verdana" panose="020B0604030504040204" pitchFamily="34" charset="0"/>
+              </a:rPr>
+              <a:t>Image Credit: </a:t>
+            </a:r>
+            <a:r>
+              <a:rPr lang="en-US" sz="1400" dirty="0">
+                <a:solidFill>
+                  <a:schemeClr val="tx1">
+                    <a:lumMod val="65000"/>
+                    <a:lumOff val="35000"/>
+                  </a:schemeClr>
+                </a:solidFill>
+                <a:latin typeface="+mj-lt"/>
+              </a:rPr>
+              <a:t>https://www.uncutmountainsupply.com/icons/of-saints/by-name/a/icon-of-adam-naming-the-animals-15th-c-meteora-1aa10/</a:t>
+            </a:r>
+            <a:endParaRPr lang="en-US" sz="1400" dirty="0">
+              <a:solidFill>
+                <a:schemeClr val="tx1">
+                  <a:lumMod val="65000"/>
+                  <a:lumOff val="35000"/>
+                </a:schemeClr>
+              </a:solidFill>
+              <a:latin typeface="+mj-lt"/>
+              <a:ea typeface="Verdana" panose="020B0604030504040204" pitchFamily="34" charset="0"/>
+            </a:endParaRPr>
+          </a:p>
+        </p:txBody>
+      </p:sp>
+    </p:spTree>
+    <p:extLst>
+      <p:ext uri="{BB962C8B-B14F-4D97-AF65-F5344CB8AC3E}">
+        <p14:creationId xmlns:p14="http://schemas.microsoft.com/office/powerpoint/2010/main" val="4083169647"/>
       </p:ext>
     </p:extLst>
   </p:cSld>

</xml_diff>

<commit_message>
Re-sequenced presentations & prepared them for color upgrade.
</commit_message>
<xml_diff>
--- a/presentations/01_py_intro.pptx
+++ b/presentations/01_py_intro.pptx
@@ -5,7 +5,7 @@
     <p:sldMasterId id="2147483648" r:id="rId1"/>
   </p:sldMasterIdLst>
   <p:notesMasterIdLst>
-    <p:notesMasterId r:id="rId18"/>
+    <p:notesMasterId r:id="rId9"/>
   </p:notesMasterIdLst>
   <p:sldIdLst>
     <p:sldId id="324" r:id="rId2"/>
@@ -13,17 +13,8 @@
     <p:sldId id="326" r:id="rId4"/>
     <p:sldId id="304" r:id="rId5"/>
     <p:sldId id="327" r:id="rId6"/>
-    <p:sldId id="323" r:id="rId7"/>
-    <p:sldId id="282" r:id="rId8"/>
-    <p:sldId id="277" r:id="rId9"/>
-    <p:sldId id="280" r:id="rId10"/>
-    <p:sldId id="278" r:id="rId11"/>
-    <p:sldId id="287" r:id="rId12"/>
-    <p:sldId id="296" r:id="rId13"/>
-    <p:sldId id="289" r:id="rId14"/>
-    <p:sldId id="293" r:id="rId15"/>
-    <p:sldId id="276" r:id="rId16"/>
-    <p:sldId id="328" r:id="rId17"/>
+    <p:sldId id="328" r:id="rId7"/>
+    <p:sldId id="323" r:id="rId8"/>
   </p:sldIdLst>
   <p:sldSz cx="12192000" cy="6858000"/>
   <p:notesSz cx="6858000" cy="9144000"/>
@@ -223,7 +214,7 @@
           <a:p>
             <a:fld id="{FD93C9B2-20F6-4DB1-B471-224337D0AC79}" type="datetimeFigureOut">
               <a:rPr lang="en-US" smtClean="0"/>
-              <a:t>9/26/2022</a:t>
+              <a:t>11/18/2022</a:t>
             </a:fld>
             <a:endParaRPr lang="en-US"/>
           </a:p>
@@ -581,615 +572,6 @@
 </p:notes>
 </file>
 
-<file path=ppt/notesSlides/notesSlide10.xml><?xml version="1.0" encoding="utf-8"?>
-<p:notes xmlns:a="http://schemas.openxmlformats.org/drawingml/2006/main" xmlns:r="http://schemas.openxmlformats.org/officeDocument/2006/relationships" xmlns:p="http://schemas.openxmlformats.org/presentationml/2006/main">
-  <p:cSld>
-    <p:spTree>
-      <p:nvGrpSpPr>
-        <p:cNvPr id="1" name=""/>
-        <p:cNvGrpSpPr/>
-        <p:nvPr/>
-      </p:nvGrpSpPr>
-      <p:grpSpPr>
-        <a:xfrm>
-          <a:off x="0" y="0"/>
-          <a:ext cx="0" cy="0"/>
-          <a:chOff x="0" y="0"/>
-          <a:chExt cx="0" cy="0"/>
-        </a:xfrm>
-      </p:grpSpPr>
-      <p:sp>
-        <p:nvSpPr>
-          <p:cNvPr id="2" name="Slide Image Placeholder 1"/>
-          <p:cNvSpPr>
-            <a:spLocks noGrp="1" noRot="1" noChangeAspect="1"/>
-          </p:cNvSpPr>
-          <p:nvPr>
-            <p:ph type="sldImg"/>
-          </p:nvPr>
-        </p:nvSpPr>
-        <p:spPr/>
-      </p:sp>
-      <p:sp>
-        <p:nvSpPr>
-          <p:cNvPr id="3" name="Notes Placeholder 2"/>
-          <p:cNvSpPr>
-            <a:spLocks noGrp="1"/>
-          </p:cNvSpPr>
-          <p:nvPr>
-            <p:ph type="body" idx="1"/>
-          </p:nvPr>
-        </p:nvSpPr>
-        <p:spPr/>
-        <p:txBody>
-          <a:bodyPr/>
-          <a:lstStyle/>
-          <a:p>
-            <a:pPr marL="0" marR="0" lvl="0" indent="0" algn="l" defTabSz="914400" rtl="0" eaLnBrk="1" fontAlgn="auto" latinLnBrk="0" hangingPunct="1">
-              <a:lnSpc>
-                <a:spcPct val="100000"/>
-              </a:lnSpc>
-              <a:spcBef>
-                <a:spcPts val="0"/>
-              </a:spcBef>
-              <a:spcAft>
-                <a:spcPts val="0"/>
-              </a:spcAft>
-              <a:buClrTx/>
-              <a:buSzTx/>
-              <a:buFontTx/>
-              <a:buNone/>
-              <a:tabLst/>
-              <a:defRPr/>
-            </a:pPr>
-            <a:endParaRPr lang="en-US" dirty="0"/>
-          </a:p>
-        </p:txBody>
-      </p:sp>
-      <p:sp>
-        <p:nvSpPr>
-          <p:cNvPr id="4" name="Slide Number Placeholder 3"/>
-          <p:cNvSpPr>
-            <a:spLocks noGrp="1"/>
-          </p:cNvSpPr>
-          <p:nvPr>
-            <p:ph type="sldNum" sz="quarter" idx="5"/>
-          </p:nvPr>
-        </p:nvSpPr>
-        <p:spPr/>
-        <p:txBody>
-          <a:bodyPr/>
-          <a:lstStyle/>
-          <a:p>
-            <a:fld id="{3148858F-F1DB-4027-9C85-CCA6849540DD}" type="slidenum">
-              <a:rPr lang="en-US" smtClean="0"/>
-              <a:t>10</a:t>
-            </a:fld>
-            <a:endParaRPr lang="en-US"/>
-          </a:p>
-        </p:txBody>
-      </p:sp>
-    </p:spTree>
-    <p:extLst>
-      <p:ext uri="{BB962C8B-B14F-4D97-AF65-F5344CB8AC3E}">
-        <p14:creationId xmlns:p14="http://schemas.microsoft.com/office/powerpoint/2010/main" val="4054386845"/>
-      </p:ext>
-    </p:extLst>
-  </p:cSld>
-  <p:clrMapOvr>
-    <a:masterClrMapping/>
-  </p:clrMapOvr>
-</p:notes>
-</file>
-
-<file path=ppt/notesSlides/notesSlide11.xml><?xml version="1.0" encoding="utf-8"?>
-<p:notes xmlns:a="http://schemas.openxmlformats.org/drawingml/2006/main" xmlns:r="http://schemas.openxmlformats.org/officeDocument/2006/relationships" xmlns:p="http://schemas.openxmlformats.org/presentationml/2006/main">
-  <p:cSld>
-    <p:spTree>
-      <p:nvGrpSpPr>
-        <p:cNvPr id="1" name=""/>
-        <p:cNvGrpSpPr/>
-        <p:nvPr/>
-      </p:nvGrpSpPr>
-      <p:grpSpPr>
-        <a:xfrm>
-          <a:off x="0" y="0"/>
-          <a:ext cx="0" cy="0"/>
-          <a:chOff x="0" y="0"/>
-          <a:chExt cx="0" cy="0"/>
-        </a:xfrm>
-      </p:grpSpPr>
-      <p:sp>
-        <p:nvSpPr>
-          <p:cNvPr id="2" name="Slide Image Placeholder 1"/>
-          <p:cNvSpPr>
-            <a:spLocks noGrp="1" noRot="1" noChangeAspect="1"/>
-          </p:cNvSpPr>
-          <p:nvPr>
-            <p:ph type="sldImg"/>
-          </p:nvPr>
-        </p:nvSpPr>
-        <p:spPr/>
-      </p:sp>
-      <p:sp>
-        <p:nvSpPr>
-          <p:cNvPr id="3" name="Notes Placeholder 2"/>
-          <p:cNvSpPr>
-            <a:spLocks noGrp="1"/>
-          </p:cNvSpPr>
-          <p:nvPr>
-            <p:ph type="body" idx="1"/>
-          </p:nvPr>
-        </p:nvSpPr>
-        <p:spPr/>
-        <p:txBody>
-          <a:bodyPr/>
-          <a:lstStyle/>
-          <a:p>
-            <a:pPr marL="0" marR="0" lvl="0" indent="0" algn="l" defTabSz="914400" rtl="0" eaLnBrk="1" fontAlgn="auto" latinLnBrk="0" hangingPunct="1">
-              <a:lnSpc>
-                <a:spcPct val="100000"/>
-              </a:lnSpc>
-              <a:spcBef>
-                <a:spcPts val="0"/>
-              </a:spcBef>
-              <a:spcAft>
-                <a:spcPts val="0"/>
-              </a:spcAft>
-              <a:buClrTx/>
-              <a:buSzTx/>
-              <a:buFontTx/>
-              <a:buNone/>
-              <a:tabLst/>
-              <a:defRPr/>
-            </a:pPr>
-            <a:endParaRPr lang="en-US" dirty="0"/>
-          </a:p>
-        </p:txBody>
-      </p:sp>
-      <p:sp>
-        <p:nvSpPr>
-          <p:cNvPr id="4" name="Slide Number Placeholder 3"/>
-          <p:cNvSpPr>
-            <a:spLocks noGrp="1"/>
-          </p:cNvSpPr>
-          <p:nvPr>
-            <p:ph type="sldNum" sz="quarter" idx="5"/>
-          </p:nvPr>
-        </p:nvSpPr>
-        <p:spPr/>
-        <p:txBody>
-          <a:bodyPr/>
-          <a:lstStyle/>
-          <a:p>
-            <a:fld id="{3148858F-F1DB-4027-9C85-CCA6849540DD}" type="slidenum">
-              <a:rPr lang="en-US" smtClean="0"/>
-              <a:t>11</a:t>
-            </a:fld>
-            <a:endParaRPr lang="en-US"/>
-          </a:p>
-        </p:txBody>
-      </p:sp>
-    </p:spTree>
-    <p:extLst>
-      <p:ext uri="{BB962C8B-B14F-4D97-AF65-F5344CB8AC3E}">
-        <p14:creationId xmlns:p14="http://schemas.microsoft.com/office/powerpoint/2010/main" val="2996454508"/>
-      </p:ext>
-    </p:extLst>
-  </p:cSld>
-  <p:clrMapOvr>
-    <a:masterClrMapping/>
-  </p:clrMapOvr>
-</p:notes>
-</file>
-
-<file path=ppt/notesSlides/notesSlide12.xml><?xml version="1.0" encoding="utf-8"?>
-<p:notes xmlns:a="http://schemas.openxmlformats.org/drawingml/2006/main" xmlns:r="http://schemas.openxmlformats.org/officeDocument/2006/relationships" xmlns:p="http://schemas.openxmlformats.org/presentationml/2006/main">
-  <p:cSld>
-    <p:spTree>
-      <p:nvGrpSpPr>
-        <p:cNvPr id="1" name=""/>
-        <p:cNvGrpSpPr/>
-        <p:nvPr/>
-      </p:nvGrpSpPr>
-      <p:grpSpPr>
-        <a:xfrm>
-          <a:off x="0" y="0"/>
-          <a:ext cx="0" cy="0"/>
-          <a:chOff x="0" y="0"/>
-          <a:chExt cx="0" cy="0"/>
-        </a:xfrm>
-      </p:grpSpPr>
-      <p:sp>
-        <p:nvSpPr>
-          <p:cNvPr id="2" name="Slide Image Placeholder 1"/>
-          <p:cNvSpPr>
-            <a:spLocks noGrp="1" noRot="1" noChangeAspect="1"/>
-          </p:cNvSpPr>
-          <p:nvPr>
-            <p:ph type="sldImg"/>
-          </p:nvPr>
-        </p:nvSpPr>
-        <p:spPr/>
-      </p:sp>
-      <p:sp>
-        <p:nvSpPr>
-          <p:cNvPr id="3" name="Notes Placeholder 2"/>
-          <p:cNvSpPr>
-            <a:spLocks noGrp="1"/>
-          </p:cNvSpPr>
-          <p:nvPr>
-            <p:ph type="body" idx="1"/>
-          </p:nvPr>
-        </p:nvSpPr>
-        <p:spPr/>
-        <p:txBody>
-          <a:bodyPr/>
-          <a:lstStyle/>
-          <a:p>
-            <a:pPr marL="0" marR="0" lvl="0" indent="0" algn="l" defTabSz="914400" rtl="0" eaLnBrk="1" fontAlgn="auto" latinLnBrk="0" hangingPunct="1">
-              <a:lnSpc>
-                <a:spcPct val="100000"/>
-              </a:lnSpc>
-              <a:spcBef>
-                <a:spcPts val="0"/>
-              </a:spcBef>
-              <a:spcAft>
-                <a:spcPts val="0"/>
-              </a:spcAft>
-              <a:buClrTx/>
-              <a:buSzTx/>
-              <a:buFontTx/>
-              <a:buNone/>
-              <a:tabLst/>
-              <a:defRPr/>
-            </a:pPr>
-            <a:endParaRPr lang="en-US" dirty="0"/>
-          </a:p>
-        </p:txBody>
-      </p:sp>
-      <p:sp>
-        <p:nvSpPr>
-          <p:cNvPr id="4" name="Slide Number Placeholder 3"/>
-          <p:cNvSpPr>
-            <a:spLocks noGrp="1"/>
-          </p:cNvSpPr>
-          <p:nvPr>
-            <p:ph type="sldNum" sz="quarter" idx="5"/>
-          </p:nvPr>
-        </p:nvSpPr>
-        <p:spPr/>
-        <p:txBody>
-          <a:bodyPr/>
-          <a:lstStyle/>
-          <a:p>
-            <a:fld id="{3148858F-F1DB-4027-9C85-CCA6849540DD}" type="slidenum">
-              <a:rPr lang="en-US" smtClean="0"/>
-              <a:t>12</a:t>
-            </a:fld>
-            <a:endParaRPr lang="en-US"/>
-          </a:p>
-        </p:txBody>
-      </p:sp>
-    </p:spTree>
-    <p:extLst>
-      <p:ext uri="{BB962C8B-B14F-4D97-AF65-F5344CB8AC3E}">
-        <p14:creationId xmlns:p14="http://schemas.microsoft.com/office/powerpoint/2010/main" val="30799508"/>
-      </p:ext>
-    </p:extLst>
-  </p:cSld>
-  <p:clrMapOvr>
-    <a:masterClrMapping/>
-  </p:clrMapOvr>
-</p:notes>
-</file>
-
-<file path=ppt/notesSlides/notesSlide13.xml><?xml version="1.0" encoding="utf-8"?>
-<p:notes xmlns:a="http://schemas.openxmlformats.org/drawingml/2006/main" xmlns:r="http://schemas.openxmlformats.org/officeDocument/2006/relationships" xmlns:p="http://schemas.openxmlformats.org/presentationml/2006/main">
-  <p:cSld>
-    <p:spTree>
-      <p:nvGrpSpPr>
-        <p:cNvPr id="1" name=""/>
-        <p:cNvGrpSpPr/>
-        <p:nvPr/>
-      </p:nvGrpSpPr>
-      <p:grpSpPr>
-        <a:xfrm>
-          <a:off x="0" y="0"/>
-          <a:ext cx="0" cy="0"/>
-          <a:chOff x="0" y="0"/>
-          <a:chExt cx="0" cy="0"/>
-        </a:xfrm>
-      </p:grpSpPr>
-      <p:sp>
-        <p:nvSpPr>
-          <p:cNvPr id="2" name="Slide Image Placeholder 1"/>
-          <p:cNvSpPr>
-            <a:spLocks noGrp="1" noRot="1" noChangeAspect="1"/>
-          </p:cNvSpPr>
-          <p:nvPr>
-            <p:ph type="sldImg"/>
-          </p:nvPr>
-        </p:nvSpPr>
-        <p:spPr/>
-      </p:sp>
-      <p:sp>
-        <p:nvSpPr>
-          <p:cNvPr id="3" name="Notes Placeholder 2"/>
-          <p:cNvSpPr>
-            <a:spLocks noGrp="1"/>
-          </p:cNvSpPr>
-          <p:nvPr>
-            <p:ph type="body" idx="1"/>
-          </p:nvPr>
-        </p:nvSpPr>
-        <p:spPr/>
-        <p:txBody>
-          <a:bodyPr/>
-          <a:lstStyle/>
-          <a:p>
-            <a:pPr marL="0" marR="0" lvl="0" indent="0" algn="l" defTabSz="914400" rtl="0" eaLnBrk="1" fontAlgn="auto" latinLnBrk="0" hangingPunct="1">
-              <a:lnSpc>
-                <a:spcPct val="100000"/>
-              </a:lnSpc>
-              <a:spcBef>
-                <a:spcPts val="0"/>
-              </a:spcBef>
-              <a:spcAft>
-                <a:spcPts val="0"/>
-              </a:spcAft>
-              <a:buClrTx/>
-              <a:buSzTx/>
-              <a:buFontTx/>
-              <a:buNone/>
-              <a:tabLst/>
-              <a:defRPr/>
-            </a:pPr>
-            <a:endParaRPr lang="en-US" dirty="0"/>
-          </a:p>
-        </p:txBody>
-      </p:sp>
-      <p:sp>
-        <p:nvSpPr>
-          <p:cNvPr id="4" name="Slide Number Placeholder 3"/>
-          <p:cNvSpPr>
-            <a:spLocks noGrp="1"/>
-          </p:cNvSpPr>
-          <p:nvPr>
-            <p:ph type="sldNum" sz="quarter" idx="5"/>
-          </p:nvPr>
-        </p:nvSpPr>
-        <p:spPr/>
-        <p:txBody>
-          <a:bodyPr/>
-          <a:lstStyle/>
-          <a:p>
-            <a:fld id="{3148858F-F1DB-4027-9C85-CCA6849540DD}" type="slidenum">
-              <a:rPr lang="en-US" smtClean="0"/>
-              <a:t>13</a:t>
-            </a:fld>
-            <a:endParaRPr lang="en-US"/>
-          </a:p>
-        </p:txBody>
-      </p:sp>
-    </p:spTree>
-    <p:extLst>
-      <p:ext uri="{BB962C8B-B14F-4D97-AF65-F5344CB8AC3E}">
-        <p14:creationId xmlns:p14="http://schemas.microsoft.com/office/powerpoint/2010/main" val="555085068"/>
-      </p:ext>
-    </p:extLst>
-  </p:cSld>
-  <p:clrMapOvr>
-    <a:masterClrMapping/>
-  </p:clrMapOvr>
-</p:notes>
-</file>
-
-<file path=ppt/notesSlides/notesSlide14.xml><?xml version="1.0" encoding="utf-8"?>
-<p:notes xmlns:a="http://schemas.openxmlformats.org/drawingml/2006/main" xmlns:r="http://schemas.openxmlformats.org/officeDocument/2006/relationships" xmlns:p="http://schemas.openxmlformats.org/presentationml/2006/main">
-  <p:cSld>
-    <p:spTree>
-      <p:nvGrpSpPr>
-        <p:cNvPr id="1" name=""/>
-        <p:cNvGrpSpPr/>
-        <p:nvPr/>
-      </p:nvGrpSpPr>
-      <p:grpSpPr>
-        <a:xfrm>
-          <a:off x="0" y="0"/>
-          <a:ext cx="0" cy="0"/>
-          <a:chOff x="0" y="0"/>
-          <a:chExt cx="0" cy="0"/>
-        </a:xfrm>
-      </p:grpSpPr>
-      <p:sp>
-        <p:nvSpPr>
-          <p:cNvPr id="2" name="Slide Image Placeholder 1"/>
-          <p:cNvSpPr>
-            <a:spLocks noGrp="1" noRot="1" noChangeAspect="1"/>
-          </p:cNvSpPr>
-          <p:nvPr>
-            <p:ph type="sldImg"/>
-          </p:nvPr>
-        </p:nvSpPr>
-        <p:spPr/>
-      </p:sp>
-      <p:sp>
-        <p:nvSpPr>
-          <p:cNvPr id="3" name="Notes Placeholder 2"/>
-          <p:cNvSpPr>
-            <a:spLocks noGrp="1"/>
-          </p:cNvSpPr>
-          <p:nvPr>
-            <p:ph type="body" idx="1"/>
-          </p:nvPr>
-        </p:nvSpPr>
-        <p:spPr/>
-        <p:txBody>
-          <a:bodyPr/>
-          <a:lstStyle/>
-          <a:p>
-            <a:pPr marL="0" marR="0" lvl="0" indent="0" algn="l" defTabSz="914400" rtl="0" eaLnBrk="1" fontAlgn="auto" latinLnBrk="0" hangingPunct="1">
-              <a:lnSpc>
-                <a:spcPct val="100000"/>
-              </a:lnSpc>
-              <a:spcBef>
-                <a:spcPts val="0"/>
-              </a:spcBef>
-              <a:spcAft>
-                <a:spcPts val="0"/>
-              </a:spcAft>
-              <a:buClrTx/>
-              <a:buSzTx/>
-              <a:buFontTx/>
-              <a:buNone/>
-              <a:tabLst/>
-              <a:defRPr/>
-            </a:pPr>
-            <a:endParaRPr lang="en-US" dirty="0"/>
-          </a:p>
-        </p:txBody>
-      </p:sp>
-      <p:sp>
-        <p:nvSpPr>
-          <p:cNvPr id="4" name="Slide Number Placeholder 3"/>
-          <p:cNvSpPr>
-            <a:spLocks noGrp="1"/>
-          </p:cNvSpPr>
-          <p:nvPr>
-            <p:ph type="sldNum" sz="quarter" idx="5"/>
-          </p:nvPr>
-        </p:nvSpPr>
-        <p:spPr/>
-        <p:txBody>
-          <a:bodyPr/>
-          <a:lstStyle/>
-          <a:p>
-            <a:fld id="{3148858F-F1DB-4027-9C85-CCA6849540DD}" type="slidenum">
-              <a:rPr lang="en-US" smtClean="0"/>
-              <a:t>14</a:t>
-            </a:fld>
-            <a:endParaRPr lang="en-US"/>
-          </a:p>
-        </p:txBody>
-      </p:sp>
-    </p:spTree>
-    <p:extLst>
-      <p:ext uri="{BB962C8B-B14F-4D97-AF65-F5344CB8AC3E}">
-        <p14:creationId xmlns:p14="http://schemas.microsoft.com/office/powerpoint/2010/main" val="651591465"/>
-      </p:ext>
-    </p:extLst>
-  </p:cSld>
-  <p:clrMapOvr>
-    <a:masterClrMapping/>
-  </p:clrMapOvr>
-</p:notes>
-</file>
-
-<file path=ppt/notesSlides/notesSlide15.xml><?xml version="1.0" encoding="utf-8"?>
-<p:notes xmlns:a="http://schemas.openxmlformats.org/drawingml/2006/main" xmlns:r="http://schemas.openxmlformats.org/officeDocument/2006/relationships" xmlns:p="http://schemas.openxmlformats.org/presentationml/2006/main">
-  <p:cSld>
-    <p:spTree>
-      <p:nvGrpSpPr>
-        <p:cNvPr id="1" name=""/>
-        <p:cNvGrpSpPr/>
-        <p:nvPr/>
-      </p:nvGrpSpPr>
-      <p:grpSpPr>
-        <a:xfrm>
-          <a:off x="0" y="0"/>
-          <a:ext cx="0" cy="0"/>
-          <a:chOff x="0" y="0"/>
-          <a:chExt cx="0" cy="0"/>
-        </a:xfrm>
-      </p:grpSpPr>
-      <p:sp>
-        <p:nvSpPr>
-          <p:cNvPr id="2" name="Slide Image Placeholder 1"/>
-          <p:cNvSpPr>
-            <a:spLocks noGrp="1" noRot="1" noChangeAspect="1"/>
-          </p:cNvSpPr>
-          <p:nvPr>
-            <p:ph type="sldImg"/>
-          </p:nvPr>
-        </p:nvSpPr>
-        <p:spPr/>
-      </p:sp>
-      <p:sp>
-        <p:nvSpPr>
-          <p:cNvPr id="3" name="Notes Placeholder 2"/>
-          <p:cNvSpPr>
-            <a:spLocks noGrp="1"/>
-          </p:cNvSpPr>
-          <p:nvPr>
-            <p:ph type="body" idx="1"/>
-          </p:nvPr>
-        </p:nvSpPr>
-        <p:spPr/>
-        <p:txBody>
-          <a:bodyPr/>
-          <a:lstStyle/>
-          <a:p>
-            <a:pPr marL="0" marR="0" lvl="0" indent="0" algn="l" defTabSz="914400" rtl="0" eaLnBrk="1" fontAlgn="auto" latinLnBrk="0" hangingPunct="1">
-              <a:lnSpc>
-                <a:spcPct val="100000"/>
-              </a:lnSpc>
-              <a:spcBef>
-                <a:spcPts val="0"/>
-              </a:spcBef>
-              <a:spcAft>
-                <a:spcPts val="0"/>
-              </a:spcAft>
-              <a:buClrTx/>
-              <a:buSzTx/>
-              <a:buFontTx/>
-              <a:buNone/>
-              <a:tabLst/>
-              <a:defRPr/>
-            </a:pPr>
-            <a:r>
-              <a:rPr lang="en-US" dirty="0"/>
-              <a:t>Interpreted languages are much slower than compiled languages.  When performance matters, an interpreted language may not be the best solution.  If that’s the case with you, Nvidia provides the Cuda development environment which supports the C and C++ languages.  These are compiled languages as opposed to interpreted. </a:t>
-            </a:r>
-          </a:p>
-        </p:txBody>
-      </p:sp>
-      <p:sp>
-        <p:nvSpPr>
-          <p:cNvPr id="4" name="Slide Number Placeholder 3"/>
-          <p:cNvSpPr>
-            <a:spLocks noGrp="1"/>
-          </p:cNvSpPr>
-          <p:nvPr>
-            <p:ph type="sldNum" sz="quarter" idx="5"/>
-          </p:nvPr>
-        </p:nvSpPr>
-        <p:spPr/>
-        <p:txBody>
-          <a:bodyPr/>
-          <a:lstStyle/>
-          <a:p>
-            <a:fld id="{3148858F-F1DB-4027-9C85-CCA6849540DD}" type="slidenum">
-              <a:rPr lang="en-US" smtClean="0"/>
-              <a:t>15</a:t>
-            </a:fld>
-            <a:endParaRPr lang="en-US"/>
-          </a:p>
-        </p:txBody>
-      </p:sp>
-    </p:spTree>
-    <p:extLst>
-      <p:ext uri="{BB962C8B-B14F-4D97-AF65-F5344CB8AC3E}">
-        <p14:creationId xmlns:p14="http://schemas.microsoft.com/office/powerpoint/2010/main" val="4129922841"/>
-      </p:ext>
-    </p:extLst>
-  </p:cSld>
-  <p:clrMapOvr>
-    <a:masterClrMapping/>
-  </p:clrMapOvr>
-</p:notes>
-</file>
-
 <file path=ppt/notesSlides/notesSlide2.xml><?xml version="1.0" encoding="utf-8"?>
 <p:notes xmlns:a="http://schemas.openxmlformats.org/drawingml/2006/main" xmlns:r="http://schemas.openxmlformats.org/officeDocument/2006/relationships" xmlns:p="http://schemas.openxmlformats.org/presentationml/2006/main">
   <p:cSld>
@@ -2556,7 +1938,7 @@
           <a:p>
             <a:fld id="{3148858F-F1DB-4027-9C85-CCA6849540DD}" type="slidenum">
               <a:rPr lang="en-US" smtClean="0"/>
-              <a:t>6</a:t>
+              <a:t>7</a:t>
             </a:fld>
             <a:endParaRPr lang="en-US"/>
           </a:p>
@@ -2566,377 +1948,6 @@
     <p:extLst>
       <p:ext uri="{BB962C8B-B14F-4D97-AF65-F5344CB8AC3E}">
         <p14:creationId xmlns:p14="http://schemas.microsoft.com/office/powerpoint/2010/main" val="1279646560"/>
-      </p:ext>
-    </p:extLst>
-  </p:cSld>
-  <p:clrMapOvr>
-    <a:masterClrMapping/>
-  </p:clrMapOvr>
-</p:notes>
-</file>
-
-<file path=ppt/notesSlides/notesSlide7.xml><?xml version="1.0" encoding="utf-8"?>
-<p:notes xmlns:a="http://schemas.openxmlformats.org/drawingml/2006/main" xmlns:r="http://schemas.openxmlformats.org/officeDocument/2006/relationships" xmlns:p="http://schemas.openxmlformats.org/presentationml/2006/main">
-  <p:cSld>
-    <p:spTree>
-      <p:nvGrpSpPr>
-        <p:cNvPr id="1" name=""/>
-        <p:cNvGrpSpPr/>
-        <p:nvPr/>
-      </p:nvGrpSpPr>
-      <p:grpSpPr>
-        <a:xfrm>
-          <a:off x="0" y="0"/>
-          <a:ext cx="0" cy="0"/>
-          <a:chOff x="0" y="0"/>
-          <a:chExt cx="0" cy="0"/>
-        </a:xfrm>
-      </p:grpSpPr>
-      <p:sp>
-        <p:nvSpPr>
-          <p:cNvPr id="2" name="Slide Image Placeholder 1"/>
-          <p:cNvSpPr>
-            <a:spLocks noGrp="1" noRot="1" noChangeAspect="1"/>
-          </p:cNvSpPr>
-          <p:nvPr>
-            <p:ph type="sldImg"/>
-          </p:nvPr>
-        </p:nvSpPr>
-        <p:spPr/>
-      </p:sp>
-      <p:sp>
-        <p:nvSpPr>
-          <p:cNvPr id="3" name="Notes Placeholder 2"/>
-          <p:cNvSpPr>
-            <a:spLocks noGrp="1"/>
-          </p:cNvSpPr>
-          <p:nvPr>
-            <p:ph type="body" idx="1"/>
-          </p:nvPr>
-        </p:nvSpPr>
-        <p:spPr/>
-        <p:txBody>
-          <a:bodyPr/>
-          <a:lstStyle/>
-          <a:p>
-            <a:r>
-              <a:rPr lang="en-US" baseline="0" dirty="0"/>
-              <a:t>In computer science, a variable is a named location in memory.  Consider this clear plastic container with a variety of objects in it.  Each object is a specific size and takes up a certain amount of space.  Now think of this container as your computer’s memory.  Each time you create and assign a specific value to a variable, the software allocates space in memory large enough to contain whatever you assign to it.  Or using a container analogy,  it creates a box to hold its value.  The variable’s </a:t>
-            </a:r>
-            <a:r>
-              <a:rPr lang="en-US" b="1" baseline="0" dirty="0"/>
-              <a:t>datatype </a:t>
-            </a:r>
-            <a:r>
-              <a:rPr lang="en-US" b="0" baseline="0" dirty="0"/>
-              <a:t>determines the amount of memory required to hold it, just as we see in this picture.  </a:t>
-            </a:r>
-            <a:r>
-              <a:rPr lang="en-US" baseline="0" dirty="0"/>
-              <a:t>Behind the name you use for a variable, there’s a hidden address or pointer to its location or compartment in memory.</a:t>
-            </a:r>
-            <a:endParaRPr lang="en-US" dirty="0"/>
-          </a:p>
-          <a:p>
-            <a:pPr marL="0" marR="0" lvl="0" indent="0" algn="l" defTabSz="914400" rtl="0" eaLnBrk="1" fontAlgn="auto" latinLnBrk="0" hangingPunct="1">
-              <a:lnSpc>
-                <a:spcPct val="100000"/>
-              </a:lnSpc>
-              <a:spcBef>
-                <a:spcPts val="0"/>
-              </a:spcBef>
-              <a:spcAft>
-                <a:spcPts val="0"/>
-              </a:spcAft>
-              <a:buClrTx/>
-              <a:buSzTx/>
-              <a:buFontTx/>
-              <a:buNone/>
-              <a:tabLst/>
-              <a:defRPr/>
-            </a:pPr>
-            <a:endParaRPr lang="en-US" dirty="0"/>
-          </a:p>
-        </p:txBody>
-      </p:sp>
-      <p:sp>
-        <p:nvSpPr>
-          <p:cNvPr id="4" name="Slide Number Placeholder 3"/>
-          <p:cNvSpPr>
-            <a:spLocks noGrp="1"/>
-          </p:cNvSpPr>
-          <p:nvPr>
-            <p:ph type="sldNum" sz="quarter" idx="5"/>
-          </p:nvPr>
-        </p:nvSpPr>
-        <p:spPr/>
-        <p:txBody>
-          <a:bodyPr/>
-          <a:lstStyle/>
-          <a:p>
-            <a:fld id="{3148858F-F1DB-4027-9C85-CCA6849540DD}" type="slidenum">
-              <a:rPr lang="en-US" smtClean="0"/>
-              <a:t>7</a:t>
-            </a:fld>
-            <a:endParaRPr lang="en-US"/>
-          </a:p>
-        </p:txBody>
-      </p:sp>
-    </p:spTree>
-    <p:extLst>
-      <p:ext uri="{BB962C8B-B14F-4D97-AF65-F5344CB8AC3E}">
-        <p14:creationId xmlns:p14="http://schemas.microsoft.com/office/powerpoint/2010/main" val="2360977460"/>
-      </p:ext>
-    </p:extLst>
-  </p:cSld>
-  <p:clrMapOvr>
-    <a:masterClrMapping/>
-  </p:clrMapOvr>
-</p:notes>
-</file>
-
-<file path=ppt/notesSlides/notesSlide8.xml><?xml version="1.0" encoding="utf-8"?>
-<p:notes xmlns:a="http://schemas.openxmlformats.org/drawingml/2006/main" xmlns:r="http://schemas.openxmlformats.org/officeDocument/2006/relationships" xmlns:p="http://schemas.openxmlformats.org/presentationml/2006/main">
-  <p:cSld>
-    <p:spTree>
-      <p:nvGrpSpPr>
-        <p:cNvPr id="1" name=""/>
-        <p:cNvGrpSpPr/>
-        <p:nvPr/>
-      </p:nvGrpSpPr>
-      <p:grpSpPr>
-        <a:xfrm>
-          <a:off x="0" y="0"/>
-          <a:ext cx="0" cy="0"/>
-          <a:chOff x="0" y="0"/>
-          <a:chExt cx="0" cy="0"/>
-        </a:xfrm>
-      </p:grpSpPr>
-      <p:sp>
-        <p:nvSpPr>
-          <p:cNvPr id="2" name="Slide Image Placeholder 1"/>
-          <p:cNvSpPr>
-            <a:spLocks noGrp="1" noRot="1" noChangeAspect="1"/>
-          </p:cNvSpPr>
-          <p:nvPr>
-            <p:ph type="sldImg"/>
-          </p:nvPr>
-        </p:nvSpPr>
-        <p:spPr/>
-      </p:sp>
-      <p:sp>
-        <p:nvSpPr>
-          <p:cNvPr id="3" name="Notes Placeholder 2"/>
-          <p:cNvSpPr>
-            <a:spLocks noGrp="1"/>
-          </p:cNvSpPr>
-          <p:nvPr>
-            <p:ph type="body" idx="1"/>
-          </p:nvPr>
-        </p:nvSpPr>
-        <p:spPr/>
-        <p:txBody>
-          <a:bodyPr/>
-          <a:lstStyle/>
-          <a:p>
-            <a:pPr marL="0" marR="0" lvl="0" indent="0" algn="l" defTabSz="914400" rtl="0" eaLnBrk="1" fontAlgn="auto" latinLnBrk="0" hangingPunct="1">
-              <a:lnSpc>
-                <a:spcPct val="100000"/>
-              </a:lnSpc>
-              <a:spcBef>
-                <a:spcPts val="0"/>
-              </a:spcBef>
-              <a:spcAft>
-                <a:spcPts val="0"/>
-              </a:spcAft>
-              <a:buClrTx/>
-              <a:buSzTx/>
-              <a:buFontTx/>
-              <a:buNone/>
-              <a:tabLst/>
-              <a:defRPr/>
-            </a:pPr>
-            <a:r>
-              <a:rPr lang="en-US" dirty="0"/>
-              <a:t>And this graphic shows Python’s datatypes.</a:t>
-            </a:r>
-          </a:p>
-          <a:p>
-            <a:pPr marL="0" marR="0" lvl="0" indent="0" algn="l" defTabSz="914400" rtl="0" eaLnBrk="1" fontAlgn="auto" latinLnBrk="0" hangingPunct="1">
-              <a:lnSpc>
-                <a:spcPct val="100000"/>
-              </a:lnSpc>
-              <a:spcBef>
-                <a:spcPts val="0"/>
-              </a:spcBef>
-              <a:spcAft>
-                <a:spcPts val="0"/>
-              </a:spcAft>
-              <a:buClrTx/>
-              <a:buSzTx/>
-              <a:buFontTx/>
-              <a:buNone/>
-              <a:tabLst/>
-              <a:defRPr/>
-            </a:pPr>
-            <a:endParaRPr lang="en-US" dirty="0"/>
-          </a:p>
-          <a:p>
-            <a:pPr marL="0" marR="0" lvl="0" indent="0" algn="l" defTabSz="914400" rtl="0" eaLnBrk="1" fontAlgn="auto" latinLnBrk="0" hangingPunct="1">
-              <a:lnSpc>
-                <a:spcPct val="100000"/>
-              </a:lnSpc>
-              <a:spcBef>
-                <a:spcPts val="0"/>
-              </a:spcBef>
-              <a:spcAft>
-                <a:spcPts val="0"/>
-              </a:spcAft>
-              <a:buClrTx/>
-              <a:buSzTx/>
-              <a:buFontTx/>
-              <a:buNone/>
-              <a:tabLst/>
-              <a:defRPr/>
-            </a:pPr>
-            <a:r>
-              <a:rPr lang="en-US" dirty="0"/>
-              <a:t>https://pynative.com/python-data-types/</a:t>
-            </a:r>
-          </a:p>
-        </p:txBody>
-      </p:sp>
-      <p:sp>
-        <p:nvSpPr>
-          <p:cNvPr id="4" name="Slide Number Placeholder 3"/>
-          <p:cNvSpPr>
-            <a:spLocks noGrp="1"/>
-          </p:cNvSpPr>
-          <p:nvPr>
-            <p:ph type="sldNum" sz="quarter" idx="5"/>
-          </p:nvPr>
-        </p:nvSpPr>
-        <p:spPr/>
-        <p:txBody>
-          <a:bodyPr/>
-          <a:lstStyle/>
-          <a:p>
-            <a:fld id="{3148858F-F1DB-4027-9C85-CCA6849540DD}" type="slidenum">
-              <a:rPr lang="en-US" smtClean="0"/>
-              <a:t>8</a:t>
-            </a:fld>
-            <a:endParaRPr lang="en-US"/>
-          </a:p>
-        </p:txBody>
-      </p:sp>
-    </p:spTree>
-    <p:extLst>
-      <p:ext uri="{BB962C8B-B14F-4D97-AF65-F5344CB8AC3E}">
-        <p14:creationId xmlns:p14="http://schemas.microsoft.com/office/powerpoint/2010/main" val="62286822"/>
-      </p:ext>
-    </p:extLst>
-  </p:cSld>
-  <p:clrMapOvr>
-    <a:masterClrMapping/>
-  </p:clrMapOvr>
-</p:notes>
-</file>
-
-<file path=ppt/notesSlides/notesSlide9.xml><?xml version="1.0" encoding="utf-8"?>
-<p:notes xmlns:a="http://schemas.openxmlformats.org/drawingml/2006/main" xmlns:r="http://schemas.openxmlformats.org/officeDocument/2006/relationships" xmlns:p="http://schemas.openxmlformats.org/presentationml/2006/main">
-  <p:cSld>
-    <p:spTree>
-      <p:nvGrpSpPr>
-        <p:cNvPr id="1" name=""/>
-        <p:cNvGrpSpPr/>
-        <p:nvPr/>
-      </p:nvGrpSpPr>
-      <p:grpSpPr>
-        <a:xfrm>
-          <a:off x="0" y="0"/>
-          <a:ext cx="0" cy="0"/>
-          <a:chOff x="0" y="0"/>
-          <a:chExt cx="0" cy="0"/>
-        </a:xfrm>
-      </p:grpSpPr>
-      <p:sp>
-        <p:nvSpPr>
-          <p:cNvPr id="2" name="Slide Image Placeholder 1"/>
-          <p:cNvSpPr>
-            <a:spLocks noGrp="1" noRot="1" noChangeAspect="1"/>
-          </p:cNvSpPr>
-          <p:nvPr>
-            <p:ph type="sldImg"/>
-          </p:nvPr>
-        </p:nvSpPr>
-        <p:spPr/>
-      </p:sp>
-      <p:sp>
-        <p:nvSpPr>
-          <p:cNvPr id="3" name="Notes Placeholder 2"/>
-          <p:cNvSpPr>
-            <a:spLocks noGrp="1"/>
-          </p:cNvSpPr>
-          <p:nvPr>
-            <p:ph type="body" idx="1"/>
-          </p:nvPr>
-        </p:nvSpPr>
-        <p:spPr/>
-        <p:txBody>
-          <a:bodyPr/>
-          <a:lstStyle/>
-          <a:p>
-            <a:pPr marL="0" marR="0" lvl="0" indent="0" algn="l" defTabSz="914400" rtl="0" eaLnBrk="1" fontAlgn="auto" latinLnBrk="0" hangingPunct="1">
-              <a:lnSpc>
-                <a:spcPct val="100000"/>
-              </a:lnSpc>
-              <a:spcBef>
-                <a:spcPts val="0"/>
-              </a:spcBef>
-              <a:spcAft>
-                <a:spcPts val="0"/>
-              </a:spcAft>
-              <a:buClrTx/>
-              <a:buSzTx/>
-              <a:buFontTx/>
-              <a:buNone/>
-              <a:tabLst/>
-              <a:defRPr/>
-            </a:pPr>
-            <a:r>
-              <a:rPr lang="en-US" dirty="0"/>
-              <a:t>Adam naming the animals in the Biblical story.  Variable naming and standards are critically important.</a:t>
-            </a:r>
-          </a:p>
-        </p:txBody>
-      </p:sp>
-      <p:sp>
-        <p:nvSpPr>
-          <p:cNvPr id="4" name="Slide Number Placeholder 3"/>
-          <p:cNvSpPr>
-            <a:spLocks noGrp="1"/>
-          </p:cNvSpPr>
-          <p:nvPr>
-            <p:ph type="sldNum" sz="quarter" idx="5"/>
-          </p:nvPr>
-        </p:nvSpPr>
-        <p:spPr/>
-        <p:txBody>
-          <a:bodyPr/>
-          <a:lstStyle/>
-          <a:p>
-            <a:fld id="{3148858F-F1DB-4027-9C85-CCA6849540DD}" type="slidenum">
-              <a:rPr lang="en-US" smtClean="0"/>
-              <a:t>9</a:t>
-            </a:fld>
-            <a:endParaRPr lang="en-US"/>
-          </a:p>
-        </p:txBody>
-      </p:sp>
-    </p:spTree>
-    <p:extLst>
-      <p:ext uri="{BB962C8B-B14F-4D97-AF65-F5344CB8AC3E}">
-        <p14:creationId xmlns:p14="http://schemas.microsoft.com/office/powerpoint/2010/main" val="828379136"/>
       </p:ext>
     </p:extLst>
   </p:cSld>
@@ -3093,7 +2104,7 @@
           <a:p>
             <a:fld id="{C3F78080-8D0A-4BE8-A5B4-CB115102D524}" type="datetimeFigureOut">
               <a:rPr lang="en-US" smtClean="0"/>
-              <a:t>9/26/2022</a:t>
+              <a:t>11/18/2022</a:t>
             </a:fld>
             <a:endParaRPr lang="en-US"/>
           </a:p>
@@ -3291,7 +2302,7 @@
           <a:p>
             <a:fld id="{C3F78080-8D0A-4BE8-A5B4-CB115102D524}" type="datetimeFigureOut">
               <a:rPr lang="en-US" smtClean="0"/>
-              <a:t>9/26/2022</a:t>
+              <a:t>11/18/2022</a:t>
             </a:fld>
             <a:endParaRPr lang="en-US"/>
           </a:p>
@@ -3499,7 +2510,7 @@
           <a:p>
             <a:fld id="{C3F78080-8D0A-4BE8-A5B4-CB115102D524}" type="datetimeFigureOut">
               <a:rPr lang="en-US" smtClean="0"/>
-              <a:t>9/26/2022</a:t>
+              <a:t>11/18/2022</a:t>
             </a:fld>
             <a:endParaRPr lang="en-US"/>
           </a:p>
@@ -3697,7 +2708,7 @@
           <a:p>
             <a:fld id="{C3F78080-8D0A-4BE8-A5B4-CB115102D524}" type="datetimeFigureOut">
               <a:rPr lang="en-US" smtClean="0"/>
-              <a:t>9/26/2022</a:t>
+              <a:t>11/18/2022</a:t>
             </a:fld>
             <a:endParaRPr lang="en-US"/>
           </a:p>
@@ -3972,7 +2983,7 @@
           <a:p>
             <a:fld id="{C3F78080-8D0A-4BE8-A5B4-CB115102D524}" type="datetimeFigureOut">
               <a:rPr lang="en-US" smtClean="0"/>
-              <a:t>9/26/2022</a:t>
+              <a:t>11/18/2022</a:t>
             </a:fld>
             <a:endParaRPr lang="en-US"/>
           </a:p>
@@ -4237,7 +3248,7 @@
           <a:p>
             <a:fld id="{C3F78080-8D0A-4BE8-A5B4-CB115102D524}" type="datetimeFigureOut">
               <a:rPr lang="en-US" smtClean="0"/>
-              <a:t>9/26/2022</a:t>
+              <a:t>11/18/2022</a:t>
             </a:fld>
             <a:endParaRPr lang="en-US"/>
           </a:p>
@@ -4649,7 +3660,7 @@
           <a:p>
             <a:fld id="{C3F78080-8D0A-4BE8-A5B4-CB115102D524}" type="datetimeFigureOut">
               <a:rPr lang="en-US" smtClean="0"/>
-              <a:t>9/26/2022</a:t>
+              <a:t>11/18/2022</a:t>
             </a:fld>
             <a:endParaRPr lang="en-US"/>
           </a:p>
@@ -4790,7 +3801,7 @@
           <a:p>
             <a:fld id="{C3F78080-8D0A-4BE8-A5B4-CB115102D524}" type="datetimeFigureOut">
               <a:rPr lang="en-US" smtClean="0"/>
-              <a:t>9/26/2022</a:t>
+              <a:t>11/18/2022</a:t>
             </a:fld>
             <a:endParaRPr lang="en-US"/>
           </a:p>
@@ -4903,7 +3914,7 @@
           <a:p>
             <a:fld id="{C3F78080-8D0A-4BE8-A5B4-CB115102D524}" type="datetimeFigureOut">
               <a:rPr lang="en-US" smtClean="0"/>
-              <a:t>9/26/2022</a:t>
+              <a:t>11/18/2022</a:t>
             </a:fld>
             <a:endParaRPr lang="en-US"/>
           </a:p>
@@ -5214,7 +4225,7 @@
           <a:p>
             <a:fld id="{C3F78080-8D0A-4BE8-A5B4-CB115102D524}" type="datetimeFigureOut">
               <a:rPr lang="en-US" smtClean="0"/>
-              <a:t>9/26/2022</a:t>
+              <a:t>11/18/2022</a:t>
             </a:fld>
             <a:endParaRPr lang="en-US"/>
           </a:p>
@@ -5502,7 +4513,7 @@
           <a:p>
             <a:fld id="{C3F78080-8D0A-4BE8-A5B4-CB115102D524}" type="datetimeFigureOut">
               <a:rPr lang="en-US" smtClean="0"/>
-              <a:t>9/26/2022</a:t>
+              <a:t>11/18/2022</a:t>
             </a:fld>
             <a:endParaRPr lang="en-US"/>
           </a:p>
@@ -5743,7 +4754,7 @@
           <a:p>
             <a:fld id="{C3F78080-8D0A-4BE8-A5B4-CB115102D524}" type="datetimeFigureOut">
               <a:rPr lang="en-US" smtClean="0"/>
-              <a:t>9/26/2022</a:t>
+              <a:t>11/18/2022</a:t>
             </a:fld>
             <a:endParaRPr lang="en-US"/>
           </a:p>
@@ -6254,722 +5265,6 @@
       </p:transition>
     </mc:Fallback>
   </mc:AlternateContent>
-</p:sld>
-</file>
-
-<file path=ppt/slides/slide10.xml><?xml version="1.0" encoding="utf-8"?>
-<p:sld xmlns:a="http://schemas.openxmlformats.org/drawingml/2006/main" xmlns:r="http://schemas.openxmlformats.org/officeDocument/2006/relationships" xmlns:p="http://schemas.openxmlformats.org/presentationml/2006/main">
-  <p:cSld>
-    <p:spTree>
-      <p:nvGrpSpPr>
-        <p:cNvPr id="1" name=""/>
-        <p:cNvGrpSpPr/>
-        <p:nvPr/>
-      </p:nvGrpSpPr>
-      <p:grpSpPr>
-        <a:xfrm>
-          <a:off x="0" y="0"/>
-          <a:ext cx="0" cy="0"/>
-          <a:chOff x="0" y="0"/>
-          <a:chExt cx="0" cy="0"/>
-        </a:xfrm>
-      </p:grpSpPr>
-      <p:pic>
-        <p:nvPicPr>
-          <p:cNvPr id="6" name="Picture 5">
-            <a:extLst>
-              <a:ext uri="{FF2B5EF4-FFF2-40B4-BE49-F238E27FC236}">
-                <a16:creationId xmlns:a16="http://schemas.microsoft.com/office/drawing/2014/main" id="{5212B4CC-59B9-452D-AFCB-6E4FCFC20CB8}"/>
-              </a:ext>
-            </a:extLst>
-          </p:cNvPr>
-          <p:cNvPicPr>
-            <a:picLocks noChangeAspect="1"/>
-          </p:cNvPicPr>
-          <p:nvPr/>
-        </p:nvPicPr>
-        <p:blipFill>
-          <a:blip r:embed="rId3"/>
-          <a:stretch>
-            <a:fillRect/>
-          </a:stretch>
-        </p:blipFill>
-        <p:spPr>
-          <a:xfrm>
-            <a:off x="4038600" y="1566862"/>
-            <a:ext cx="4114800" cy="3724275"/>
-          </a:xfrm>
-          <a:prstGeom prst="rect">
-            <a:avLst/>
-          </a:prstGeom>
-        </p:spPr>
-      </p:pic>
-    </p:spTree>
-    <p:extLst>
-      <p:ext uri="{BB962C8B-B14F-4D97-AF65-F5344CB8AC3E}">
-        <p14:creationId xmlns:p14="http://schemas.microsoft.com/office/powerpoint/2010/main" val="811428612"/>
-      </p:ext>
-    </p:extLst>
-  </p:cSld>
-  <p:clrMapOvr>
-    <a:masterClrMapping/>
-  </p:clrMapOvr>
-  <mc:AlternateContent xmlns:mc="http://schemas.openxmlformats.org/markup-compatibility/2006" xmlns:p14="http://schemas.microsoft.com/office/powerpoint/2010/main">
-    <mc:Choice Requires="p14">
-      <p:transition spd="med" p14:dur="700">
-        <p:fade/>
-      </p:transition>
-    </mc:Choice>
-    <mc:Fallback xmlns="">
-      <p:transition spd="med">
-        <p:fade/>
-      </p:transition>
-    </mc:Fallback>
-  </mc:AlternateContent>
-</p:sld>
-</file>
-
-<file path=ppt/slides/slide11.xml><?xml version="1.0" encoding="utf-8"?>
-<p:sld xmlns:a="http://schemas.openxmlformats.org/drawingml/2006/main" xmlns:r="http://schemas.openxmlformats.org/officeDocument/2006/relationships" xmlns:p="http://schemas.openxmlformats.org/presentationml/2006/main">
-  <p:cSld>
-    <p:spTree>
-      <p:nvGrpSpPr>
-        <p:cNvPr id="1" name=""/>
-        <p:cNvGrpSpPr/>
-        <p:nvPr/>
-      </p:nvGrpSpPr>
-      <p:grpSpPr>
-        <a:xfrm>
-          <a:off x="0" y="0"/>
-          <a:ext cx="0" cy="0"/>
-          <a:chOff x="0" y="0"/>
-          <a:chExt cx="0" cy="0"/>
-        </a:xfrm>
-      </p:grpSpPr>
-      <p:pic>
-        <p:nvPicPr>
-          <p:cNvPr id="3074" name="Picture 2" descr="String (computer science) - Wikipedia">
-            <a:extLst>
-              <a:ext uri="{FF2B5EF4-FFF2-40B4-BE49-F238E27FC236}">
-                <a16:creationId xmlns:a16="http://schemas.microsoft.com/office/drawing/2014/main" id="{15EFD3A0-1D45-4D8E-9A1A-B9ADD49D3143}"/>
-              </a:ext>
-            </a:extLst>
-          </p:cNvPr>
-          <p:cNvPicPr>
-            <a:picLocks noChangeAspect="1" noChangeArrowheads="1"/>
-          </p:cNvPicPr>
-          <p:nvPr/>
-        </p:nvPicPr>
-        <p:blipFill>
-          <a:blip r:embed="rId3">
-            <a:extLst>
-              <a:ext uri="{28A0092B-C50C-407E-A947-70E740481C1C}">
-                <a14:useLocalDpi xmlns:a14="http://schemas.microsoft.com/office/drawing/2010/main" val="0"/>
-              </a:ext>
-            </a:extLst>
-          </a:blip>
-          <a:srcRect/>
-          <a:stretch>
-            <a:fillRect/>
-          </a:stretch>
-        </p:blipFill>
-        <p:spPr bwMode="auto">
-          <a:xfrm>
-            <a:off x="1928813" y="1833563"/>
-            <a:ext cx="8334375" cy="3190875"/>
-          </a:xfrm>
-          <a:prstGeom prst="rect">
-            <a:avLst/>
-          </a:prstGeom>
-          <a:noFill/>
-          <a:extLst>
-            <a:ext uri="{909E8E84-426E-40DD-AFC4-6F175D3DCCD1}">
-              <a14:hiddenFill xmlns:a14="http://schemas.microsoft.com/office/drawing/2010/main">
-                <a:solidFill>
-                  <a:srgbClr val="FFFFFF"/>
-                </a:solidFill>
-              </a14:hiddenFill>
-            </a:ext>
-          </a:extLst>
-        </p:spPr>
-      </p:pic>
-    </p:spTree>
-    <p:extLst>
-      <p:ext uri="{BB962C8B-B14F-4D97-AF65-F5344CB8AC3E}">
-        <p14:creationId xmlns:p14="http://schemas.microsoft.com/office/powerpoint/2010/main" val="2815250072"/>
-      </p:ext>
-    </p:extLst>
-  </p:cSld>
-  <p:clrMapOvr>
-    <a:masterClrMapping/>
-  </p:clrMapOvr>
-  <mc:AlternateContent xmlns:mc="http://schemas.openxmlformats.org/markup-compatibility/2006" xmlns:p14="http://schemas.microsoft.com/office/powerpoint/2010/main">
-    <mc:Choice Requires="p14">
-      <p:transition spd="med" p14:dur="700">
-        <p:fade/>
-      </p:transition>
-    </mc:Choice>
-    <mc:Fallback xmlns="">
-      <p:transition spd="med">
-        <p:fade/>
-      </p:transition>
-    </mc:Fallback>
-  </mc:AlternateContent>
-</p:sld>
-</file>
-
-<file path=ppt/slides/slide12.xml><?xml version="1.0" encoding="utf-8"?>
-<p:sld xmlns:a="http://schemas.openxmlformats.org/drawingml/2006/main" xmlns:r="http://schemas.openxmlformats.org/officeDocument/2006/relationships" xmlns:p="http://schemas.openxmlformats.org/presentationml/2006/main">
-  <p:cSld>
-    <p:spTree>
-      <p:nvGrpSpPr>
-        <p:cNvPr id="1" name=""/>
-        <p:cNvGrpSpPr/>
-        <p:nvPr/>
-      </p:nvGrpSpPr>
-      <p:grpSpPr>
-        <a:xfrm>
-          <a:off x="0" y="0"/>
-          <a:ext cx="0" cy="0"/>
-          <a:chOff x="0" y="0"/>
-          <a:chExt cx="0" cy="0"/>
-        </a:xfrm>
-      </p:grpSpPr>
-      <p:pic>
-        <p:nvPicPr>
-          <p:cNvPr id="3" name="Picture 2">
-            <a:extLst>
-              <a:ext uri="{FF2B5EF4-FFF2-40B4-BE49-F238E27FC236}">
-                <a16:creationId xmlns:a16="http://schemas.microsoft.com/office/drawing/2014/main" id="{A116E95B-71E5-46A9-8486-2DA7BEE91608}"/>
-              </a:ext>
-            </a:extLst>
-          </p:cNvPr>
-          <p:cNvPicPr>
-            <a:picLocks noChangeAspect="1"/>
-          </p:cNvPicPr>
-          <p:nvPr/>
-        </p:nvPicPr>
-        <p:blipFill>
-          <a:blip r:embed="rId3"/>
-          <a:stretch>
-            <a:fillRect/>
-          </a:stretch>
-        </p:blipFill>
-        <p:spPr>
-          <a:xfrm>
-            <a:off x="2194577" y="2846579"/>
-            <a:ext cx="7802846" cy="1164842"/>
-          </a:xfrm>
-          <a:prstGeom prst="rect">
-            <a:avLst/>
-          </a:prstGeom>
-        </p:spPr>
-      </p:pic>
-    </p:spTree>
-    <p:extLst>
-      <p:ext uri="{BB962C8B-B14F-4D97-AF65-F5344CB8AC3E}">
-        <p14:creationId xmlns:p14="http://schemas.microsoft.com/office/powerpoint/2010/main" val="1132462549"/>
-      </p:ext>
-    </p:extLst>
-  </p:cSld>
-  <p:clrMapOvr>
-    <a:masterClrMapping/>
-  </p:clrMapOvr>
-  <mc:AlternateContent xmlns:mc="http://schemas.openxmlformats.org/markup-compatibility/2006" xmlns:p14="http://schemas.microsoft.com/office/powerpoint/2010/main">
-    <mc:Choice Requires="p14">
-      <p:transition spd="med" p14:dur="700">
-        <p:fade/>
-      </p:transition>
-    </mc:Choice>
-    <mc:Fallback xmlns="">
-      <p:transition spd="med">
-        <p:fade/>
-      </p:transition>
-    </mc:Fallback>
-  </mc:AlternateContent>
-</p:sld>
-</file>
-
-<file path=ppt/slides/slide13.xml><?xml version="1.0" encoding="utf-8"?>
-<p:sld xmlns:a="http://schemas.openxmlformats.org/drawingml/2006/main" xmlns:r="http://schemas.openxmlformats.org/officeDocument/2006/relationships" xmlns:p="http://schemas.openxmlformats.org/presentationml/2006/main">
-  <p:cSld>
-    <p:spTree>
-      <p:nvGrpSpPr>
-        <p:cNvPr id="1" name=""/>
-        <p:cNvGrpSpPr/>
-        <p:nvPr/>
-      </p:nvGrpSpPr>
-      <p:grpSpPr>
-        <a:xfrm>
-          <a:off x="0" y="0"/>
-          <a:ext cx="0" cy="0"/>
-          <a:chOff x="0" y="0"/>
-          <a:chExt cx="0" cy="0"/>
-        </a:xfrm>
-      </p:grpSpPr>
-      <p:pic>
-        <p:nvPicPr>
-          <p:cNvPr id="3" name="Picture 2">
-            <a:extLst>
-              <a:ext uri="{FF2B5EF4-FFF2-40B4-BE49-F238E27FC236}">
-                <a16:creationId xmlns:a16="http://schemas.microsoft.com/office/drawing/2014/main" id="{765BD16E-6F7E-4BB3-B14E-321F8EABC368}"/>
-              </a:ext>
-            </a:extLst>
-          </p:cNvPr>
-          <p:cNvPicPr>
-            <a:picLocks noChangeAspect="1"/>
-          </p:cNvPicPr>
-          <p:nvPr/>
-        </p:nvPicPr>
-        <p:blipFill>
-          <a:blip r:embed="rId3"/>
-          <a:stretch>
-            <a:fillRect/>
-          </a:stretch>
-        </p:blipFill>
-        <p:spPr>
-          <a:xfrm>
-            <a:off x="2886075" y="1333500"/>
-            <a:ext cx="6419850" cy="4191000"/>
-          </a:xfrm>
-          <a:prstGeom prst="rect">
-            <a:avLst/>
-          </a:prstGeom>
-        </p:spPr>
-      </p:pic>
-      <p:sp>
-        <p:nvSpPr>
-          <p:cNvPr id="5" name="Title 4">
-            <a:extLst>
-              <a:ext uri="{FF2B5EF4-FFF2-40B4-BE49-F238E27FC236}">
-                <a16:creationId xmlns:a16="http://schemas.microsoft.com/office/drawing/2014/main" id="{0BF7903E-A0BF-4F75-BE02-8F3B808B0F73}"/>
-              </a:ext>
-            </a:extLst>
-          </p:cNvPr>
-          <p:cNvSpPr>
-            <a:spLocks noGrp="1"/>
-          </p:cNvSpPr>
-          <p:nvPr>
-            <p:ph type="title"/>
-          </p:nvPr>
-        </p:nvSpPr>
-        <p:spPr/>
-        <p:txBody>
-          <a:bodyPr/>
-          <a:lstStyle/>
-          <a:p>
-            <a:endParaRPr lang="en-US"/>
-          </a:p>
-        </p:txBody>
-      </p:sp>
-    </p:spTree>
-    <p:extLst>
-      <p:ext uri="{BB962C8B-B14F-4D97-AF65-F5344CB8AC3E}">
-        <p14:creationId xmlns:p14="http://schemas.microsoft.com/office/powerpoint/2010/main" val="2021418747"/>
-      </p:ext>
-    </p:extLst>
-  </p:cSld>
-  <p:clrMapOvr>
-    <a:masterClrMapping/>
-  </p:clrMapOvr>
-  <mc:AlternateContent xmlns:mc="http://schemas.openxmlformats.org/markup-compatibility/2006" xmlns:p14="http://schemas.microsoft.com/office/powerpoint/2010/main">
-    <mc:Choice Requires="p14">
-      <p:transition spd="med" p14:dur="700">
-        <p:fade/>
-      </p:transition>
-    </mc:Choice>
-    <mc:Fallback xmlns="">
-      <p:transition spd="med">
-        <p:fade/>
-      </p:transition>
-    </mc:Fallback>
-  </mc:AlternateContent>
-</p:sld>
-</file>
-
-<file path=ppt/slides/slide14.xml><?xml version="1.0" encoding="utf-8"?>
-<p:sld xmlns:a="http://schemas.openxmlformats.org/drawingml/2006/main" xmlns:r="http://schemas.openxmlformats.org/officeDocument/2006/relationships" xmlns:p="http://schemas.openxmlformats.org/presentationml/2006/main">
-  <p:cSld>
-    <p:spTree>
-      <p:nvGrpSpPr>
-        <p:cNvPr id="1" name=""/>
-        <p:cNvGrpSpPr/>
-        <p:nvPr/>
-      </p:nvGrpSpPr>
-      <p:grpSpPr>
-        <a:xfrm>
-          <a:off x="0" y="0"/>
-          <a:ext cx="0" cy="0"/>
-          <a:chOff x="0" y="0"/>
-          <a:chExt cx="0" cy="0"/>
-        </a:xfrm>
-      </p:grpSpPr>
-      <p:pic>
-        <p:nvPicPr>
-          <p:cNvPr id="1026" name="Picture 2" descr="Python Datatype conversion">
-            <a:extLst>
-              <a:ext uri="{FF2B5EF4-FFF2-40B4-BE49-F238E27FC236}">
-                <a16:creationId xmlns:a16="http://schemas.microsoft.com/office/drawing/2014/main" id="{C5A4E410-78DF-44F2-BB04-9461EED29C66}"/>
-              </a:ext>
-            </a:extLst>
-          </p:cNvPr>
-          <p:cNvPicPr>
-            <a:picLocks noChangeAspect="1" noChangeArrowheads="1"/>
-          </p:cNvPicPr>
-          <p:nvPr/>
-        </p:nvPicPr>
-        <p:blipFill>
-          <a:blip r:embed="rId3">
-            <a:extLst>
-              <a:ext uri="{28A0092B-C50C-407E-A947-70E740481C1C}">
-                <a14:useLocalDpi xmlns:a14="http://schemas.microsoft.com/office/drawing/2010/main" val="0"/>
-              </a:ext>
-            </a:extLst>
-          </a:blip>
-          <a:srcRect/>
-          <a:stretch>
-            <a:fillRect/>
-          </a:stretch>
-        </p:blipFill>
-        <p:spPr bwMode="auto">
-          <a:xfrm>
-            <a:off x="2400255" y="2404008"/>
-            <a:ext cx="7391489" cy="2049983"/>
-          </a:xfrm>
-          <a:prstGeom prst="rect">
-            <a:avLst/>
-          </a:prstGeom>
-          <a:noFill/>
-          <a:extLst>
-            <a:ext uri="{909E8E84-426E-40DD-AFC4-6F175D3DCCD1}">
-              <a14:hiddenFill xmlns:a14="http://schemas.microsoft.com/office/drawing/2010/main">
-                <a:solidFill>
-                  <a:srgbClr val="FFFFFF"/>
-                </a:solidFill>
-              </a14:hiddenFill>
-            </a:ext>
-          </a:extLst>
-        </p:spPr>
-      </p:pic>
-      <p:pic>
-        <p:nvPicPr>
-          <p:cNvPr id="4" name="Picture 3">
-            <a:extLst>
-              <a:ext uri="{FF2B5EF4-FFF2-40B4-BE49-F238E27FC236}">
-                <a16:creationId xmlns:a16="http://schemas.microsoft.com/office/drawing/2014/main" id="{D20A1309-E55E-44DB-9811-96C67DA5C666}"/>
-              </a:ext>
-            </a:extLst>
-          </p:cNvPr>
-          <p:cNvPicPr>
-            <a:picLocks noChangeAspect="1"/>
-          </p:cNvPicPr>
-          <p:nvPr/>
-        </p:nvPicPr>
-        <p:blipFill>
-          <a:blip r:embed="rId4">
-            <a:extLst>
-              <a:ext uri="{28A0092B-C50C-407E-A947-70E740481C1C}">
-                <a14:useLocalDpi xmlns:a14="http://schemas.microsoft.com/office/drawing/2010/main" val="0"/>
-              </a:ext>
-            </a:extLst>
-          </a:blip>
-          <a:stretch>
-            <a:fillRect/>
-          </a:stretch>
-        </p:blipFill>
-        <p:spPr>
-          <a:xfrm>
-            <a:off x="10066897" y="4529137"/>
-            <a:ext cx="2116085" cy="2328862"/>
-          </a:xfrm>
-          <a:prstGeom prst="rect">
-            <a:avLst/>
-          </a:prstGeom>
-        </p:spPr>
-      </p:pic>
-      <p:sp>
-        <p:nvSpPr>
-          <p:cNvPr id="8" name="TextBox 7">
-            <a:extLst>
-              <a:ext uri="{FF2B5EF4-FFF2-40B4-BE49-F238E27FC236}">
-                <a16:creationId xmlns:a16="http://schemas.microsoft.com/office/drawing/2014/main" id="{FBA9AB83-FE78-48D0-8549-1BCE5EAB6D3A}"/>
-              </a:ext>
-            </a:extLst>
-          </p:cNvPr>
-          <p:cNvSpPr txBox="1"/>
-          <p:nvPr/>
-        </p:nvSpPr>
-        <p:spPr>
-          <a:xfrm>
-            <a:off x="0" y="6550223"/>
-            <a:ext cx="12192000" cy="307777"/>
-          </a:xfrm>
-          <a:prstGeom prst="rect">
-            <a:avLst/>
-          </a:prstGeom>
-          <a:noFill/>
-        </p:spPr>
-        <p:txBody>
-          <a:bodyPr wrap="square" rtlCol="0">
-            <a:spAutoFit/>
-          </a:bodyPr>
-          <a:lstStyle/>
-          <a:p>
-            <a:r>
-              <a:rPr lang="en-US" sz="1400" dirty="0">
-                <a:solidFill>
-                  <a:schemeClr val="tx1">
-                    <a:lumMod val="65000"/>
-                    <a:lumOff val="35000"/>
-                  </a:schemeClr>
-                </a:solidFill>
-                <a:latin typeface="+mj-lt"/>
-                <a:ea typeface="Verdana" panose="020B0604030504040204" pitchFamily="34" charset="0"/>
-              </a:rPr>
-              <a:t>Image Credit: </a:t>
-            </a:r>
-            <a:r>
-              <a:rPr lang="en-US" sz="1400" dirty="0">
-                <a:solidFill>
-                  <a:schemeClr val="tx1">
-                    <a:lumMod val="65000"/>
-                    <a:lumOff val="35000"/>
-                  </a:schemeClr>
-                </a:solidFill>
-              </a:rPr>
-              <a:t>https://www.vectorstock.com/royalty-free-vector/cartoon-wizard-vector-1693529</a:t>
-            </a:r>
-            <a:endParaRPr lang="en-US" sz="1400" dirty="0">
-              <a:solidFill>
-                <a:schemeClr val="tx1">
-                  <a:lumMod val="65000"/>
-                  <a:lumOff val="35000"/>
-                </a:schemeClr>
-              </a:solidFill>
-              <a:latin typeface="+mj-lt"/>
-              <a:ea typeface="Verdana" panose="020B0604030504040204" pitchFamily="34" charset="0"/>
-            </a:endParaRPr>
-          </a:p>
-        </p:txBody>
-      </p:sp>
-    </p:spTree>
-    <p:extLst>
-      <p:ext uri="{BB962C8B-B14F-4D97-AF65-F5344CB8AC3E}">
-        <p14:creationId xmlns:p14="http://schemas.microsoft.com/office/powerpoint/2010/main" val="3192052037"/>
-      </p:ext>
-    </p:extLst>
-  </p:cSld>
-  <p:clrMapOvr>
-    <a:masterClrMapping/>
-  </p:clrMapOvr>
-  <mc:AlternateContent xmlns:mc="http://schemas.openxmlformats.org/markup-compatibility/2006" xmlns:p14="http://schemas.microsoft.com/office/powerpoint/2010/main">
-    <mc:Choice Requires="p14">
-      <p:transition spd="med" p14:dur="700">
-        <p:fade/>
-      </p:transition>
-    </mc:Choice>
-    <mc:Fallback xmlns="">
-      <p:transition spd="med">
-        <p:fade/>
-      </p:transition>
-    </mc:Fallback>
-  </mc:AlternateContent>
-</p:sld>
-</file>
-
-<file path=ppt/slides/slide15.xml><?xml version="1.0" encoding="utf-8"?>
-<p:sld xmlns:a="http://schemas.openxmlformats.org/drawingml/2006/main" xmlns:r="http://schemas.openxmlformats.org/officeDocument/2006/relationships" xmlns:p="http://schemas.openxmlformats.org/presentationml/2006/main">
-  <p:cSld>
-    <p:spTree>
-      <p:nvGrpSpPr>
-        <p:cNvPr id="1" name=""/>
-        <p:cNvGrpSpPr/>
-        <p:nvPr/>
-      </p:nvGrpSpPr>
-      <p:grpSpPr>
-        <a:xfrm>
-          <a:off x="0" y="0"/>
-          <a:ext cx="0" cy="0"/>
-          <a:chOff x="0" y="0"/>
-          <a:chExt cx="0" cy="0"/>
-        </a:xfrm>
-      </p:grpSpPr>
-      <p:sp>
-        <p:nvSpPr>
-          <p:cNvPr id="2" name="Title 1">
-            <a:extLst>
-              <a:ext uri="{FF2B5EF4-FFF2-40B4-BE49-F238E27FC236}">
-                <a16:creationId xmlns:a16="http://schemas.microsoft.com/office/drawing/2014/main" id="{8306FF31-301F-43F0-8202-A782726E446A}"/>
-              </a:ext>
-            </a:extLst>
-          </p:cNvPr>
-          <p:cNvSpPr>
-            <a:spLocks noGrp="1"/>
-          </p:cNvSpPr>
-          <p:nvPr>
-            <p:ph type="title"/>
-          </p:nvPr>
-        </p:nvSpPr>
-        <p:spPr>
-          <a:xfrm>
-            <a:off x="0" y="365127"/>
-            <a:ext cx="12191999" cy="827416"/>
-          </a:xfrm>
-        </p:spPr>
-        <p:txBody>
-          <a:bodyPr>
-            <a:normAutofit/>
-          </a:bodyPr>
-          <a:lstStyle/>
-          <a:p>
-            <a:pPr algn="ctr"/>
-            <a:r>
-              <a:rPr lang="en-US" sz="4000" dirty="0">
-                <a:latin typeface="Palatino Linotype" panose="02040502050505030304" pitchFamily="18" charset="0"/>
-                <a:cs typeface="Segoe UI Light" panose="020B0502040204020203" pitchFamily="34" charset="0"/>
-              </a:rPr>
-              <a:t>Architecture (Interpreted Languages)</a:t>
-            </a:r>
-          </a:p>
-        </p:txBody>
-      </p:sp>
-      <p:pic>
-        <p:nvPicPr>
-          <p:cNvPr id="5" name="Content Placeholder 12">
-            <a:extLst>
-              <a:ext uri="{FF2B5EF4-FFF2-40B4-BE49-F238E27FC236}">
-                <a16:creationId xmlns:a16="http://schemas.microsoft.com/office/drawing/2014/main" id="{67D6BD1D-3F09-4338-B1FF-CD4EABF496E1}"/>
-              </a:ext>
-            </a:extLst>
-          </p:cNvPr>
-          <p:cNvPicPr>
-            <a:picLocks noGrp="1" noChangeAspect="1"/>
-          </p:cNvPicPr>
-          <p:nvPr>
-            <p:ph idx="1"/>
-          </p:nvPr>
-        </p:nvPicPr>
-        <p:blipFill>
-          <a:blip r:embed="rId3">
-            <a:extLst>
-              <a:ext uri="{28A0092B-C50C-407E-A947-70E740481C1C}">
-                <a14:useLocalDpi xmlns:a14="http://schemas.microsoft.com/office/drawing/2010/main" val="0"/>
-              </a:ext>
-            </a:extLst>
-          </a:blip>
-          <a:stretch>
-            <a:fillRect/>
-          </a:stretch>
-        </p:blipFill>
-        <p:spPr>
-          <a:xfrm>
-            <a:off x="813319" y="1982277"/>
-            <a:ext cx="10149431" cy="3437166"/>
-          </a:xfrm>
-        </p:spPr>
-      </p:pic>
-    </p:spTree>
-    <p:extLst>
-      <p:ext uri="{BB962C8B-B14F-4D97-AF65-F5344CB8AC3E}">
-        <p14:creationId xmlns:p14="http://schemas.microsoft.com/office/powerpoint/2010/main" val="791954200"/>
-      </p:ext>
-    </p:extLst>
-  </p:cSld>
-  <p:clrMapOvr>
-    <a:masterClrMapping/>
-  </p:clrMapOvr>
-  <mc:AlternateContent xmlns:mc="http://schemas.openxmlformats.org/markup-compatibility/2006" xmlns:p14="http://schemas.microsoft.com/office/powerpoint/2010/main">
-    <mc:Choice Requires="p14">
-      <p:transition spd="med" p14:dur="700">
-        <p:fade/>
-      </p:transition>
-    </mc:Choice>
-    <mc:Fallback xmlns="">
-      <p:transition spd="med">
-        <p:fade/>
-      </p:transition>
-    </mc:Fallback>
-  </mc:AlternateContent>
-</p:sld>
-</file>
-
-<file path=ppt/slides/slide16.xml><?xml version="1.0" encoding="utf-8"?>
-<p:sld xmlns:a="http://schemas.openxmlformats.org/drawingml/2006/main" xmlns:r="http://schemas.openxmlformats.org/officeDocument/2006/relationships" xmlns:p="http://schemas.openxmlformats.org/presentationml/2006/main">
-  <p:cSld>
-    <p:spTree>
-      <p:nvGrpSpPr>
-        <p:cNvPr id="1" name=""/>
-        <p:cNvGrpSpPr/>
-        <p:nvPr/>
-      </p:nvGrpSpPr>
-      <p:grpSpPr>
-        <a:xfrm>
-          <a:off x="0" y="0"/>
-          <a:ext cx="0" cy="0"/>
-          <a:chOff x="0" y="0"/>
-          <a:chExt cx="0" cy="0"/>
-        </a:xfrm>
-      </p:grpSpPr>
-      <p:sp>
-        <p:nvSpPr>
-          <p:cNvPr id="2" name="Title 1">
-            <a:extLst>
-              <a:ext uri="{FF2B5EF4-FFF2-40B4-BE49-F238E27FC236}">
-                <a16:creationId xmlns:a16="http://schemas.microsoft.com/office/drawing/2014/main" id="{E572A712-B415-4A2E-7599-A6167150739A}"/>
-              </a:ext>
-            </a:extLst>
-          </p:cNvPr>
-          <p:cNvSpPr>
-            <a:spLocks noGrp="1"/>
-          </p:cNvSpPr>
-          <p:nvPr>
-            <p:ph type="title"/>
-          </p:nvPr>
-        </p:nvSpPr>
-        <p:spPr/>
-        <p:txBody>
-          <a:bodyPr/>
-          <a:lstStyle/>
-          <a:p>
-            <a:endParaRPr lang="en-US"/>
-          </a:p>
-        </p:txBody>
-      </p:sp>
-      <p:sp>
-        <p:nvSpPr>
-          <p:cNvPr id="3" name="Content Placeholder 2">
-            <a:extLst>
-              <a:ext uri="{FF2B5EF4-FFF2-40B4-BE49-F238E27FC236}">
-                <a16:creationId xmlns:a16="http://schemas.microsoft.com/office/drawing/2014/main" id="{5B6CACE9-0FC0-9826-3B3C-E9376F8D983A}"/>
-              </a:ext>
-            </a:extLst>
-          </p:cNvPr>
-          <p:cNvSpPr>
-            <a:spLocks noGrp="1"/>
-          </p:cNvSpPr>
-          <p:nvPr>
-            <p:ph idx="1"/>
-          </p:nvPr>
-        </p:nvSpPr>
-        <p:spPr/>
-        <p:txBody>
-          <a:bodyPr/>
-          <a:lstStyle/>
-          <a:p>
-            <a:endParaRPr lang="en-US"/>
-          </a:p>
-        </p:txBody>
-      </p:sp>
-    </p:spTree>
-    <p:extLst>
-      <p:ext uri="{BB962C8B-B14F-4D97-AF65-F5344CB8AC3E}">
-        <p14:creationId xmlns:p14="http://schemas.microsoft.com/office/powerpoint/2010/main" val="2552202046"/>
-      </p:ext>
-    </p:extLst>
-  </p:cSld>
-  <p:clrMapOvr>
-    <a:masterClrMapping/>
-  </p:clrMapOvr>
 </p:sld>
 </file>
 
@@ -8328,6 +6623,86 @@
           <a:chExt cx="0" cy="0"/>
         </a:xfrm>
       </p:grpSpPr>
+      <p:sp>
+        <p:nvSpPr>
+          <p:cNvPr id="2" name="Title 1">
+            <a:extLst>
+              <a:ext uri="{FF2B5EF4-FFF2-40B4-BE49-F238E27FC236}">
+                <a16:creationId xmlns:a16="http://schemas.microsoft.com/office/drawing/2014/main" id="{E572A712-B415-4A2E-7599-A6167150739A}"/>
+              </a:ext>
+            </a:extLst>
+          </p:cNvPr>
+          <p:cNvSpPr>
+            <a:spLocks noGrp="1"/>
+          </p:cNvSpPr>
+          <p:nvPr>
+            <p:ph type="title"/>
+          </p:nvPr>
+        </p:nvSpPr>
+        <p:spPr/>
+        <p:txBody>
+          <a:bodyPr/>
+          <a:lstStyle/>
+          <a:p>
+            <a:endParaRPr lang="en-US"/>
+          </a:p>
+        </p:txBody>
+      </p:sp>
+      <p:sp>
+        <p:nvSpPr>
+          <p:cNvPr id="3" name="Content Placeholder 2">
+            <a:extLst>
+              <a:ext uri="{FF2B5EF4-FFF2-40B4-BE49-F238E27FC236}">
+                <a16:creationId xmlns:a16="http://schemas.microsoft.com/office/drawing/2014/main" id="{5B6CACE9-0FC0-9826-3B3C-E9376F8D983A}"/>
+              </a:ext>
+            </a:extLst>
+          </p:cNvPr>
+          <p:cNvSpPr>
+            <a:spLocks noGrp="1"/>
+          </p:cNvSpPr>
+          <p:nvPr>
+            <p:ph idx="1"/>
+          </p:nvPr>
+        </p:nvSpPr>
+        <p:spPr/>
+        <p:txBody>
+          <a:bodyPr/>
+          <a:lstStyle/>
+          <a:p>
+            <a:endParaRPr lang="en-US"/>
+          </a:p>
+        </p:txBody>
+      </p:sp>
+    </p:spTree>
+    <p:extLst>
+      <p:ext uri="{BB962C8B-B14F-4D97-AF65-F5344CB8AC3E}">
+        <p14:creationId xmlns:p14="http://schemas.microsoft.com/office/powerpoint/2010/main" val="2552202046"/>
+      </p:ext>
+    </p:extLst>
+  </p:cSld>
+  <p:clrMapOvr>
+    <a:masterClrMapping/>
+  </p:clrMapOvr>
+</p:sld>
+</file>
+
+<file path=ppt/slides/slide7.xml><?xml version="1.0" encoding="utf-8"?>
+<p:sld xmlns:a="http://schemas.openxmlformats.org/drawingml/2006/main" xmlns:r="http://schemas.openxmlformats.org/officeDocument/2006/relationships" xmlns:p="http://schemas.openxmlformats.org/presentationml/2006/main">
+  <p:cSld>
+    <p:spTree>
+      <p:nvGrpSpPr>
+        <p:cNvPr id="1" name=""/>
+        <p:cNvGrpSpPr/>
+        <p:nvPr/>
+      </p:nvGrpSpPr>
+      <p:grpSpPr>
+        <a:xfrm>
+          <a:off x="0" y="0"/>
+          <a:ext cx="0" cy="0"/>
+          <a:chOff x="0" y="0"/>
+          <a:chExt cx="0" cy="0"/>
+        </a:xfrm>
+      </p:grpSpPr>
       <p:pic>
         <p:nvPicPr>
           <p:cNvPr id="1026" name="Picture 2" descr="Project Jupyter - Wikipedia">
@@ -8379,463 +6754,6 @@
     <p:extLst>
       <p:ext uri="{BB962C8B-B14F-4D97-AF65-F5344CB8AC3E}">
         <p14:creationId xmlns:p14="http://schemas.microsoft.com/office/powerpoint/2010/main" val="2383651979"/>
-      </p:ext>
-    </p:extLst>
-  </p:cSld>
-  <p:clrMapOvr>
-    <a:masterClrMapping/>
-  </p:clrMapOvr>
-  <mc:AlternateContent xmlns:mc="http://schemas.openxmlformats.org/markup-compatibility/2006" xmlns:p14="http://schemas.microsoft.com/office/powerpoint/2010/main">
-    <mc:Choice Requires="p14">
-      <p:transition spd="med" p14:dur="700">
-        <p:fade/>
-      </p:transition>
-    </mc:Choice>
-    <mc:Fallback xmlns="">
-      <p:transition spd="med">
-        <p:fade/>
-      </p:transition>
-    </mc:Fallback>
-  </mc:AlternateContent>
-</p:sld>
-</file>
-
-<file path=ppt/slides/slide7.xml><?xml version="1.0" encoding="utf-8"?>
-<p:sld xmlns:a="http://schemas.openxmlformats.org/drawingml/2006/main" xmlns:r="http://schemas.openxmlformats.org/officeDocument/2006/relationships" xmlns:p="http://schemas.openxmlformats.org/presentationml/2006/main">
-  <p:cSld>
-    <p:spTree>
-      <p:nvGrpSpPr>
-        <p:cNvPr id="1" name=""/>
-        <p:cNvGrpSpPr/>
-        <p:nvPr/>
-      </p:nvGrpSpPr>
-      <p:grpSpPr>
-        <a:xfrm>
-          <a:off x="0" y="0"/>
-          <a:ext cx="0" cy="0"/>
-          <a:chOff x="0" y="0"/>
-          <a:chExt cx="0" cy="0"/>
-        </a:xfrm>
-      </p:grpSpPr>
-      <p:sp>
-        <p:nvSpPr>
-          <p:cNvPr id="2" name="Title 1">
-            <a:extLst>
-              <a:ext uri="{FF2B5EF4-FFF2-40B4-BE49-F238E27FC236}">
-                <a16:creationId xmlns:a16="http://schemas.microsoft.com/office/drawing/2014/main" id="{8306FF31-301F-43F0-8202-A782726E446A}"/>
-              </a:ext>
-            </a:extLst>
-          </p:cNvPr>
-          <p:cNvSpPr>
-            <a:spLocks noGrp="1"/>
-          </p:cNvSpPr>
-          <p:nvPr>
-            <p:ph type="title"/>
-          </p:nvPr>
-        </p:nvSpPr>
-        <p:spPr>
-          <a:xfrm>
-            <a:off x="0" y="365127"/>
-            <a:ext cx="12191999" cy="827416"/>
-          </a:xfrm>
-        </p:spPr>
-        <p:txBody>
-          <a:bodyPr>
-            <a:normAutofit/>
-          </a:bodyPr>
-          <a:lstStyle/>
-          <a:p>
-            <a:pPr algn="ctr"/>
-            <a:r>
-              <a:rPr lang="en-US" sz="4000" dirty="0">
-                <a:latin typeface="Palatino Linotype" panose="02040502050505030304" pitchFamily="18" charset="0"/>
-                <a:cs typeface="Segoe UI Light" panose="020B0502040204020203" pitchFamily="34" charset="0"/>
-              </a:rPr>
-              <a:t> Variables</a:t>
-            </a:r>
-          </a:p>
-        </p:txBody>
-      </p:sp>
-      <p:pic>
-        <p:nvPicPr>
-          <p:cNvPr id="7" name="Content Placeholder 3">
-            <a:extLst>
-              <a:ext uri="{FF2B5EF4-FFF2-40B4-BE49-F238E27FC236}">
-                <a16:creationId xmlns:a16="http://schemas.microsoft.com/office/drawing/2014/main" id="{79EF0D20-244D-4570-B07B-49B241ECC7E1}"/>
-              </a:ext>
-            </a:extLst>
-          </p:cNvPr>
-          <p:cNvPicPr>
-            <a:picLocks noGrp="1" noChangeAspect="1"/>
-          </p:cNvPicPr>
-          <p:nvPr>
-            <p:ph idx="1"/>
-          </p:nvPr>
-        </p:nvPicPr>
-        <p:blipFill>
-          <a:blip r:embed="rId3">
-            <a:extLst>
-              <a:ext uri="{28A0092B-C50C-407E-A947-70E740481C1C}">
-                <a14:useLocalDpi xmlns:a14="http://schemas.microsoft.com/office/drawing/2010/main" val="0"/>
-              </a:ext>
-            </a:extLst>
-          </a:blip>
-          <a:stretch>
-            <a:fillRect/>
-          </a:stretch>
-        </p:blipFill>
-        <p:spPr>
-          <a:xfrm>
-            <a:off x="3920331" y="1825625"/>
-            <a:ext cx="4351338" cy="4351338"/>
-          </a:xfrm>
-          <a:solidFill>
-            <a:schemeClr val="accent1">
-              <a:lumMod val="20000"/>
-              <a:lumOff val="80000"/>
-            </a:schemeClr>
-          </a:solidFill>
-          <a:effectLst>
-            <a:softEdge rad="0"/>
-          </a:effectLst>
-        </p:spPr>
-      </p:pic>
-    </p:spTree>
-    <p:extLst>
-      <p:ext uri="{BB962C8B-B14F-4D97-AF65-F5344CB8AC3E}">
-        <p14:creationId xmlns:p14="http://schemas.microsoft.com/office/powerpoint/2010/main" val="337556145"/>
-      </p:ext>
-    </p:extLst>
-  </p:cSld>
-  <p:clrMapOvr>
-    <a:masterClrMapping/>
-  </p:clrMapOvr>
-  <mc:AlternateContent xmlns:mc="http://schemas.openxmlformats.org/markup-compatibility/2006" xmlns:p14="http://schemas.microsoft.com/office/powerpoint/2010/main">
-    <mc:Choice Requires="p14">
-      <p:transition spd="med" p14:dur="700">
-        <p:fade/>
-      </p:transition>
-    </mc:Choice>
-    <mc:Fallback xmlns="">
-      <p:transition spd="med">
-        <p:fade/>
-      </p:transition>
-    </mc:Fallback>
-  </mc:AlternateContent>
-</p:sld>
-</file>
-
-<file path=ppt/slides/slide8.xml><?xml version="1.0" encoding="utf-8"?>
-<p:sld xmlns:a="http://schemas.openxmlformats.org/drawingml/2006/main" xmlns:r="http://schemas.openxmlformats.org/officeDocument/2006/relationships" xmlns:p="http://schemas.openxmlformats.org/presentationml/2006/main">
-  <p:cSld>
-    <p:spTree>
-      <p:nvGrpSpPr>
-        <p:cNvPr id="1" name=""/>
-        <p:cNvGrpSpPr/>
-        <p:nvPr/>
-      </p:nvGrpSpPr>
-      <p:grpSpPr>
-        <a:xfrm>
-          <a:off x="0" y="0"/>
-          <a:ext cx="0" cy="0"/>
-          <a:chOff x="0" y="0"/>
-          <a:chExt cx="0" cy="0"/>
-        </a:xfrm>
-      </p:grpSpPr>
-      <p:pic>
-        <p:nvPicPr>
-          <p:cNvPr id="1026" name="Picture 2" descr="Python Data Types – PYnative">
-            <a:extLst>
-              <a:ext uri="{FF2B5EF4-FFF2-40B4-BE49-F238E27FC236}">
-                <a16:creationId xmlns:a16="http://schemas.microsoft.com/office/drawing/2014/main" id="{56597BF9-7BA9-4FF7-95D0-F8C4362F5209}"/>
-              </a:ext>
-            </a:extLst>
-          </p:cNvPr>
-          <p:cNvPicPr>
-            <a:picLocks noChangeAspect="1" noChangeArrowheads="1"/>
-          </p:cNvPicPr>
-          <p:nvPr/>
-        </p:nvPicPr>
-        <p:blipFill>
-          <a:blip r:embed="rId3">
-            <a:extLst>
-              <a:ext uri="{28A0092B-C50C-407E-A947-70E740481C1C}">
-                <a14:useLocalDpi xmlns:a14="http://schemas.microsoft.com/office/drawing/2010/main" val="0"/>
-              </a:ext>
-            </a:extLst>
-          </a:blip>
-          <a:srcRect/>
-          <a:stretch>
-            <a:fillRect/>
-          </a:stretch>
-        </p:blipFill>
-        <p:spPr bwMode="auto">
-          <a:xfrm>
-            <a:off x="3152775" y="862012"/>
-            <a:ext cx="5886450" cy="5133975"/>
-          </a:xfrm>
-          <a:prstGeom prst="rect">
-            <a:avLst/>
-          </a:prstGeom>
-          <a:noFill/>
-          <a:extLst>
-            <a:ext uri="{909E8E84-426E-40DD-AFC4-6F175D3DCCD1}">
-              <a14:hiddenFill xmlns:a14="http://schemas.microsoft.com/office/drawing/2010/main">
-                <a:solidFill>
-                  <a:srgbClr val="FFFFFF"/>
-                </a:solidFill>
-              </a14:hiddenFill>
-            </a:ext>
-          </a:extLst>
-        </p:spPr>
-      </p:pic>
-      <p:sp>
-        <p:nvSpPr>
-          <p:cNvPr id="3" name="TextBox 2">
-            <a:extLst>
-              <a:ext uri="{FF2B5EF4-FFF2-40B4-BE49-F238E27FC236}">
-                <a16:creationId xmlns:a16="http://schemas.microsoft.com/office/drawing/2014/main" id="{A187EEFE-7DF5-468D-A426-71737BD128AA}"/>
-              </a:ext>
-            </a:extLst>
-          </p:cNvPr>
-          <p:cNvSpPr txBox="1"/>
-          <p:nvPr/>
-        </p:nvSpPr>
-        <p:spPr>
-          <a:xfrm>
-            <a:off x="0" y="6550223"/>
-            <a:ext cx="12192000" cy="307777"/>
-          </a:xfrm>
-          <a:prstGeom prst="rect">
-            <a:avLst/>
-          </a:prstGeom>
-          <a:noFill/>
-        </p:spPr>
-        <p:txBody>
-          <a:bodyPr wrap="square" rtlCol="0">
-            <a:spAutoFit/>
-          </a:bodyPr>
-          <a:lstStyle/>
-          <a:p>
-            <a:pPr marL="0" marR="0" lvl="0" indent="0" algn="l" defTabSz="914400" rtl="0" eaLnBrk="1" fontAlgn="auto" latinLnBrk="0" hangingPunct="1">
-              <a:lnSpc>
-                <a:spcPct val="100000"/>
-              </a:lnSpc>
-              <a:spcBef>
-                <a:spcPts val="0"/>
-              </a:spcBef>
-              <a:spcAft>
-                <a:spcPts val="0"/>
-              </a:spcAft>
-              <a:buClrTx/>
-              <a:buSzTx/>
-              <a:buFontTx/>
-              <a:buNone/>
-              <a:tabLst/>
-              <a:defRPr/>
-            </a:pPr>
-            <a:r>
-              <a:rPr lang="en-US" sz="1400" dirty="0">
-                <a:solidFill>
-                  <a:schemeClr val="tx1">
-                    <a:lumMod val="65000"/>
-                    <a:lumOff val="35000"/>
-                  </a:schemeClr>
-                </a:solidFill>
-                <a:latin typeface="+mj-lt"/>
-                <a:ea typeface="Verdana" panose="020B0604030504040204" pitchFamily="34" charset="0"/>
-              </a:rPr>
-              <a:t>Image Credit: </a:t>
-            </a:r>
-            <a:r>
-              <a:rPr lang="en-US" sz="1400" dirty="0">
-                <a:solidFill>
-                  <a:schemeClr val="tx1">
-                    <a:lumMod val="65000"/>
-                    <a:lumOff val="35000"/>
-                  </a:schemeClr>
-                </a:solidFill>
-                <a:latin typeface="+mj-lt"/>
-              </a:rPr>
-              <a:t>https://pynative.com/python-data-types/</a:t>
-            </a:r>
-          </a:p>
-        </p:txBody>
-      </p:sp>
-    </p:spTree>
-    <p:extLst>
-      <p:ext uri="{BB962C8B-B14F-4D97-AF65-F5344CB8AC3E}">
-        <p14:creationId xmlns:p14="http://schemas.microsoft.com/office/powerpoint/2010/main" val="170311557"/>
-      </p:ext>
-    </p:extLst>
-  </p:cSld>
-  <p:clrMapOvr>
-    <a:masterClrMapping/>
-  </p:clrMapOvr>
-  <mc:AlternateContent xmlns:mc="http://schemas.openxmlformats.org/markup-compatibility/2006" xmlns:p14="http://schemas.microsoft.com/office/powerpoint/2010/main">
-    <mc:Choice Requires="p14">
-      <p:transition spd="med" p14:dur="700">
-        <p:fade/>
-      </p:transition>
-    </mc:Choice>
-    <mc:Fallback xmlns="">
-      <p:transition spd="med">
-        <p:fade/>
-      </p:transition>
-    </mc:Fallback>
-  </mc:AlternateContent>
-</p:sld>
-</file>
-
-<file path=ppt/slides/slide9.xml><?xml version="1.0" encoding="utf-8"?>
-<p:sld xmlns:a="http://schemas.openxmlformats.org/drawingml/2006/main" xmlns:r="http://schemas.openxmlformats.org/officeDocument/2006/relationships" xmlns:p="http://schemas.openxmlformats.org/presentationml/2006/main">
-  <p:cSld>
-    <p:spTree>
-      <p:nvGrpSpPr>
-        <p:cNvPr id="1" name=""/>
-        <p:cNvGrpSpPr/>
-        <p:nvPr/>
-      </p:nvGrpSpPr>
-      <p:grpSpPr>
-        <a:xfrm>
-          <a:off x="0" y="0"/>
-          <a:ext cx="0" cy="0"/>
-          <a:chOff x="0" y="0"/>
-          <a:chExt cx="0" cy="0"/>
-        </a:xfrm>
-      </p:grpSpPr>
-      <p:pic>
-        <p:nvPicPr>
-          <p:cNvPr id="2050" name="Picture 2" descr="Icon of Adam Naming the Animals - 15th c. Meteora - (1AA10) - Uncut  Mountain Supply">
-            <a:extLst>
-              <a:ext uri="{FF2B5EF4-FFF2-40B4-BE49-F238E27FC236}">
-                <a16:creationId xmlns:a16="http://schemas.microsoft.com/office/drawing/2014/main" id="{A8A604AE-38F9-4BA8-858C-E33429DF7680}"/>
-              </a:ext>
-            </a:extLst>
-          </p:cNvPr>
-          <p:cNvPicPr>
-            <a:picLocks noChangeAspect="1" noChangeArrowheads="1"/>
-          </p:cNvPicPr>
-          <p:nvPr/>
-        </p:nvPicPr>
-        <p:blipFill>
-          <a:blip r:embed="rId3">
-            <a:extLst>
-              <a:ext uri="{28A0092B-C50C-407E-A947-70E740481C1C}">
-                <a14:useLocalDpi xmlns:a14="http://schemas.microsoft.com/office/drawing/2010/main" val="0"/>
-              </a:ext>
-            </a:extLst>
-          </a:blip>
-          <a:srcRect/>
-          <a:stretch>
-            <a:fillRect/>
-          </a:stretch>
-        </p:blipFill>
-        <p:spPr bwMode="auto">
-          <a:xfrm>
-            <a:off x="2785598" y="1290062"/>
-            <a:ext cx="6620804" cy="4277875"/>
-          </a:xfrm>
-          <a:prstGeom prst="rect">
-            <a:avLst/>
-          </a:prstGeom>
-          <a:noFill/>
-          <a:ln w="3175">
-            <a:solidFill>
-              <a:schemeClr val="tx1">
-                <a:lumMod val="75000"/>
-                <a:lumOff val="25000"/>
-              </a:schemeClr>
-            </a:solidFill>
-          </a:ln>
-          <a:effectLst>
-            <a:outerShdw blurRad="50800" dist="38100" dir="2700000" algn="tl" rotWithShape="0">
-              <a:prstClr val="black">
-                <a:alpha val="40000"/>
-              </a:prstClr>
-            </a:outerShdw>
-          </a:effectLst>
-          <a:extLst>
-            <a:ext uri="{909E8E84-426E-40DD-AFC4-6F175D3DCCD1}">
-              <a14:hiddenFill xmlns:a14="http://schemas.microsoft.com/office/drawing/2010/main">
-                <a:solidFill>
-                  <a:srgbClr val="FFFFFF"/>
-                </a:solidFill>
-              </a14:hiddenFill>
-            </a:ext>
-          </a:extLst>
-        </p:spPr>
-      </p:pic>
-      <p:sp>
-        <p:nvSpPr>
-          <p:cNvPr id="6" name="TextBox 5">
-            <a:extLst>
-              <a:ext uri="{FF2B5EF4-FFF2-40B4-BE49-F238E27FC236}">
-                <a16:creationId xmlns:a16="http://schemas.microsoft.com/office/drawing/2014/main" id="{29F3E589-6F1A-4BB3-B969-F58FCA3DE9E0}"/>
-              </a:ext>
-            </a:extLst>
-          </p:cNvPr>
-          <p:cNvSpPr txBox="1"/>
-          <p:nvPr/>
-        </p:nvSpPr>
-        <p:spPr>
-          <a:xfrm>
-            <a:off x="0" y="6550223"/>
-            <a:ext cx="12192000" cy="307777"/>
-          </a:xfrm>
-          <a:prstGeom prst="rect">
-            <a:avLst/>
-          </a:prstGeom>
-          <a:noFill/>
-        </p:spPr>
-        <p:txBody>
-          <a:bodyPr wrap="square" rtlCol="0">
-            <a:spAutoFit/>
-          </a:bodyPr>
-          <a:lstStyle/>
-          <a:p>
-            <a:r>
-              <a:rPr lang="en-US" sz="1400" dirty="0">
-                <a:solidFill>
-                  <a:schemeClr val="tx1">
-                    <a:lumMod val="65000"/>
-                    <a:lumOff val="35000"/>
-                  </a:schemeClr>
-                </a:solidFill>
-                <a:latin typeface="+mj-lt"/>
-                <a:ea typeface="Verdana" panose="020B0604030504040204" pitchFamily="34" charset="0"/>
-              </a:rPr>
-              <a:t>Image Credit: </a:t>
-            </a:r>
-            <a:r>
-              <a:rPr lang="en-US" sz="1400" dirty="0">
-                <a:solidFill>
-                  <a:schemeClr val="tx1">
-                    <a:lumMod val="65000"/>
-                    <a:lumOff val="35000"/>
-                  </a:schemeClr>
-                </a:solidFill>
-                <a:latin typeface="+mj-lt"/>
-              </a:rPr>
-              <a:t>https://www.uncutmountainsupply.com/icons/of-saints/by-name/a/icon-of-adam-naming-the-animals-15th-c-meteora-1aa10/</a:t>
-            </a:r>
-            <a:endParaRPr lang="en-US" sz="1400" dirty="0">
-              <a:solidFill>
-                <a:schemeClr val="tx1">
-                  <a:lumMod val="65000"/>
-                  <a:lumOff val="35000"/>
-                </a:schemeClr>
-              </a:solidFill>
-              <a:latin typeface="+mj-lt"/>
-              <a:ea typeface="Verdana" panose="020B0604030504040204" pitchFamily="34" charset="0"/>
-            </a:endParaRPr>
-          </a:p>
-        </p:txBody>
-      </p:sp>
-    </p:spTree>
-    <p:extLst>
-      <p:ext uri="{BB962C8B-B14F-4D97-AF65-F5344CB8AC3E}">
-        <p14:creationId xmlns:p14="http://schemas.microsoft.com/office/powerpoint/2010/main" val="4083169647"/>
       </p:ext>
     </p:extLst>
   </p:cSld>

</xml_diff>